<commit_message>
Start action filters slides
</commit_message>
<xml_diff>
--- a/AspNetCoreMVC.pptx
+++ b/AspNetCoreMVC.pptx
@@ -5,7 +5,7 @@
     <p:sldMasterId id="2147483648" r:id="rId1"/>
   </p:sldMasterIdLst>
   <p:notesMasterIdLst>
-    <p:notesMasterId r:id="rId26"/>
+    <p:notesMasterId r:id="rId29"/>
   </p:notesMasterIdLst>
   <p:sldIdLst>
     <p:sldId id="256" r:id="rId2"/>
@@ -32,6 +32,9 @@
     <p:sldId id="277" r:id="rId23"/>
     <p:sldId id="278" r:id="rId24"/>
     <p:sldId id="279" r:id="rId25"/>
+    <p:sldId id="280" r:id="rId26"/>
+    <p:sldId id="281" r:id="rId27"/>
+    <p:sldId id="282" r:id="rId28"/>
   </p:sldIdLst>
   <p:sldSz cx="12192000" cy="6858000"/>
   <p:notesSz cx="6858000" cy="9144000"/>
@@ -220,7 +223,7 @@
           <a:p>
             <a:fld id="{1747B90C-FE49-44DE-93E7-FA9DDECBEA03}" type="datetimeFigureOut">
               <a:rPr lang="en-US" smtClean="0"/>
-              <a:t>25-Sep-19</a:t>
+              <a:t>28-Sep-19</a:t>
             </a:fld>
             <a:endParaRPr lang="en-US"/>
           </a:p>
@@ -572,6 +575,192 @@
 </p:notes>
 </file>
 
+<file path=ppt/notesSlides/notesSlide2.xml><?xml version="1.0" encoding="utf-8"?>
+<p:notes xmlns:a="http://schemas.openxmlformats.org/drawingml/2006/main" xmlns:r="http://schemas.openxmlformats.org/officeDocument/2006/relationships" xmlns:p="http://schemas.openxmlformats.org/presentationml/2006/main">
+  <p:cSld>
+    <p:spTree>
+      <p:nvGrpSpPr>
+        <p:cNvPr id="1" name=""/>
+        <p:cNvGrpSpPr/>
+        <p:nvPr/>
+      </p:nvGrpSpPr>
+      <p:grpSpPr>
+        <a:xfrm>
+          <a:off x="0" y="0"/>
+          <a:ext cx="0" cy="0"/>
+          <a:chOff x="0" y="0"/>
+          <a:chExt cx="0" cy="0"/>
+        </a:xfrm>
+      </p:grpSpPr>
+      <p:sp>
+        <p:nvSpPr>
+          <p:cNvPr id="2" name="Slide Image Placeholder 1"/>
+          <p:cNvSpPr>
+            <a:spLocks noGrp="1" noRot="1" noChangeAspect="1"/>
+          </p:cNvSpPr>
+          <p:nvPr>
+            <p:ph type="sldImg"/>
+          </p:nvPr>
+        </p:nvSpPr>
+        <p:spPr/>
+      </p:sp>
+      <p:sp>
+        <p:nvSpPr>
+          <p:cNvPr id="3" name="Notes Placeholder 2"/>
+          <p:cNvSpPr>
+            <a:spLocks noGrp="1"/>
+          </p:cNvSpPr>
+          <p:nvPr>
+            <p:ph type="body" idx="1"/>
+          </p:nvPr>
+        </p:nvSpPr>
+        <p:spPr/>
+        <p:txBody>
+          <a:bodyPr/>
+          <a:lstStyle/>
+          <a:p>
+            <a:r>
+              <a:rPr lang="en-US" dirty="0" err="1" smtClean="0"/>
+              <a:t>OnActionExecuting</a:t>
+            </a:r>
+            <a:r>
+              <a:rPr lang="en-US" baseline="0" dirty="0" smtClean="0"/>
+              <a:t> – before the action method is invoked</a:t>
+            </a:r>
+          </a:p>
+          <a:p>
+            <a:r>
+              <a:rPr lang="en-US" baseline="0" dirty="0" err="1" smtClean="0"/>
+              <a:t>OnActionExecuted</a:t>
+            </a:r>
+            <a:r>
+              <a:rPr lang="en-US" baseline="0" dirty="0" smtClean="0"/>
+              <a:t> – after </a:t>
+            </a:r>
+            <a:endParaRPr lang="en-US" dirty="0"/>
+          </a:p>
+        </p:txBody>
+      </p:sp>
+      <p:sp>
+        <p:nvSpPr>
+          <p:cNvPr id="4" name="Slide Number Placeholder 3"/>
+          <p:cNvSpPr>
+            <a:spLocks noGrp="1"/>
+          </p:cNvSpPr>
+          <p:nvPr>
+            <p:ph type="sldNum" sz="quarter" idx="10"/>
+          </p:nvPr>
+        </p:nvSpPr>
+        <p:spPr/>
+        <p:txBody>
+          <a:bodyPr/>
+          <a:lstStyle/>
+          <a:p>
+            <a:fld id="{BA1D5B97-ACF5-4677-A104-92B2393AA446}" type="slidenum">
+              <a:rPr lang="en-US" smtClean="0"/>
+              <a:t>25</a:t>
+            </a:fld>
+            <a:endParaRPr lang="en-US"/>
+          </a:p>
+        </p:txBody>
+      </p:sp>
+    </p:spTree>
+    <p:extLst>
+      <p:ext uri="{BB962C8B-B14F-4D97-AF65-F5344CB8AC3E}">
+        <p14:creationId xmlns:p14="http://schemas.microsoft.com/office/powerpoint/2010/main" val="1687305837"/>
+      </p:ext>
+    </p:extLst>
+  </p:cSld>
+  <p:clrMapOvr>
+    <a:masterClrMapping/>
+  </p:clrMapOvr>
+</p:notes>
+</file>
+
+<file path=ppt/notesSlides/notesSlide3.xml><?xml version="1.0" encoding="utf-8"?>
+<p:notes xmlns:a="http://schemas.openxmlformats.org/drawingml/2006/main" xmlns:r="http://schemas.openxmlformats.org/officeDocument/2006/relationships" xmlns:p="http://schemas.openxmlformats.org/presentationml/2006/main">
+  <p:cSld>
+    <p:spTree>
+      <p:nvGrpSpPr>
+        <p:cNvPr id="1" name=""/>
+        <p:cNvGrpSpPr/>
+        <p:nvPr/>
+      </p:nvGrpSpPr>
+      <p:grpSpPr>
+        <a:xfrm>
+          <a:off x="0" y="0"/>
+          <a:ext cx="0" cy="0"/>
+          <a:chOff x="0" y="0"/>
+          <a:chExt cx="0" cy="0"/>
+        </a:xfrm>
+      </p:grpSpPr>
+      <p:sp>
+        <p:nvSpPr>
+          <p:cNvPr id="2" name="Slide Image Placeholder 1"/>
+          <p:cNvSpPr>
+            <a:spLocks noGrp="1" noRot="1" noChangeAspect="1"/>
+          </p:cNvSpPr>
+          <p:nvPr>
+            <p:ph type="sldImg"/>
+          </p:nvPr>
+        </p:nvSpPr>
+        <p:spPr/>
+      </p:sp>
+      <p:sp>
+        <p:nvSpPr>
+          <p:cNvPr id="3" name="Notes Placeholder 2"/>
+          <p:cNvSpPr>
+            <a:spLocks noGrp="1"/>
+          </p:cNvSpPr>
+          <p:nvPr>
+            <p:ph type="body" idx="1"/>
+          </p:nvPr>
+        </p:nvSpPr>
+        <p:spPr/>
+        <p:txBody>
+          <a:bodyPr/>
+          <a:lstStyle/>
+          <a:p>
+            <a:endParaRPr lang="en-US" dirty="0"/>
+          </a:p>
+        </p:txBody>
+      </p:sp>
+      <p:sp>
+        <p:nvSpPr>
+          <p:cNvPr id="4" name="Slide Number Placeholder 3"/>
+          <p:cNvSpPr>
+            <a:spLocks noGrp="1"/>
+          </p:cNvSpPr>
+          <p:nvPr>
+            <p:ph type="sldNum" sz="quarter" idx="10"/>
+          </p:nvPr>
+        </p:nvSpPr>
+        <p:spPr/>
+        <p:txBody>
+          <a:bodyPr/>
+          <a:lstStyle/>
+          <a:p>
+            <a:fld id="{BA1D5B97-ACF5-4677-A104-92B2393AA446}" type="slidenum">
+              <a:rPr lang="en-US" smtClean="0"/>
+              <a:t>27</a:t>
+            </a:fld>
+            <a:endParaRPr lang="en-US"/>
+          </a:p>
+        </p:txBody>
+      </p:sp>
+    </p:spTree>
+    <p:extLst>
+      <p:ext uri="{BB962C8B-B14F-4D97-AF65-F5344CB8AC3E}">
+        <p14:creationId xmlns:p14="http://schemas.microsoft.com/office/powerpoint/2010/main" val="66650666"/>
+      </p:ext>
+    </p:extLst>
+  </p:cSld>
+  <p:clrMapOvr>
+    <a:masterClrMapping/>
+  </p:clrMapOvr>
+</p:notes>
+</file>
+
 <file path=ppt/slideLayouts/slideLayout1.xml><?xml version="1.0" encoding="utf-8"?>
 <p:sldLayout xmlns:a="http://schemas.openxmlformats.org/drawingml/2006/main" xmlns:r="http://schemas.openxmlformats.org/officeDocument/2006/relationships" xmlns:p="http://schemas.openxmlformats.org/presentationml/2006/main" type="title" preserve="1">
   <p:cSld name="Title Slide">
@@ -703,7 +892,7 @@
           <a:p>
             <a:fld id="{622E22BE-79DE-4FFF-A515-BF1CA8DF801A}" type="datetimeFigureOut">
               <a:rPr lang="en-US" smtClean="0"/>
-              <a:t>25-Sep-19</a:t>
+              <a:t>28-Sep-19</a:t>
             </a:fld>
             <a:endParaRPr lang="en-US"/>
           </a:p>
@@ -873,7 +1062,7 @@
           <a:p>
             <a:fld id="{622E22BE-79DE-4FFF-A515-BF1CA8DF801A}" type="datetimeFigureOut">
               <a:rPr lang="en-US" smtClean="0"/>
-              <a:t>25-Sep-19</a:t>
+              <a:t>28-Sep-19</a:t>
             </a:fld>
             <a:endParaRPr lang="en-US"/>
           </a:p>
@@ -1053,7 +1242,7 @@
           <a:p>
             <a:fld id="{622E22BE-79DE-4FFF-A515-BF1CA8DF801A}" type="datetimeFigureOut">
               <a:rPr lang="en-US" smtClean="0"/>
-              <a:t>25-Sep-19</a:t>
+              <a:t>28-Sep-19</a:t>
             </a:fld>
             <a:endParaRPr lang="en-US"/>
           </a:p>
@@ -1223,7 +1412,7 @@
           <a:p>
             <a:fld id="{622E22BE-79DE-4FFF-A515-BF1CA8DF801A}" type="datetimeFigureOut">
               <a:rPr lang="en-US" smtClean="0"/>
-              <a:t>25-Sep-19</a:t>
+              <a:t>28-Sep-19</a:t>
             </a:fld>
             <a:endParaRPr lang="en-US"/>
           </a:p>
@@ -1469,7 +1658,7 @@
           <a:p>
             <a:fld id="{622E22BE-79DE-4FFF-A515-BF1CA8DF801A}" type="datetimeFigureOut">
               <a:rPr lang="en-US" smtClean="0"/>
-              <a:t>25-Sep-19</a:t>
+              <a:t>28-Sep-19</a:t>
             </a:fld>
             <a:endParaRPr lang="en-US"/>
           </a:p>
@@ -1701,7 +1890,7 @@
           <a:p>
             <a:fld id="{622E22BE-79DE-4FFF-A515-BF1CA8DF801A}" type="datetimeFigureOut">
               <a:rPr lang="en-US" smtClean="0"/>
-              <a:t>25-Sep-19</a:t>
+              <a:t>28-Sep-19</a:t>
             </a:fld>
             <a:endParaRPr lang="en-US"/>
           </a:p>
@@ -2068,7 +2257,7 @@
           <a:p>
             <a:fld id="{622E22BE-79DE-4FFF-A515-BF1CA8DF801A}" type="datetimeFigureOut">
               <a:rPr lang="en-US" smtClean="0"/>
-              <a:t>25-Sep-19</a:t>
+              <a:t>28-Sep-19</a:t>
             </a:fld>
             <a:endParaRPr lang="en-US"/>
           </a:p>
@@ -2186,7 +2375,7 @@
           <a:p>
             <a:fld id="{622E22BE-79DE-4FFF-A515-BF1CA8DF801A}" type="datetimeFigureOut">
               <a:rPr lang="en-US" smtClean="0"/>
-              <a:t>25-Sep-19</a:t>
+              <a:t>28-Sep-19</a:t>
             </a:fld>
             <a:endParaRPr lang="en-US"/>
           </a:p>
@@ -2281,7 +2470,7 @@
           <a:p>
             <a:fld id="{622E22BE-79DE-4FFF-A515-BF1CA8DF801A}" type="datetimeFigureOut">
               <a:rPr lang="en-US" smtClean="0"/>
-              <a:t>25-Sep-19</a:t>
+              <a:t>28-Sep-19</a:t>
             </a:fld>
             <a:endParaRPr lang="en-US"/>
           </a:p>
@@ -2558,7 +2747,7 @@
           <a:p>
             <a:fld id="{622E22BE-79DE-4FFF-A515-BF1CA8DF801A}" type="datetimeFigureOut">
               <a:rPr lang="en-US" smtClean="0"/>
-              <a:t>25-Sep-19</a:t>
+              <a:t>28-Sep-19</a:t>
             </a:fld>
             <a:endParaRPr lang="en-US"/>
           </a:p>
@@ -2811,7 +3000,7 @@
           <a:p>
             <a:fld id="{622E22BE-79DE-4FFF-A515-BF1CA8DF801A}" type="datetimeFigureOut">
               <a:rPr lang="en-US" smtClean="0"/>
-              <a:t>25-Sep-19</a:t>
+              <a:t>28-Sep-19</a:t>
             </a:fld>
             <a:endParaRPr lang="en-US"/>
           </a:p>
@@ -3024,7 +3213,7 @@
           <a:p>
             <a:fld id="{622E22BE-79DE-4FFF-A515-BF1CA8DF801A}" type="datetimeFigureOut">
               <a:rPr lang="en-US" smtClean="0"/>
-              <a:t>25-Sep-19</a:t>
+              <a:t>28-Sep-19</a:t>
             </a:fld>
             <a:endParaRPr lang="en-US"/>
           </a:p>
@@ -5035,7 +5224,6 @@
               <a:rPr lang="en-US" dirty="0"/>
               <a:t>}</a:t>
             </a:r>
-            <a:endParaRPr lang="en-US" dirty="0"/>
           </a:p>
         </p:txBody>
       </p:sp>
@@ -5938,6 +6126,841 @@
     <p:extLst>
       <p:ext uri="{BB962C8B-B14F-4D97-AF65-F5344CB8AC3E}">
         <p14:creationId xmlns:p14="http://schemas.microsoft.com/office/powerpoint/2010/main" val="414908481"/>
+      </p:ext>
+    </p:extLst>
+  </p:cSld>
+  <p:clrMapOvr>
+    <a:masterClrMapping/>
+  </p:clrMapOvr>
+  <p:timing>
+    <p:tnLst>
+      <p:par>
+        <p:cTn id="1" dur="indefinite" restart="never" nodeType="tmRoot"/>
+      </p:par>
+    </p:tnLst>
+  </p:timing>
+</p:sld>
+</file>
+
+<file path=ppt/slides/slide25.xml><?xml version="1.0" encoding="utf-8"?>
+<p:sld xmlns:a="http://schemas.openxmlformats.org/drawingml/2006/main" xmlns:r="http://schemas.openxmlformats.org/officeDocument/2006/relationships" xmlns:p="http://schemas.openxmlformats.org/presentationml/2006/main">
+  <p:cSld>
+    <p:bg>
+      <p:bgPr>
+        <a:gradFill>
+          <a:gsLst>
+            <a:gs pos="0">
+              <a:schemeClr val="accent1">
+                <a:lumMod val="5000"/>
+                <a:lumOff val="95000"/>
+              </a:schemeClr>
+            </a:gs>
+            <a:gs pos="42000">
+              <a:schemeClr val="accent1">
+                <a:lumMod val="45000"/>
+                <a:lumOff val="55000"/>
+              </a:schemeClr>
+            </a:gs>
+            <a:gs pos="83000">
+              <a:schemeClr val="accent1">
+                <a:lumMod val="45000"/>
+                <a:lumOff val="55000"/>
+              </a:schemeClr>
+            </a:gs>
+            <a:gs pos="100000">
+              <a:schemeClr val="accent1">
+                <a:lumMod val="30000"/>
+                <a:lumOff val="70000"/>
+              </a:schemeClr>
+            </a:gs>
+          </a:gsLst>
+          <a:lin ang="5400000" scaled="1"/>
+        </a:gradFill>
+        <a:effectLst/>
+      </p:bgPr>
+    </p:bg>
+    <p:spTree>
+      <p:nvGrpSpPr>
+        <p:cNvPr id="1" name=""/>
+        <p:cNvGrpSpPr/>
+        <p:nvPr/>
+      </p:nvGrpSpPr>
+      <p:grpSpPr>
+        <a:xfrm>
+          <a:off x="0" y="0"/>
+          <a:ext cx="0" cy="0"/>
+          <a:chOff x="0" y="0"/>
+          <a:chExt cx="0" cy="0"/>
+        </a:xfrm>
+      </p:grpSpPr>
+      <p:sp>
+        <p:nvSpPr>
+          <p:cNvPr id="2" name="Title 1"/>
+          <p:cNvSpPr>
+            <a:spLocks noGrp="1"/>
+          </p:cNvSpPr>
+          <p:nvPr>
+            <p:ph type="title"/>
+          </p:nvPr>
+        </p:nvSpPr>
+        <p:spPr/>
+        <p:txBody>
+          <a:bodyPr/>
+          <a:lstStyle/>
+          <a:p>
+            <a:r>
+              <a:rPr lang="en-US" dirty="0" smtClean="0"/>
+              <a:t>Action Filters</a:t>
+            </a:r>
+            <a:endParaRPr lang="en-US" dirty="0"/>
+          </a:p>
+        </p:txBody>
+      </p:sp>
+      <p:sp>
+        <p:nvSpPr>
+          <p:cNvPr id="3" name="Rectangle 2"/>
+          <p:cNvSpPr/>
+          <p:nvPr/>
+        </p:nvSpPr>
+        <p:spPr>
+          <a:xfrm>
+            <a:off x="299206" y="1892022"/>
+            <a:ext cx="11892794" cy="4401205"/>
+          </a:xfrm>
+          <a:prstGeom prst="rect">
+            <a:avLst/>
+          </a:prstGeom>
+        </p:spPr>
+        <p:txBody>
+          <a:bodyPr wrap="square">
+            <a:spAutoFit/>
+          </a:bodyPr>
+          <a:lstStyle/>
+          <a:p>
+            <a:r>
+              <a:rPr lang="en-US" sz="2800" dirty="0">
+                <a:latin typeface="Consolas" panose="020B0609020204030204" pitchFamily="49" charset="0"/>
+              </a:rPr>
+              <a:t>namespace </a:t>
+            </a:r>
+            <a:r>
+              <a:rPr lang="en-US" sz="2800" dirty="0" err="1">
+                <a:latin typeface="Consolas" panose="020B0609020204030204" pitchFamily="49" charset="0"/>
+              </a:rPr>
+              <a:t>Microsoft.AspNetCore.Mvc.Filters</a:t>
+            </a:r>
+            <a:r>
+              <a:rPr lang="en-US" sz="2800" dirty="0">
+                <a:latin typeface="Consolas" panose="020B0609020204030204" pitchFamily="49" charset="0"/>
+              </a:rPr>
+              <a:t> </a:t>
+            </a:r>
+            <a:r>
+              <a:rPr lang="en-US" sz="2800" dirty="0" smtClean="0">
+                <a:latin typeface="Consolas" panose="020B0609020204030204" pitchFamily="49" charset="0"/>
+              </a:rPr>
+              <a:t>{</a:t>
+            </a:r>
+          </a:p>
+          <a:p>
+            <a:endParaRPr lang="en-US" sz="2800" dirty="0">
+              <a:latin typeface="Consolas" panose="020B0609020204030204" pitchFamily="49" charset="0"/>
+            </a:endParaRPr>
+          </a:p>
+          <a:p>
+            <a:r>
+              <a:rPr lang="en-US" sz="2800" dirty="0" smtClean="0">
+                <a:latin typeface="Consolas" panose="020B0609020204030204" pitchFamily="49" charset="0"/>
+              </a:rPr>
+              <a:t>	public </a:t>
+            </a:r>
+            <a:r>
+              <a:rPr lang="en-US" sz="2800" dirty="0">
+                <a:latin typeface="Consolas" panose="020B0609020204030204" pitchFamily="49" charset="0"/>
+              </a:rPr>
+              <a:t>interface </a:t>
+            </a:r>
+            <a:r>
+              <a:rPr lang="en-US" sz="2800" dirty="0" err="1">
+                <a:latin typeface="Consolas" panose="020B0609020204030204" pitchFamily="49" charset="0"/>
+              </a:rPr>
+              <a:t>IActionFilter</a:t>
+            </a:r>
+            <a:r>
+              <a:rPr lang="en-US" sz="2800" dirty="0">
+                <a:latin typeface="Consolas" panose="020B0609020204030204" pitchFamily="49" charset="0"/>
+              </a:rPr>
+              <a:t> : </a:t>
+            </a:r>
+            <a:r>
+              <a:rPr lang="en-US" sz="2800" dirty="0" err="1">
+                <a:latin typeface="Consolas" panose="020B0609020204030204" pitchFamily="49" charset="0"/>
+              </a:rPr>
+              <a:t>IFilterMetadata</a:t>
+            </a:r>
+            <a:r>
+              <a:rPr lang="en-US" sz="2800" dirty="0">
+                <a:latin typeface="Consolas" panose="020B0609020204030204" pitchFamily="49" charset="0"/>
+              </a:rPr>
+              <a:t> </a:t>
+            </a:r>
+            <a:r>
+              <a:rPr lang="en-US" sz="2800" dirty="0" smtClean="0">
+                <a:latin typeface="Consolas" panose="020B0609020204030204" pitchFamily="49" charset="0"/>
+              </a:rPr>
+              <a:t>{</a:t>
+            </a:r>
+          </a:p>
+          <a:p>
+            <a:endParaRPr lang="en-US" sz="2800" dirty="0">
+              <a:latin typeface="Consolas" panose="020B0609020204030204" pitchFamily="49" charset="0"/>
+            </a:endParaRPr>
+          </a:p>
+          <a:p>
+            <a:r>
+              <a:rPr lang="en-US" sz="2800" dirty="0" smtClean="0">
+                <a:latin typeface="Consolas" panose="020B0609020204030204" pitchFamily="49" charset="0"/>
+              </a:rPr>
+              <a:t>	void </a:t>
+            </a:r>
+            <a:r>
+              <a:rPr lang="en-US" sz="2800" dirty="0" err="1">
+                <a:latin typeface="Consolas" panose="020B0609020204030204" pitchFamily="49" charset="0"/>
+              </a:rPr>
+              <a:t>OnActionExecuting</a:t>
+            </a:r>
+            <a:r>
+              <a:rPr lang="en-US" sz="2800" dirty="0">
+                <a:latin typeface="Consolas" panose="020B0609020204030204" pitchFamily="49" charset="0"/>
+              </a:rPr>
+              <a:t>(</a:t>
+            </a:r>
+            <a:r>
+              <a:rPr lang="en-US" sz="2800" dirty="0" err="1">
+                <a:solidFill>
+                  <a:srgbClr val="FF0000"/>
+                </a:solidFill>
+                <a:latin typeface="Consolas" panose="020B0609020204030204" pitchFamily="49" charset="0"/>
+              </a:rPr>
+              <a:t>ActionExecutingContext</a:t>
+            </a:r>
+            <a:r>
+              <a:rPr lang="en-US" sz="2800" dirty="0">
+                <a:latin typeface="Consolas" panose="020B0609020204030204" pitchFamily="49" charset="0"/>
+              </a:rPr>
+              <a:t> context</a:t>
+            </a:r>
+            <a:r>
+              <a:rPr lang="en-US" sz="2800" dirty="0" smtClean="0">
+                <a:latin typeface="Consolas" panose="020B0609020204030204" pitchFamily="49" charset="0"/>
+              </a:rPr>
+              <a:t>);</a:t>
+            </a:r>
+          </a:p>
+          <a:p>
+            <a:endParaRPr lang="en-US" sz="2800" dirty="0">
+              <a:latin typeface="Consolas" panose="020B0609020204030204" pitchFamily="49" charset="0"/>
+            </a:endParaRPr>
+          </a:p>
+          <a:p>
+            <a:r>
+              <a:rPr lang="en-US" sz="2800" dirty="0" smtClean="0">
+                <a:latin typeface="Consolas" panose="020B0609020204030204" pitchFamily="49" charset="0"/>
+              </a:rPr>
+              <a:t>	void </a:t>
+            </a:r>
+            <a:r>
+              <a:rPr lang="en-US" sz="2800" dirty="0" err="1">
+                <a:latin typeface="Consolas" panose="020B0609020204030204" pitchFamily="49" charset="0"/>
+              </a:rPr>
+              <a:t>OnActionExecuted</a:t>
+            </a:r>
+            <a:r>
+              <a:rPr lang="en-US" sz="2800" dirty="0">
+                <a:latin typeface="Consolas" panose="020B0609020204030204" pitchFamily="49" charset="0"/>
+              </a:rPr>
+              <a:t>(</a:t>
+            </a:r>
+            <a:r>
+              <a:rPr lang="en-US" sz="2800" dirty="0" err="1">
+                <a:solidFill>
+                  <a:srgbClr val="FF0000"/>
+                </a:solidFill>
+                <a:latin typeface="Consolas" panose="020B0609020204030204" pitchFamily="49" charset="0"/>
+              </a:rPr>
+              <a:t>ActionExecutedContext</a:t>
+            </a:r>
+            <a:r>
+              <a:rPr lang="en-US" sz="2800" dirty="0">
+                <a:latin typeface="Consolas" panose="020B0609020204030204" pitchFamily="49" charset="0"/>
+              </a:rPr>
+              <a:t> context</a:t>
+            </a:r>
+            <a:r>
+              <a:rPr lang="en-US" sz="2800" dirty="0" smtClean="0">
+                <a:latin typeface="Consolas" panose="020B0609020204030204" pitchFamily="49" charset="0"/>
+              </a:rPr>
+              <a:t>);</a:t>
+            </a:r>
+          </a:p>
+          <a:p>
+            <a:endParaRPr lang="en-US" sz="2800" dirty="0">
+              <a:latin typeface="Consolas" panose="020B0609020204030204" pitchFamily="49" charset="0"/>
+            </a:endParaRPr>
+          </a:p>
+          <a:p>
+            <a:r>
+              <a:rPr lang="en-US" sz="2800" dirty="0" smtClean="0">
+                <a:latin typeface="Consolas" panose="020B0609020204030204" pitchFamily="49" charset="0"/>
+              </a:rPr>
+              <a:t>	}</a:t>
+            </a:r>
+            <a:endParaRPr lang="en-US" sz="2800" dirty="0">
+              <a:latin typeface="Consolas" panose="020B0609020204030204" pitchFamily="49" charset="0"/>
+            </a:endParaRPr>
+          </a:p>
+          <a:p>
+            <a:r>
+              <a:rPr lang="en-US" sz="2800" dirty="0">
+                <a:latin typeface="Consolas" panose="020B0609020204030204" pitchFamily="49" charset="0"/>
+              </a:rPr>
+              <a:t>}</a:t>
+            </a:r>
+          </a:p>
+        </p:txBody>
+      </p:sp>
+    </p:spTree>
+    <p:extLst>
+      <p:ext uri="{BB962C8B-B14F-4D97-AF65-F5344CB8AC3E}">
+        <p14:creationId xmlns:p14="http://schemas.microsoft.com/office/powerpoint/2010/main" val="1074381049"/>
+      </p:ext>
+    </p:extLst>
+  </p:cSld>
+  <p:clrMapOvr>
+    <a:masterClrMapping/>
+  </p:clrMapOvr>
+  <p:timing>
+    <p:tnLst>
+      <p:par>
+        <p:cTn id="1" dur="indefinite" restart="never" nodeType="tmRoot"/>
+      </p:par>
+    </p:tnLst>
+  </p:timing>
+</p:sld>
+</file>
+
+<file path=ppt/slides/slide26.xml><?xml version="1.0" encoding="utf-8"?>
+<p:sld xmlns:a="http://schemas.openxmlformats.org/drawingml/2006/main" xmlns:r="http://schemas.openxmlformats.org/officeDocument/2006/relationships" xmlns:p="http://schemas.openxmlformats.org/presentationml/2006/main">
+  <p:cSld>
+    <p:bg>
+      <p:bgPr>
+        <a:gradFill>
+          <a:gsLst>
+            <a:gs pos="0">
+              <a:schemeClr val="accent1">
+                <a:lumMod val="5000"/>
+                <a:lumOff val="95000"/>
+              </a:schemeClr>
+            </a:gs>
+            <a:gs pos="42000">
+              <a:schemeClr val="accent1">
+                <a:lumMod val="45000"/>
+                <a:lumOff val="55000"/>
+              </a:schemeClr>
+            </a:gs>
+            <a:gs pos="83000">
+              <a:schemeClr val="accent1">
+                <a:lumMod val="45000"/>
+                <a:lumOff val="55000"/>
+              </a:schemeClr>
+            </a:gs>
+            <a:gs pos="100000">
+              <a:schemeClr val="accent1">
+                <a:lumMod val="30000"/>
+                <a:lumOff val="70000"/>
+              </a:schemeClr>
+            </a:gs>
+          </a:gsLst>
+          <a:lin ang="5400000" scaled="1"/>
+        </a:gradFill>
+        <a:effectLst/>
+      </p:bgPr>
+    </p:bg>
+    <p:spTree>
+      <p:nvGrpSpPr>
+        <p:cNvPr id="1" name=""/>
+        <p:cNvGrpSpPr/>
+        <p:nvPr/>
+      </p:nvGrpSpPr>
+      <p:grpSpPr>
+        <a:xfrm>
+          <a:off x="0" y="0"/>
+          <a:ext cx="0" cy="0"/>
+          <a:chOff x="0" y="0"/>
+          <a:chExt cx="0" cy="0"/>
+        </a:xfrm>
+      </p:grpSpPr>
+      <p:sp>
+        <p:nvSpPr>
+          <p:cNvPr id="2" name="Title 1"/>
+          <p:cNvSpPr>
+            <a:spLocks noGrp="1"/>
+          </p:cNvSpPr>
+          <p:nvPr>
+            <p:ph type="title"/>
+          </p:nvPr>
+        </p:nvSpPr>
+        <p:spPr/>
+        <p:txBody>
+          <a:bodyPr/>
+          <a:lstStyle/>
+          <a:p>
+            <a:r>
+              <a:rPr lang="en-US" dirty="0" smtClean="0"/>
+              <a:t>Action Filters</a:t>
+            </a:r>
+            <a:endParaRPr lang="en-US" dirty="0"/>
+          </a:p>
+        </p:txBody>
+      </p:sp>
+      <p:sp>
+        <p:nvSpPr>
+          <p:cNvPr id="3" name="Rectangle 2"/>
+          <p:cNvSpPr/>
+          <p:nvPr/>
+        </p:nvSpPr>
+        <p:spPr>
+          <a:xfrm>
+            <a:off x="299206" y="1892022"/>
+            <a:ext cx="11892794" cy="3539430"/>
+          </a:xfrm>
+          <a:prstGeom prst="rect">
+            <a:avLst/>
+          </a:prstGeom>
+        </p:spPr>
+        <p:txBody>
+          <a:bodyPr wrap="square">
+            <a:spAutoFit/>
+          </a:bodyPr>
+          <a:lstStyle/>
+          <a:p>
+            <a:r>
+              <a:rPr lang="en-US" sz="2800" dirty="0" err="1" smtClean="0">
+                <a:latin typeface="Consolas" panose="020B0609020204030204" pitchFamily="49" charset="0"/>
+              </a:rPr>
+              <a:t>ActionExecutingContext</a:t>
+            </a:r>
+            <a:r>
+              <a:rPr lang="en-US" sz="2800" dirty="0" smtClean="0">
+                <a:latin typeface="Consolas" panose="020B0609020204030204" pitchFamily="49" charset="0"/>
+              </a:rPr>
+              <a:t> properties:</a:t>
+            </a:r>
+          </a:p>
+          <a:p>
+            <a:endParaRPr lang="en-US" sz="2800" dirty="0">
+              <a:latin typeface="Consolas" panose="020B0609020204030204" pitchFamily="49" charset="0"/>
+            </a:endParaRPr>
+          </a:p>
+          <a:p>
+            <a:pPr marL="457200" indent="-457200">
+              <a:buFont typeface="Arial" panose="020B0604020202020204" pitchFamily="34" charset="0"/>
+              <a:buChar char="•"/>
+            </a:pPr>
+            <a:r>
+              <a:rPr lang="en-US" sz="2800" dirty="0" smtClean="0">
+                <a:latin typeface="Consolas" panose="020B0609020204030204" pitchFamily="49" charset="0"/>
+              </a:rPr>
+              <a:t> </a:t>
+            </a:r>
+            <a:r>
+              <a:rPr lang="en-US" sz="2800" dirty="0" smtClean="0">
+                <a:solidFill>
+                  <a:srgbClr val="C00000"/>
+                </a:solidFill>
+                <a:latin typeface="Consolas" panose="020B0609020204030204" pitchFamily="49" charset="0"/>
+              </a:rPr>
+              <a:t>Controller</a:t>
+            </a:r>
+          </a:p>
+          <a:p>
+            <a:pPr marL="457200" indent="-457200">
+              <a:buFont typeface="Arial" panose="020B0604020202020204" pitchFamily="34" charset="0"/>
+              <a:buChar char="•"/>
+            </a:pPr>
+            <a:endParaRPr lang="en-US" sz="2800" dirty="0" smtClean="0">
+              <a:latin typeface="Consolas" panose="020B0609020204030204" pitchFamily="49" charset="0"/>
+            </a:endParaRPr>
+          </a:p>
+          <a:p>
+            <a:pPr marL="457200" indent="-457200">
+              <a:buFont typeface="Arial" panose="020B0604020202020204" pitchFamily="34" charset="0"/>
+              <a:buChar char="•"/>
+            </a:pPr>
+            <a:r>
+              <a:rPr lang="en-US" sz="2800" dirty="0" smtClean="0">
+                <a:latin typeface="Consolas" panose="020B0609020204030204" pitchFamily="49" charset="0"/>
+              </a:rPr>
+              <a:t> </a:t>
+            </a:r>
+            <a:r>
+              <a:rPr lang="en-US" sz="2800" dirty="0" err="1" smtClean="0">
+                <a:solidFill>
+                  <a:srgbClr val="C00000"/>
+                </a:solidFill>
+                <a:latin typeface="Consolas" panose="020B0609020204030204" pitchFamily="49" charset="0"/>
+              </a:rPr>
+              <a:t>ActionArguments</a:t>
+            </a:r>
+            <a:r>
+              <a:rPr lang="en-US" sz="2800" dirty="0" smtClean="0">
+                <a:latin typeface="Consolas" panose="020B0609020204030204" pitchFamily="49" charset="0"/>
+              </a:rPr>
+              <a:t> – dictionary of arguments</a:t>
+            </a:r>
+          </a:p>
+          <a:p>
+            <a:pPr marL="457200" indent="-457200">
+              <a:buFont typeface="Arial" panose="020B0604020202020204" pitchFamily="34" charset="0"/>
+              <a:buChar char="•"/>
+            </a:pPr>
+            <a:endParaRPr lang="en-US" sz="2800" dirty="0" smtClean="0">
+              <a:latin typeface="Consolas" panose="020B0609020204030204" pitchFamily="49" charset="0"/>
+            </a:endParaRPr>
+          </a:p>
+          <a:p>
+            <a:pPr marL="457200" indent="-457200">
+              <a:buFont typeface="Arial" panose="020B0604020202020204" pitchFamily="34" charset="0"/>
+              <a:buChar char="•"/>
+            </a:pPr>
+            <a:r>
+              <a:rPr lang="en-US" sz="2800" dirty="0" smtClean="0">
+                <a:latin typeface="Consolas" panose="020B0609020204030204" pitchFamily="49" charset="0"/>
+              </a:rPr>
+              <a:t> </a:t>
+            </a:r>
+            <a:r>
+              <a:rPr lang="en-US" sz="2800" dirty="0" err="1" smtClean="0">
+                <a:solidFill>
+                  <a:srgbClr val="C00000"/>
+                </a:solidFill>
+                <a:latin typeface="Consolas" panose="020B0609020204030204" pitchFamily="49" charset="0"/>
+              </a:rPr>
+              <a:t>IActionResult</a:t>
+            </a:r>
+            <a:r>
+              <a:rPr lang="en-US" sz="2800" dirty="0" smtClean="0">
+                <a:latin typeface="Consolas" panose="020B0609020204030204" pitchFamily="49" charset="0"/>
+              </a:rPr>
+              <a:t> </a:t>
+            </a:r>
+            <a:r>
+              <a:rPr lang="en-US" sz="2800" dirty="0" smtClean="0">
+                <a:solidFill>
+                  <a:srgbClr val="C00000"/>
+                </a:solidFill>
+                <a:latin typeface="Consolas" panose="020B0609020204030204" pitchFamily="49" charset="0"/>
+              </a:rPr>
+              <a:t>Result</a:t>
+            </a:r>
+            <a:r>
+              <a:rPr lang="en-US" sz="2800" dirty="0" smtClean="0">
+                <a:latin typeface="Consolas" panose="020B0609020204030204" pitchFamily="49" charset="0"/>
+              </a:rPr>
+              <a:t> – if set, short-circuits the request and returns </a:t>
+            </a:r>
+          </a:p>
+        </p:txBody>
+      </p:sp>
+    </p:spTree>
+    <p:extLst>
+      <p:ext uri="{BB962C8B-B14F-4D97-AF65-F5344CB8AC3E}">
+        <p14:creationId xmlns:p14="http://schemas.microsoft.com/office/powerpoint/2010/main" val="2307477297"/>
+      </p:ext>
+    </p:extLst>
+  </p:cSld>
+  <p:clrMapOvr>
+    <a:masterClrMapping/>
+  </p:clrMapOvr>
+  <p:timing>
+    <p:tnLst>
+      <p:par>
+        <p:cTn id="1" dur="indefinite" restart="never" nodeType="tmRoot"/>
+      </p:par>
+    </p:tnLst>
+  </p:timing>
+</p:sld>
+</file>
+
+<file path=ppt/slides/slide27.xml><?xml version="1.0" encoding="utf-8"?>
+<p:sld xmlns:a="http://schemas.openxmlformats.org/drawingml/2006/main" xmlns:r="http://schemas.openxmlformats.org/officeDocument/2006/relationships" xmlns:p="http://schemas.openxmlformats.org/presentationml/2006/main">
+  <p:cSld>
+    <p:bg>
+      <p:bgPr>
+        <a:gradFill>
+          <a:gsLst>
+            <a:gs pos="0">
+              <a:schemeClr val="accent1">
+                <a:lumMod val="5000"/>
+                <a:lumOff val="95000"/>
+              </a:schemeClr>
+            </a:gs>
+            <a:gs pos="42000">
+              <a:schemeClr val="accent1">
+                <a:lumMod val="45000"/>
+                <a:lumOff val="55000"/>
+              </a:schemeClr>
+            </a:gs>
+            <a:gs pos="83000">
+              <a:schemeClr val="accent1">
+                <a:lumMod val="45000"/>
+                <a:lumOff val="55000"/>
+              </a:schemeClr>
+            </a:gs>
+            <a:gs pos="100000">
+              <a:schemeClr val="accent1">
+                <a:lumMod val="30000"/>
+                <a:lumOff val="70000"/>
+              </a:schemeClr>
+            </a:gs>
+          </a:gsLst>
+          <a:lin ang="5400000" scaled="1"/>
+        </a:gradFill>
+        <a:effectLst/>
+      </p:bgPr>
+    </p:bg>
+    <p:spTree>
+      <p:nvGrpSpPr>
+        <p:cNvPr id="1" name=""/>
+        <p:cNvGrpSpPr/>
+        <p:nvPr/>
+      </p:nvGrpSpPr>
+      <p:grpSpPr>
+        <a:xfrm>
+          <a:off x="0" y="0"/>
+          <a:ext cx="0" cy="0"/>
+          <a:chOff x="0" y="0"/>
+          <a:chExt cx="0" cy="0"/>
+        </a:xfrm>
+      </p:grpSpPr>
+      <p:sp>
+        <p:nvSpPr>
+          <p:cNvPr id="2" name="Title 1"/>
+          <p:cNvSpPr>
+            <a:spLocks noGrp="1"/>
+          </p:cNvSpPr>
+          <p:nvPr>
+            <p:ph type="title"/>
+          </p:nvPr>
+        </p:nvSpPr>
+        <p:spPr/>
+        <p:txBody>
+          <a:bodyPr/>
+          <a:lstStyle/>
+          <a:p>
+            <a:r>
+              <a:rPr lang="en-US" dirty="0" smtClean="0"/>
+              <a:t>Action Filters</a:t>
+            </a:r>
+            <a:endParaRPr lang="en-US" dirty="0"/>
+          </a:p>
+        </p:txBody>
+      </p:sp>
+      <p:sp>
+        <p:nvSpPr>
+          <p:cNvPr id="3" name="Rectangle 2"/>
+          <p:cNvSpPr/>
+          <p:nvPr/>
+        </p:nvSpPr>
+        <p:spPr>
+          <a:xfrm>
+            <a:off x="299206" y="1892022"/>
+            <a:ext cx="11892794" cy="3539430"/>
+          </a:xfrm>
+          <a:prstGeom prst="rect">
+            <a:avLst/>
+          </a:prstGeom>
+        </p:spPr>
+        <p:txBody>
+          <a:bodyPr wrap="square">
+            <a:spAutoFit/>
+          </a:bodyPr>
+          <a:lstStyle/>
+          <a:p>
+            <a:r>
+              <a:rPr lang="en-US" sz="2800" dirty="0" err="1" smtClean="0">
+                <a:latin typeface="Consolas" panose="020B0609020204030204" pitchFamily="49" charset="0"/>
+              </a:rPr>
+              <a:t>ActionExecutedContext</a:t>
+            </a:r>
+            <a:r>
+              <a:rPr lang="en-US" sz="2800" dirty="0" smtClean="0">
+                <a:latin typeface="Consolas" panose="020B0609020204030204" pitchFamily="49" charset="0"/>
+              </a:rPr>
+              <a:t> properties:</a:t>
+            </a:r>
+          </a:p>
+          <a:p>
+            <a:endParaRPr lang="en-US" sz="2800" dirty="0">
+              <a:latin typeface="Consolas" panose="020B0609020204030204" pitchFamily="49" charset="0"/>
+            </a:endParaRPr>
+          </a:p>
+          <a:p>
+            <a:pPr marL="457200" indent="-457200">
+              <a:buFont typeface="Arial" panose="020B0604020202020204" pitchFamily="34" charset="0"/>
+              <a:buChar char="•"/>
+            </a:pPr>
+            <a:r>
+              <a:rPr lang="en-US" sz="2800" dirty="0" smtClean="0">
+                <a:latin typeface="Consolas" panose="020B0609020204030204" pitchFamily="49" charset="0"/>
+              </a:rPr>
+              <a:t> Controller</a:t>
+            </a:r>
+          </a:p>
+          <a:p>
+            <a:pPr marL="457200" indent="-457200">
+              <a:buFont typeface="Arial" panose="020B0604020202020204" pitchFamily="34" charset="0"/>
+              <a:buChar char="•"/>
+            </a:pPr>
+            <a:r>
+              <a:rPr lang="en-US" sz="2800" dirty="0" smtClean="0">
+                <a:latin typeface="Consolas" panose="020B0609020204030204" pitchFamily="49" charset="0"/>
+              </a:rPr>
+              <a:t> </a:t>
+            </a:r>
+            <a:r>
+              <a:rPr lang="en-US" sz="2800" dirty="0" smtClean="0">
+                <a:solidFill>
+                  <a:srgbClr val="C00000"/>
+                </a:solidFill>
+                <a:latin typeface="Consolas" panose="020B0609020204030204" pitchFamily="49" charset="0"/>
+              </a:rPr>
+              <a:t>Canceled </a:t>
+            </a:r>
+            <a:r>
+              <a:rPr lang="en-US" sz="2800" dirty="0" smtClean="0">
+                <a:latin typeface="Consolas" panose="020B0609020204030204" pitchFamily="49" charset="0"/>
+              </a:rPr>
+              <a:t>– true if another filter has set Result</a:t>
+            </a:r>
+            <a:endParaRPr lang="en-US" sz="2800" dirty="0" smtClean="0">
+              <a:solidFill>
+                <a:srgbClr val="C00000"/>
+              </a:solidFill>
+              <a:latin typeface="Consolas" panose="020B0609020204030204" pitchFamily="49" charset="0"/>
+            </a:endParaRPr>
+          </a:p>
+          <a:p>
+            <a:pPr marL="457200" indent="-457200">
+              <a:buFont typeface="Arial" panose="020B0604020202020204" pitchFamily="34" charset="0"/>
+              <a:buChar char="•"/>
+            </a:pPr>
+            <a:r>
+              <a:rPr lang="en-US" sz="2800" dirty="0">
+                <a:latin typeface="Consolas" panose="020B0609020204030204" pitchFamily="49" charset="0"/>
+              </a:rPr>
+              <a:t> </a:t>
+            </a:r>
+            <a:r>
+              <a:rPr lang="en-US" sz="2800" dirty="0" smtClean="0">
+                <a:latin typeface="Consolas" panose="020B0609020204030204" pitchFamily="49" charset="0"/>
+              </a:rPr>
+              <a:t>Exception</a:t>
+            </a:r>
+          </a:p>
+          <a:p>
+            <a:pPr marL="457200" indent="-457200">
+              <a:buFont typeface="Arial" panose="020B0604020202020204" pitchFamily="34" charset="0"/>
+              <a:buChar char="•"/>
+            </a:pPr>
+            <a:r>
+              <a:rPr lang="en-US" sz="2800" dirty="0">
+                <a:latin typeface="Consolas" panose="020B0609020204030204" pitchFamily="49" charset="0"/>
+              </a:rPr>
+              <a:t> </a:t>
+            </a:r>
+            <a:r>
+              <a:rPr lang="en-US" sz="2800" dirty="0" err="1" smtClean="0">
+                <a:latin typeface="Consolas" panose="020B0609020204030204" pitchFamily="49" charset="0"/>
+              </a:rPr>
+              <a:t>ExceptionDispatchInfo</a:t>
+            </a:r>
+            <a:r>
+              <a:rPr lang="en-US" sz="2800" dirty="0" smtClean="0">
+                <a:latin typeface="Consolas" panose="020B0609020204030204" pitchFamily="49" charset="0"/>
+              </a:rPr>
+              <a:t> – stack trace</a:t>
+            </a:r>
+          </a:p>
+          <a:p>
+            <a:pPr marL="457200" indent="-457200">
+              <a:buFont typeface="Arial" panose="020B0604020202020204" pitchFamily="34" charset="0"/>
+              <a:buChar char="•"/>
+            </a:pPr>
+            <a:r>
+              <a:rPr lang="en-US" sz="2800" dirty="0" smtClean="0">
+                <a:latin typeface="Consolas" panose="020B0609020204030204" pitchFamily="49" charset="0"/>
+              </a:rPr>
+              <a:t> </a:t>
+            </a:r>
+            <a:r>
+              <a:rPr lang="en-US" sz="2800" dirty="0" err="1" smtClean="0">
+                <a:solidFill>
+                  <a:srgbClr val="C00000"/>
+                </a:solidFill>
+                <a:latin typeface="Consolas" panose="020B0609020204030204" pitchFamily="49" charset="0"/>
+              </a:rPr>
+              <a:t>ExceptionHandled</a:t>
+            </a:r>
+            <a:r>
+              <a:rPr lang="en-US" sz="2800" dirty="0" smtClean="0">
+                <a:latin typeface="Consolas" panose="020B0609020204030204" pitchFamily="49" charset="0"/>
+              </a:rPr>
+              <a:t> – if set to true – suppresses exception</a:t>
+            </a:r>
+          </a:p>
+          <a:p>
+            <a:pPr marL="457200" indent="-457200">
+              <a:buFont typeface="Arial" panose="020B0604020202020204" pitchFamily="34" charset="0"/>
+              <a:buChar char="•"/>
+            </a:pPr>
+            <a:r>
+              <a:rPr lang="en-US" sz="2800" dirty="0" smtClean="0">
+                <a:latin typeface="Consolas" panose="020B0609020204030204" pitchFamily="49" charset="0"/>
+              </a:rPr>
+              <a:t> </a:t>
+            </a:r>
+            <a:r>
+              <a:rPr lang="en-US" sz="2800" dirty="0" err="1" smtClean="0">
+                <a:solidFill>
+                  <a:srgbClr val="C00000"/>
+                </a:solidFill>
+                <a:latin typeface="Consolas" panose="020B0609020204030204" pitchFamily="49" charset="0"/>
+              </a:rPr>
+              <a:t>IActionResult</a:t>
+            </a:r>
+            <a:r>
+              <a:rPr lang="en-US" sz="2800" dirty="0" smtClean="0">
+                <a:solidFill>
+                  <a:srgbClr val="C00000"/>
+                </a:solidFill>
+                <a:latin typeface="Consolas" panose="020B0609020204030204" pitchFamily="49" charset="0"/>
+              </a:rPr>
+              <a:t> Result </a:t>
+            </a:r>
+            <a:r>
+              <a:rPr lang="en-US" sz="2800" dirty="0" smtClean="0">
+                <a:latin typeface="Consolas" panose="020B0609020204030204" pitchFamily="49" charset="0"/>
+              </a:rPr>
+              <a:t>– can change or replace result</a:t>
+            </a:r>
+          </a:p>
+        </p:txBody>
+      </p:sp>
+    </p:spTree>
+    <p:extLst>
+      <p:ext uri="{BB962C8B-B14F-4D97-AF65-F5344CB8AC3E}">
+        <p14:creationId xmlns:p14="http://schemas.microsoft.com/office/powerpoint/2010/main" val="616895066"/>
       </p:ext>
     </p:extLst>
   </p:cSld>

</xml_diff>

<commit_message>
Add Action filters and Async action filters
</commit_message>
<xml_diff>
--- a/AspNetCoreMVC.pptx
+++ b/AspNetCoreMVC.pptx
@@ -5,7 +5,7 @@
     <p:sldMasterId id="2147483648" r:id="rId1"/>
   </p:sldMasterIdLst>
   <p:notesMasterIdLst>
-    <p:notesMasterId r:id="rId29"/>
+    <p:notesMasterId r:id="rId36"/>
   </p:notesMasterIdLst>
   <p:sldIdLst>
     <p:sldId id="256" r:id="rId2"/>
@@ -34,7 +34,14 @@
     <p:sldId id="279" r:id="rId25"/>
     <p:sldId id="280" r:id="rId26"/>
     <p:sldId id="281" r:id="rId27"/>
-    <p:sldId id="282" r:id="rId28"/>
+    <p:sldId id="283" r:id="rId28"/>
+    <p:sldId id="284" r:id="rId29"/>
+    <p:sldId id="285" r:id="rId30"/>
+    <p:sldId id="286" r:id="rId31"/>
+    <p:sldId id="287" r:id="rId32"/>
+    <p:sldId id="289" r:id="rId33"/>
+    <p:sldId id="290" r:id="rId34"/>
+    <p:sldId id="291" r:id="rId35"/>
   </p:sldIdLst>
   <p:sldSz cx="12192000" cy="6858000"/>
   <p:notesSz cx="6858000" cy="9144000"/>
@@ -223,7 +230,7 @@
           <a:p>
             <a:fld id="{1747B90C-FE49-44DE-93E7-FA9DDECBEA03}" type="datetimeFigureOut">
               <a:rPr lang="en-US" smtClean="0"/>
-              <a:t>28-Sep-19</a:t>
+              <a:t>29-Sep-19</a:t>
             </a:fld>
             <a:endParaRPr lang="en-US"/>
           </a:p>
@@ -575,6 +582,90 @@
 </p:notes>
 </file>
 
+<file path=ppt/notesSlides/notesSlide10.xml><?xml version="1.0" encoding="utf-8"?>
+<p:notes xmlns:a="http://schemas.openxmlformats.org/drawingml/2006/main" xmlns:r="http://schemas.openxmlformats.org/officeDocument/2006/relationships" xmlns:p="http://schemas.openxmlformats.org/presentationml/2006/main">
+  <p:cSld>
+    <p:spTree>
+      <p:nvGrpSpPr>
+        <p:cNvPr id="1" name=""/>
+        <p:cNvGrpSpPr/>
+        <p:nvPr/>
+      </p:nvGrpSpPr>
+      <p:grpSpPr>
+        <a:xfrm>
+          <a:off x="0" y="0"/>
+          <a:ext cx="0" cy="0"/>
+          <a:chOff x="0" y="0"/>
+          <a:chExt cx="0" cy="0"/>
+        </a:xfrm>
+      </p:grpSpPr>
+      <p:sp>
+        <p:nvSpPr>
+          <p:cNvPr id="2" name="Slide Image Placeholder 1"/>
+          <p:cNvSpPr>
+            <a:spLocks noGrp="1" noRot="1" noChangeAspect="1"/>
+          </p:cNvSpPr>
+          <p:nvPr>
+            <p:ph type="sldImg"/>
+          </p:nvPr>
+        </p:nvSpPr>
+        <p:spPr/>
+      </p:sp>
+      <p:sp>
+        <p:nvSpPr>
+          <p:cNvPr id="3" name="Notes Placeholder 2"/>
+          <p:cNvSpPr>
+            <a:spLocks noGrp="1"/>
+          </p:cNvSpPr>
+          <p:nvPr>
+            <p:ph type="body" idx="1"/>
+          </p:nvPr>
+        </p:nvSpPr>
+        <p:spPr/>
+        <p:txBody>
+          <a:bodyPr/>
+          <a:lstStyle/>
+          <a:p>
+            <a:endParaRPr lang="en-US" dirty="0"/>
+          </a:p>
+        </p:txBody>
+      </p:sp>
+      <p:sp>
+        <p:nvSpPr>
+          <p:cNvPr id="4" name="Slide Number Placeholder 3"/>
+          <p:cNvSpPr>
+            <a:spLocks noGrp="1"/>
+          </p:cNvSpPr>
+          <p:nvPr>
+            <p:ph type="sldNum" sz="quarter" idx="10"/>
+          </p:nvPr>
+        </p:nvSpPr>
+        <p:spPr/>
+        <p:txBody>
+          <a:bodyPr/>
+          <a:lstStyle/>
+          <a:p>
+            <a:fld id="{BA1D5B97-ACF5-4677-A104-92B2393AA446}" type="slidenum">
+              <a:rPr lang="en-US" smtClean="0"/>
+              <a:t>34</a:t>
+            </a:fld>
+            <a:endParaRPr lang="en-US"/>
+          </a:p>
+        </p:txBody>
+      </p:sp>
+    </p:spTree>
+    <p:extLst>
+      <p:ext uri="{BB962C8B-B14F-4D97-AF65-F5344CB8AC3E}">
+        <p14:creationId xmlns:p14="http://schemas.microsoft.com/office/powerpoint/2010/main" val="715180734"/>
+      </p:ext>
+    </p:extLst>
+  </p:cSld>
+  <p:clrMapOvr>
+    <a:masterClrMapping/>
+  </p:clrMapOvr>
+</p:notes>
+</file>
+
 <file path=ppt/notesSlides/notesSlide2.xml><?xml version="1.0" encoding="utf-8"?>
 <p:notes xmlns:a="http://schemas.openxmlformats.org/drawingml/2006/main" xmlns:r="http://schemas.openxmlformats.org/officeDocument/2006/relationships" xmlns:p="http://schemas.openxmlformats.org/presentationml/2006/main">
   <p:cSld>
@@ -751,7 +842,511 @@
     </p:spTree>
     <p:extLst>
       <p:ext uri="{BB962C8B-B14F-4D97-AF65-F5344CB8AC3E}">
-        <p14:creationId xmlns:p14="http://schemas.microsoft.com/office/powerpoint/2010/main" val="66650666"/>
+        <p14:creationId xmlns:p14="http://schemas.microsoft.com/office/powerpoint/2010/main" val="2276269795"/>
+      </p:ext>
+    </p:extLst>
+  </p:cSld>
+  <p:clrMapOvr>
+    <a:masterClrMapping/>
+  </p:clrMapOvr>
+</p:notes>
+</file>
+
+<file path=ppt/notesSlides/notesSlide4.xml><?xml version="1.0" encoding="utf-8"?>
+<p:notes xmlns:a="http://schemas.openxmlformats.org/drawingml/2006/main" xmlns:r="http://schemas.openxmlformats.org/officeDocument/2006/relationships" xmlns:p="http://schemas.openxmlformats.org/presentationml/2006/main">
+  <p:cSld>
+    <p:spTree>
+      <p:nvGrpSpPr>
+        <p:cNvPr id="1" name=""/>
+        <p:cNvGrpSpPr/>
+        <p:nvPr/>
+      </p:nvGrpSpPr>
+      <p:grpSpPr>
+        <a:xfrm>
+          <a:off x="0" y="0"/>
+          <a:ext cx="0" cy="0"/>
+          <a:chOff x="0" y="0"/>
+          <a:chExt cx="0" cy="0"/>
+        </a:xfrm>
+      </p:grpSpPr>
+      <p:sp>
+        <p:nvSpPr>
+          <p:cNvPr id="2" name="Slide Image Placeholder 1"/>
+          <p:cNvSpPr>
+            <a:spLocks noGrp="1" noRot="1" noChangeAspect="1"/>
+          </p:cNvSpPr>
+          <p:nvPr>
+            <p:ph type="sldImg"/>
+          </p:nvPr>
+        </p:nvSpPr>
+        <p:spPr/>
+      </p:sp>
+      <p:sp>
+        <p:nvSpPr>
+          <p:cNvPr id="3" name="Notes Placeholder 2"/>
+          <p:cNvSpPr>
+            <a:spLocks noGrp="1"/>
+          </p:cNvSpPr>
+          <p:nvPr>
+            <p:ph type="body" idx="1"/>
+          </p:nvPr>
+        </p:nvSpPr>
+        <p:spPr/>
+        <p:txBody>
+          <a:bodyPr/>
+          <a:lstStyle/>
+          <a:p>
+            <a:endParaRPr lang="en-US" dirty="0"/>
+          </a:p>
+        </p:txBody>
+      </p:sp>
+      <p:sp>
+        <p:nvSpPr>
+          <p:cNvPr id="4" name="Slide Number Placeholder 3"/>
+          <p:cNvSpPr>
+            <a:spLocks noGrp="1"/>
+          </p:cNvSpPr>
+          <p:nvPr>
+            <p:ph type="sldNum" sz="quarter" idx="10"/>
+          </p:nvPr>
+        </p:nvSpPr>
+        <p:spPr/>
+        <p:txBody>
+          <a:bodyPr/>
+          <a:lstStyle/>
+          <a:p>
+            <a:fld id="{BA1D5B97-ACF5-4677-A104-92B2393AA446}" type="slidenum">
+              <a:rPr lang="en-US" smtClean="0"/>
+              <a:t>28</a:t>
+            </a:fld>
+            <a:endParaRPr lang="en-US"/>
+          </a:p>
+        </p:txBody>
+      </p:sp>
+    </p:spTree>
+    <p:extLst>
+      <p:ext uri="{BB962C8B-B14F-4D97-AF65-F5344CB8AC3E}">
+        <p14:creationId xmlns:p14="http://schemas.microsoft.com/office/powerpoint/2010/main" val="2804259370"/>
+      </p:ext>
+    </p:extLst>
+  </p:cSld>
+  <p:clrMapOvr>
+    <a:masterClrMapping/>
+  </p:clrMapOvr>
+</p:notes>
+</file>
+
+<file path=ppt/notesSlides/notesSlide5.xml><?xml version="1.0" encoding="utf-8"?>
+<p:notes xmlns:a="http://schemas.openxmlformats.org/drawingml/2006/main" xmlns:r="http://schemas.openxmlformats.org/officeDocument/2006/relationships" xmlns:p="http://schemas.openxmlformats.org/presentationml/2006/main">
+  <p:cSld>
+    <p:spTree>
+      <p:nvGrpSpPr>
+        <p:cNvPr id="1" name=""/>
+        <p:cNvGrpSpPr/>
+        <p:nvPr/>
+      </p:nvGrpSpPr>
+      <p:grpSpPr>
+        <a:xfrm>
+          <a:off x="0" y="0"/>
+          <a:ext cx="0" cy="0"/>
+          <a:chOff x="0" y="0"/>
+          <a:chExt cx="0" cy="0"/>
+        </a:xfrm>
+      </p:grpSpPr>
+      <p:sp>
+        <p:nvSpPr>
+          <p:cNvPr id="2" name="Slide Image Placeholder 1"/>
+          <p:cNvSpPr>
+            <a:spLocks noGrp="1" noRot="1" noChangeAspect="1"/>
+          </p:cNvSpPr>
+          <p:nvPr>
+            <p:ph type="sldImg"/>
+          </p:nvPr>
+        </p:nvSpPr>
+        <p:spPr/>
+      </p:sp>
+      <p:sp>
+        <p:nvSpPr>
+          <p:cNvPr id="3" name="Notes Placeholder 2"/>
+          <p:cNvSpPr>
+            <a:spLocks noGrp="1"/>
+          </p:cNvSpPr>
+          <p:nvPr>
+            <p:ph type="body" idx="1"/>
+          </p:nvPr>
+        </p:nvSpPr>
+        <p:spPr/>
+        <p:txBody>
+          <a:bodyPr/>
+          <a:lstStyle/>
+          <a:p>
+            <a:endParaRPr lang="en-US" dirty="0"/>
+          </a:p>
+        </p:txBody>
+      </p:sp>
+      <p:sp>
+        <p:nvSpPr>
+          <p:cNvPr id="4" name="Slide Number Placeholder 3"/>
+          <p:cNvSpPr>
+            <a:spLocks noGrp="1"/>
+          </p:cNvSpPr>
+          <p:nvPr>
+            <p:ph type="sldNum" sz="quarter" idx="10"/>
+          </p:nvPr>
+        </p:nvSpPr>
+        <p:spPr/>
+        <p:txBody>
+          <a:bodyPr/>
+          <a:lstStyle/>
+          <a:p>
+            <a:fld id="{BA1D5B97-ACF5-4677-A104-92B2393AA446}" type="slidenum">
+              <a:rPr lang="en-US" smtClean="0"/>
+              <a:t>29</a:t>
+            </a:fld>
+            <a:endParaRPr lang="en-US"/>
+          </a:p>
+        </p:txBody>
+      </p:sp>
+    </p:spTree>
+    <p:extLst>
+      <p:ext uri="{BB962C8B-B14F-4D97-AF65-F5344CB8AC3E}">
+        <p14:creationId xmlns:p14="http://schemas.microsoft.com/office/powerpoint/2010/main" val="14116046"/>
+      </p:ext>
+    </p:extLst>
+  </p:cSld>
+  <p:clrMapOvr>
+    <a:masterClrMapping/>
+  </p:clrMapOvr>
+</p:notes>
+</file>
+
+<file path=ppt/notesSlides/notesSlide6.xml><?xml version="1.0" encoding="utf-8"?>
+<p:notes xmlns:a="http://schemas.openxmlformats.org/drawingml/2006/main" xmlns:r="http://schemas.openxmlformats.org/officeDocument/2006/relationships" xmlns:p="http://schemas.openxmlformats.org/presentationml/2006/main">
+  <p:cSld>
+    <p:spTree>
+      <p:nvGrpSpPr>
+        <p:cNvPr id="1" name=""/>
+        <p:cNvGrpSpPr/>
+        <p:nvPr/>
+      </p:nvGrpSpPr>
+      <p:grpSpPr>
+        <a:xfrm>
+          <a:off x="0" y="0"/>
+          <a:ext cx="0" cy="0"/>
+          <a:chOff x="0" y="0"/>
+          <a:chExt cx="0" cy="0"/>
+        </a:xfrm>
+      </p:grpSpPr>
+      <p:sp>
+        <p:nvSpPr>
+          <p:cNvPr id="2" name="Slide Image Placeholder 1"/>
+          <p:cNvSpPr>
+            <a:spLocks noGrp="1" noRot="1" noChangeAspect="1"/>
+          </p:cNvSpPr>
+          <p:nvPr>
+            <p:ph type="sldImg"/>
+          </p:nvPr>
+        </p:nvSpPr>
+        <p:spPr/>
+      </p:sp>
+      <p:sp>
+        <p:nvSpPr>
+          <p:cNvPr id="3" name="Notes Placeholder 2"/>
+          <p:cNvSpPr>
+            <a:spLocks noGrp="1"/>
+          </p:cNvSpPr>
+          <p:nvPr>
+            <p:ph type="body" idx="1"/>
+          </p:nvPr>
+        </p:nvSpPr>
+        <p:spPr/>
+        <p:txBody>
+          <a:bodyPr/>
+          <a:lstStyle/>
+          <a:p>
+            <a:endParaRPr lang="en-US" dirty="0"/>
+          </a:p>
+        </p:txBody>
+      </p:sp>
+      <p:sp>
+        <p:nvSpPr>
+          <p:cNvPr id="4" name="Slide Number Placeholder 3"/>
+          <p:cNvSpPr>
+            <a:spLocks noGrp="1"/>
+          </p:cNvSpPr>
+          <p:nvPr>
+            <p:ph type="sldNum" sz="quarter" idx="10"/>
+          </p:nvPr>
+        </p:nvSpPr>
+        <p:spPr/>
+        <p:txBody>
+          <a:bodyPr/>
+          <a:lstStyle/>
+          <a:p>
+            <a:fld id="{BA1D5B97-ACF5-4677-A104-92B2393AA446}" type="slidenum">
+              <a:rPr lang="en-US" smtClean="0"/>
+              <a:t>30</a:t>
+            </a:fld>
+            <a:endParaRPr lang="en-US"/>
+          </a:p>
+        </p:txBody>
+      </p:sp>
+    </p:spTree>
+    <p:extLst>
+      <p:ext uri="{BB962C8B-B14F-4D97-AF65-F5344CB8AC3E}">
+        <p14:creationId xmlns:p14="http://schemas.microsoft.com/office/powerpoint/2010/main" val="3715279138"/>
+      </p:ext>
+    </p:extLst>
+  </p:cSld>
+  <p:clrMapOvr>
+    <a:masterClrMapping/>
+  </p:clrMapOvr>
+</p:notes>
+</file>
+
+<file path=ppt/notesSlides/notesSlide7.xml><?xml version="1.0" encoding="utf-8"?>
+<p:notes xmlns:a="http://schemas.openxmlformats.org/drawingml/2006/main" xmlns:r="http://schemas.openxmlformats.org/officeDocument/2006/relationships" xmlns:p="http://schemas.openxmlformats.org/presentationml/2006/main">
+  <p:cSld>
+    <p:spTree>
+      <p:nvGrpSpPr>
+        <p:cNvPr id="1" name=""/>
+        <p:cNvGrpSpPr/>
+        <p:nvPr/>
+      </p:nvGrpSpPr>
+      <p:grpSpPr>
+        <a:xfrm>
+          <a:off x="0" y="0"/>
+          <a:ext cx="0" cy="0"/>
+          <a:chOff x="0" y="0"/>
+          <a:chExt cx="0" cy="0"/>
+        </a:xfrm>
+      </p:grpSpPr>
+      <p:sp>
+        <p:nvSpPr>
+          <p:cNvPr id="2" name="Slide Image Placeholder 1"/>
+          <p:cNvSpPr>
+            <a:spLocks noGrp="1" noRot="1" noChangeAspect="1"/>
+          </p:cNvSpPr>
+          <p:nvPr>
+            <p:ph type="sldImg"/>
+          </p:nvPr>
+        </p:nvSpPr>
+        <p:spPr/>
+      </p:sp>
+      <p:sp>
+        <p:nvSpPr>
+          <p:cNvPr id="3" name="Notes Placeholder 2"/>
+          <p:cNvSpPr>
+            <a:spLocks noGrp="1"/>
+          </p:cNvSpPr>
+          <p:nvPr>
+            <p:ph type="body" idx="1"/>
+          </p:nvPr>
+        </p:nvSpPr>
+        <p:spPr/>
+        <p:txBody>
+          <a:bodyPr/>
+          <a:lstStyle/>
+          <a:p>
+            <a:endParaRPr lang="en-US" dirty="0"/>
+          </a:p>
+        </p:txBody>
+      </p:sp>
+      <p:sp>
+        <p:nvSpPr>
+          <p:cNvPr id="4" name="Slide Number Placeholder 3"/>
+          <p:cNvSpPr>
+            <a:spLocks noGrp="1"/>
+          </p:cNvSpPr>
+          <p:nvPr>
+            <p:ph type="sldNum" sz="quarter" idx="10"/>
+          </p:nvPr>
+        </p:nvSpPr>
+        <p:spPr/>
+        <p:txBody>
+          <a:bodyPr/>
+          <a:lstStyle/>
+          <a:p>
+            <a:fld id="{BA1D5B97-ACF5-4677-A104-92B2393AA446}" type="slidenum">
+              <a:rPr lang="en-US" smtClean="0"/>
+              <a:t>31</a:t>
+            </a:fld>
+            <a:endParaRPr lang="en-US"/>
+          </a:p>
+        </p:txBody>
+      </p:sp>
+    </p:spTree>
+    <p:extLst>
+      <p:ext uri="{BB962C8B-B14F-4D97-AF65-F5344CB8AC3E}">
+        <p14:creationId xmlns:p14="http://schemas.microsoft.com/office/powerpoint/2010/main" val="3534564159"/>
+      </p:ext>
+    </p:extLst>
+  </p:cSld>
+  <p:clrMapOvr>
+    <a:masterClrMapping/>
+  </p:clrMapOvr>
+</p:notes>
+</file>
+
+<file path=ppt/notesSlides/notesSlide8.xml><?xml version="1.0" encoding="utf-8"?>
+<p:notes xmlns:a="http://schemas.openxmlformats.org/drawingml/2006/main" xmlns:r="http://schemas.openxmlformats.org/officeDocument/2006/relationships" xmlns:p="http://schemas.openxmlformats.org/presentationml/2006/main">
+  <p:cSld>
+    <p:spTree>
+      <p:nvGrpSpPr>
+        <p:cNvPr id="1" name=""/>
+        <p:cNvGrpSpPr/>
+        <p:nvPr/>
+      </p:nvGrpSpPr>
+      <p:grpSpPr>
+        <a:xfrm>
+          <a:off x="0" y="0"/>
+          <a:ext cx="0" cy="0"/>
+          <a:chOff x="0" y="0"/>
+          <a:chExt cx="0" cy="0"/>
+        </a:xfrm>
+      </p:grpSpPr>
+      <p:sp>
+        <p:nvSpPr>
+          <p:cNvPr id="2" name="Slide Image Placeholder 1"/>
+          <p:cNvSpPr>
+            <a:spLocks noGrp="1" noRot="1" noChangeAspect="1"/>
+          </p:cNvSpPr>
+          <p:nvPr>
+            <p:ph type="sldImg"/>
+          </p:nvPr>
+        </p:nvSpPr>
+        <p:spPr/>
+      </p:sp>
+      <p:sp>
+        <p:nvSpPr>
+          <p:cNvPr id="3" name="Notes Placeholder 2"/>
+          <p:cNvSpPr>
+            <a:spLocks noGrp="1"/>
+          </p:cNvSpPr>
+          <p:nvPr>
+            <p:ph type="body" idx="1"/>
+          </p:nvPr>
+        </p:nvSpPr>
+        <p:spPr/>
+        <p:txBody>
+          <a:bodyPr/>
+          <a:lstStyle/>
+          <a:p>
+            <a:endParaRPr lang="en-US" dirty="0"/>
+          </a:p>
+        </p:txBody>
+      </p:sp>
+      <p:sp>
+        <p:nvSpPr>
+          <p:cNvPr id="4" name="Slide Number Placeholder 3"/>
+          <p:cNvSpPr>
+            <a:spLocks noGrp="1"/>
+          </p:cNvSpPr>
+          <p:nvPr>
+            <p:ph type="sldNum" sz="quarter" idx="10"/>
+          </p:nvPr>
+        </p:nvSpPr>
+        <p:spPr/>
+        <p:txBody>
+          <a:bodyPr/>
+          <a:lstStyle/>
+          <a:p>
+            <a:fld id="{BA1D5B97-ACF5-4677-A104-92B2393AA446}" type="slidenum">
+              <a:rPr lang="en-US" smtClean="0"/>
+              <a:t>32</a:t>
+            </a:fld>
+            <a:endParaRPr lang="en-US"/>
+          </a:p>
+        </p:txBody>
+      </p:sp>
+    </p:spTree>
+    <p:extLst>
+      <p:ext uri="{BB962C8B-B14F-4D97-AF65-F5344CB8AC3E}">
+        <p14:creationId xmlns:p14="http://schemas.microsoft.com/office/powerpoint/2010/main" val="1450392297"/>
+      </p:ext>
+    </p:extLst>
+  </p:cSld>
+  <p:clrMapOvr>
+    <a:masterClrMapping/>
+  </p:clrMapOvr>
+</p:notes>
+</file>
+
+<file path=ppt/notesSlides/notesSlide9.xml><?xml version="1.0" encoding="utf-8"?>
+<p:notes xmlns:a="http://schemas.openxmlformats.org/drawingml/2006/main" xmlns:r="http://schemas.openxmlformats.org/officeDocument/2006/relationships" xmlns:p="http://schemas.openxmlformats.org/presentationml/2006/main">
+  <p:cSld>
+    <p:spTree>
+      <p:nvGrpSpPr>
+        <p:cNvPr id="1" name=""/>
+        <p:cNvGrpSpPr/>
+        <p:nvPr/>
+      </p:nvGrpSpPr>
+      <p:grpSpPr>
+        <a:xfrm>
+          <a:off x="0" y="0"/>
+          <a:ext cx="0" cy="0"/>
+          <a:chOff x="0" y="0"/>
+          <a:chExt cx="0" cy="0"/>
+        </a:xfrm>
+      </p:grpSpPr>
+      <p:sp>
+        <p:nvSpPr>
+          <p:cNvPr id="2" name="Slide Image Placeholder 1"/>
+          <p:cNvSpPr>
+            <a:spLocks noGrp="1" noRot="1" noChangeAspect="1"/>
+          </p:cNvSpPr>
+          <p:nvPr>
+            <p:ph type="sldImg"/>
+          </p:nvPr>
+        </p:nvSpPr>
+        <p:spPr/>
+      </p:sp>
+      <p:sp>
+        <p:nvSpPr>
+          <p:cNvPr id="3" name="Notes Placeholder 2"/>
+          <p:cNvSpPr>
+            <a:spLocks noGrp="1"/>
+          </p:cNvSpPr>
+          <p:nvPr>
+            <p:ph type="body" idx="1"/>
+          </p:nvPr>
+        </p:nvSpPr>
+        <p:spPr/>
+        <p:txBody>
+          <a:bodyPr/>
+          <a:lstStyle/>
+          <a:p>
+            <a:endParaRPr lang="en-US" dirty="0"/>
+          </a:p>
+        </p:txBody>
+      </p:sp>
+      <p:sp>
+        <p:nvSpPr>
+          <p:cNvPr id="4" name="Slide Number Placeholder 3"/>
+          <p:cNvSpPr>
+            <a:spLocks noGrp="1"/>
+          </p:cNvSpPr>
+          <p:nvPr>
+            <p:ph type="sldNum" sz="quarter" idx="10"/>
+          </p:nvPr>
+        </p:nvSpPr>
+        <p:spPr/>
+        <p:txBody>
+          <a:bodyPr/>
+          <a:lstStyle/>
+          <a:p>
+            <a:fld id="{BA1D5B97-ACF5-4677-A104-92B2393AA446}" type="slidenum">
+              <a:rPr lang="en-US" smtClean="0"/>
+              <a:t>33</a:t>
+            </a:fld>
+            <a:endParaRPr lang="en-US"/>
+          </a:p>
+        </p:txBody>
+      </p:sp>
+    </p:spTree>
+    <p:extLst>
+      <p:ext uri="{BB962C8B-B14F-4D97-AF65-F5344CB8AC3E}">
+        <p14:creationId xmlns:p14="http://schemas.microsoft.com/office/powerpoint/2010/main" val="2370971245"/>
       </p:ext>
     </p:extLst>
   </p:cSld>
@@ -892,7 +1487,7 @@
           <a:p>
             <a:fld id="{622E22BE-79DE-4FFF-A515-BF1CA8DF801A}" type="datetimeFigureOut">
               <a:rPr lang="en-US" smtClean="0"/>
-              <a:t>28-Sep-19</a:t>
+              <a:t>29-Sep-19</a:t>
             </a:fld>
             <a:endParaRPr lang="en-US"/>
           </a:p>
@@ -1062,7 +1657,7 @@
           <a:p>
             <a:fld id="{622E22BE-79DE-4FFF-A515-BF1CA8DF801A}" type="datetimeFigureOut">
               <a:rPr lang="en-US" smtClean="0"/>
-              <a:t>28-Sep-19</a:t>
+              <a:t>29-Sep-19</a:t>
             </a:fld>
             <a:endParaRPr lang="en-US"/>
           </a:p>
@@ -1242,7 +1837,7 @@
           <a:p>
             <a:fld id="{622E22BE-79DE-4FFF-A515-BF1CA8DF801A}" type="datetimeFigureOut">
               <a:rPr lang="en-US" smtClean="0"/>
-              <a:t>28-Sep-19</a:t>
+              <a:t>29-Sep-19</a:t>
             </a:fld>
             <a:endParaRPr lang="en-US"/>
           </a:p>
@@ -1412,7 +2007,7 @@
           <a:p>
             <a:fld id="{622E22BE-79DE-4FFF-A515-BF1CA8DF801A}" type="datetimeFigureOut">
               <a:rPr lang="en-US" smtClean="0"/>
-              <a:t>28-Sep-19</a:t>
+              <a:t>29-Sep-19</a:t>
             </a:fld>
             <a:endParaRPr lang="en-US"/>
           </a:p>
@@ -1658,7 +2253,7 @@
           <a:p>
             <a:fld id="{622E22BE-79DE-4FFF-A515-BF1CA8DF801A}" type="datetimeFigureOut">
               <a:rPr lang="en-US" smtClean="0"/>
-              <a:t>28-Sep-19</a:t>
+              <a:t>29-Sep-19</a:t>
             </a:fld>
             <a:endParaRPr lang="en-US"/>
           </a:p>
@@ -1890,7 +2485,7 @@
           <a:p>
             <a:fld id="{622E22BE-79DE-4FFF-A515-BF1CA8DF801A}" type="datetimeFigureOut">
               <a:rPr lang="en-US" smtClean="0"/>
-              <a:t>28-Sep-19</a:t>
+              <a:t>29-Sep-19</a:t>
             </a:fld>
             <a:endParaRPr lang="en-US"/>
           </a:p>
@@ -2257,7 +2852,7 @@
           <a:p>
             <a:fld id="{622E22BE-79DE-4FFF-A515-BF1CA8DF801A}" type="datetimeFigureOut">
               <a:rPr lang="en-US" smtClean="0"/>
-              <a:t>28-Sep-19</a:t>
+              <a:t>29-Sep-19</a:t>
             </a:fld>
             <a:endParaRPr lang="en-US"/>
           </a:p>
@@ -2375,7 +2970,7 @@
           <a:p>
             <a:fld id="{622E22BE-79DE-4FFF-A515-BF1CA8DF801A}" type="datetimeFigureOut">
               <a:rPr lang="en-US" smtClean="0"/>
-              <a:t>28-Sep-19</a:t>
+              <a:t>29-Sep-19</a:t>
             </a:fld>
             <a:endParaRPr lang="en-US"/>
           </a:p>
@@ -2470,7 +3065,7 @@
           <a:p>
             <a:fld id="{622E22BE-79DE-4FFF-A515-BF1CA8DF801A}" type="datetimeFigureOut">
               <a:rPr lang="en-US" smtClean="0"/>
-              <a:t>28-Sep-19</a:t>
+              <a:t>29-Sep-19</a:t>
             </a:fld>
             <a:endParaRPr lang="en-US"/>
           </a:p>
@@ -2747,7 +3342,7 @@
           <a:p>
             <a:fld id="{622E22BE-79DE-4FFF-A515-BF1CA8DF801A}" type="datetimeFigureOut">
               <a:rPr lang="en-US" smtClean="0"/>
-              <a:t>28-Sep-19</a:t>
+              <a:t>29-Sep-19</a:t>
             </a:fld>
             <a:endParaRPr lang="en-US"/>
           </a:p>
@@ -3000,7 +3595,7 @@
           <a:p>
             <a:fld id="{622E22BE-79DE-4FFF-A515-BF1CA8DF801A}" type="datetimeFigureOut">
               <a:rPr lang="en-US" smtClean="0"/>
-              <a:t>28-Sep-19</a:t>
+              <a:t>29-Sep-19</a:t>
             </a:fld>
             <a:endParaRPr lang="en-US"/>
           </a:p>
@@ -3213,7 +3808,7 @@
           <a:p>
             <a:fld id="{622E22BE-79DE-4FFF-A515-BF1CA8DF801A}" type="datetimeFigureOut">
               <a:rPr lang="en-US" smtClean="0"/>
-              <a:t>28-Sep-19</a:t>
+              <a:t>29-Sep-19</a:t>
             </a:fld>
             <a:endParaRPr lang="en-US"/>
           </a:p>
@@ -5856,7 +6451,15 @@
           <a:p>
             <a:r>
               <a:rPr lang="en-US" dirty="0" smtClean="0"/>
-              <a:t>Authorization filters example</a:t>
+              <a:t>Authorization </a:t>
+            </a:r>
+            <a:r>
+              <a:rPr lang="en-US" dirty="0" smtClean="0"/>
+              <a:t>filter </a:t>
+            </a:r>
+            <a:r>
+              <a:rPr lang="en-US" dirty="0" smtClean="0"/>
+              <a:t>example</a:t>
             </a:r>
             <a:endParaRPr lang="en-US" dirty="0"/>
           </a:p>
@@ -5974,7 +6577,15 @@
           <a:p>
             <a:r>
               <a:rPr lang="en-US" dirty="0" smtClean="0"/>
-              <a:t>Authorization filters example</a:t>
+              <a:t>Authorization </a:t>
+            </a:r>
+            <a:r>
+              <a:rPr lang="en-US" dirty="0" smtClean="0"/>
+              <a:t>filter </a:t>
+            </a:r>
+            <a:r>
+              <a:rPr lang="en-US" dirty="0" smtClean="0"/>
+              <a:t>example</a:t>
             </a:r>
             <a:endParaRPr lang="en-US" dirty="0"/>
           </a:p>
@@ -6092,7 +6703,15 @@
           <a:p>
             <a:r>
               <a:rPr lang="en-US" dirty="0" smtClean="0"/>
-              <a:t>Authorization filters example</a:t>
+              <a:t>Authorization </a:t>
+            </a:r>
+            <a:r>
+              <a:rPr lang="en-US" dirty="0" smtClean="0"/>
+              <a:t>filter </a:t>
+            </a:r>
+            <a:r>
+              <a:rPr lang="en-US" dirty="0" smtClean="0"/>
+              <a:t>example</a:t>
             </a:r>
             <a:endParaRPr lang="en-US" dirty="0"/>
           </a:p>
@@ -6960,7 +7579,269 @@
     </p:spTree>
     <p:extLst>
       <p:ext uri="{BB962C8B-B14F-4D97-AF65-F5344CB8AC3E}">
-        <p14:creationId xmlns:p14="http://schemas.microsoft.com/office/powerpoint/2010/main" val="616895066"/>
+        <p14:creationId xmlns:p14="http://schemas.microsoft.com/office/powerpoint/2010/main" val="989413559"/>
+      </p:ext>
+    </p:extLst>
+  </p:cSld>
+  <p:clrMapOvr>
+    <a:masterClrMapping/>
+  </p:clrMapOvr>
+  <p:timing>
+    <p:tnLst>
+      <p:par>
+        <p:cTn id="1" dur="indefinite" restart="never" nodeType="tmRoot"/>
+      </p:par>
+    </p:tnLst>
+  </p:timing>
+</p:sld>
+</file>
+
+<file path=ppt/slides/slide28.xml><?xml version="1.0" encoding="utf-8"?>
+<p:sld xmlns:a="http://schemas.openxmlformats.org/drawingml/2006/main" xmlns:r="http://schemas.openxmlformats.org/officeDocument/2006/relationships" xmlns:p="http://schemas.openxmlformats.org/presentationml/2006/main">
+  <p:cSld>
+    <p:bg>
+      <p:bgPr>
+        <a:gradFill>
+          <a:gsLst>
+            <a:gs pos="0">
+              <a:schemeClr val="accent1">
+                <a:lumMod val="5000"/>
+                <a:lumOff val="95000"/>
+              </a:schemeClr>
+            </a:gs>
+            <a:gs pos="42000">
+              <a:schemeClr val="accent1">
+                <a:lumMod val="45000"/>
+                <a:lumOff val="55000"/>
+              </a:schemeClr>
+            </a:gs>
+            <a:gs pos="83000">
+              <a:schemeClr val="accent1">
+                <a:lumMod val="45000"/>
+                <a:lumOff val="55000"/>
+              </a:schemeClr>
+            </a:gs>
+            <a:gs pos="100000">
+              <a:schemeClr val="accent1">
+                <a:lumMod val="30000"/>
+                <a:lumOff val="70000"/>
+              </a:schemeClr>
+            </a:gs>
+          </a:gsLst>
+          <a:lin ang="5400000" scaled="1"/>
+        </a:gradFill>
+        <a:effectLst/>
+      </p:bgPr>
+    </p:bg>
+    <p:spTree>
+      <p:nvGrpSpPr>
+        <p:cNvPr id="1" name=""/>
+        <p:cNvGrpSpPr/>
+        <p:nvPr/>
+      </p:nvGrpSpPr>
+      <p:grpSpPr>
+        <a:xfrm>
+          <a:off x="0" y="0"/>
+          <a:ext cx="0" cy="0"/>
+          <a:chOff x="0" y="0"/>
+          <a:chExt cx="0" cy="0"/>
+        </a:xfrm>
+      </p:grpSpPr>
+      <p:sp>
+        <p:nvSpPr>
+          <p:cNvPr id="2" name="Title 1"/>
+          <p:cNvSpPr>
+            <a:spLocks noGrp="1"/>
+          </p:cNvSpPr>
+          <p:nvPr>
+            <p:ph type="title"/>
+          </p:nvPr>
+        </p:nvSpPr>
+        <p:spPr>
+          <a:xfrm>
+            <a:off x="768015" y="0"/>
+            <a:ext cx="10515600" cy="1325563"/>
+          </a:xfrm>
+        </p:spPr>
+        <p:txBody>
+          <a:bodyPr/>
+          <a:lstStyle/>
+          <a:p>
+            <a:r>
+              <a:rPr lang="en-US" dirty="0" smtClean="0"/>
+              <a:t>Action </a:t>
+            </a:r>
+            <a:r>
+              <a:rPr lang="en-US" dirty="0" smtClean="0"/>
+              <a:t>Filter exa</a:t>
+            </a:r>
+            <a:r>
+              <a:rPr lang="en-US" dirty="0" smtClean="0"/>
+              <a:t>mple</a:t>
+            </a:r>
+            <a:endParaRPr lang="en-US" dirty="0"/>
+          </a:p>
+        </p:txBody>
+      </p:sp>
+      <p:pic>
+        <p:nvPicPr>
+          <p:cNvPr id="4" name="Picture 3"/>
+          <p:cNvPicPr>
+            <a:picLocks noChangeAspect="1"/>
+          </p:cNvPicPr>
+          <p:nvPr/>
+        </p:nvPicPr>
+        <p:blipFill>
+          <a:blip r:embed="rId3"/>
+          <a:stretch>
+            <a:fillRect/>
+          </a:stretch>
+        </p:blipFill>
+        <p:spPr>
+          <a:xfrm>
+            <a:off x="768015" y="1164054"/>
+            <a:ext cx="9129963" cy="5529414"/>
+          </a:xfrm>
+          <a:prstGeom prst="rect">
+            <a:avLst/>
+          </a:prstGeom>
+        </p:spPr>
+      </p:pic>
+    </p:spTree>
+    <p:extLst>
+      <p:ext uri="{BB962C8B-B14F-4D97-AF65-F5344CB8AC3E}">
+        <p14:creationId xmlns:p14="http://schemas.microsoft.com/office/powerpoint/2010/main" val="1841371994"/>
+      </p:ext>
+    </p:extLst>
+  </p:cSld>
+  <p:clrMapOvr>
+    <a:masterClrMapping/>
+  </p:clrMapOvr>
+  <p:timing>
+    <p:tnLst>
+      <p:par>
+        <p:cTn id="1" dur="indefinite" restart="never" nodeType="tmRoot"/>
+      </p:par>
+    </p:tnLst>
+  </p:timing>
+</p:sld>
+</file>
+
+<file path=ppt/slides/slide29.xml><?xml version="1.0" encoding="utf-8"?>
+<p:sld xmlns:a="http://schemas.openxmlformats.org/drawingml/2006/main" xmlns:r="http://schemas.openxmlformats.org/officeDocument/2006/relationships" xmlns:p="http://schemas.openxmlformats.org/presentationml/2006/main">
+  <p:cSld>
+    <p:bg>
+      <p:bgPr>
+        <a:gradFill>
+          <a:gsLst>
+            <a:gs pos="0">
+              <a:schemeClr val="accent1">
+                <a:lumMod val="5000"/>
+                <a:lumOff val="95000"/>
+              </a:schemeClr>
+            </a:gs>
+            <a:gs pos="42000">
+              <a:schemeClr val="accent1">
+                <a:lumMod val="45000"/>
+                <a:lumOff val="55000"/>
+              </a:schemeClr>
+            </a:gs>
+            <a:gs pos="83000">
+              <a:schemeClr val="accent1">
+                <a:lumMod val="45000"/>
+                <a:lumOff val="55000"/>
+              </a:schemeClr>
+            </a:gs>
+            <a:gs pos="100000">
+              <a:schemeClr val="accent1">
+                <a:lumMod val="30000"/>
+                <a:lumOff val="70000"/>
+              </a:schemeClr>
+            </a:gs>
+          </a:gsLst>
+          <a:lin ang="5400000" scaled="1"/>
+        </a:gradFill>
+        <a:effectLst/>
+      </p:bgPr>
+    </p:bg>
+    <p:spTree>
+      <p:nvGrpSpPr>
+        <p:cNvPr id="1" name=""/>
+        <p:cNvGrpSpPr/>
+        <p:nvPr/>
+      </p:nvGrpSpPr>
+      <p:grpSpPr>
+        <a:xfrm>
+          <a:off x="0" y="0"/>
+          <a:ext cx="0" cy="0"/>
+          <a:chOff x="0" y="0"/>
+          <a:chExt cx="0" cy="0"/>
+        </a:xfrm>
+      </p:grpSpPr>
+      <p:sp>
+        <p:nvSpPr>
+          <p:cNvPr id="2" name="Title 1"/>
+          <p:cNvSpPr>
+            <a:spLocks noGrp="1"/>
+          </p:cNvSpPr>
+          <p:nvPr>
+            <p:ph type="title"/>
+          </p:nvPr>
+        </p:nvSpPr>
+        <p:spPr>
+          <a:xfrm>
+            <a:off x="768015" y="0"/>
+            <a:ext cx="10515600" cy="1325563"/>
+          </a:xfrm>
+        </p:spPr>
+        <p:txBody>
+          <a:bodyPr/>
+          <a:lstStyle/>
+          <a:p>
+            <a:r>
+              <a:rPr lang="en-US" dirty="0" smtClean="0"/>
+              <a:t>Action </a:t>
+            </a:r>
+            <a:r>
+              <a:rPr lang="en-US" dirty="0" smtClean="0"/>
+              <a:t>Filter exa</a:t>
+            </a:r>
+            <a:r>
+              <a:rPr lang="en-US" dirty="0" smtClean="0"/>
+              <a:t>mple</a:t>
+            </a:r>
+            <a:endParaRPr lang="en-US" dirty="0"/>
+          </a:p>
+        </p:txBody>
+      </p:sp>
+      <p:pic>
+        <p:nvPicPr>
+          <p:cNvPr id="3" name="Picture 2"/>
+          <p:cNvPicPr>
+            <a:picLocks noChangeAspect="1"/>
+          </p:cNvPicPr>
+          <p:nvPr/>
+        </p:nvPicPr>
+        <p:blipFill>
+          <a:blip r:embed="rId3"/>
+          <a:stretch>
+            <a:fillRect/>
+          </a:stretch>
+        </p:blipFill>
+        <p:spPr>
+          <a:xfrm>
+            <a:off x="947485" y="1854953"/>
+            <a:ext cx="10156659" cy="4134924"/>
+          </a:xfrm>
+          <a:prstGeom prst="rect">
+            <a:avLst/>
+          </a:prstGeom>
+        </p:spPr>
+      </p:pic>
+    </p:spTree>
+    <p:extLst>
+      <p:ext uri="{BB962C8B-B14F-4D97-AF65-F5344CB8AC3E}">
+        <p14:creationId xmlns:p14="http://schemas.microsoft.com/office/powerpoint/2010/main" val="3804632878"/>
       </p:ext>
     </p:extLst>
   </p:cSld>
@@ -7124,6 +8005,745 @@
     <p:extLst>
       <p:ext uri="{BB962C8B-B14F-4D97-AF65-F5344CB8AC3E}">
         <p14:creationId xmlns:p14="http://schemas.microsoft.com/office/powerpoint/2010/main" val="4052774876"/>
+      </p:ext>
+    </p:extLst>
+  </p:cSld>
+  <p:clrMapOvr>
+    <a:masterClrMapping/>
+  </p:clrMapOvr>
+  <p:timing>
+    <p:tnLst>
+      <p:par>
+        <p:cTn id="1" dur="indefinite" restart="never" nodeType="tmRoot"/>
+      </p:par>
+    </p:tnLst>
+  </p:timing>
+</p:sld>
+</file>
+
+<file path=ppt/slides/slide30.xml><?xml version="1.0" encoding="utf-8"?>
+<p:sld xmlns:a="http://schemas.openxmlformats.org/drawingml/2006/main" xmlns:r="http://schemas.openxmlformats.org/officeDocument/2006/relationships" xmlns:p="http://schemas.openxmlformats.org/presentationml/2006/main">
+  <p:cSld>
+    <p:bg>
+      <p:bgPr>
+        <a:gradFill>
+          <a:gsLst>
+            <a:gs pos="0">
+              <a:schemeClr val="accent1">
+                <a:lumMod val="5000"/>
+                <a:lumOff val="95000"/>
+              </a:schemeClr>
+            </a:gs>
+            <a:gs pos="42000">
+              <a:schemeClr val="accent1">
+                <a:lumMod val="45000"/>
+                <a:lumOff val="55000"/>
+              </a:schemeClr>
+            </a:gs>
+            <a:gs pos="83000">
+              <a:schemeClr val="accent1">
+                <a:lumMod val="45000"/>
+                <a:lumOff val="55000"/>
+              </a:schemeClr>
+            </a:gs>
+            <a:gs pos="100000">
+              <a:schemeClr val="accent1">
+                <a:lumMod val="30000"/>
+                <a:lumOff val="70000"/>
+              </a:schemeClr>
+            </a:gs>
+          </a:gsLst>
+          <a:lin ang="5400000" scaled="1"/>
+        </a:gradFill>
+        <a:effectLst/>
+      </p:bgPr>
+    </p:bg>
+    <p:spTree>
+      <p:nvGrpSpPr>
+        <p:cNvPr id="1" name=""/>
+        <p:cNvGrpSpPr/>
+        <p:nvPr/>
+      </p:nvGrpSpPr>
+      <p:grpSpPr>
+        <a:xfrm>
+          <a:off x="0" y="0"/>
+          <a:ext cx="0" cy="0"/>
+          <a:chOff x="0" y="0"/>
+          <a:chExt cx="0" cy="0"/>
+        </a:xfrm>
+      </p:grpSpPr>
+      <p:sp>
+        <p:nvSpPr>
+          <p:cNvPr id="2" name="Title 1"/>
+          <p:cNvSpPr>
+            <a:spLocks noGrp="1"/>
+          </p:cNvSpPr>
+          <p:nvPr>
+            <p:ph type="title"/>
+          </p:nvPr>
+        </p:nvSpPr>
+        <p:spPr>
+          <a:xfrm>
+            <a:off x="768015" y="128337"/>
+            <a:ext cx="10515600" cy="1325563"/>
+          </a:xfrm>
+        </p:spPr>
+        <p:txBody>
+          <a:bodyPr/>
+          <a:lstStyle/>
+          <a:p>
+            <a:r>
+              <a:rPr lang="en-US" dirty="0" smtClean="0"/>
+              <a:t>Action </a:t>
+            </a:r>
+            <a:r>
+              <a:rPr lang="en-US" dirty="0" smtClean="0"/>
+              <a:t>Filter exa</a:t>
+            </a:r>
+            <a:r>
+              <a:rPr lang="en-US" dirty="0" smtClean="0"/>
+              <a:t>mple</a:t>
+            </a:r>
+            <a:endParaRPr lang="en-US" dirty="0"/>
+          </a:p>
+        </p:txBody>
+      </p:sp>
+      <p:pic>
+        <p:nvPicPr>
+          <p:cNvPr id="5" name="Picture 4"/>
+          <p:cNvPicPr>
+            <a:picLocks noChangeAspect="1"/>
+          </p:cNvPicPr>
+          <p:nvPr/>
+        </p:nvPicPr>
+        <p:blipFill>
+          <a:blip r:embed="rId3"/>
+          <a:stretch>
+            <a:fillRect/>
+          </a:stretch>
+        </p:blipFill>
+        <p:spPr>
+          <a:xfrm>
+            <a:off x="809284" y="1967248"/>
+            <a:ext cx="10474331" cy="3471026"/>
+          </a:xfrm>
+          <a:prstGeom prst="rect">
+            <a:avLst/>
+          </a:prstGeom>
+        </p:spPr>
+      </p:pic>
+    </p:spTree>
+    <p:extLst>
+      <p:ext uri="{BB962C8B-B14F-4D97-AF65-F5344CB8AC3E}">
+        <p14:creationId xmlns:p14="http://schemas.microsoft.com/office/powerpoint/2010/main" val="76871038"/>
+      </p:ext>
+    </p:extLst>
+  </p:cSld>
+  <p:clrMapOvr>
+    <a:masterClrMapping/>
+  </p:clrMapOvr>
+  <p:timing>
+    <p:tnLst>
+      <p:par>
+        <p:cTn id="1" dur="indefinite" restart="never" nodeType="tmRoot"/>
+      </p:par>
+    </p:tnLst>
+  </p:timing>
+</p:sld>
+</file>
+
+<file path=ppt/slides/slide31.xml><?xml version="1.0" encoding="utf-8"?>
+<p:sld xmlns:a="http://schemas.openxmlformats.org/drawingml/2006/main" xmlns:r="http://schemas.openxmlformats.org/officeDocument/2006/relationships" xmlns:p="http://schemas.openxmlformats.org/presentationml/2006/main">
+  <p:cSld>
+    <p:bg>
+      <p:bgPr>
+        <a:gradFill>
+          <a:gsLst>
+            <a:gs pos="0">
+              <a:schemeClr val="accent1">
+                <a:lumMod val="5000"/>
+                <a:lumOff val="95000"/>
+              </a:schemeClr>
+            </a:gs>
+            <a:gs pos="42000">
+              <a:schemeClr val="accent1">
+                <a:lumMod val="45000"/>
+                <a:lumOff val="55000"/>
+              </a:schemeClr>
+            </a:gs>
+            <a:gs pos="83000">
+              <a:schemeClr val="accent1">
+                <a:lumMod val="45000"/>
+                <a:lumOff val="55000"/>
+              </a:schemeClr>
+            </a:gs>
+            <a:gs pos="100000">
+              <a:schemeClr val="accent1">
+                <a:lumMod val="30000"/>
+                <a:lumOff val="70000"/>
+              </a:schemeClr>
+            </a:gs>
+          </a:gsLst>
+          <a:lin ang="5400000" scaled="1"/>
+        </a:gradFill>
+        <a:effectLst/>
+      </p:bgPr>
+    </p:bg>
+    <p:spTree>
+      <p:nvGrpSpPr>
+        <p:cNvPr id="1" name=""/>
+        <p:cNvGrpSpPr/>
+        <p:nvPr/>
+      </p:nvGrpSpPr>
+      <p:grpSpPr>
+        <a:xfrm>
+          <a:off x="0" y="0"/>
+          <a:ext cx="0" cy="0"/>
+          <a:chOff x="0" y="0"/>
+          <a:chExt cx="0" cy="0"/>
+        </a:xfrm>
+      </p:grpSpPr>
+      <p:sp>
+        <p:nvSpPr>
+          <p:cNvPr id="2" name="Title 1"/>
+          <p:cNvSpPr>
+            <a:spLocks noGrp="1"/>
+          </p:cNvSpPr>
+          <p:nvPr>
+            <p:ph type="title"/>
+          </p:nvPr>
+        </p:nvSpPr>
+        <p:spPr>
+          <a:xfrm>
+            <a:off x="768015" y="128337"/>
+            <a:ext cx="10515600" cy="1325563"/>
+          </a:xfrm>
+        </p:spPr>
+        <p:txBody>
+          <a:bodyPr/>
+          <a:lstStyle/>
+          <a:p>
+            <a:r>
+              <a:rPr lang="en-US" dirty="0"/>
+              <a:t>Asynchronous Action Filter</a:t>
+            </a:r>
+            <a:endParaRPr lang="en-US" dirty="0"/>
+          </a:p>
+        </p:txBody>
+      </p:sp>
+      <p:sp>
+        <p:nvSpPr>
+          <p:cNvPr id="3" name="Rectangle 2"/>
+          <p:cNvSpPr/>
+          <p:nvPr/>
+        </p:nvSpPr>
+        <p:spPr>
+          <a:xfrm>
+            <a:off x="362953" y="2209073"/>
+            <a:ext cx="12294269" cy="3539430"/>
+          </a:xfrm>
+          <a:prstGeom prst="rect">
+            <a:avLst/>
+          </a:prstGeom>
+        </p:spPr>
+        <p:txBody>
+          <a:bodyPr wrap="square">
+            <a:spAutoFit/>
+          </a:bodyPr>
+          <a:lstStyle/>
+          <a:p>
+            <a:r>
+              <a:rPr lang="en-US" sz="2800" dirty="0">
+                <a:latin typeface="Consolas" panose="020B0609020204030204" pitchFamily="49" charset="0"/>
+              </a:rPr>
+              <a:t>public interface </a:t>
+            </a:r>
+            <a:r>
+              <a:rPr lang="en-US" sz="2800" dirty="0" err="1">
+                <a:latin typeface="Consolas" panose="020B0609020204030204" pitchFamily="49" charset="0"/>
+              </a:rPr>
+              <a:t>IAsyncActionFilter</a:t>
+            </a:r>
+            <a:r>
+              <a:rPr lang="en-US" sz="2800" dirty="0">
+                <a:latin typeface="Consolas" panose="020B0609020204030204" pitchFamily="49" charset="0"/>
+              </a:rPr>
+              <a:t> : </a:t>
+            </a:r>
+            <a:r>
+              <a:rPr lang="en-US" sz="2800" dirty="0" err="1">
+                <a:latin typeface="Consolas" panose="020B0609020204030204" pitchFamily="49" charset="0"/>
+              </a:rPr>
+              <a:t>IFilterMetadata</a:t>
+            </a:r>
+            <a:r>
+              <a:rPr lang="en-US" sz="2800" dirty="0">
+                <a:latin typeface="Consolas" panose="020B0609020204030204" pitchFamily="49" charset="0"/>
+              </a:rPr>
+              <a:t> </a:t>
+            </a:r>
+            <a:r>
+              <a:rPr lang="en-US" sz="2800" dirty="0" smtClean="0">
+                <a:latin typeface="Consolas" panose="020B0609020204030204" pitchFamily="49" charset="0"/>
+              </a:rPr>
+              <a:t>{</a:t>
+            </a:r>
+          </a:p>
+          <a:p>
+            <a:endParaRPr lang="en-US" sz="2800" dirty="0" smtClean="0">
+              <a:latin typeface="Consolas" panose="020B0609020204030204" pitchFamily="49" charset="0"/>
+            </a:endParaRPr>
+          </a:p>
+          <a:p>
+            <a:endParaRPr lang="en-US" sz="2800" dirty="0">
+              <a:latin typeface="Consolas" panose="020B0609020204030204" pitchFamily="49" charset="0"/>
+            </a:endParaRPr>
+          </a:p>
+          <a:p>
+            <a:r>
+              <a:rPr lang="en-US" sz="2800" dirty="0">
+                <a:latin typeface="Consolas" panose="020B0609020204030204" pitchFamily="49" charset="0"/>
+              </a:rPr>
+              <a:t>Task </a:t>
+            </a:r>
+            <a:r>
+              <a:rPr lang="en-US" sz="2800" dirty="0" err="1">
+                <a:latin typeface="Consolas" panose="020B0609020204030204" pitchFamily="49" charset="0"/>
+              </a:rPr>
+              <a:t>OnActionExecutionAsync</a:t>
+            </a:r>
+            <a:r>
+              <a:rPr lang="en-US" sz="2800" dirty="0">
+                <a:latin typeface="Consolas" panose="020B0609020204030204" pitchFamily="49" charset="0"/>
+              </a:rPr>
+              <a:t>(</a:t>
+            </a:r>
+            <a:r>
+              <a:rPr lang="en-US" sz="2800" dirty="0" err="1">
+                <a:latin typeface="Consolas" panose="020B0609020204030204" pitchFamily="49" charset="0"/>
+              </a:rPr>
+              <a:t>ActionExecutingContext</a:t>
+            </a:r>
+            <a:r>
+              <a:rPr lang="en-US" sz="2800" dirty="0">
+                <a:latin typeface="Consolas" panose="020B0609020204030204" pitchFamily="49" charset="0"/>
+              </a:rPr>
+              <a:t> context,</a:t>
+            </a:r>
+          </a:p>
+          <a:p>
+            <a:r>
+              <a:rPr lang="en-US" sz="2800" dirty="0" err="1">
+                <a:latin typeface="Consolas" panose="020B0609020204030204" pitchFamily="49" charset="0"/>
+              </a:rPr>
+              <a:t>ActionExecutionDelegate</a:t>
+            </a:r>
+            <a:r>
+              <a:rPr lang="en-US" sz="2800" dirty="0">
+                <a:latin typeface="Consolas" panose="020B0609020204030204" pitchFamily="49" charset="0"/>
+              </a:rPr>
+              <a:t> next</a:t>
+            </a:r>
+            <a:r>
+              <a:rPr lang="en-US" sz="2800" dirty="0" smtClean="0">
+                <a:latin typeface="Consolas" panose="020B0609020204030204" pitchFamily="49" charset="0"/>
+              </a:rPr>
+              <a:t>);</a:t>
+            </a:r>
+          </a:p>
+          <a:p>
+            <a:endParaRPr lang="en-US" sz="2800" dirty="0">
+              <a:latin typeface="Consolas" panose="020B0609020204030204" pitchFamily="49" charset="0"/>
+            </a:endParaRPr>
+          </a:p>
+          <a:p>
+            <a:endParaRPr lang="en-US" sz="2800" dirty="0">
+              <a:latin typeface="Consolas" panose="020B0609020204030204" pitchFamily="49" charset="0"/>
+            </a:endParaRPr>
+          </a:p>
+          <a:p>
+            <a:r>
+              <a:rPr lang="en-US" sz="2800" dirty="0">
+                <a:latin typeface="Consolas" panose="020B0609020204030204" pitchFamily="49" charset="0"/>
+              </a:rPr>
+              <a:t>}</a:t>
+            </a:r>
+          </a:p>
+        </p:txBody>
+      </p:sp>
+    </p:spTree>
+    <p:extLst>
+      <p:ext uri="{BB962C8B-B14F-4D97-AF65-F5344CB8AC3E}">
+        <p14:creationId xmlns:p14="http://schemas.microsoft.com/office/powerpoint/2010/main" val="1904373804"/>
+      </p:ext>
+    </p:extLst>
+  </p:cSld>
+  <p:clrMapOvr>
+    <a:masterClrMapping/>
+  </p:clrMapOvr>
+  <p:timing>
+    <p:tnLst>
+      <p:par>
+        <p:cTn id="1" dur="indefinite" restart="never" nodeType="tmRoot"/>
+      </p:par>
+    </p:tnLst>
+  </p:timing>
+</p:sld>
+</file>
+
+<file path=ppt/slides/slide32.xml><?xml version="1.0" encoding="utf-8"?>
+<p:sld xmlns:a="http://schemas.openxmlformats.org/drawingml/2006/main" xmlns:r="http://schemas.openxmlformats.org/officeDocument/2006/relationships" xmlns:p="http://schemas.openxmlformats.org/presentationml/2006/main">
+  <p:cSld>
+    <p:bg>
+      <p:bgPr>
+        <a:gradFill>
+          <a:gsLst>
+            <a:gs pos="0">
+              <a:schemeClr val="accent1">
+                <a:lumMod val="5000"/>
+                <a:lumOff val="95000"/>
+              </a:schemeClr>
+            </a:gs>
+            <a:gs pos="42000">
+              <a:schemeClr val="accent1">
+                <a:lumMod val="45000"/>
+                <a:lumOff val="55000"/>
+              </a:schemeClr>
+            </a:gs>
+            <a:gs pos="83000">
+              <a:schemeClr val="accent1">
+                <a:lumMod val="45000"/>
+                <a:lumOff val="55000"/>
+              </a:schemeClr>
+            </a:gs>
+            <a:gs pos="100000">
+              <a:schemeClr val="accent1">
+                <a:lumMod val="30000"/>
+                <a:lumOff val="70000"/>
+              </a:schemeClr>
+            </a:gs>
+          </a:gsLst>
+          <a:lin ang="5400000" scaled="1"/>
+        </a:gradFill>
+        <a:effectLst/>
+      </p:bgPr>
+    </p:bg>
+    <p:spTree>
+      <p:nvGrpSpPr>
+        <p:cNvPr id="1" name=""/>
+        <p:cNvGrpSpPr/>
+        <p:nvPr/>
+      </p:nvGrpSpPr>
+      <p:grpSpPr>
+        <a:xfrm>
+          <a:off x="0" y="0"/>
+          <a:ext cx="0" cy="0"/>
+          <a:chOff x="0" y="0"/>
+          <a:chExt cx="0" cy="0"/>
+        </a:xfrm>
+      </p:grpSpPr>
+      <p:sp>
+        <p:nvSpPr>
+          <p:cNvPr id="2" name="Title 1"/>
+          <p:cNvSpPr>
+            <a:spLocks noGrp="1"/>
+          </p:cNvSpPr>
+          <p:nvPr>
+            <p:ph type="title"/>
+          </p:nvPr>
+        </p:nvSpPr>
+        <p:spPr>
+          <a:xfrm>
+            <a:off x="768014" y="240631"/>
+            <a:ext cx="10515600" cy="1325563"/>
+          </a:xfrm>
+        </p:spPr>
+        <p:txBody>
+          <a:bodyPr/>
+          <a:lstStyle/>
+          <a:p>
+            <a:r>
+              <a:rPr lang="en-US" dirty="0"/>
+              <a:t>Asynchronous Action Filter</a:t>
+            </a:r>
+            <a:endParaRPr lang="en-US" dirty="0"/>
+          </a:p>
+        </p:txBody>
+      </p:sp>
+      <p:pic>
+        <p:nvPicPr>
+          <p:cNvPr id="4" name="Picture 3"/>
+          <p:cNvPicPr>
+            <a:picLocks noChangeAspect="1"/>
+          </p:cNvPicPr>
+          <p:nvPr/>
+        </p:nvPicPr>
+        <p:blipFill>
+          <a:blip r:embed="rId3"/>
+          <a:stretch>
+            <a:fillRect/>
+          </a:stretch>
+        </p:blipFill>
+        <p:spPr>
+          <a:xfrm>
+            <a:off x="68639" y="1903078"/>
+            <a:ext cx="11914349" cy="3920205"/>
+          </a:xfrm>
+          <a:prstGeom prst="rect">
+            <a:avLst/>
+          </a:prstGeom>
+        </p:spPr>
+      </p:pic>
+    </p:spTree>
+    <p:extLst>
+      <p:ext uri="{BB962C8B-B14F-4D97-AF65-F5344CB8AC3E}">
+        <p14:creationId xmlns:p14="http://schemas.microsoft.com/office/powerpoint/2010/main" val="4256286627"/>
+      </p:ext>
+    </p:extLst>
+  </p:cSld>
+  <p:clrMapOvr>
+    <a:masterClrMapping/>
+  </p:clrMapOvr>
+  <p:timing>
+    <p:tnLst>
+      <p:par>
+        <p:cTn id="1" dur="indefinite" restart="never" nodeType="tmRoot"/>
+      </p:par>
+    </p:tnLst>
+  </p:timing>
+</p:sld>
+</file>
+
+<file path=ppt/slides/slide33.xml><?xml version="1.0" encoding="utf-8"?>
+<p:sld xmlns:a="http://schemas.openxmlformats.org/drawingml/2006/main" xmlns:r="http://schemas.openxmlformats.org/officeDocument/2006/relationships" xmlns:p="http://schemas.openxmlformats.org/presentationml/2006/main">
+  <p:cSld>
+    <p:bg>
+      <p:bgPr>
+        <a:gradFill>
+          <a:gsLst>
+            <a:gs pos="0">
+              <a:schemeClr val="accent1">
+                <a:lumMod val="5000"/>
+                <a:lumOff val="95000"/>
+              </a:schemeClr>
+            </a:gs>
+            <a:gs pos="42000">
+              <a:schemeClr val="accent1">
+                <a:lumMod val="45000"/>
+                <a:lumOff val="55000"/>
+              </a:schemeClr>
+            </a:gs>
+            <a:gs pos="83000">
+              <a:schemeClr val="accent1">
+                <a:lumMod val="45000"/>
+                <a:lumOff val="55000"/>
+              </a:schemeClr>
+            </a:gs>
+            <a:gs pos="100000">
+              <a:schemeClr val="accent1">
+                <a:lumMod val="30000"/>
+                <a:lumOff val="70000"/>
+              </a:schemeClr>
+            </a:gs>
+          </a:gsLst>
+          <a:lin ang="5400000" scaled="1"/>
+        </a:gradFill>
+        <a:effectLst/>
+      </p:bgPr>
+    </p:bg>
+    <p:spTree>
+      <p:nvGrpSpPr>
+        <p:cNvPr id="1" name=""/>
+        <p:cNvGrpSpPr/>
+        <p:nvPr/>
+      </p:nvGrpSpPr>
+      <p:grpSpPr>
+        <a:xfrm>
+          <a:off x="0" y="0"/>
+          <a:ext cx="0" cy="0"/>
+          <a:chOff x="0" y="0"/>
+          <a:chExt cx="0" cy="0"/>
+        </a:xfrm>
+      </p:grpSpPr>
+      <p:sp>
+        <p:nvSpPr>
+          <p:cNvPr id="2" name="Title 1"/>
+          <p:cNvSpPr>
+            <a:spLocks noGrp="1"/>
+          </p:cNvSpPr>
+          <p:nvPr>
+            <p:ph type="title"/>
+          </p:nvPr>
+        </p:nvSpPr>
+        <p:spPr>
+          <a:xfrm>
+            <a:off x="768015" y="128337"/>
+            <a:ext cx="10515600" cy="1325563"/>
+          </a:xfrm>
+        </p:spPr>
+        <p:txBody>
+          <a:bodyPr/>
+          <a:lstStyle/>
+          <a:p>
+            <a:r>
+              <a:rPr lang="en-US" dirty="0"/>
+              <a:t>Asynchronous Action Filter</a:t>
+            </a:r>
+            <a:endParaRPr lang="en-US" dirty="0"/>
+          </a:p>
+        </p:txBody>
+      </p:sp>
+      <p:pic>
+        <p:nvPicPr>
+          <p:cNvPr id="4" name="Picture 3"/>
+          <p:cNvPicPr>
+            <a:picLocks noChangeAspect="1"/>
+          </p:cNvPicPr>
+          <p:nvPr/>
+        </p:nvPicPr>
+        <p:blipFill>
+          <a:blip r:embed="rId3"/>
+          <a:stretch>
+            <a:fillRect/>
+          </a:stretch>
+        </p:blipFill>
+        <p:spPr>
+          <a:xfrm>
+            <a:off x="4056647" y="4189552"/>
+            <a:ext cx="7942848" cy="2509879"/>
+          </a:xfrm>
+          <a:prstGeom prst="rect">
+            <a:avLst/>
+          </a:prstGeom>
+        </p:spPr>
+      </p:pic>
+      <p:pic>
+        <p:nvPicPr>
+          <p:cNvPr id="5" name="Picture 4"/>
+          <p:cNvPicPr>
+            <a:picLocks noChangeAspect="1"/>
+          </p:cNvPicPr>
+          <p:nvPr/>
+        </p:nvPicPr>
+        <p:blipFill>
+          <a:blip r:embed="rId4"/>
+          <a:stretch>
+            <a:fillRect/>
+          </a:stretch>
+        </p:blipFill>
+        <p:spPr>
+          <a:xfrm>
+            <a:off x="521793" y="1140469"/>
+            <a:ext cx="7329815" cy="3049083"/>
+          </a:xfrm>
+          <a:prstGeom prst="rect">
+            <a:avLst/>
+          </a:prstGeom>
+        </p:spPr>
+      </p:pic>
+    </p:spTree>
+    <p:extLst>
+      <p:ext uri="{BB962C8B-B14F-4D97-AF65-F5344CB8AC3E}">
+        <p14:creationId xmlns:p14="http://schemas.microsoft.com/office/powerpoint/2010/main" val="2179539707"/>
+      </p:ext>
+    </p:extLst>
+  </p:cSld>
+  <p:clrMapOvr>
+    <a:masterClrMapping/>
+  </p:clrMapOvr>
+  <p:timing>
+    <p:tnLst>
+      <p:par>
+        <p:cTn id="1" dur="indefinite" restart="never" nodeType="tmRoot"/>
+      </p:par>
+    </p:tnLst>
+  </p:timing>
+</p:sld>
+</file>
+
+<file path=ppt/slides/slide34.xml><?xml version="1.0" encoding="utf-8"?>
+<p:sld xmlns:a="http://schemas.openxmlformats.org/drawingml/2006/main" xmlns:r="http://schemas.openxmlformats.org/officeDocument/2006/relationships" xmlns:p="http://schemas.openxmlformats.org/presentationml/2006/main">
+  <p:cSld>
+    <p:bg>
+      <p:bgPr>
+        <a:gradFill>
+          <a:gsLst>
+            <a:gs pos="0">
+              <a:schemeClr val="accent1">
+                <a:lumMod val="5000"/>
+                <a:lumOff val="95000"/>
+              </a:schemeClr>
+            </a:gs>
+            <a:gs pos="42000">
+              <a:schemeClr val="accent1">
+                <a:lumMod val="45000"/>
+                <a:lumOff val="55000"/>
+              </a:schemeClr>
+            </a:gs>
+            <a:gs pos="83000">
+              <a:schemeClr val="accent1">
+                <a:lumMod val="45000"/>
+                <a:lumOff val="55000"/>
+              </a:schemeClr>
+            </a:gs>
+            <a:gs pos="100000">
+              <a:schemeClr val="accent1">
+                <a:lumMod val="30000"/>
+                <a:lumOff val="70000"/>
+              </a:schemeClr>
+            </a:gs>
+          </a:gsLst>
+          <a:lin ang="5400000" scaled="1"/>
+        </a:gradFill>
+        <a:effectLst/>
+      </p:bgPr>
+    </p:bg>
+    <p:spTree>
+      <p:nvGrpSpPr>
+        <p:cNvPr id="1" name=""/>
+        <p:cNvGrpSpPr/>
+        <p:nvPr/>
+      </p:nvGrpSpPr>
+      <p:grpSpPr>
+        <a:xfrm>
+          <a:off x="0" y="0"/>
+          <a:ext cx="0" cy="0"/>
+          <a:chOff x="0" y="0"/>
+          <a:chExt cx="0" cy="0"/>
+        </a:xfrm>
+      </p:grpSpPr>
+      <p:sp>
+        <p:nvSpPr>
+          <p:cNvPr id="2" name="Title 1"/>
+          <p:cNvSpPr>
+            <a:spLocks noGrp="1"/>
+          </p:cNvSpPr>
+          <p:nvPr>
+            <p:ph type="title"/>
+          </p:nvPr>
+        </p:nvSpPr>
+        <p:spPr>
+          <a:xfrm>
+            <a:off x="768015" y="128337"/>
+            <a:ext cx="10515600" cy="1325563"/>
+          </a:xfrm>
+        </p:spPr>
+        <p:txBody>
+          <a:bodyPr/>
+          <a:lstStyle/>
+          <a:p>
+            <a:r>
+              <a:rPr lang="en-US" smtClean="0"/>
+              <a:t>Result Filters</a:t>
+            </a:r>
+            <a:endParaRPr lang="en-US" dirty="0"/>
+          </a:p>
+        </p:txBody>
+      </p:sp>
+    </p:spTree>
+    <p:extLst>
+      <p:ext uri="{BB962C8B-B14F-4D97-AF65-F5344CB8AC3E}">
+        <p14:creationId xmlns:p14="http://schemas.microsoft.com/office/powerpoint/2010/main" val="4144785726"/>
       </p:ext>
     </p:extLst>
   </p:cSld>

</xml_diff>

<commit_message>
Add Result filter examples
</commit_message>
<xml_diff>
--- a/AspNetCoreMVC.pptx
+++ b/AspNetCoreMVC.pptx
@@ -5,7 +5,7 @@
     <p:sldMasterId id="2147483648" r:id="rId1"/>
   </p:sldMasterIdLst>
   <p:notesMasterIdLst>
-    <p:notesMasterId r:id="rId39"/>
+    <p:notesMasterId r:id="rId42"/>
   </p:notesMasterIdLst>
   <p:sldIdLst>
     <p:sldId id="256" r:id="rId2"/>
@@ -45,6 +45,9 @@
     <p:sldId id="292" r:id="rId36"/>
     <p:sldId id="294" r:id="rId37"/>
     <p:sldId id="293" r:id="rId38"/>
+    <p:sldId id="295" r:id="rId39"/>
+    <p:sldId id="296" r:id="rId40"/>
+    <p:sldId id="297" r:id="rId41"/>
   </p:sldIdLst>
   <p:sldSz cx="12192000" cy="6858000"/>
   <p:notesSz cx="6858000" cy="9144000"/>
@@ -233,7 +236,7 @@
           <a:p>
             <a:fld id="{1747B90C-FE49-44DE-93E7-FA9DDECBEA03}" type="datetimeFigureOut">
               <a:rPr lang="en-US" smtClean="0"/>
-              <a:t>30-Sep-19</a:t>
+              <a:t>01-Oct-19</a:t>
             </a:fld>
             <a:endParaRPr lang="en-US"/>
           </a:p>
@@ -921,6 +924,270 @@
 </p:notes>
 </file>
 
+<file path=ppt/notesSlides/notesSlide14.xml><?xml version="1.0" encoding="utf-8"?>
+<p:notes xmlns:a="http://schemas.openxmlformats.org/drawingml/2006/main" xmlns:r="http://schemas.openxmlformats.org/officeDocument/2006/relationships" xmlns:p="http://schemas.openxmlformats.org/presentationml/2006/main">
+  <p:cSld>
+    <p:spTree>
+      <p:nvGrpSpPr>
+        <p:cNvPr id="1" name=""/>
+        <p:cNvGrpSpPr/>
+        <p:nvPr/>
+      </p:nvGrpSpPr>
+      <p:grpSpPr>
+        <a:xfrm>
+          <a:off x="0" y="0"/>
+          <a:ext cx="0" cy="0"/>
+          <a:chOff x="0" y="0"/>
+          <a:chExt cx="0" cy="0"/>
+        </a:xfrm>
+      </p:grpSpPr>
+      <p:sp>
+        <p:nvSpPr>
+          <p:cNvPr id="2" name="Slide Image Placeholder 1"/>
+          <p:cNvSpPr>
+            <a:spLocks noGrp="1" noRot="1" noChangeAspect="1"/>
+          </p:cNvSpPr>
+          <p:nvPr>
+            <p:ph type="sldImg"/>
+          </p:nvPr>
+        </p:nvSpPr>
+        <p:spPr/>
+      </p:sp>
+      <p:sp>
+        <p:nvSpPr>
+          <p:cNvPr id="3" name="Notes Placeholder 2"/>
+          <p:cNvSpPr>
+            <a:spLocks noGrp="1"/>
+          </p:cNvSpPr>
+          <p:nvPr>
+            <p:ph type="body" idx="1"/>
+          </p:nvPr>
+        </p:nvSpPr>
+        <p:spPr/>
+        <p:txBody>
+          <a:bodyPr/>
+          <a:lstStyle/>
+          <a:p>
+            <a:endParaRPr lang="en-US" dirty="0"/>
+          </a:p>
+        </p:txBody>
+      </p:sp>
+      <p:sp>
+        <p:nvSpPr>
+          <p:cNvPr id="4" name="Slide Number Placeholder 3"/>
+          <p:cNvSpPr>
+            <a:spLocks noGrp="1"/>
+          </p:cNvSpPr>
+          <p:nvPr>
+            <p:ph type="sldNum" sz="quarter" idx="10"/>
+          </p:nvPr>
+        </p:nvSpPr>
+        <p:spPr/>
+        <p:txBody>
+          <a:bodyPr/>
+          <a:lstStyle/>
+          <a:p>
+            <a:fld id="{BA1D5B97-ACF5-4677-A104-92B2393AA446}" type="slidenum">
+              <a:rPr lang="en-US" smtClean="0"/>
+              <a:t>38</a:t>
+            </a:fld>
+            <a:endParaRPr lang="en-US"/>
+          </a:p>
+        </p:txBody>
+      </p:sp>
+    </p:spTree>
+    <p:extLst>
+      <p:ext uri="{BB962C8B-B14F-4D97-AF65-F5344CB8AC3E}">
+        <p14:creationId xmlns:p14="http://schemas.microsoft.com/office/powerpoint/2010/main" val="4021984117"/>
+      </p:ext>
+    </p:extLst>
+  </p:cSld>
+  <p:clrMapOvr>
+    <a:masterClrMapping/>
+  </p:clrMapOvr>
+</p:notes>
+</file>
+
+<file path=ppt/notesSlides/notesSlide15.xml><?xml version="1.0" encoding="utf-8"?>
+<p:notes xmlns:a="http://schemas.openxmlformats.org/drawingml/2006/main" xmlns:r="http://schemas.openxmlformats.org/officeDocument/2006/relationships" xmlns:p="http://schemas.openxmlformats.org/presentationml/2006/main">
+  <p:cSld>
+    <p:spTree>
+      <p:nvGrpSpPr>
+        <p:cNvPr id="1" name=""/>
+        <p:cNvGrpSpPr/>
+        <p:nvPr/>
+      </p:nvGrpSpPr>
+      <p:grpSpPr>
+        <a:xfrm>
+          <a:off x="0" y="0"/>
+          <a:ext cx="0" cy="0"/>
+          <a:chOff x="0" y="0"/>
+          <a:chExt cx="0" cy="0"/>
+        </a:xfrm>
+      </p:grpSpPr>
+      <p:sp>
+        <p:nvSpPr>
+          <p:cNvPr id="2" name="Slide Image Placeholder 1"/>
+          <p:cNvSpPr>
+            <a:spLocks noGrp="1" noRot="1" noChangeAspect="1"/>
+          </p:cNvSpPr>
+          <p:nvPr>
+            <p:ph type="sldImg"/>
+          </p:nvPr>
+        </p:nvSpPr>
+        <p:spPr/>
+      </p:sp>
+      <p:sp>
+        <p:nvSpPr>
+          <p:cNvPr id="3" name="Notes Placeholder 2"/>
+          <p:cNvSpPr>
+            <a:spLocks noGrp="1"/>
+          </p:cNvSpPr>
+          <p:nvPr>
+            <p:ph type="body" idx="1"/>
+          </p:nvPr>
+        </p:nvSpPr>
+        <p:spPr/>
+        <p:txBody>
+          <a:bodyPr/>
+          <a:lstStyle/>
+          <a:p>
+            <a:r>
+              <a:rPr lang="en-US" dirty="0" smtClean="0"/>
+              <a:t>Next</a:t>
+            </a:r>
+            <a:r>
+              <a:rPr lang="en-US" baseline="0" dirty="0" smtClean="0"/>
+              <a:t> must be invoked to complete request processing pipeline and render result. If not called – it won’t </a:t>
+            </a:r>
+            <a:r>
+              <a:rPr lang="en-US" baseline="0" smtClean="0"/>
+              <a:t>be rendered</a:t>
+            </a:r>
+            <a:endParaRPr lang="en-US" dirty="0"/>
+          </a:p>
+        </p:txBody>
+      </p:sp>
+      <p:sp>
+        <p:nvSpPr>
+          <p:cNvPr id="4" name="Slide Number Placeholder 3"/>
+          <p:cNvSpPr>
+            <a:spLocks noGrp="1"/>
+          </p:cNvSpPr>
+          <p:nvPr>
+            <p:ph type="sldNum" sz="quarter" idx="10"/>
+          </p:nvPr>
+        </p:nvSpPr>
+        <p:spPr/>
+        <p:txBody>
+          <a:bodyPr/>
+          <a:lstStyle/>
+          <a:p>
+            <a:fld id="{BA1D5B97-ACF5-4677-A104-92B2393AA446}" type="slidenum">
+              <a:rPr lang="en-US" smtClean="0"/>
+              <a:t>39</a:t>
+            </a:fld>
+            <a:endParaRPr lang="en-US"/>
+          </a:p>
+        </p:txBody>
+      </p:sp>
+    </p:spTree>
+    <p:extLst>
+      <p:ext uri="{BB962C8B-B14F-4D97-AF65-F5344CB8AC3E}">
+        <p14:creationId xmlns:p14="http://schemas.microsoft.com/office/powerpoint/2010/main" val="3073958785"/>
+      </p:ext>
+    </p:extLst>
+  </p:cSld>
+  <p:clrMapOvr>
+    <a:masterClrMapping/>
+  </p:clrMapOvr>
+</p:notes>
+</file>
+
+<file path=ppt/notesSlides/notesSlide16.xml><?xml version="1.0" encoding="utf-8"?>
+<p:notes xmlns:a="http://schemas.openxmlformats.org/drawingml/2006/main" xmlns:r="http://schemas.openxmlformats.org/officeDocument/2006/relationships" xmlns:p="http://schemas.openxmlformats.org/presentationml/2006/main">
+  <p:cSld>
+    <p:spTree>
+      <p:nvGrpSpPr>
+        <p:cNvPr id="1" name=""/>
+        <p:cNvGrpSpPr/>
+        <p:nvPr/>
+      </p:nvGrpSpPr>
+      <p:grpSpPr>
+        <a:xfrm>
+          <a:off x="0" y="0"/>
+          <a:ext cx="0" cy="0"/>
+          <a:chOff x="0" y="0"/>
+          <a:chExt cx="0" cy="0"/>
+        </a:xfrm>
+      </p:grpSpPr>
+      <p:sp>
+        <p:nvSpPr>
+          <p:cNvPr id="2" name="Slide Image Placeholder 1"/>
+          <p:cNvSpPr>
+            <a:spLocks noGrp="1" noRot="1" noChangeAspect="1"/>
+          </p:cNvSpPr>
+          <p:nvPr>
+            <p:ph type="sldImg"/>
+          </p:nvPr>
+        </p:nvSpPr>
+        <p:spPr/>
+      </p:sp>
+      <p:sp>
+        <p:nvSpPr>
+          <p:cNvPr id="3" name="Notes Placeholder 2"/>
+          <p:cNvSpPr>
+            <a:spLocks noGrp="1"/>
+          </p:cNvSpPr>
+          <p:nvPr>
+            <p:ph type="body" idx="1"/>
+          </p:nvPr>
+        </p:nvSpPr>
+        <p:spPr/>
+        <p:txBody>
+          <a:bodyPr/>
+          <a:lstStyle/>
+          <a:p>
+            <a:endParaRPr lang="en-US" dirty="0"/>
+          </a:p>
+        </p:txBody>
+      </p:sp>
+      <p:sp>
+        <p:nvSpPr>
+          <p:cNvPr id="4" name="Slide Number Placeholder 3"/>
+          <p:cNvSpPr>
+            <a:spLocks noGrp="1"/>
+          </p:cNvSpPr>
+          <p:nvPr>
+            <p:ph type="sldNum" sz="quarter" idx="10"/>
+          </p:nvPr>
+        </p:nvSpPr>
+        <p:spPr/>
+        <p:txBody>
+          <a:bodyPr/>
+          <a:lstStyle/>
+          <a:p>
+            <a:fld id="{BA1D5B97-ACF5-4677-A104-92B2393AA446}" type="slidenum">
+              <a:rPr lang="en-US" smtClean="0"/>
+              <a:t>40</a:t>
+            </a:fld>
+            <a:endParaRPr lang="en-US"/>
+          </a:p>
+        </p:txBody>
+      </p:sp>
+    </p:spTree>
+    <p:extLst>
+      <p:ext uri="{BB962C8B-B14F-4D97-AF65-F5344CB8AC3E}">
+        <p14:creationId xmlns:p14="http://schemas.microsoft.com/office/powerpoint/2010/main" val="3491427142"/>
+      </p:ext>
+    </p:extLst>
+  </p:cSld>
+  <p:clrMapOvr>
+    <a:masterClrMapping/>
+  </p:clrMapOvr>
+</p:notes>
+</file>
+
 <file path=ppt/notesSlides/notesSlide2.xml><?xml version="1.0" encoding="utf-8"?>
 <p:notes xmlns:a="http://schemas.openxmlformats.org/drawingml/2006/main" xmlns:r="http://schemas.openxmlformats.org/officeDocument/2006/relationships" xmlns:p="http://schemas.openxmlformats.org/presentationml/2006/main">
   <p:cSld>
@@ -1742,7 +2009,7 @@
           <a:p>
             <a:fld id="{622E22BE-79DE-4FFF-A515-BF1CA8DF801A}" type="datetimeFigureOut">
               <a:rPr lang="en-US" smtClean="0"/>
-              <a:t>30-Sep-19</a:t>
+              <a:t>01-Oct-19</a:t>
             </a:fld>
             <a:endParaRPr lang="en-US"/>
           </a:p>
@@ -1912,7 +2179,7 @@
           <a:p>
             <a:fld id="{622E22BE-79DE-4FFF-A515-BF1CA8DF801A}" type="datetimeFigureOut">
               <a:rPr lang="en-US" smtClean="0"/>
-              <a:t>30-Sep-19</a:t>
+              <a:t>01-Oct-19</a:t>
             </a:fld>
             <a:endParaRPr lang="en-US"/>
           </a:p>
@@ -2092,7 +2359,7 @@
           <a:p>
             <a:fld id="{622E22BE-79DE-4FFF-A515-BF1CA8DF801A}" type="datetimeFigureOut">
               <a:rPr lang="en-US" smtClean="0"/>
-              <a:t>30-Sep-19</a:t>
+              <a:t>01-Oct-19</a:t>
             </a:fld>
             <a:endParaRPr lang="en-US"/>
           </a:p>
@@ -2262,7 +2529,7 @@
           <a:p>
             <a:fld id="{622E22BE-79DE-4FFF-A515-BF1CA8DF801A}" type="datetimeFigureOut">
               <a:rPr lang="en-US" smtClean="0"/>
-              <a:t>30-Sep-19</a:t>
+              <a:t>01-Oct-19</a:t>
             </a:fld>
             <a:endParaRPr lang="en-US"/>
           </a:p>
@@ -2508,7 +2775,7 @@
           <a:p>
             <a:fld id="{622E22BE-79DE-4FFF-A515-BF1CA8DF801A}" type="datetimeFigureOut">
               <a:rPr lang="en-US" smtClean="0"/>
-              <a:t>30-Sep-19</a:t>
+              <a:t>01-Oct-19</a:t>
             </a:fld>
             <a:endParaRPr lang="en-US"/>
           </a:p>
@@ -2740,7 +3007,7 @@
           <a:p>
             <a:fld id="{622E22BE-79DE-4FFF-A515-BF1CA8DF801A}" type="datetimeFigureOut">
               <a:rPr lang="en-US" smtClean="0"/>
-              <a:t>30-Sep-19</a:t>
+              <a:t>01-Oct-19</a:t>
             </a:fld>
             <a:endParaRPr lang="en-US"/>
           </a:p>
@@ -3107,7 +3374,7 @@
           <a:p>
             <a:fld id="{622E22BE-79DE-4FFF-A515-BF1CA8DF801A}" type="datetimeFigureOut">
               <a:rPr lang="en-US" smtClean="0"/>
-              <a:t>30-Sep-19</a:t>
+              <a:t>01-Oct-19</a:t>
             </a:fld>
             <a:endParaRPr lang="en-US"/>
           </a:p>
@@ -3225,7 +3492,7 @@
           <a:p>
             <a:fld id="{622E22BE-79DE-4FFF-A515-BF1CA8DF801A}" type="datetimeFigureOut">
               <a:rPr lang="en-US" smtClean="0"/>
-              <a:t>30-Sep-19</a:t>
+              <a:t>01-Oct-19</a:t>
             </a:fld>
             <a:endParaRPr lang="en-US"/>
           </a:p>
@@ -3320,7 +3587,7 @@
           <a:p>
             <a:fld id="{622E22BE-79DE-4FFF-A515-BF1CA8DF801A}" type="datetimeFigureOut">
               <a:rPr lang="en-US" smtClean="0"/>
-              <a:t>30-Sep-19</a:t>
+              <a:t>01-Oct-19</a:t>
             </a:fld>
             <a:endParaRPr lang="en-US"/>
           </a:p>
@@ -3597,7 +3864,7 @@
           <a:p>
             <a:fld id="{622E22BE-79DE-4FFF-A515-BF1CA8DF801A}" type="datetimeFigureOut">
               <a:rPr lang="en-US" smtClean="0"/>
-              <a:t>30-Sep-19</a:t>
+              <a:t>01-Oct-19</a:t>
             </a:fld>
             <a:endParaRPr lang="en-US"/>
           </a:p>
@@ -3850,7 +4117,7 @@
           <a:p>
             <a:fld id="{622E22BE-79DE-4FFF-A515-BF1CA8DF801A}" type="datetimeFigureOut">
               <a:rPr lang="en-US" smtClean="0"/>
-              <a:t>30-Sep-19</a:t>
+              <a:t>01-Oct-19</a:t>
             </a:fld>
             <a:endParaRPr lang="en-US"/>
           </a:p>
@@ -4063,7 +4330,7 @@
           <a:p>
             <a:fld id="{622E22BE-79DE-4FFF-A515-BF1CA8DF801A}" type="datetimeFigureOut">
               <a:rPr lang="en-US" smtClean="0"/>
-              <a:t>30-Sep-19</a:t>
+              <a:t>01-Oct-19</a:t>
             </a:fld>
             <a:endParaRPr lang="en-US"/>
           </a:p>
@@ -9643,6 +9910,133 @@
         </p:nvSpPr>
         <p:spPr>
           <a:xfrm>
+            <a:off x="310063" y="-128337"/>
+            <a:ext cx="10515600" cy="1325563"/>
+          </a:xfrm>
+        </p:spPr>
+        <p:txBody>
+          <a:bodyPr/>
+          <a:lstStyle/>
+          <a:p>
+            <a:r>
+              <a:rPr lang="en-US" dirty="0" smtClean="0"/>
+              <a:t>Result </a:t>
+            </a:r>
+            <a:r>
+              <a:rPr lang="en-US" dirty="0" smtClean="0"/>
+              <a:t>Filter example</a:t>
+            </a:r>
+            <a:endParaRPr lang="en-US" dirty="0"/>
+          </a:p>
+        </p:txBody>
+      </p:sp>
+      <p:pic>
+        <p:nvPicPr>
+          <p:cNvPr id="5" name="Picture 4"/>
+          <p:cNvPicPr>
+            <a:picLocks noChangeAspect="1"/>
+          </p:cNvPicPr>
+          <p:nvPr/>
+        </p:nvPicPr>
+        <p:blipFill>
+          <a:blip r:embed="rId3"/>
+          <a:stretch>
+            <a:fillRect/>
+          </a:stretch>
+        </p:blipFill>
+        <p:spPr>
+          <a:xfrm>
+            <a:off x="310063" y="1080965"/>
+            <a:ext cx="11431504" cy="5552445"/>
+          </a:xfrm>
+          <a:prstGeom prst="rect">
+            <a:avLst/>
+          </a:prstGeom>
+        </p:spPr>
+      </p:pic>
+    </p:spTree>
+    <p:extLst>
+      <p:ext uri="{BB962C8B-B14F-4D97-AF65-F5344CB8AC3E}">
+        <p14:creationId xmlns:p14="http://schemas.microsoft.com/office/powerpoint/2010/main" val="2888376638"/>
+      </p:ext>
+    </p:extLst>
+  </p:cSld>
+  <p:clrMapOvr>
+    <a:masterClrMapping/>
+  </p:clrMapOvr>
+  <p:timing>
+    <p:tnLst>
+      <p:par>
+        <p:cTn id="1" dur="indefinite" restart="never" nodeType="tmRoot"/>
+      </p:par>
+    </p:tnLst>
+  </p:timing>
+</p:sld>
+</file>
+
+<file path=ppt/slides/slide38.xml><?xml version="1.0" encoding="utf-8"?>
+<p:sld xmlns:a="http://schemas.openxmlformats.org/drawingml/2006/main" xmlns:r="http://schemas.openxmlformats.org/officeDocument/2006/relationships" xmlns:p="http://schemas.openxmlformats.org/presentationml/2006/main">
+  <p:cSld>
+    <p:bg>
+      <p:bgPr>
+        <a:gradFill>
+          <a:gsLst>
+            <a:gs pos="0">
+              <a:schemeClr val="accent1">
+                <a:lumMod val="5000"/>
+                <a:lumOff val="95000"/>
+              </a:schemeClr>
+            </a:gs>
+            <a:gs pos="42000">
+              <a:schemeClr val="accent1">
+                <a:lumMod val="45000"/>
+                <a:lumOff val="55000"/>
+              </a:schemeClr>
+            </a:gs>
+            <a:gs pos="83000">
+              <a:schemeClr val="accent1">
+                <a:lumMod val="45000"/>
+                <a:lumOff val="55000"/>
+              </a:schemeClr>
+            </a:gs>
+            <a:gs pos="100000">
+              <a:schemeClr val="accent1">
+                <a:lumMod val="30000"/>
+                <a:lumOff val="70000"/>
+              </a:schemeClr>
+            </a:gs>
+          </a:gsLst>
+          <a:lin ang="5400000" scaled="1"/>
+        </a:gradFill>
+        <a:effectLst/>
+      </p:bgPr>
+    </p:bg>
+    <p:spTree>
+      <p:nvGrpSpPr>
+        <p:cNvPr id="1" name=""/>
+        <p:cNvGrpSpPr/>
+        <p:nvPr/>
+      </p:nvGrpSpPr>
+      <p:grpSpPr>
+        <a:xfrm>
+          <a:off x="0" y="0"/>
+          <a:ext cx="0" cy="0"/>
+          <a:chOff x="0" y="0"/>
+          <a:chExt cx="0" cy="0"/>
+        </a:xfrm>
+      </p:grpSpPr>
+      <p:sp>
+        <p:nvSpPr>
+          <p:cNvPr id="2" name="Title 1"/>
+          <p:cNvSpPr>
+            <a:spLocks noGrp="1"/>
+          </p:cNvSpPr>
+          <p:nvPr>
+            <p:ph type="title"/>
+          </p:nvPr>
+        </p:nvSpPr>
+        <p:spPr>
+          <a:xfrm>
             <a:off x="768015" y="128337"/>
             <a:ext cx="10515600" cy="1325563"/>
           </a:xfrm>
@@ -9652,17 +10046,200 @@
           <a:lstStyle/>
           <a:p>
             <a:r>
-              <a:rPr lang="en-US" smtClean="0"/>
-              <a:t>Result Filters</a:t>
+              <a:rPr lang="en-US" dirty="0" smtClean="0"/>
+              <a:t>Result </a:t>
+            </a:r>
+            <a:r>
+              <a:rPr lang="en-US" dirty="0" smtClean="0"/>
+              <a:t>Filter example</a:t>
             </a:r>
             <a:endParaRPr lang="en-US" dirty="0"/>
           </a:p>
         </p:txBody>
       </p:sp>
+      <p:pic>
+        <p:nvPicPr>
+          <p:cNvPr id="3" name="Picture 2"/>
+          <p:cNvPicPr>
+            <a:picLocks noChangeAspect="1"/>
+          </p:cNvPicPr>
+          <p:nvPr/>
+        </p:nvPicPr>
+        <p:blipFill>
+          <a:blip r:embed="rId3"/>
+          <a:stretch>
+            <a:fillRect/>
+          </a:stretch>
+        </p:blipFill>
+        <p:spPr>
+          <a:xfrm>
+            <a:off x="768013" y="1277437"/>
+            <a:ext cx="5600701" cy="2331256"/>
+          </a:xfrm>
+          <a:prstGeom prst="rect">
+            <a:avLst/>
+          </a:prstGeom>
+        </p:spPr>
+      </p:pic>
+      <p:pic>
+        <p:nvPicPr>
+          <p:cNvPr id="6" name="Picture 5"/>
+          <p:cNvPicPr>
+            <a:picLocks noChangeAspect="1"/>
+          </p:cNvPicPr>
+          <p:nvPr/>
+        </p:nvPicPr>
+        <p:blipFill>
+          <a:blip r:embed="rId4"/>
+          <a:stretch>
+            <a:fillRect/>
+          </a:stretch>
+        </p:blipFill>
+        <p:spPr>
+          <a:xfrm>
+            <a:off x="768013" y="3785156"/>
+            <a:ext cx="11006892" cy="2938348"/>
+          </a:xfrm>
+          <a:prstGeom prst="rect">
+            <a:avLst/>
+          </a:prstGeom>
+        </p:spPr>
+      </p:pic>
     </p:spTree>
     <p:extLst>
       <p:ext uri="{BB962C8B-B14F-4D97-AF65-F5344CB8AC3E}">
-        <p14:creationId xmlns:p14="http://schemas.microsoft.com/office/powerpoint/2010/main" val="2888376638"/>
+        <p14:creationId xmlns:p14="http://schemas.microsoft.com/office/powerpoint/2010/main" val="3824714592"/>
+      </p:ext>
+    </p:extLst>
+  </p:cSld>
+  <p:clrMapOvr>
+    <a:masterClrMapping/>
+  </p:clrMapOvr>
+  <p:timing>
+    <p:tnLst>
+      <p:par>
+        <p:cTn id="1" dur="indefinite" restart="never" nodeType="tmRoot"/>
+      </p:par>
+    </p:tnLst>
+  </p:timing>
+</p:sld>
+</file>
+
+<file path=ppt/slides/slide39.xml><?xml version="1.0" encoding="utf-8"?>
+<p:sld xmlns:a="http://schemas.openxmlformats.org/drawingml/2006/main" xmlns:r="http://schemas.openxmlformats.org/officeDocument/2006/relationships" xmlns:p="http://schemas.openxmlformats.org/presentationml/2006/main">
+  <p:cSld>
+    <p:bg>
+      <p:bgPr>
+        <a:gradFill>
+          <a:gsLst>
+            <a:gs pos="0">
+              <a:schemeClr val="accent1">
+                <a:lumMod val="5000"/>
+                <a:lumOff val="95000"/>
+              </a:schemeClr>
+            </a:gs>
+            <a:gs pos="42000">
+              <a:schemeClr val="accent1">
+                <a:lumMod val="45000"/>
+                <a:lumOff val="55000"/>
+              </a:schemeClr>
+            </a:gs>
+            <a:gs pos="83000">
+              <a:schemeClr val="accent1">
+                <a:lumMod val="45000"/>
+                <a:lumOff val="55000"/>
+              </a:schemeClr>
+            </a:gs>
+            <a:gs pos="100000">
+              <a:schemeClr val="accent1">
+                <a:lumMod val="30000"/>
+                <a:lumOff val="70000"/>
+              </a:schemeClr>
+            </a:gs>
+          </a:gsLst>
+          <a:lin ang="5400000" scaled="1"/>
+        </a:gradFill>
+        <a:effectLst/>
+      </p:bgPr>
+    </p:bg>
+    <p:spTree>
+      <p:nvGrpSpPr>
+        <p:cNvPr id="1" name=""/>
+        <p:cNvGrpSpPr/>
+        <p:nvPr/>
+      </p:nvGrpSpPr>
+      <p:grpSpPr>
+        <a:xfrm>
+          <a:off x="0" y="0"/>
+          <a:ext cx="0" cy="0"/>
+          <a:chOff x="0" y="0"/>
+          <a:chExt cx="0" cy="0"/>
+        </a:xfrm>
+      </p:grpSpPr>
+      <p:sp>
+        <p:nvSpPr>
+          <p:cNvPr id="2" name="Title 1"/>
+          <p:cNvSpPr>
+            <a:spLocks noGrp="1"/>
+          </p:cNvSpPr>
+          <p:nvPr>
+            <p:ph type="title"/>
+          </p:nvPr>
+        </p:nvSpPr>
+        <p:spPr>
+          <a:xfrm>
+            <a:off x="312821" y="-164575"/>
+            <a:ext cx="10515600" cy="1325563"/>
+          </a:xfrm>
+        </p:spPr>
+        <p:txBody>
+          <a:bodyPr/>
+          <a:lstStyle/>
+          <a:p>
+            <a:r>
+              <a:rPr lang="en-US" dirty="0" err="1" smtClean="0"/>
+              <a:t>Async</a:t>
+            </a:r>
+            <a:r>
+              <a:rPr lang="en-US" dirty="0" smtClean="0"/>
+              <a:t> </a:t>
+            </a:r>
+            <a:r>
+              <a:rPr lang="en-US" dirty="0" smtClean="0"/>
+              <a:t>Result Filter example</a:t>
+            </a:r>
+            <a:endParaRPr lang="en-US" dirty="0"/>
+          </a:p>
+        </p:txBody>
+      </p:sp>
+      <p:pic>
+        <p:nvPicPr>
+          <p:cNvPr id="5" name="Picture 4"/>
+          <p:cNvPicPr>
+            <a:picLocks noChangeAspect="1"/>
+          </p:cNvPicPr>
+          <p:nvPr/>
+        </p:nvPicPr>
+        <p:blipFill>
+          <a:blip r:embed="rId3"/>
+          <a:stretch>
+            <a:fillRect/>
+          </a:stretch>
+        </p:blipFill>
+        <p:spPr>
+          <a:xfrm>
+            <a:off x="970546" y="768266"/>
+            <a:ext cx="10355179" cy="5921554"/>
+          </a:xfrm>
+          <a:prstGeom prst="rect">
+            <a:avLst/>
+          </a:prstGeom>
+        </p:spPr>
+      </p:pic>
+    </p:spTree>
+    <p:extLst>
+      <p:ext uri="{BB962C8B-B14F-4D97-AF65-F5344CB8AC3E}">
+        <p14:creationId xmlns:p14="http://schemas.microsoft.com/office/powerpoint/2010/main" val="2421624679"/>
       </p:ext>
     </p:extLst>
   </p:cSld>
@@ -9824,6 +10401,105 @@
     <p:extLst>
       <p:ext uri="{BB962C8B-B14F-4D97-AF65-F5344CB8AC3E}">
         <p14:creationId xmlns:p14="http://schemas.microsoft.com/office/powerpoint/2010/main" val="1015542385"/>
+      </p:ext>
+    </p:extLst>
+  </p:cSld>
+  <p:clrMapOvr>
+    <a:masterClrMapping/>
+  </p:clrMapOvr>
+  <p:timing>
+    <p:tnLst>
+      <p:par>
+        <p:cTn id="1" dur="indefinite" restart="never" nodeType="tmRoot"/>
+      </p:par>
+    </p:tnLst>
+  </p:timing>
+</p:sld>
+</file>
+
+<file path=ppt/slides/slide40.xml><?xml version="1.0" encoding="utf-8"?>
+<p:sld xmlns:a="http://schemas.openxmlformats.org/drawingml/2006/main" xmlns:r="http://schemas.openxmlformats.org/officeDocument/2006/relationships" xmlns:p="http://schemas.openxmlformats.org/presentationml/2006/main">
+  <p:cSld>
+    <p:bg>
+      <p:bgPr>
+        <a:gradFill>
+          <a:gsLst>
+            <a:gs pos="0">
+              <a:schemeClr val="accent1">
+                <a:lumMod val="5000"/>
+                <a:lumOff val="95000"/>
+              </a:schemeClr>
+            </a:gs>
+            <a:gs pos="42000">
+              <a:schemeClr val="accent1">
+                <a:lumMod val="45000"/>
+                <a:lumOff val="55000"/>
+              </a:schemeClr>
+            </a:gs>
+            <a:gs pos="83000">
+              <a:schemeClr val="accent1">
+                <a:lumMod val="45000"/>
+                <a:lumOff val="55000"/>
+              </a:schemeClr>
+            </a:gs>
+            <a:gs pos="100000">
+              <a:schemeClr val="accent1">
+                <a:lumMod val="30000"/>
+                <a:lumOff val="70000"/>
+              </a:schemeClr>
+            </a:gs>
+          </a:gsLst>
+          <a:lin ang="5400000" scaled="1"/>
+        </a:gradFill>
+        <a:effectLst/>
+      </p:bgPr>
+    </p:bg>
+    <p:spTree>
+      <p:nvGrpSpPr>
+        <p:cNvPr id="1" name=""/>
+        <p:cNvGrpSpPr/>
+        <p:nvPr/>
+      </p:nvGrpSpPr>
+      <p:grpSpPr>
+        <a:xfrm>
+          <a:off x="0" y="0"/>
+          <a:ext cx="0" cy="0"/>
+          <a:chOff x="0" y="0"/>
+          <a:chExt cx="0" cy="0"/>
+        </a:xfrm>
+      </p:grpSpPr>
+      <p:sp>
+        <p:nvSpPr>
+          <p:cNvPr id="2" name="Title 1"/>
+          <p:cNvSpPr>
+            <a:spLocks noGrp="1"/>
+          </p:cNvSpPr>
+          <p:nvPr>
+            <p:ph type="title"/>
+          </p:nvPr>
+        </p:nvSpPr>
+        <p:spPr>
+          <a:xfrm>
+            <a:off x="312821" y="-164575"/>
+            <a:ext cx="10515600" cy="1325563"/>
+          </a:xfrm>
+        </p:spPr>
+        <p:txBody>
+          <a:bodyPr/>
+          <a:lstStyle/>
+          <a:p>
+            <a:r>
+              <a:rPr lang="en-US" dirty="0" smtClean="0"/>
+              <a:t>Hybrid Action\Result filter</a:t>
+            </a:r>
+            <a:endParaRPr lang="en-US" dirty="0"/>
+          </a:p>
+        </p:txBody>
+      </p:sp>
+    </p:spTree>
+    <p:extLst>
+      <p:ext uri="{BB962C8B-B14F-4D97-AF65-F5344CB8AC3E}">
+        <p14:creationId xmlns:p14="http://schemas.microsoft.com/office/powerpoint/2010/main" val="2086029567"/>
       </p:ext>
     </p:extLst>
   </p:cSld>

</xml_diff>

<commit_message>
Add Hybrid Action\Result filter
</commit_message>
<xml_diff>
--- a/AspNetCoreMVC.pptx
+++ b/AspNetCoreMVC.pptx
@@ -5,7 +5,7 @@
     <p:sldMasterId id="2147483648" r:id="rId1"/>
   </p:sldMasterIdLst>
   <p:notesMasterIdLst>
-    <p:notesMasterId r:id="rId42"/>
+    <p:notesMasterId r:id="rId45"/>
   </p:notesMasterIdLst>
   <p:sldIdLst>
     <p:sldId id="256" r:id="rId2"/>
@@ -48,6 +48,9 @@
     <p:sldId id="295" r:id="rId39"/>
     <p:sldId id="296" r:id="rId40"/>
     <p:sldId id="297" r:id="rId41"/>
+    <p:sldId id="298" r:id="rId42"/>
+    <p:sldId id="299" r:id="rId43"/>
+    <p:sldId id="300" r:id="rId44"/>
   </p:sldIdLst>
   <p:sldSz cx="12192000" cy="6858000"/>
   <p:notesSz cx="6858000" cy="9144000"/>
@@ -236,7 +239,7 @@
           <a:p>
             <a:fld id="{1747B90C-FE49-44DE-93E7-FA9DDECBEA03}" type="datetimeFigureOut">
               <a:rPr lang="en-US" smtClean="0"/>
-              <a:t>01-Oct-19</a:t>
+              <a:t>02-Oct-19</a:t>
             </a:fld>
             <a:endParaRPr lang="en-US"/>
           </a:p>
@@ -1188,6 +1191,325 @@
 </p:notes>
 </file>
 
+<file path=ppt/notesSlides/notesSlide17.xml><?xml version="1.0" encoding="utf-8"?>
+<p:notes xmlns:a="http://schemas.openxmlformats.org/drawingml/2006/main" xmlns:r="http://schemas.openxmlformats.org/officeDocument/2006/relationships" xmlns:p="http://schemas.openxmlformats.org/presentationml/2006/main">
+  <p:cSld>
+    <p:spTree>
+      <p:nvGrpSpPr>
+        <p:cNvPr id="1" name=""/>
+        <p:cNvGrpSpPr/>
+        <p:nvPr/>
+      </p:nvGrpSpPr>
+      <p:grpSpPr>
+        <a:xfrm>
+          <a:off x="0" y="0"/>
+          <a:ext cx="0" cy="0"/>
+          <a:chOff x="0" y="0"/>
+          <a:chExt cx="0" cy="0"/>
+        </a:xfrm>
+      </p:grpSpPr>
+      <p:sp>
+        <p:nvSpPr>
+          <p:cNvPr id="2" name="Slide Image Placeholder 1"/>
+          <p:cNvSpPr>
+            <a:spLocks noGrp="1" noRot="1" noChangeAspect="1"/>
+          </p:cNvSpPr>
+          <p:nvPr>
+            <p:ph type="sldImg"/>
+          </p:nvPr>
+        </p:nvSpPr>
+        <p:spPr/>
+      </p:sp>
+      <p:sp>
+        <p:nvSpPr>
+          <p:cNvPr id="3" name="Notes Placeholder 2"/>
+          <p:cNvSpPr>
+            <a:spLocks noGrp="1"/>
+          </p:cNvSpPr>
+          <p:nvPr>
+            <p:ph type="body" idx="1"/>
+          </p:nvPr>
+        </p:nvSpPr>
+        <p:spPr/>
+        <p:txBody>
+          <a:bodyPr/>
+          <a:lstStyle/>
+          <a:p>
+            <a:endParaRPr lang="en-US" dirty="0"/>
+          </a:p>
+        </p:txBody>
+      </p:sp>
+      <p:sp>
+        <p:nvSpPr>
+          <p:cNvPr id="4" name="Slide Number Placeholder 3"/>
+          <p:cNvSpPr>
+            <a:spLocks noGrp="1"/>
+          </p:cNvSpPr>
+          <p:nvPr>
+            <p:ph type="sldNum" sz="quarter" idx="10"/>
+          </p:nvPr>
+        </p:nvSpPr>
+        <p:spPr/>
+        <p:txBody>
+          <a:bodyPr/>
+          <a:lstStyle/>
+          <a:p>
+            <a:fld id="{BA1D5B97-ACF5-4677-A104-92B2393AA446}" type="slidenum">
+              <a:rPr lang="en-US" smtClean="0"/>
+              <a:t>41</a:t>
+            </a:fld>
+            <a:endParaRPr lang="en-US"/>
+          </a:p>
+        </p:txBody>
+      </p:sp>
+    </p:spTree>
+    <p:extLst>
+      <p:ext uri="{BB962C8B-B14F-4D97-AF65-F5344CB8AC3E}">
+        <p14:creationId xmlns:p14="http://schemas.microsoft.com/office/powerpoint/2010/main" val="4037530485"/>
+      </p:ext>
+    </p:extLst>
+  </p:cSld>
+  <p:clrMapOvr>
+    <a:masterClrMapping/>
+  </p:clrMapOvr>
+</p:notes>
+</file>
+
+<file path=ppt/notesSlides/notesSlide18.xml><?xml version="1.0" encoding="utf-8"?>
+<p:notes xmlns:a="http://schemas.openxmlformats.org/drawingml/2006/main" xmlns:r="http://schemas.openxmlformats.org/officeDocument/2006/relationships" xmlns:p="http://schemas.openxmlformats.org/presentationml/2006/main">
+  <p:cSld>
+    <p:spTree>
+      <p:nvGrpSpPr>
+        <p:cNvPr id="1" name=""/>
+        <p:cNvGrpSpPr/>
+        <p:nvPr/>
+      </p:nvGrpSpPr>
+      <p:grpSpPr>
+        <a:xfrm>
+          <a:off x="0" y="0"/>
+          <a:ext cx="0" cy="0"/>
+          <a:chOff x="0" y="0"/>
+          <a:chExt cx="0" cy="0"/>
+        </a:xfrm>
+      </p:grpSpPr>
+      <p:sp>
+        <p:nvSpPr>
+          <p:cNvPr id="2" name="Slide Image Placeholder 1"/>
+          <p:cNvSpPr>
+            <a:spLocks noGrp="1" noRot="1" noChangeAspect="1"/>
+          </p:cNvSpPr>
+          <p:nvPr>
+            <p:ph type="sldImg"/>
+          </p:nvPr>
+        </p:nvSpPr>
+        <p:spPr/>
+      </p:sp>
+      <p:sp>
+        <p:nvSpPr>
+          <p:cNvPr id="3" name="Notes Placeholder 2"/>
+          <p:cNvSpPr>
+            <a:spLocks noGrp="1"/>
+          </p:cNvSpPr>
+          <p:nvPr>
+            <p:ph type="body" idx="1"/>
+          </p:nvPr>
+        </p:nvSpPr>
+        <p:spPr/>
+        <p:txBody>
+          <a:bodyPr/>
+          <a:lstStyle/>
+          <a:p>
+            <a:r>
+              <a:rPr lang="en-US" dirty="0" smtClean="0"/>
+              <a:t>The output is after because </a:t>
+            </a:r>
+            <a:r>
+              <a:rPr lang="en-US" sz="1200" b="0" i="0" u="none" strike="noStrike" kern="1200" baseline="0" dirty="0" smtClean="0">
+                <a:solidFill>
+                  <a:schemeClr val="tx1"/>
+                </a:solidFill>
+                <a:latin typeface="+mn-lt"/>
+                <a:ea typeface="+mn-ea"/>
+                <a:cs typeface="+mn-cs"/>
+              </a:rPr>
+              <a:t>it is written in the post-processed stage of the result filter.</a:t>
+            </a:r>
+          </a:p>
+          <a:p>
+            <a:r>
+              <a:rPr lang="en-US" sz="1200" b="0" i="0" u="none" strike="noStrike" kern="1200" baseline="0" dirty="0" smtClean="0">
+                <a:solidFill>
+                  <a:schemeClr val="tx1"/>
+                </a:solidFill>
+                <a:latin typeface="+mn-lt"/>
+                <a:ea typeface="+mn-ea"/>
+                <a:cs typeface="+mn-cs"/>
+              </a:rPr>
+              <a:t>In this case attribute order doesn’t matter.</a:t>
+            </a:r>
+            <a:endParaRPr lang="en-US" dirty="0"/>
+          </a:p>
+        </p:txBody>
+      </p:sp>
+      <p:sp>
+        <p:nvSpPr>
+          <p:cNvPr id="4" name="Slide Number Placeholder 3"/>
+          <p:cNvSpPr>
+            <a:spLocks noGrp="1"/>
+          </p:cNvSpPr>
+          <p:nvPr>
+            <p:ph type="sldNum" sz="quarter" idx="10"/>
+          </p:nvPr>
+        </p:nvSpPr>
+        <p:spPr/>
+        <p:txBody>
+          <a:bodyPr/>
+          <a:lstStyle/>
+          <a:p>
+            <a:fld id="{BA1D5B97-ACF5-4677-A104-92B2393AA446}" type="slidenum">
+              <a:rPr lang="en-US" smtClean="0"/>
+              <a:t>42</a:t>
+            </a:fld>
+            <a:endParaRPr lang="en-US"/>
+          </a:p>
+        </p:txBody>
+      </p:sp>
+    </p:spTree>
+    <p:extLst>
+      <p:ext uri="{BB962C8B-B14F-4D97-AF65-F5344CB8AC3E}">
+        <p14:creationId xmlns:p14="http://schemas.microsoft.com/office/powerpoint/2010/main" val="1220094986"/>
+      </p:ext>
+    </p:extLst>
+  </p:cSld>
+  <p:clrMapOvr>
+    <a:masterClrMapping/>
+  </p:clrMapOvr>
+</p:notes>
+</file>
+
+<file path=ppt/notesSlides/notesSlide19.xml><?xml version="1.0" encoding="utf-8"?>
+<p:notes xmlns:a="http://schemas.openxmlformats.org/drawingml/2006/main" xmlns:r="http://schemas.openxmlformats.org/officeDocument/2006/relationships" xmlns:p="http://schemas.openxmlformats.org/presentationml/2006/main">
+  <p:cSld>
+    <p:spTree>
+      <p:nvGrpSpPr>
+        <p:cNvPr id="1" name=""/>
+        <p:cNvGrpSpPr/>
+        <p:nvPr/>
+      </p:nvGrpSpPr>
+      <p:grpSpPr>
+        <a:xfrm>
+          <a:off x="0" y="0"/>
+          <a:ext cx="0" cy="0"/>
+          <a:chOff x="0" y="0"/>
+          <a:chExt cx="0" cy="0"/>
+        </a:xfrm>
+      </p:grpSpPr>
+      <p:sp>
+        <p:nvSpPr>
+          <p:cNvPr id="2" name="Slide Image Placeholder 1"/>
+          <p:cNvSpPr>
+            <a:spLocks noGrp="1" noRot="1" noChangeAspect="1"/>
+          </p:cNvSpPr>
+          <p:nvPr>
+            <p:ph type="sldImg"/>
+          </p:nvPr>
+        </p:nvSpPr>
+        <p:spPr/>
+      </p:sp>
+      <p:sp>
+        <p:nvSpPr>
+          <p:cNvPr id="3" name="Notes Placeholder 2"/>
+          <p:cNvSpPr>
+            <a:spLocks noGrp="1"/>
+          </p:cNvSpPr>
+          <p:nvPr>
+            <p:ph type="body" idx="1"/>
+          </p:nvPr>
+        </p:nvSpPr>
+        <p:spPr/>
+        <p:txBody>
+          <a:bodyPr/>
+          <a:lstStyle/>
+          <a:p>
+            <a:r>
+              <a:rPr lang="en-US" dirty="0" smtClean="0"/>
+              <a:t>The output is after because </a:t>
+            </a:r>
+            <a:r>
+              <a:rPr lang="en-US" sz="1200" b="0" i="0" u="none" strike="noStrike" kern="1200" baseline="0" dirty="0" smtClean="0">
+                <a:solidFill>
+                  <a:schemeClr val="tx1"/>
+                </a:solidFill>
+                <a:latin typeface="+mn-lt"/>
+                <a:ea typeface="+mn-ea"/>
+                <a:cs typeface="+mn-cs"/>
+              </a:rPr>
+              <a:t>it is written in the post-processed stage of the result filter.</a:t>
+            </a:r>
+          </a:p>
+          <a:p>
+            <a:r>
+              <a:rPr lang="en-US" sz="1200" b="0" i="0" u="none" strike="noStrike" kern="1200" baseline="0" dirty="0" smtClean="0">
+                <a:solidFill>
+                  <a:schemeClr val="tx1"/>
+                </a:solidFill>
+                <a:latin typeface="+mn-lt"/>
+                <a:ea typeface="+mn-ea"/>
+                <a:cs typeface="+mn-cs"/>
+              </a:rPr>
+              <a:t>In this case attribute </a:t>
+            </a:r>
+            <a:r>
+              <a:rPr lang="en-US" sz="1200" b="0" i="0" u="none" strike="noStrike" kern="1200" baseline="0" smtClean="0">
+                <a:solidFill>
+                  <a:schemeClr val="tx1"/>
+                </a:solidFill>
+                <a:latin typeface="+mn-lt"/>
+                <a:ea typeface="+mn-ea"/>
+                <a:cs typeface="+mn-cs"/>
+              </a:rPr>
+              <a:t>order doesn’t matter.</a:t>
+            </a:r>
+            <a:endParaRPr lang="en-US" dirty="0"/>
+          </a:p>
+        </p:txBody>
+      </p:sp>
+      <p:sp>
+        <p:nvSpPr>
+          <p:cNvPr id="4" name="Slide Number Placeholder 3"/>
+          <p:cNvSpPr>
+            <a:spLocks noGrp="1"/>
+          </p:cNvSpPr>
+          <p:nvPr>
+            <p:ph type="sldNum" sz="quarter" idx="10"/>
+          </p:nvPr>
+        </p:nvSpPr>
+        <p:spPr/>
+        <p:txBody>
+          <a:bodyPr/>
+          <a:lstStyle/>
+          <a:p>
+            <a:fld id="{BA1D5B97-ACF5-4677-A104-92B2393AA446}" type="slidenum">
+              <a:rPr lang="en-US" smtClean="0"/>
+              <a:t>43</a:t>
+            </a:fld>
+            <a:endParaRPr lang="en-US"/>
+          </a:p>
+        </p:txBody>
+      </p:sp>
+    </p:spTree>
+    <p:extLst>
+      <p:ext uri="{BB962C8B-B14F-4D97-AF65-F5344CB8AC3E}">
+        <p14:creationId xmlns:p14="http://schemas.microsoft.com/office/powerpoint/2010/main" val="2286928545"/>
+      </p:ext>
+    </p:extLst>
+  </p:cSld>
+  <p:clrMapOvr>
+    <a:masterClrMapping/>
+  </p:clrMapOvr>
+</p:notes>
+</file>
+
 <file path=ppt/notesSlides/notesSlide2.xml><?xml version="1.0" encoding="utf-8"?>
 <p:notes xmlns:a="http://schemas.openxmlformats.org/drawingml/2006/main" xmlns:r="http://schemas.openxmlformats.org/officeDocument/2006/relationships" xmlns:p="http://schemas.openxmlformats.org/presentationml/2006/main">
   <p:cSld>
@@ -2009,7 +2331,7 @@
           <a:p>
             <a:fld id="{622E22BE-79DE-4FFF-A515-BF1CA8DF801A}" type="datetimeFigureOut">
               <a:rPr lang="en-US" smtClean="0"/>
-              <a:t>01-Oct-19</a:t>
+              <a:t>02-Oct-19</a:t>
             </a:fld>
             <a:endParaRPr lang="en-US"/>
           </a:p>
@@ -2179,7 +2501,7 @@
           <a:p>
             <a:fld id="{622E22BE-79DE-4FFF-A515-BF1CA8DF801A}" type="datetimeFigureOut">
               <a:rPr lang="en-US" smtClean="0"/>
-              <a:t>01-Oct-19</a:t>
+              <a:t>02-Oct-19</a:t>
             </a:fld>
             <a:endParaRPr lang="en-US"/>
           </a:p>
@@ -2359,7 +2681,7 @@
           <a:p>
             <a:fld id="{622E22BE-79DE-4FFF-A515-BF1CA8DF801A}" type="datetimeFigureOut">
               <a:rPr lang="en-US" smtClean="0"/>
-              <a:t>01-Oct-19</a:t>
+              <a:t>02-Oct-19</a:t>
             </a:fld>
             <a:endParaRPr lang="en-US"/>
           </a:p>
@@ -2529,7 +2851,7 @@
           <a:p>
             <a:fld id="{622E22BE-79DE-4FFF-A515-BF1CA8DF801A}" type="datetimeFigureOut">
               <a:rPr lang="en-US" smtClean="0"/>
-              <a:t>01-Oct-19</a:t>
+              <a:t>02-Oct-19</a:t>
             </a:fld>
             <a:endParaRPr lang="en-US"/>
           </a:p>
@@ -2775,7 +3097,7 @@
           <a:p>
             <a:fld id="{622E22BE-79DE-4FFF-A515-BF1CA8DF801A}" type="datetimeFigureOut">
               <a:rPr lang="en-US" smtClean="0"/>
-              <a:t>01-Oct-19</a:t>
+              <a:t>02-Oct-19</a:t>
             </a:fld>
             <a:endParaRPr lang="en-US"/>
           </a:p>
@@ -3007,7 +3329,7 @@
           <a:p>
             <a:fld id="{622E22BE-79DE-4FFF-A515-BF1CA8DF801A}" type="datetimeFigureOut">
               <a:rPr lang="en-US" smtClean="0"/>
-              <a:t>01-Oct-19</a:t>
+              <a:t>02-Oct-19</a:t>
             </a:fld>
             <a:endParaRPr lang="en-US"/>
           </a:p>
@@ -3374,7 +3696,7 @@
           <a:p>
             <a:fld id="{622E22BE-79DE-4FFF-A515-BF1CA8DF801A}" type="datetimeFigureOut">
               <a:rPr lang="en-US" smtClean="0"/>
-              <a:t>01-Oct-19</a:t>
+              <a:t>02-Oct-19</a:t>
             </a:fld>
             <a:endParaRPr lang="en-US"/>
           </a:p>
@@ -3492,7 +3814,7 @@
           <a:p>
             <a:fld id="{622E22BE-79DE-4FFF-A515-BF1CA8DF801A}" type="datetimeFigureOut">
               <a:rPr lang="en-US" smtClean="0"/>
-              <a:t>01-Oct-19</a:t>
+              <a:t>02-Oct-19</a:t>
             </a:fld>
             <a:endParaRPr lang="en-US"/>
           </a:p>
@@ -3587,7 +3909,7 @@
           <a:p>
             <a:fld id="{622E22BE-79DE-4FFF-A515-BF1CA8DF801A}" type="datetimeFigureOut">
               <a:rPr lang="en-US" smtClean="0"/>
-              <a:t>01-Oct-19</a:t>
+              <a:t>02-Oct-19</a:t>
             </a:fld>
             <a:endParaRPr lang="en-US"/>
           </a:p>
@@ -3864,7 +4186,7 @@
           <a:p>
             <a:fld id="{622E22BE-79DE-4FFF-A515-BF1CA8DF801A}" type="datetimeFigureOut">
               <a:rPr lang="en-US" smtClean="0"/>
-              <a:t>01-Oct-19</a:t>
+              <a:t>02-Oct-19</a:t>
             </a:fld>
             <a:endParaRPr lang="en-US"/>
           </a:p>
@@ -4117,7 +4439,7 @@
           <a:p>
             <a:fld id="{622E22BE-79DE-4FFF-A515-BF1CA8DF801A}" type="datetimeFigureOut">
               <a:rPr lang="en-US" smtClean="0"/>
-              <a:t>01-Oct-19</a:t>
+              <a:t>02-Oct-19</a:t>
             </a:fld>
             <a:endParaRPr lang="en-US"/>
           </a:p>
@@ -4330,7 +4652,7 @@
           <a:p>
             <a:fld id="{622E22BE-79DE-4FFF-A515-BF1CA8DF801A}" type="datetimeFigureOut">
               <a:rPr lang="en-US" smtClean="0"/>
-              <a:t>01-Oct-19</a:t>
+              <a:t>02-Oct-19</a:t>
             </a:fld>
             <a:endParaRPr lang="en-US"/>
           </a:p>
@@ -9920,11 +10242,7 @@
           <a:p>
             <a:r>
               <a:rPr lang="en-US" dirty="0" smtClean="0"/>
-              <a:t>Result </a:t>
-            </a:r>
-            <a:r>
-              <a:rPr lang="en-US" dirty="0" smtClean="0"/>
-              <a:t>Filter example</a:t>
+              <a:t>Result Filter example</a:t>
             </a:r>
             <a:endParaRPr lang="en-US" dirty="0"/>
           </a:p>
@@ -10047,11 +10365,7 @@
           <a:p>
             <a:r>
               <a:rPr lang="en-US" dirty="0" smtClean="0"/>
-              <a:t>Result </a:t>
-            </a:r>
-            <a:r>
-              <a:rPr lang="en-US" dirty="0" smtClean="0"/>
-              <a:t>Filter example</a:t>
+              <a:t>Result Filter example</a:t>
             </a:r>
             <a:endParaRPr lang="en-US" dirty="0"/>
           </a:p>
@@ -10202,11 +10516,7 @@
             </a:r>
             <a:r>
               <a:rPr lang="en-US" dirty="0" smtClean="0"/>
-              <a:t> </a:t>
-            </a:r>
-            <a:r>
-              <a:rPr lang="en-US" dirty="0" smtClean="0"/>
-              <a:t>Result Filter example</a:t>
+              <a:t> Result Filter example</a:t>
             </a:r>
             <a:endParaRPr lang="en-US" dirty="0"/>
           </a:p>
@@ -10496,10 +10806,403 @@
           </a:p>
         </p:txBody>
       </p:sp>
+      <p:pic>
+        <p:nvPicPr>
+          <p:cNvPr id="5" name="Picture 4"/>
+          <p:cNvPicPr>
+            <a:picLocks noChangeAspect="1"/>
+          </p:cNvPicPr>
+          <p:nvPr/>
+        </p:nvPicPr>
+        <p:blipFill>
+          <a:blip r:embed="rId3"/>
+          <a:stretch>
+            <a:fillRect/>
+          </a:stretch>
+        </p:blipFill>
+        <p:spPr>
+          <a:xfrm>
+            <a:off x="1566862" y="983832"/>
+            <a:ext cx="9085096" cy="5527968"/>
+          </a:xfrm>
+          <a:prstGeom prst="rect">
+            <a:avLst/>
+          </a:prstGeom>
+        </p:spPr>
+      </p:pic>
     </p:spTree>
     <p:extLst>
       <p:ext uri="{BB962C8B-B14F-4D97-AF65-F5344CB8AC3E}">
         <p14:creationId xmlns:p14="http://schemas.microsoft.com/office/powerpoint/2010/main" val="2086029567"/>
+      </p:ext>
+    </p:extLst>
+  </p:cSld>
+  <p:clrMapOvr>
+    <a:masterClrMapping/>
+  </p:clrMapOvr>
+  <p:timing>
+    <p:tnLst>
+      <p:par>
+        <p:cTn id="1" dur="indefinite" restart="never" nodeType="tmRoot"/>
+      </p:par>
+    </p:tnLst>
+  </p:timing>
+</p:sld>
+</file>
+
+<file path=ppt/slides/slide41.xml><?xml version="1.0" encoding="utf-8"?>
+<p:sld xmlns:a="http://schemas.openxmlformats.org/drawingml/2006/main" xmlns:r="http://schemas.openxmlformats.org/officeDocument/2006/relationships" xmlns:p="http://schemas.openxmlformats.org/presentationml/2006/main">
+  <p:cSld>
+    <p:bg>
+      <p:bgPr>
+        <a:gradFill>
+          <a:gsLst>
+            <a:gs pos="0">
+              <a:schemeClr val="accent1">
+                <a:lumMod val="5000"/>
+                <a:lumOff val="95000"/>
+              </a:schemeClr>
+            </a:gs>
+            <a:gs pos="42000">
+              <a:schemeClr val="accent1">
+                <a:lumMod val="45000"/>
+                <a:lumOff val="55000"/>
+              </a:schemeClr>
+            </a:gs>
+            <a:gs pos="83000">
+              <a:schemeClr val="accent1">
+                <a:lumMod val="45000"/>
+                <a:lumOff val="55000"/>
+              </a:schemeClr>
+            </a:gs>
+            <a:gs pos="100000">
+              <a:schemeClr val="accent1">
+                <a:lumMod val="30000"/>
+                <a:lumOff val="70000"/>
+              </a:schemeClr>
+            </a:gs>
+          </a:gsLst>
+          <a:lin ang="5400000" scaled="1"/>
+        </a:gradFill>
+        <a:effectLst/>
+      </p:bgPr>
+    </p:bg>
+    <p:spTree>
+      <p:nvGrpSpPr>
+        <p:cNvPr id="1" name=""/>
+        <p:cNvGrpSpPr/>
+        <p:nvPr/>
+      </p:nvGrpSpPr>
+      <p:grpSpPr>
+        <a:xfrm>
+          <a:off x="0" y="0"/>
+          <a:ext cx="0" cy="0"/>
+          <a:chOff x="0" y="0"/>
+          <a:chExt cx="0" cy="0"/>
+        </a:xfrm>
+      </p:grpSpPr>
+      <p:sp>
+        <p:nvSpPr>
+          <p:cNvPr id="2" name="Title 1"/>
+          <p:cNvSpPr>
+            <a:spLocks noGrp="1"/>
+          </p:cNvSpPr>
+          <p:nvPr>
+            <p:ph type="title"/>
+          </p:nvPr>
+        </p:nvSpPr>
+        <p:spPr>
+          <a:xfrm>
+            <a:off x="312821" y="-164575"/>
+            <a:ext cx="10515600" cy="1325563"/>
+          </a:xfrm>
+        </p:spPr>
+        <p:txBody>
+          <a:bodyPr/>
+          <a:lstStyle/>
+          <a:p>
+            <a:r>
+              <a:rPr lang="en-US" dirty="0" smtClean="0"/>
+              <a:t>Hybrid Action\Result filter</a:t>
+            </a:r>
+            <a:endParaRPr lang="en-US" dirty="0"/>
+          </a:p>
+        </p:txBody>
+      </p:sp>
+      <p:pic>
+        <p:nvPicPr>
+          <p:cNvPr id="3" name="Picture 2"/>
+          <p:cNvPicPr>
+            <a:picLocks noChangeAspect="1"/>
+          </p:cNvPicPr>
+          <p:nvPr/>
+        </p:nvPicPr>
+        <p:blipFill>
+          <a:blip r:embed="rId3"/>
+          <a:stretch>
+            <a:fillRect/>
+          </a:stretch>
+        </p:blipFill>
+        <p:spPr>
+          <a:xfrm>
+            <a:off x="1860884" y="805864"/>
+            <a:ext cx="8839200" cy="5816071"/>
+          </a:xfrm>
+          <a:prstGeom prst="rect">
+            <a:avLst/>
+          </a:prstGeom>
+        </p:spPr>
+      </p:pic>
+    </p:spTree>
+    <p:extLst>
+      <p:ext uri="{BB962C8B-B14F-4D97-AF65-F5344CB8AC3E}">
+        <p14:creationId xmlns:p14="http://schemas.microsoft.com/office/powerpoint/2010/main" val="2200360858"/>
+      </p:ext>
+    </p:extLst>
+  </p:cSld>
+  <p:clrMapOvr>
+    <a:masterClrMapping/>
+  </p:clrMapOvr>
+  <p:timing>
+    <p:tnLst>
+      <p:par>
+        <p:cTn id="1" dur="indefinite" restart="never" nodeType="tmRoot"/>
+      </p:par>
+    </p:tnLst>
+  </p:timing>
+</p:sld>
+</file>
+
+<file path=ppt/slides/slide42.xml><?xml version="1.0" encoding="utf-8"?>
+<p:sld xmlns:a="http://schemas.openxmlformats.org/drawingml/2006/main" xmlns:r="http://schemas.openxmlformats.org/officeDocument/2006/relationships" xmlns:p="http://schemas.openxmlformats.org/presentationml/2006/main">
+  <p:cSld>
+    <p:bg>
+      <p:bgPr>
+        <a:gradFill>
+          <a:gsLst>
+            <a:gs pos="0">
+              <a:schemeClr val="accent1">
+                <a:lumMod val="5000"/>
+                <a:lumOff val="95000"/>
+              </a:schemeClr>
+            </a:gs>
+            <a:gs pos="42000">
+              <a:schemeClr val="accent1">
+                <a:lumMod val="45000"/>
+                <a:lumOff val="55000"/>
+              </a:schemeClr>
+            </a:gs>
+            <a:gs pos="83000">
+              <a:schemeClr val="accent1">
+                <a:lumMod val="45000"/>
+                <a:lumOff val="55000"/>
+              </a:schemeClr>
+            </a:gs>
+            <a:gs pos="100000">
+              <a:schemeClr val="accent1">
+                <a:lumMod val="30000"/>
+                <a:lumOff val="70000"/>
+              </a:schemeClr>
+            </a:gs>
+          </a:gsLst>
+          <a:lin ang="5400000" scaled="1"/>
+        </a:gradFill>
+        <a:effectLst/>
+      </p:bgPr>
+    </p:bg>
+    <p:spTree>
+      <p:nvGrpSpPr>
+        <p:cNvPr id="1" name=""/>
+        <p:cNvGrpSpPr/>
+        <p:nvPr/>
+      </p:nvGrpSpPr>
+      <p:grpSpPr>
+        <a:xfrm>
+          <a:off x="0" y="0"/>
+          <a:ext cx="0" cy="0"/>
+          <a:chOff x="0" y="0"/>
+          <a:chExt cx="0" cy="0"/>
+        </a:xfrm>
+      </p:grpSpPr>
+      <p:sp>
+        <p:nvSpPr>
+          <p:cNvPr id="2" name="Title 1"/>
+          <p:cNvSpPr>
+            <a:spLocks noGrp="1"/>
+          </p:cNvSpPr>
+          <p:nvPr>
+            <p:ph type="title"/>
+          </p:nvPr>
+        </p:nvSpPr>
+        <p:spPr>
+          <a:xfrm>
+            <a:off x="312821" y="-164575"/>
+            <a:ext cx="10515600" cy="1325563"/>
+          </a:xfrm>
+        </p:spPr>
+        <p:txBody>
+          <a:bodyPr/>
+          <a:lstStyle/>
+          <a:p>
+            <a:r>
+              <a:rPr lang="en-US" dirty="0" smtClean="0"/>
+              <a:t>Hybrid Action\Result filter</a:t>
+            </a:r>
+            <a:endParaRPr lang="en-US" dirty="0"/>
+          </a:p>
+        </p:txBody>
+      </p:sp>
+      <p:pic>
+        <p:nvPicPr>
+          <p:cNvPr id="4" name="Picture 3"/>
+          <p:cNvPicPr>
+            <a:picLocks noChangeAspect="1"/>
+          </p:cNvPicPr>
+          <p:nvPr/>
+        </p:nvPicPr>
+        <p:blipFill>
+          <a:blip r:embed="rId3"/>
+          <a:stretch>
+            <a:fillRect/>
+          </a:stretch>
+        </p:blipFill>
+        <p:spPr>
+          <a:xfrm>
+            <a:off x="312821" y="919007"/>
+            <a:ext cx="7099627" cy="3063291"/>
+          </a:xfrm>
+          <a:prstGeom prst="rect">
+            <a:avLst/>
+          </a:prstGeom>
+        </p:spPr>
+      </p:pic>
+      <p:pic>
+        <p:nvPicPr>
+          <p:cNvPr id="5" name="Picture 4"/>
+          <p:cNvPicPr>
+            <a:picLocks noChangeAspect="1"/>
+          </p:cNvPicPr>
+          <p:nvPr/>
+        </p:nvPicPr>
+        <p:blipFill>
+          <a:blip r:embed="rId4"/>
+          <a:stretch>
+            <a:fillRect/>
+          </a:stretch>
+        </p:blipFill>
+        <p:spPr>
+          <a:xfrm>
+            <a:off x="4156154" y="3607301"/>
+            <a:ext cx="7896876" cy="2969962"/>
+          </a:xfrm>
+          <a:prstGeom prst="rect">
+            <a:avLst/>
+          </a:prstGeom>
+        </p:spPr>
+      </p:pic>
+    </p:spTree>
+    <p:extLst>
+      <p:ext uri="{BB962C8B-B14F-4D97-AF65-F5344CB8AC3E}">
+        <p14:creationId xmlns:p14="http://schemas.microsoft.com/office/powerpoint/2010/main" val="2415538666"/>
+      </p:ext>
+    </p:extLst>
+  </p:cSld>
+  <p:clrMapOvr>
+    <a:masterClrMapping/>
+  </p:clrMapOvr>
+  <p:timing>
+    <p:tnLst>
+      <p:par>
+        <p:cTn id="1" dur="indefinite" restart="never" nodeType="tmRoot"/>
+      </p:par>
+    </p:tnLst>
+  </p:timing>
+</p:sld>
+</file>
+
+<file path=ppt/slides/slide43.xml><?xml version="1.0" encoding="utf-8"?>
+<p:sld xmlns:a="http://schemas.openxmlformats.org/drawingml/2006/main" xmlns:r="http://schemas.openxmlformats.org/officeDocument/2006/relationships" xmlns:p="http://schemas.openxmlformats.org/presentationml/2006/main">
+  <p:cSld>
+    <p:bg>
+      <p:bgPr>
+        <a:gradFill>
+          <a:gsLst>
+            <a:gs pos="0">
+              <a:schemeClr val="accent1">
+                <a:lumMod val="5000"/>
+                <a:lumOff val="95000"/>
+              </a:schemeClr>
+            </a:gs>
+            <a:gs pos="42000">
+              <a:schemeClr val="accent1">
+                <a:lumMod val="45000"/>
+                <a:lumOff val="55000"/>
+              </a:schemeClr>
+            </a:gs>
+            <a:gs pos="83000">
+              <a:schemeClr val="accent1">
+                <a:lumMod val="45000"/>
+                <a:lumOff val="55000"/>
+              </a:schemeClr>
+            </a:gs>
+            <a:gs pos="100000">
+              <a:schemeClr val="accent1">
+                <a:lumMod val="30000"/>
+                <a:lumOff val="70000"/>
+              </a:schemeClr>
+            </a:gs>
+          </a:gsLst>
+          <a:lin ang="5400000" scaled="1"/>
+        </a:gradFill>
+        <a:effectLst/>
+      </p:bgPr>
+    </p:bg>
+    <p:spTree>
+      <p:nvGrpSpPr>
+        <p:cNvPr id="1" name=""/>
+        <p:cNvGrpSpPr/>
+        <p:nvPr/>
+      </p:nvGrpSpPr>
+      <p:grpSpPr>
+        <a:xfrm>
+          <a:off x="0" y="0"/>
+          <a:ext cx="0" cy="0"/>
+          <a:chOff x="0" y="0"/>
+          <a:chExt cx="0" cy="0"/>
+        </a:xfrm>
+      </p:grpSpPr>
+      <p:sp>
+        <p:nvSpPr>
+          <p:cNvPr id="2" name="Title 1"/>
+          <p:cNvSpPr>
+            <a:spLocks noGrp="1"/>
+          </p:cNvSpPr>
+          <p:nvPr>
+            <p:ph type="title"/>
+          </p:nvPr>
+        </p:nvSpPr>
+        <p:spPr>
+          <a:xfrm>
+            <a:off x="312821" y="-164575"/>
+            <a:ext cx="10515600" cy="1325563"/>
+          </a:xfrm>
+        </p:spPr>
+        <p:txBody>
+          <a:bodyPr/>
+          <a:lstStyle/>
+          <a:p>
+            <a:r>
+              <a:rPr lang="en-US" smtClean="0"/>
+              <a:t>Exception filters</a:t>
+            </a:r>
+            <a:endParaRPr lang="en-US" dirty="0"/>
+          </a:p>
+        </p:txBody>
+      </p:sp>
+    </p:spTree>
+    <p:extLst>
+      <p:ext uri="{BB962C8B-B14F-4D97-AF65-F5344CB8AC3E}">
+        <p14:creationId xmlns:p14="http://schemas.microsoft.com/office/powerpoint/2010/main" val="3955229661"/>
       </p:ext>
     </p:extLst>
   </p:cSld>

</xml_diff>

<commit_message>
Make font larger in slide
</commit_message>
<xml_diff>
--- a/AspNetCoreMVC.pptx
+++ b/AspNetCoreMVC.pptx
@@ -6340,23 +6340,25 @@
         </p:nvSpPr>
         <p:spPr>
           <a:xfrm>
-            <a:off x="838200" y="2228297"/>
+            <a:off x="1031631" y="1690688"/>
             <a:ext cx="10515600" cy="4351338"/>
           </a:xfrm>
         </p:spPr>
         <p:txBody>
-          <a:bodyPr/>
+          <a:bodyPr>
+            <a:normAutofit/>
+          </a:bodyPr>
           <a:lstStyle/>
           <a:p>
             <a:pPr marL="0" indent="0">
               <a:buNone/>
             </a:pPr>
             <a:r>
-              <a:rPr lang="en-US" dirty="0"/>
+              <a:rPr lang="en-US" sz="3600" dirty="0"/>
               <a:t>	</a:t>
             </a:r>
             <a:r>
-              <a:rPr lang="en-US" dirty="0" smtClean="0"/>
+              <a:rPr lang="en-US" sz="3600" dirty="0" smtClean="0"/>
               <a:t>Types and order of filters:</a:t>
             </a:r>
           </a:p>
@@ -6364,83 +6366,83 @@
             <a:pPr marL="0" indent="0">
               <a:buNone/>
             </a:pPr>
-            <a:endParaRPr lang="en-US" dirty="0" smtClean="0"/>
-          </a:p>
-          <a:p>
-            <a:r>
-              <a:rPr lang="en-US" dirty="0" smtClean="0"/>
+            <a:endParaRPr lang="en-US" sz="3600" dirty="0" smtClean="0"/>
+          </a:p>
+          <a:p>
+            <a:r>
+              <a:rPr lang="en-US" sz="3600" dirty="0" smtClean="0"/>
               <a:t>Authorization – I(</a:t>
             </a:r>
             <a:r>
-              <a:rPr lang="en-US" dirty="0" err="1" smtClean="0"/>
+              <a:rPr lang="en-US" sz="3600" dirty="0" err="1" smtClean="0"/>
               <a:t>Async</a:t>
             </a:r>
             <a:r>
-              <a:rPr lang="en-US" dirty="0" smtClean="0"/>
+              <a:rPr lang="en-US" sz="3600" dirty="0" smtClean="0"/>
               <a:t>)</a:t>
             </a:r>
             <a:r>
-              <a:rPr lang="en-US" dirty="0" err="1" smtClean="0"/>
+              <a:rPr lang="en-US" sz="3600" dirty="0" err="1" smtClean="0"/>
               <a:t>AuthorizationFilter</a:t>
             </a:r>
-            <a:endParaRPr lang="en-US" dirty="0" smtClean="0"/>
-          </a:p>
-          <a:p>
-            <a:r>
-              <a:rPr lang="en-US" dirty="0" smtClean="0"/>
+            <a:endParaRPr lang="en-US" sz="3600" dirty="0" smtClean="0"/>
+          </a:p>
+          <a:p>
+            <a:r>
+              <a:rPr lang="en-US" sz="3600" dirty="0" smtClean="0"/>
               <a:t>Action – I(</a:t>
             </a:r>
             <a:r>
-              <a:rPr lang="en-US" dirty="0" err="1" smtClean="0"/>
+              <a:rPr lang="en-US" sz="3600" dirty="0" err="1" smtClean="0"/>
               <a:t>Async</a:t>
             </a:r>
             <a:r>
-              <a:rPr lang="en-US" dirty="0" smtClean="0"/>
+              <a:rPr lang="en-US" sz="3600" dirty="0" smtClean="0"/>
               <a:t>)</a:t>
             </a:r>
             <a:r>
-              <a:rPr lang="en-US" dirty="0" err="1" smtClean="0"/>
+              <a:rPr lang="en-US" sz="3600" dirty="0" err="1" smtClean="0"/>
               <a:t>ActionFilter</a:t>
             </a:r>
-            <a:endParaRPr lang="en-US" dirty="0" smtClean="0"/>
-          </a:p>
-          <a:p>
-            <a:r>
-              <a:rPr lang="en-US" dirty="0" smtClean="0"/>
+            <a:endParaRPr lang="en-US" sz="3600" dirty="0" smtClean="0"/>
+          </a:p>
+          <a:p>
+            <a:r>
+              <a:rPr lang="en-US" sz="3600" dirty="0" smtClean="0"/>
               <a:t>Result – I(</a:t>
             </a:r>
             <a:r>
-              <a:rPr lang="en-US" dirty="0" err="1" smtClean="0"/>
+              <a:rPr lang="en-US" sz="3600" dirty="0" err="1" smtClean="0"/>
               <a:t>Async</a:t>
             </a:r>
             <a:r>
-              <a:rPr lang="en-US" dirty="0" smtClean="0"/>
+              <a:rPr lang="en-US" sz="3600" dirty="0" smtClean="0"/>
               <a:t>)</a:t>
             </a:r>
             <a:r>
-              <a:rPr lang="en-US" dirty="0" err="1" smtClean="0"/>
+              <a:rPr lang="en-US" sz="3600" dirty="0" err="1" smtClean="0"/>
               <a:t>ResultFilter</a:t>
             </a:r>
-            <a:endParaRPr lang="en-US" dirty="0" smtClean="0"/>
-          </a:p>
-          <a:p>
-            <a:r>
-              <a:rPr lang="en-US" dirty="0" smtClean="0"/>
+            <a:endParaRPr lang="en-US" sz="3600" dirty="0" smtClean="0"/>
+          </a:p>
+          <a:p>
+            <a:r>
+              <a:rPr lang="en-US" sz="3600" dirty="0" smtClean="0"/>
               <a:t>Exception – I(</a:t>
             </a:r>
             <a:r>
-              <a:rPr lang="en-US" dirty="0" err="1" smtClean="0"/>
+              <a:rPr lang="en-US" sz="3600" dirty="0" err="1" smtClean="0"/>
               <a:t>Async</a:t>
             </a:r>
             <a:r>
-              <a:rPr lang="en-US" dirty="0" smtClean="0"/>
+              <a:rPr lang="en-US" sz="3600" dirty="0" smtClean="0"/>
               <a:t>)</a:t>
             </a:r>
             <a:r>
-              <a:rPr lang="en-US" dirty="0" err="1" smtClean="0"/>
+              <a:rPr lang="en-US" sz="3600" dirty="0" err="1" smtClean="0"/>
               <a:t>ExceptionFilter</a:t>
             </a:r>
-            <a:endParaRPr lang="en-US" dirty="0"/>
+            <a:endParaRPr lang="en-US" sz="3600" dirty="0"/>
           </a:p>
         </p:txBody>
       </p:sp>

</xml_diff>

<commit_message>
Add Exception filter example
</commit_message>
<xml_diff>
--- a/AspNetCoreMVC.pptx
+++ b/AspNetCoreMVC.pptx
@@ -5,7 +5,7 @@
     <p:sldMasterId id="2147483648" r:id="rId1"/>
   </p:sldMasterIdLst>
   <p:notesMasterIdLst>
-    <p:notesMasterId r:id="rId47"/>
+    <p:notesMasterId r:id="rId50"/>
   </p:notesMasterIdLst>
   <p:sldIdLst>
     <p:sldId id="256" r:id="rId2"/>
@@ -53,6 +53,9 @@
     <p:sldId id="301" r:id="rId44"/>
     <p:sldId id="302" r:id="rId45"/>
     <p:sldId id="303" r:id="rId46"/>
+    <p:sldId id="304" r:id="rId47"/>
+    <p:sldId id="305" r:id="rId48"/>
+    <p:sldId id="306" r:id="rId49"/>
   </p:sldIdLst>
   <p:sldSz cx="12192000" cy="6858000"/>
   <p:notesSz cx="6858000" cy="9144000"/>
@@ -241,7 +244,7 @@
           <a:p>
             <a:fld id="{1747B90C-FE49-44DE-93E7-FA9DDECBEA03}" type="datetimeFigureOut">
               <a:rPr lang="en-US" smtClean="0"/>
-              <a:t>03-Oct-19</a:t>
+              <a:t>05-Oct-19</a:t>
             </a:fld>
             <a:endParaRPr lang="en-US"/>
           </a:p>
@@ -1743,6 +1746,258 @@
 </p:notes>
 </file>
 
+<file path=ppt/notesSlides/notesSlide22.xml><?xml version="1.0" encoding="utf-8"?>
+<p:notes xmlns:a="http://schemas.openxmlformats.org/drawingml/2006/main" xmlns:r="http://schemas.openxmlformats.org/officeDocument/2006/relationships" xmlns:p="http://schemas.openxmlformats.org/presentationml/2006/main">
+  <p:cSld>
+    <p:spTree>
+      <p:nvGrpSpPr>
+        <p:cNvPr id="1" name=""/>
+        <p:cNvGrpSpPr/>
+        <p:nvPr/>
+      </p:nvGrpSpPr>
+      <p:grpSpPr>
+        <a:xfrm>
+          <a:off x="0" y="0"/>
+          <a:ext cx="0" cy="0"/>
+          <a:chOff x="0" y="0"/>
+          <a:chExt cx="0" cy="0"/>
+        </a:xfrm>
+      </p:grpSpPr>
+      <p:sp>
+        <p:nvSpPr>
+          <p:cNvPr id="2" name="Slide Image Placeholder 1"/>
+          <p:cNvSpPr>
+            <a:spLocks noGrp="1" noRot="1" noChangeAspect="1"/>
+          </p:cNvSpPr>
+          <p:nvPr>
+            <p:ph type="sldImg"/>
+          </p:nvPr>
+        </p:nvSpPr>
+        <p:spPr/>
+      </p:sp>
+      <p:sp>
+        <p:nvSpPr>
+          <p:cNvPr id="3" name="Notes Placeholder 2"/>
+          <p:cNvSpPr>
+            <a:spLocks noGrp="1"/>
+          </p:cNvSpPr>
+          <p:nvPr>
+            <p:ph type="body" idx="1"/>
+          </p:nvPr>
+        </p:nvSpPr>
+        <p:spPr/>
+        <p:txBody>
+          <a:bodyPr/>
+          <a:lstStyle/>
+          <a:p>
+            <a:endParaRPr lang="en-US" dirty="0"/>
+          </a:p>
+        </p:txBody>
+      </p:sp>
+      <p:sp>
+        <p:nvSpPr>
+          <p:cNvPr id="4" name="Slide Number Placeholder 3"/>
+          <p:cNvSpPr>
+            <a:spLocks noGrp="1"/>
+          </p:cNvSpPr>
+          <p:nvPr>
+            <p:ph type="sldNum" sz="quarter" idx="10"/>
+          </p:nvPr>
+        </p:nvSpPr>
+        <p:spPr/>
+        <p:txBody>
+          <a:bodyPr/>
+          <a:lstStyle/>
+          <a:p>
+            <a:fld id="{BA1D5B97-ACF5-4677-A104-92B2393AA446}" type="slidenum">
+              <a:rPr lang="en-US" smtClean="0"/>
+              <a:t>46</a:t>
+            </a:fld>
+            <a:endParaRPr lang="en-US"/>
+          </a:p>
+        </p:txBody>
+      </p:sp>
+    </p:spTree>
+    <p:extLst>
+      <p:ext uri="{BB962C8B-B14F-4D97-AF65-F5344CB8AC3E}">
+        <p14:creationId xmlns:p14="http://schemas.microsoft.com/office/powerpoint/2010/main" val="1114960508"/>
+      </p:ext>
+    </p:extLst>
+  </p:cSld>
+  <p:clrMapOvr>
+    <a:masterClrMapping/>
+  </p:clrMapOvr>
+</p:notes>
+</file>
+
+<file path=ppt/notesSlides/notesSlide23.xml><?xml version="1.0" encoding="utf-8"?>
+<p:notes xmlns:a="http://schemas.openxmlformats.org/drawingml/2006/main" xmlns:r="http://schemas.openxmlformats.org/officeDocument/2006/relationships" xmlns:p="http://schemas.openxmlformats.org/presentationml/2006/main">
+  <p:cSld>
+    <p:spTree>
+      <p:nvGrpSpPr>
+        <p:cNvPr id="1" name=""/>
+        <p:cNvGrpSpPr/>
+        <p:nvPr/>
+      </p:nvGrpSpPr>
+      <p:grpSpPr>
+        <a:xfrm>
+          <a:off x="0" y="0"/>
+          <a:ext cx="0" cy="0"/>
+          <a:chOff x="0" y="0"/>
+          <a:chExt cx="0" cy="0"/>
+        </a:xfrm>
+      </p:grpSpPr>
+      <p:sp>
+        <p:nvSpPr>
+          <p:cNvPr id="2" name="Slide Image Placeholder 1"/>
+          <p:cNvSpPr>
+            <a:spLocks noGrp="1" noRot="1" noChangeAspect="1"/>
+          </p:cNvSpPr>
+          <p:nvPr>
+            <p:ph type="sldImg"/>
+          </p:nvPr>
+        </p:nvSpPr>
+        <p:spPr/>
+      </p:sp>
+      <p:sp>
+        <p:nvSpPr>
+          <p:cNvPr id="3" name="Notes Placeholder 2"/>
+          <p:cNvSpPr>
+            <a:spLocks noGrp="1"/>
+          </p:cNvSpPr>
+          <p:nvPr>
+            <p:ph type="body" idx="1"/>
+          </p:nvPr>
+        </p:nvSpPr>
+        <p:spPr/>
+        <p:txBody>
+          <a:bodyPr/>
+          <a:lstStyle/>
+          <a:p>
+            <a:endParaRPr lang="en-US" dirty="0"/>
+          </a:p>
+        </p:txBody>
+      </p:sp>
+      <p:sp>
+        <p:nvSpPr>
+          <p:cNvPr id="4" name="Slide Number Placeholder 3"/>
+          <p:cNvSpPr>
+            <a:spLocks noGrp="1"/>
+          </p:cNvSpPr>
+          <p:nvPr>
+            <p:ph type="sldNum" sz="quarter" idx="10"/>
+          </p:nvPr>
+        </p:nvSpPr>
+        <p:spPr/>
+        <p:txBody>
+          <a:bodyPr/>
+          <a:lstStyle/>
+          <a:p>
+            <a:fld id="{BA1D5B97-ACF5-4677-A104-92B2393AA446}" type="slidenum">
+              <a:rPr lang="en-US" smtClean="0"/>
+              <a:t>47</a:t>
+            </a:fld>
+            <a:endParaRPr lang="en-US"/>
+          </a:p>
+        </p:txBody>
+      </p:sp>
+    </p:spTree>
+    <p:extLst>
+      <p:ext uri="{BB962C8B-B14F-4D97-AF65-F5344CB8AC3E}">
+        <p14:creationId xmlns:p14="http://schemas.microsoft.com/office/powerpoint/2010/main" val="3008778643"/>
+      </p:ext>
+    </p:extLst>
+  </p:cSld>
+  <p:clrMapOvr>
+    <a:masterClrMapping/>
+  </p:clrMapOvr>
+</p:notes>
+</file>
+
+<file path=ppt/notesSlides/notesSlide24.xml><?xml version="1.0" encoding="utf-8"?>
+<p:notes xmlns:a="http://schemas.openxmlformats.org/drawingml/2006/main" xmlns:r="http://schemas.openxmlformats.org/officeDocument/2006/relationships" xmlns:p="http://schemas.openxmlformats.org/presentationml/2006/main">
+  <p:cSld>
+    <p:spTree>
+      <p:nvGrpSpPr>
+        <p:cNvPr id="1" name=""/>
+        <p:cNvGrpSpPr/>
+        <p:nvPr/>
+      </p:nvGrpSpPr>
+      <p:grpSpPr>
+        <a:xfrm>
+          <a:off x="0" y="0"/>
+          <a:ext cx="0" cy="0"/>
+          <a:chOff x="0" y="0"/>
+          <a:chExt cx="0" cy="0"/>
+        </a:xfrm>
+      </p:grpSpPr>
+      <p:sp>
+        <p:nvSpPr>
+          <p:cNvPr id="2" name="Slide Image Placeholder 1"/>
+          <p:cNvSpPr>
+            <a:spLocks noGrp="1" noRot="1" noChangeAspect="1"/>
+          </p:cNvSpPr>
+          <p:nvPr>
+            <p:ph type="sldImg"/>
+          </p:nvPr>
+        </p:nvSpPr>
+        <p:spPr/>
+      </p:sp>
+      <p:sp>
+        <p:nvSpPr>
+          <p:cNvPr id="3" name="Notes Placeholder 2"/>
+          <p:cNvSpPr>
+            <a:spLocks noGrp="1"/>
+          </p:cNvSpPr>
+          <p:nvPr>
+            <p:ph type="body" idx="1"/>
+          </p:nvPr>
+        </p:nvSpPr>
+        <p:spPr/>
+        <p:txBody>
+          <a:bodyPr/>
+          <a:lstStyle/>
+          <a:p>
+            <a:endParaRPr lang="en-US" dirty="0"/>
+          </a:p>
+        </p:txBody>
+      </p:sp>
+      <p:sp>
+        <p:nvSpPr>
+          <p:cNvPr id="4" name="Slide Number Placeholder 3"/>
+          <p:cNvSpPr>
+            <a:spLocks noGrp="1"/>
+          </p:cNvSpPr>
+          <p:nvPr>
+            <p:ph type="sldNum" sz="quarter" idx="10"/>
+          </p:nvPr>
+        </p:nvSpPr>
+        <p:spPr/>
+        <p:txBody>
+          <a:bodyPr/>
+          <a:lstStyle/>
+          <a:p>
+            <a:fld id="{BA1D5B97-ACF5-4677-A104-92B2393AA446}" type="slidenum">
+              <a:rPr lang="en-US" smtClean="0"/>
+              <a:t>48</a:t>
+            </a:fld>
+            <a:endParaRPr lang="en-US"/>
+          </a:p>
+        </p:txBody>
+      </p:sp>
+    </p:spTree>
+    <p:extLst>
+      <p:ext uri="{BB962C8B-B14F-4D97-AF65-F5344CB8AC3E}">
+        <p14:creationId xmlns:p14="http://schemas.microsoft.com/office/powerpoint/2010/main" val="354104586"/>
+      </p:ext>
+    </p:extLst>
+  </p:cSld>
+  <p:clrMapOvr>
+    <a:masterClrMapping/>
+  </p:clrMapOvr>
+</p:notes>
+</file>
+
 <file path=ppt/notesSlides/notesSlide3.xml><?xml version="1.0" encoding="utf-8"?>
 <p:notes xmlns:a="http://schemas.openxmlformats.org/drawingml/2006/main" xmlns:r="http://schemas.openxmlformats.org/officeDocument/2006/relationships" xmlns:p="http://schemas.openxmlformats.org/presentationml/2006/main">
   <p:cSld>
@@ -2462,7 +2717,7 @@
           <a:p>
             <a:fld id="{622E22BE-79DE-4FFF-A515-BF1CA8DF801A}" type="datetimeFigureOut">
               <a:rPr lang="en-US" smtClean="0"/>
-              <a:t>03-Oct-19</a:t>
+              <a:t>05-Oct-19</a:t>
             </a:fld>
             <a:endParaRPr lang="en-US"/>
           </a:p>
@@ -2632,7 +2887,7 @@
           <a:p>
             <a:fld id="{622E22BE-79DE-4FFF-A515-BF1CA8DF801A}" type="datetimeFigureOut">
               <a:rPr lang="en-US" smtClean="0"/>
-              <a:t>03-Oct-19</a:t>
+              <a:t>05-Oct-19</a:t>
             </a:fld>
             <a:endParaRPr lang="en-US"/>
           </a:p>
@@ -2812,7 +3067,7 @@
           <a:p>
             <a:fld id="{622E22BE-79DE-4FFF-A515-BF1CA8DF801A}" type="datetimeFigureOut">
               <a:rPr lang="en-US" smtClean="0"/>
-              <a:t>03-Oct-19</a:t>
+              <a:t>05-Oct-19</a:t>
             </a:fld>
             <a:endParaRPr lang="en-US"/>
           </a:p>
@@ -2982,7 +3237,7 @@
           <a:p>
             <a:fld id="{622E22BE-79DE-4FFF-A515-BF1CA8DF801A}" type="datetimeFigureOut">
               <a:rPr lang="en-US" smtClean="0"/>
-              <a:t>03-Oct-19</a:t>
+              <a:t>05-Oct-19</a:t>
             </a:fld>
             <a:endParaRPr lang="en-US"/>
           </a:p>
@@ -3228,7 +3483,7 @@
           <a:p>
             <a:fld id="{622E22BE-79DE-4FFF-A515-BF1CA8DF801A}" type="datetimeFigureOut">
               <a:rPr lang="en-US" smtClean="0"/>
-              <a:t>03-Oct-19</a:t>
+              <a:t>05-Oct-19</a:t>
             </a:fld>
             <a:endParaRPr lang="en-US"/>
           </a:p>
@@ -3460,7 +3715,7 @@
           <a:p>
             <a:fld id="{622E22BE-79DE-4FFF-A515-BF1CA8DF801A}" type="datetimeFigureOut">
               <a:rPr lang="en-US" smtClean="0"/>
-              <a:t>03-Oct-19</a:t>
+              <a:t>05-Oct-19</a:t>
             </a:fld>
             <a:endParaRPr lang="en-US"/>
           </a:p>
@@ -3827,7 +4082,7 @@
           <a:p>
             <a:fld id="{622E22BE-79DE-4FFF-A515-BF1CA8DF801A}" type="datetimeFigureOut">
               <a:rPr lang="en-US" smtClean="0"/>
-              <a:t>03-Oct-19</a:t>
+              <a:t>05-Oct-19</a:t>
             </a:fld>
             <a:endParaRPr lang="en-US"/>
           </a:p>
@@ -3945,7 +4200,7 @@
           <a:p>
             <a:fld id="{622E22BE-79DE-4FFF-A515-BF1CA8DF801A}" type="datetimeFigureOut">
               <a:rPr lang="en-US" smtClean="0"/>
-              <a:t>03-Oct-19</a:t>
+              <a:t>05-Oct-19</a:t>
             </a:fld>
             <a:endParaRPr lang="en-US"/>
           </a:p>
@@ -4040,7 +4295,7 @@
           <a:p>
             <a:fld id="{622E22BE-79DE-4FFF-A515-BF1CA8DF801A}" type="datetimeFigureOut">
               <a:rPr lang="en-US" smtClean="0"/>
-              <a:t>03-Oct-19</a:t>
+              <a:t>05-Oct-19</a:t>
             </a:fld>
             <a:endParaRPr lang="en-US"/>
           </a:p>
@@ -4317,7 +4572,7 @@
           <a:p>
             <a:fld id="{622E22BE-79DE-4FFF-A515-BF1CA8DF801A}" type="datetimeFigureOut">
               <a:rPr lang="en-US" smtClean="0"/>
-              <a:t>03-Oct-19</a:t>
+              <a:t>05-Oct-19</a:t>
             </a:fld>
             <a:endParaRPr lang="en-US"/>
           </a:p>
@@ -4570,7 +4825,7 @@
           <a:p>
             <a:fld id="{622E22BE-79DE-4FFF-A515-BF1CA8DF801A}" type="datetimeFigureOut">
               <a:rPr lang="en-US" smtClean="0"/>
-              <a:t>03-Oct-19</a:t>
+              <a:t>05-Oct-19</a:t>
             </a:fld>
             <a:endParaRPr lang="en-US"/>
           </a:p>
@@ -4783,7 +5038,7 @@
           <a:p>
             <a:fld id="{622E22BE-79DE-4FFF-A515-BF1CA8DF801A}" type="datetimeFigureOut">
               <a:rPr lang="en-US" smtClean="0"/>
-              <a:t>03-Oct-19</a:t>
+              <a:t>05-Oct-19</a:t>
             </a:fld>
             <a:endParaRPr lang="en-US"/>
           </a:p>
@@ -11852,10 +12107,415 @@
           </a:p>
         </p:txBody>
       </p:sp>
+      <p:pic>
+        <p:nvPicPr>
+          <p:cNvPr id="3" name="Picture 2"/>
+          <p:cNvPicPr>
+            <a:picLocks noChangeAspect="1"/>
+          </p:cNvPicPr>
+          <p:nvPr/>
+        </p:nvPicPr>
+        <p:blipFill>
+          <a:blip r:embed="rId3"/>
+          <a:stretch>
+            <a:fillRect/>
+          </a:stretch>
+        </p:blipFill>
+        <p:spPr>
+          <a:xfrm>
+            <a:off x="230759" y="1617784"/>
+            <a:ext cx="11733254" cy="4396154"/>
+          </a:xfrm>
+          <a:prstGeom prst="rect">
+            <a:avLst/>
+          </a:prstGeom>
+        </p:spPr>
+      </p:pic>
     </p:spTree>
     <p:extLst>
       <p:ext uri="{BB962C8B-B14F-4D97-AF65-F5344CB8AC3E}">
         <p14:creationId xmlns:p14="http://schemas.microsoft.com/office/powerpoint/2010/main" val="2715555925"/>
+      </p:ext>
+    </p:extLst>
+  </p:cSld>
+  <p:clrMapOvr>
+    <a:masterClrMapping/>
+  </p:clrMapOvr>
+  <p:timing>
+    <p:tnLst>
+      <p:par>
+        <p:cTn id="1" dur="indefinite" restart="never" nodeType="tmRoot"/>
+      </p:par>
+    </p:tnLst>
+  </p:timing>
+</p:sld>
+</file>
+
+<file path=ppt/slides/slide46.xml><?xml version="1.0" encoding="utf-8"?>
+<p:sld xmlns:a="http://schemas.openxmlformats.org/drawingml/2006/main" xmlns:r="http://schemas.openxmlformats.org/officeDocument/2006/relationships" xmlns:p="http://schemas.openxmlformats.org/presentationml/2006/main">
+  <p:cSld>
+    <p:bg>
+      <p:bgPr>
+        <a:gradFill>
+          <a:gsLst>
+            <a:gs pos="0">
+              <a:schemeClr val="accent1">
+                <a:lumMod val="5000"/>
+                <a:lumOff val="95000"/>
+              </a:schemeClr>
+            </a:gs>
+            <a:gs pos="42000">
+              <a:schemeClr val="accent1">
+                <a:lumMod val="45000"/>
+                <a:lumOff val="55000"/>
+              </a:schemeClr>
+            </a:gs>
+            <a:gs pos="83000">
+              <a:schemeClr val="accent1">
+                <a:lumMod val="45000"/>
+                <a:lumOff val="55000"/>
+              </a:schemeClr>
+            </a:gs>
+            <a:gs pos="100000">
+              <a:schemeClr val="accent1">
+                <a:lumMod val="30000"/>
+                <a:lumOff val="70000"/>
+              </a:schemeClr>
+            </a:gs>
+          </a:gsLst>
+          <a:lin ang="5400000" scaled="1"/>
+        </a:gradFill>
+        <a:effectLst/>
+      </p:bgPr>
+    </p:bg>
+    <p:spTree>
+      <p:nvGrpSpPr>
+        <p:cNvPr id="1" name=""/>
+        <p:cNvGrpSpPr/>
+        <p:nvPr/>
+      </p:nvGrpSpPr>
+      <p:grpSpPr>
+        <a:xfrm>
+          <a:off x="0" y="0"/>
+          <a:ext cx="0" cy="0"/>
+          <a:chOff x="0" y="0"/>
+          <a:chExt cx="0" cy="0"/>
+        </a:xfrm>
+      </p:grpSpPr>
+      <p:sp>
+        <p:nvSpPr>
+          <p:cNvPr id="2" name="Title 1"/>
+          <p:cNvSpPr>
+            <a:spLocks noGrp="1"/>
+          </p:cNvSpPr>
+          <p:nvPr>
+            <p:ph type="title"/>
+          </p:nvPr>
+        </p:nvSpPr>
+        <p:spPr>
+          <a:xfrm>
+            <a:off x="312821" y="-164575"/>
+            <a:ext cx="10515600" cy="1325563"/>
+          </a:xfrm>
+        </p:spPr>
+        <p:txBody>
+          <a:bodyPr/>
+          <a:lstStyle/>
+          <a:p>
+            <a:r>
+              <a:rPr lang="en-US" dirty="0" smtClean="0"/>
+              <a:t>Exception </a:t>
+            </a:r>
+            <a:r>
+              <a:rPr lang="en-US" smtClean="0"/>
+              <a:t>filter example</a:t>
+            </a:r>
+            <a:endParaRPr lang="en-US" dirty="0"/>
+          </a:p>
+        </p:txBody>
+      </p:sp>
+      <p:pic>
+        <p:nvPicPr>
+          <p:cNvPr id="4" name="Picture 3"/>
+          <p:cNvPicPr>
+            <a:picLocks noChangeAspect="1"/>
+          </p:cNvPicPr>
+          <p:nvPr/>
+        </p:nvPicPr>
+        <p:blipFill>
+          <a:blip r:embed="rId3"/>
+          <a:stretch>
+            <a:fillRect/>
+          </a:stretch>
+        </p:blipFill>
+        <p:spPr>
+          <a:xfrm>
+            <a:off x="1817078" y="948030"/>
+            <a:ext cx="8465488" cy="5577694"/>
+          </a:xfrm>
+          <a:prstGeom prst="rect">
+            <a:avLst/>
+          </a:prstGeom>
+        </p:spPr>
+      </p:pic>
+    </p:spTree>
+    <p:extLst>
+      <p:ext uri="{BB962C8B-B14F-4D97-AF65-F5344CB8AC3E}">
+        <p14:creationId xmlns:p14="http://schemas.microsoft.com/office/powerpoint/2010/main" val="3861758591"/>
+      </p:ext>
+    </p:extLst>
+  </p:cSld>
+  <p:clrMapOvr>
+    <a:masterClrMapping/>
+  </p:clrMapOvr>
+  <p:timing>
+    <p:tnLst>
+      <p:par>
+        <p:cTn id="1" dur="indefinite" restart="never" nodeType="tmRoot"/>
+      </p:par>
+    </p:tnLst>
+  </p:timing>
+</p:sld>
+</file>
+
+<file path=ppt/slides/slide47.xml><?xml version="1.0" encoding="utf-8"?>
+<p:sld xmlns:a="http://schemas.openxmlformats.org/drawingml/2006/main" xmlns:r="http://schemas.openxmlformats.org/officeDocument/2006/relationships" xmlns:p="http://schemas.openxmlformats.org/presentationml/2006/main">
+  <p:cSld>
+    <p:bg>
+      <p:bgPr>
+        <a:gradFill>
+          <a:gsLst>
+            <a:gs pos="0">
+              <a:schemeClr val="accent1">
+                <a:lumMod val="5000"/>
+                <a:lumOff val="95000"/>
+              </a:schemeClr>
+            </a:gs>
+            <a:gs pos="42000">
+              <a:schemeClr val="accent1">
+                <a:lumMod val="45000"/>
+                <a:lumOff val="55000"/>
+              </a:schemeClr>
+            </a:gs>
+            <a:gs pos="83000">
+              <a:schemeClr val="accent1">
+                <a:lumMod val="45000"/>
+                <a:lumOff val="55000"/>
+              </a:schemeClr>
+            </a:gs>
+            <a:gs pos="100000">
+              <a:schemeClr val="accent1">
+                <a:lumMod val="30000"/>
+                <a:lumOff val="70000"/>
+              </a:schemeClr>
+            </a:gs>
+          </a:gsLst>
+          <a:lin ang="5400000" scaled="1"/>
+        </a:gradFill>
+        <a:effectLst/>
+      </p:bgPr>
+    </p:bg>
+    <p:spTree>
+      <p:nvGrpSpPr>
+        <p:cNvPr id="1" name=""/>
+        <p:cNvGrpSpPr/>
+        <p:nvPr/>
+      </p:nvGrpSpPr>
+      <p:grpSpPr>
+        <a:xfrm>
+          <a:off x="0" y="0"/>
+          <a:ext cx="0" cy="0"/>
+          <a:chOff x="0" y="0"/>
+          <a:chExt cx="0" cy="0"/>
+        </a:xfrm>
+      </p:grpSpPr>
+      <p:sp>
+        <p:nvSpPr>
+          <p:cNvPr id="2" name="Title 1"/>
+          <p:cNvSpPr>
+            <a:spLocks noGrp="1"/>
+          </p:cNvSpPr>
+          <p:nvPr>
+            <p:ph type="title"/>
+          </p:nvPr>
+        </p:nvSpPr>
+        <p:spPr>
+          <a:xfrm>
+            <a:off x="312821" y="-164575"/>
+            <a:ext cx="10515600" cy="1325563"/>
+          </a:xfrm>
+        </p:spPr>
+        <p:txBody>
+          <a:bodyPr/>
+          <a:lstStyle/>
+          <a:p>
+            <a:r>
+              <a:rPr lang="en-US" dirty="0" smtClean="0"/>
+              <a:t>Exception </a:t>
+            </a:r>
+            <a:r>
+              <a:rPr lang="en-US" smtClean="0"/>
+              <a:t>filter example</a:t>
+            </a:r>
+            <a:endParaRPr lang="en-US" dirty="0"/>
+          </a:p>
+        </p:txBody>
+      </p:sp>
+      <p:pic>
+        <p:nvPicPr>
+          <p:cNvPr id="4" name="Picture 3"/>
+          <p:cNvPicPr>
+            <a:picLocks noChangeAspect="1"/>
+          </p:cNvPicPr>
+          <p:nvPr/>
+        </p:nvPicPr>
+        <p:blipFill>
+          <a:blip r:embed="rId3"/>
+          <a:stretch>
+            <a:fillRect/>
+          </a:stretch>
+        </p:blipFill>
+        <p:spPr>
+          <a:xfrm>
+            <a:off x="684257" y="1037492"/>
+            <a:ext cx="10144164" cy="5676861"/>
+          </a:xfrm>
+          <a:prstGeom prst="rect">
+            <a:avLst/>
+          </a:prstGeom>
+        </p:spPr>
+      </p:pic>
+    </p:spTree>
+    <p:extLst>
+      <p:ext uri="{BB962C8B-B14F-4D97-AF65-F5344CB8AC3E}">
+        <p14:creationId xmlns:p14="http://schemas.microsoft.com/office/powerpoint/2010/main" val="4276829957"/>
+      </p:ext>
+    </p:extLst>
+  </p:cSld>
+  <p:clrMapOvr>
+    <a:masterClrMapping/>
+  </p:clrMapOvr>
+  <p:timing>
+    <p:tnLst>
+      <p:par>
+        <p:cTn id="1" dur="indefinite" restart="never" nodeType="tmRoot"/>
+      </p:par>
+    </p:tnLst>
+  </p:timing>
+</p:sld>
+</file>
+
+<file path=ppt/slides/slide48.xml><?xml version="1.0" encoding="utf-8"?>
+<p:sld xmlns:a="http://schemas.openxmlformats.org/drawingml/2006/main" xmlns:r="http://schemas.openxmlformats.org/officeDocument/2006/relationships" xmlns:p="http://schemas.openxmlformats.org/presentationml/2006/main">
+  <p:cSld>
+    <p:bg>
+      <p:bgPr>
+        <a:gradFill>
+          <a:gsLst>
+            <a:gs pos="0">
+              <a:schemeClr val="accent1">
+                <a:lumMod val="5000"/>
+                <a:lumOff val="95000"/>
+              </a:schemeClr>
+            </a:gs>
+            <a:gs pos="42000">
+              <a:schemeClr val="accent1">
+                <a:lumMod val="45000"/>
+                <a:lumOff val="55000"/>
+              </a:schemeClr>
+            </a:gs>
+            <a:gs pos="83000">
+              <a:schemeClr val="accent1">
+                <a:lumMod val="45000"/>
+                <a:lumOff val="55000"/>
+              </a:schemeClr>
+            </a:gs>
+            <a:gs pos="100000">
+              <a:schemeClr val="accent1">
+                <a:lumMod val="30000"/>
+                <a:lumOff val="70000"/>
+              </a:schemeClr>
+            </a:gs>
+          </a:gsLst>
+          <a:lin ang="5400000" scaled="1"/>
+        </a:gradFill>
+        <a:effectLst/>
+      </p:bgPr>
+    </p:bg>
+    <p:spTree>
+      <p:nvGrpSpPr>
+        <p:cNvPr id="1" name=""/>
+        <p:cNvGrpSpPr/>
+        <p:nvPr/>
+      </p:nvGrpSpPr>
+      <p:grpSpPr>
+        <a:xfrm>
+          <a:off x="0" y="0"/>
+          <a:ext cx="0" cy="0"/>
+          <a:chOff x="0" y="0"/>
+          <a:chExt cx="0" cy="0"/>
+        </a:xfrm>
+      </p:grpSpPr>
+      <p:sp>
+        <p:nvSpPr>
+          <p:cNvPr id="2" name="Title 1"/>
+          <p:cNvSpPr>
+            <a:spLocks noGrp="1"/>
+          </p:cNvSpPr>
+          <p:nvPr>
+            <p:ph type="title"/>
+          </p:nvPr>
+        </p:nvSpPr>
+        <p:spPr>
+          <a:xfrm>
+            <a:off x="312821" y="-164575"/>
+            <a:ext cx="10515600" cy="1325563"/>
+          </a:xfrm>
+        </p:spPr>
+        <p:txBody>
+          <a:bodyPr/>
+          <a:lstStyle/>
+          <a:p>
+            <a:r>
+              <a:rPr lang="en-US" dirty="0" smtClean="0"/>
+              <a:t>Exception </a:t>
+            </a:r>
+            <a:r>
+              <a:rPr lang="en-US" smtClean="0"/>
+              <a:t>filter example</a:t>
+            </a:r>
+            <a:endParaRPr lang="en-US" dirty="0"/>
+          </a:p>
+        </p:txBody>
+      </p:sp>
+      <p:pic>
+        <p:nvPicPr>
+          <p:cNvPr id="3" name="Picture 2"/>
+          <p:cNvPicPr>
+            <a:picLocks noChangeAspect="1"/>
+          </p:cNvPicPr>
+          <p:nvPr/>
+        </p:nvPicPr>
+        <p:blipFill>
+          <a:blip r:embed="rId3"/>
+          <a:stretch>
+            <a:fillRect/>
+          </a:stretch>
+        </p:blipFill>
+        <p:spPr>
+          <a:xfrm>
+            <a:off x="753574" y="1559572"/>
+            <a:ext cx="10834460" cy="3704089"/>
+          </a:xfrm>
+          <a:prstGeom prst="rect">
+            <a:avLst/>
+          </a:prstGeom>
+        </p:spPr>
+      </p:pic>
+    </p:spTree>
+    <p:extLst>
+      <p:ext uri="{BB962C8B-B14F-4D97-AF65-F5344CB8AC3E}">
+        <p14:creationId xmlns:p14="http://schemas.microsoft.com/office/powerpoint/2010/main" val="4249709927"/>
       </p:ext>
     </p:extLst>
   </p:cSld>

</xml_diff>

<commit_message>
Start Dependency injection for filters
</commit_message>
<xml_diff>
--- a/AspNetCoreMVC.pptx
+++ b/AspNetCoreMVC.pptx
@@ -5,7 +5,7 @@
     <p:sldMasterId id="2147483648" r:id="rId1"/>
   </p:sldMasterIdLst>
   <p:notesMasterIdLst>
-    <p:notesMasterId r:id="rId50"/>
+    <p:notesMasterId r:id="rId54"/>
   </p:notesMasterIdLst>
   <p:sldIdLst>
     <p:sldId id="256" r:id="rId2"/>
@@ -56,6 +56,10 @@
     <p:sldId id="304" r:id="rId47"/>
     <p:sldId id="305" r:id="rId48"/>
     <p:sldId id="306" r:id="rId49"/>
+    <p:sldId id="307" r:id="rId50"/>
+    <p:sldId id="308" r:id="rId51"/>
+    <p:sldId id="309" r:id="rId52"/>
+    <p:sldId id="310" r:id="rId53"/>
   </p:sldIdLst>
   <p:sldSz cx="12192000" cy="6858000"/>
   <p:notesSz cx="6858000" cy="9144000"/>
@@ -244,7 +248,7 @@
           <a:p>
             <a:fld id="{1747B90C-FE49-44DE-93E7-FA9DDECBEA03}" type="datetimeFigureOut">
               <a:rPr lang="en-US" smtClean="0"/>
-              <a:t>05-Oct-19</a:t>
+              <a:t>07-Oct-19</a:t>
             </a:fld>
             <a:endParaRPr lang="en-US"/>
           </a:p>
@@ -1998,6 +2002,342 @@
 </p:notes>
 </file>
 
+<file path=ppt/notesSlides/notesSlide25.xml><?xml version="1.0" encoding="utf-8"?>
+<p:notes xmlns:a="http://schemas.openxmlformats.org/drawingml/2006/main" xmlns:r="http://schemas.openxmlformats.org/officeDocument/2006/relationships" xmlns:p="http://schemas.openxmlformats.org/presentationml/2006/main">
+  <p:cSld>
+    <p:spTree>
+      <p:nvGrpSpPr>
+        <p:cNvPr id="1" name=""/>
+        <p:cNvGrpSpPr/>
+        <p:nvPr/>
+      </p:nvGrpSpPr>
+      <p:grpSpPr>
+        <a:xfrm>
+          <a:off x="0" y="0"/>
+          <a:ext cx="0" cy="0"/>
+          <a:chOff x="0" y="0"/>
+          <a:chExt cx="0" cy="0"/>
+        </a:xfrm>
+      </p:grpSpPr>
+      <p:sp>
+        <p:nvSpPr>
+          <p:cNvPr id="2" name="Slide Image Placeholder 1"/>
+          <p:cNvSpPr>
+            <a:spLocks noGrp="1" noRot="1" noChangeAspect="1"/>
+          </p:cNvSpPr>
+          <p:nvPr>
+            <p:ph type="sldImg"/>
+          </p:nvPr>
+        </p:nvSpPr>
+        <p:spPr/>
+      </p:sp>
+      <p:sp>
+        <p:nvSpPr>
+          <p:cNvPr id="3" name="Notes Placeholder 2"/>
+          <p:cNvSpPr>
+            <a:spLocks noGrp="1"/>
+          </p:cNvSpPr>
+          <p:nvPr>
+            <p:ph type="body" idx="1"/>
+          </p:nvPr>
+        </p:nvSpPr>
+        <p:spPr/>
+        <p:txBody>
+          <a:bodyPr/>
+          <a:lstStyle/>
+          <a:p>
+            <a:endParaRPr lang="en-US" dirty="0"/>
+          </a:p>
+        </p:txBody>
+      </p:sp>
+      <p:sp>
+        <p:nvSpPr>
+          <p:cNvPr id="4" name="Slide Number Placeholder 3"/>
+          <p:cNvSpPr>
+            <a:spLocks noGrp="1"/>
+          </p:cNvSpPr>
+          <p:nvPr>
+            <p:ph type="sldNum" sz="quarter" idx="10"/>
+          </p:nvPr>
+        </p:nvSpPr>
+        <p:spPr/>
+        <p:txBody>
+          <a:bodyPr/>
+          <a:lstStyle/>
+          <a:p>
+            <a:fld id="{BA1D5B97-ACF5-4677-A104-92B2393AA446}" type="slidenum">
+              <a:rPr lang="en-US" smtClean="0"/>
+              <a:t>49</a:t>
+            </a:fld>
+            <a:endParaRPr lang="en-US"/>
+          </a:p>
+        </p:txBody>
+      </p:sp>
+    </p:spTree>
+    <p:extLst>
+      <p:ext uri="{BB962C8B-B14F-4D97-AF65-F5344CB8AC3E}">
+        <p14:creationId xmlns:p14="http://schemas.microsoft.com/office/powerpoint/2010/main" val="2697033751"/>
+      </p:ext>
+    </p:extLst>
+  </p:cSld>
+  <p:clrMapOvr>
+    <a:masterClrMapping/>
+  </p:clrMapOvr>
+</p:notes>
+</file>
+
+<file path=ppt/notesSlides/notesSlide26.xml><?xml version="1.0" encoding="utf-8"?>
+<p:notes xmlns:a="http://schemas.openxmlformats.org/drawingml/2006/main" xmlns:r="http://schemas.openxmlformats.org/officeDocument/2006/relationships" xmlns:p="http://schemas.openxmlformats.org/presentationml/2006/main">
+  <p:cSld>
+    <p:spTree>
+      <p:nvGrpSpPr>
+        <p:cNvPr id="1" name=""/>
+        <p:cNvGrpSpPr/>
+        <p:nvPr/>
+      </p:nvGrpSpPr>
+      <p:grpSpPr>
+        <a:xfrm>
+          <a:off x="0" y="0"/>
+          <a:ext cx="0" cy="0"/>
+          <a:chOff x="0" y="0"/>
+          <a:chExt cx="0" cy="0"/>
+        </a:xfrm>
+      </p:grpSpPr>
+      <p:sp>
+        <p:nvSpPr>
+          <p:cNvPr id="2" name="Slide Image Placeholder 1"/>
+          <p:cNvSpPr>
+            <a:spLocks noGrp="1" noRot="1" noChangeAspect="1"/>
+          </p:cNvSpPr>
+          <p:nvPr>
+            <p:ph type="sldImg"/>
+          </p:nvPr>
+        </p:nvSpPr>
+        <p:spPr/>
+      </p:sp>
+      <p:sp>
+        <p:nvSpPr>
+          <p:cNvPr id="3" name="Notes Placeholder 2"/>
+          <p:cNvSpPr>
+            <a:spLocks noGrp="1"/>
+          </p:cNvSpPr>
+          <p:nvPr>
+            <p:ph type="body" idx="1"/>
+          </p:nvPr>
+        </p:nvSpPr>
+        <p:spPr/>
+        <p:txBody>
+          <a:bodyPr/>
+          <a:lstStyle/>
+          <a:p>
+            <a:endParaRPr lang="en-US" dirty="0"/>
+          </a:p>
+        </p:txBody>
+      </p:sp>
+      <p:sp>
+        <p:nvSpPr>
+          <p:cNvPr id="4" name="Slide Number Placeholder 3"/>
+          <p:cNvSpPr>
+            <a:spLocks noGrp="1"/>
+          </p:cNvSpPr>
+          <p:nvPr>
+            <p:ph type="sldNum" sz="quarter" idx="10"/>
+          </p:nvPr>
+        </p:nvSpPr>
+        <p:spPr/>
+        <p:txBody>
+          <a:bodyPr/>
+          <a:lstStyle/>
+          <a:p>
+            <a:fld id="{BA1D5B97-ACF5-4677-A104-92B2393AA446}" type="slidenum">
+              <a:rPr lang="en-US" smtClean="0"/>
+              <a:t>50</a:t>
+            </a:fld>
+            <a:endParaRPr lang="en-US"/>
+          </a:p>
+        </p:txBody>
+      </p:sp>
+    </p:spTree>
+    <p:extLst>
+      <p:ext uri="{BB962C8B-B14F-4D97-AF65-F5344CB8AC3E}">
+        <p14:creationId xmlns:p14="http://schemas.microsoft.com/office/powerpoint/2010/main" val="1992741933"/>
+      </p:ext>
+    </p:extLst>
+  </p:cSld>
+  <p:clrMapOvr>
+    <a:masterClrMapping/>
+  </p:clrMapOvr>
+</p:notes>
+</file>
+
+<file path=ppt/notesSlides/notesSlide27.xml><?xml version="1.0" encoding="utf-8"?>
+<p:notes xmlns:a="http://schemas.openxmlformats.org/drawingml/2006/main" xmlns:r="http://schemas.openxmlformats.org/officeDocument/2006/relationships" xmlns:p="http://schemas.openxmlformats.org/presentationml/2006/main">
+  <p:cSld>
+    <p:spTree>
+      <p:nvGrpSpPr>
+        <p:cNvPr id="1" name=""/>
+        <p:cNvGrpSpPr/>
+        <p:nvPr/>
+      </p:nvGrpSpPr>
+      <p:grpSpPr>
+        <a:xfrm>
+          <a:off x="0" y="0"/>
+          <a:ext cx="0" cy="0"/>
+          <a:chOff x="0" y="0"/>
+          <a:chExt cx="0" cy="0"/>
+        </a:xfrm>
+      </p:grpSpPr>
+      <p:sp>
+        <p:nvSpPr>
+          <p:cNvPr id="2" name="Slide Image Placeholder 1"/>
+          <p:cNvSpPr>
+            <a:spLocks noGrp="1" noRot="1" noChangeAspect="1"/>
+          </p:cNvSpPr>
+          <p:nvPr>
+            <p:ph type="sldImg"/>
+          </p:nvPr>
+        </p:nvSpPr>
+        <p:spPr/>
+      </p:sp>
+      <p:sp>
+        <p:nvSpPr>
+          <p:cNvPr id="3" name="Notes Placeholder 2"/>
+          <p:cNvSpPr>
+            <a:spLocks noGrp="1"/>
+          </p:cNvSpPr>
+          <p:nvPr>
+            <p:ph type="body" idx="1"/>
+          </p:nvPr>
+        </p:nvSpPr>
+        <p:spPr/>
+        <p:txBody>
+          <a:bodyPr/>
+          <a:lstStyle/>
+          <a:p>
+            <a:endParaRPr lang="en-US" dirty="0"/>
+          </a:p>
+        </p:txBody>
+      </p:sp>
+      <p:sp>
+        <p:nvSpPr>
+          <p:cNvPr id="4" name="Slide Number Placeholder 3"/>
+          <p:cNvSpPr>
+            <a:spLocks noGrp="1"/>
+          </p:cNvSpPr>
+          <p:nvPr>
+            <p:ph type="sldNum" sz="quarter" idx="10"/>
+          </p:nvPr>
+        </p:nvSpPr>
+        <p:spPr/>
+        <p:txBody>
+          <a:bodyPr/>
+          <a:lstStyle/>
+          <a:p>
+            <a:fld id="{BA1D5B97-ACF5-4677-A104-92B2393AA446}" type="slidenum">
+              <a:rPr lang="en-US" smtClean="0"/>
+              <a:t>51</a:t>
+            </a:fld>
+            <a:endParaRPr lang="en-US"/>
+          </a:p>
+        </p:txBody>
+      </p:sp>
+    </p:spTree>
+    <p:extLst>
+      <p:ext uri="{BB962C8B-B14F-4D97-AF65-F5344CB8AC3E}">
+        <p14:creationId xmlns:p14="http://schemas.microsoft.com/office/powerpoint/2010/main" val="3672527797"/>
+      </p:ext>
+    </p:extLst>
+  </p:cSld>
+  <p:clrMapOvr>
+    <a:masterClrMapping/>
+  </p:clrMapOvr>
+</p:notes>
+</file>
+
+<file path=ppt/notesSlides/notesSlide28.xml><?xml version="1.0" encoding="utf-8"?>
+<p:notes xmlns:a="http://schemas.openxmlformats.org/drawingml/2006/main" xmlns:r="http://schemas.openxmlformats.org/officeDocument/2006/relationships" xmlns:p="http://schemas.openxmlformats.org/presentationml/2006/main">
+  <p:cSld>
+    <p:spTree>
+      <p:nvGrpSpPr>
+        <p:cNvPr id="1" name=""/>
+        <p:cNvGrpSpPr/>
+        <p:nvPr/>
+      </p:nvGrpSpPr>
+      <p:grpSpPr>
+        <a:xfrm>
+          <a:off x="0" y="0"/>
+          <a:ext cx="0" cy="0"/>
+          <a:chOff x="0" y="0"/>
+          <a:chExt cx="0" cy="0"/>
+        </a:xfrm>
+      </p:grpSpPr>
+      <p:sp>
+        <p:nvSpPr>
+          <p:cNvPr id="2" name="Slide Image Placeholder 1"/>
+          <p:cNvSpPr>
+            <a:spLocks noGrp="1" noRot="1" noChangeAspect="1"/>
+          </p:cNvSpPr>
+          <p:nvPr>
+            <p:ph type="sldImg"/>
+          </p:nvPr>
+        </p:nvSpPr>
+        <p:spPr/>
+      </p:sp>
+      <p:sp>
+        <p:nvSpPr>
+          <p:cNvPr id="3" name="Notes Placeholder 2"/>
+          <p:cNvSpPr>
+            <a:spLocks noGrp="1"/>
+          </p:cNvSpPr>
+          <p:nvPr>
+            <p:ph type="body" idx="1"/>
+          </p:nvPr>
+        </p:nvSpPr>
+        <p:spPr/>
+        <p:txBody>
+          <a:bodyPr/>
+          <a:lstStyle/>
+          <a:p>
+            <a:endParaRPr lang="en-US" dirty="0"/>
+          </a:p>
+        </p:txBody>
+      </p:sp>
+      <p:sp>
+        <p:nvSpPr>
+          <p:cNvPr id="4" name="Slide Number Placeholder 3"/>
+          <p:cNvSpPr>
+            <a:spLocks noGrp="1"/>
+          </p:cNvSpPr>
+          <p:nvPr>
+            <p:ph type="sldNum" sz="quarter" idx="10"/>
+          </p:nvPr>
+        </p:nvSpPr>
+        <p:spPr/>
+        <p:txBody>
+          <a:bodyPr/>
+          <a:lstStyle/>
+          <a:p>
+            <a:fld id="{BA1D5B97-ACF5-4677-A104-92B2393AA446}" type="slidenum">
+              <a:rPr lang="en-US" smtClean="0"/>
+              <a:t>52</a:t>
+            </a:fld>
+            <a:endParaRPr lang="en-US"/>
+          </a:p>
+        </p:txBody>
+      </p:sp>
+    </p:spTree>
+    <p:extLst>
+      <p:ext uri="{BB962C8B-B14F-4D97-AF65-F5344CB8AC3E}">
+        <p14:creationId xmlns:p14="http://schemas.microsoft.com/office/powerpoint/2010/main" val="1741717228"/>
+      </p:ext>
+    </p:extLst>
+  </p:cSld>
+  <p:clrMapOvr>
+    <a:masterClrMapping/>
+  </p:clrMapOvr>
+</p:notes>
+</file>
+
 <file path=ppt/notesSlides/notesSlide3.xml><?xml version="1.0" encoding="utf-8"?>
 <p:notes xmlns:a="http://schemas.openxmlformats.org/drawingml/2006/main" xmlns:r="http://schemas.openxmlformats.org/officeDocument/2006/relationships" xmlns:p="http://schemas.openxmlformats.org/presentationml/2006/main">
   <p:cSld>
@@ -2717,7 +3057,7 @@
           <a:p>
             <a:fld id="{622E22BE-79DE-4FFF-A515-BF1CA8DF801A}" type="datetimeFigureOut">
               <a:rPr lang="en-US" smtClean="0"/>
-              <a:t>05-Oct-19</a:t>
+              <a:t>07-Oct-19</a:t>
             </a:fld>
             <a:endParaRPr lang="en-US"/>
           </a:p>
@@ -2887,7 +3227,7 @@
           <a:p>
             <a:fld id="{622E22BE-79DE-4FFF-A515-BF1CA8DF801A}" type="datetimeFigureOut">
               <a:rPr lang="en-US" smtClean="0"/>
-              <a:t>05-Oct-19</a:t>
+              <a:t>07-Oct-19</a:t>
             </a:fld>
             <a:endParaRPr lang="en-US"/>
           </a:p>
@@ -3067,7 +3407,7 @@
           <a:p>
             <a:fld id="{622E22BE-79DE-4FFF-A515-BF1CA8DF801A}" type="datetimeFigureOut">
               <a:rPr lang="en-US" smtClean="0"/>
-              <a:t>05-Oct-19</a:t>
+              <a:t>07-Oct-19</a:t>
             </a:fld>
             <a:endParaRPr lang="en-US"/>
           </a:p>
@@ -3237,7 +3577,7 @@
           <a:p>
             <a:fld id="{622E22BE-79DE-4FFF-A515-BF1CA8DF801A}" type="datetimeFigureOut">
               <a:rPr lang="en-US" smtClean="0"/>
-              <a:t>05-Oct-19</a:t>
+              <a:t>07-Oct-19</a:t>
             </a:fld>
             <a:endParaRPr lang="en-US"/>
           </a:p>
@@ -3483,7 +3823,7 @@
           <a:p>
             <a:fld id="{622E22BE-79DE-4FFF-A515-BF1CA8DF801A}" type="datetimeFigureOut">
               <a:rPr lang="en-US" smtClean="0"/>
-              <a:t>05-Oct-19</a:t>
+              <a:t>07-Oct-19</a:t>
             </a:fld>
             <a:endParaRPr lang="en-US"/>
           </a:p>
@@ -3715,7 +4055,7 @@
           <a:p>
             <a:fld id="{622E22BE-79DE-4FFF-A515-BF1CA8DF801A}" type="datetimeFigureOut">
               <a:rPr lang="en-US" smtClean="0"/>
-              <a:t>05-Oct-19</a:t>
+              <a:t>07-Oct-19</a:t>
             </a:fld>
             <a:endParaRPr lang="en-US"/>
           </a:p>
@@ -4082,7 +4422,7 @@
           <a:p>
             <a:fld id="{622E22BE-79DE-4FFF-A515-BF1CA8DF801A}" type="datetimeFigureOut">
               <a:rPr lang="en-US" smtClean="0"/>
-              <a:t>05-Oct-19</a:t>
+              <a:t>07-Oct-19</a:t>
             </a:fld>
             <a:endParaRPr lang="en-US"/>
           </a:p>
@@ -4200,7 +4540,7 @@
           <a:p>
             <a:fld id="{622E22BE-79DE-4FFF-A515-BF1CA8DF801A}" type="datetimeFigureOut">
               <a:rPr lang="en-US" smtClean="0"/>
-              <a:t>05-Oct-19</a:t>
+              <a:t>07-Oct-19</a:t>
             </a:fld>
             <a:endParaRPr lang="en-US"/>
           </a:p>
@@ -4295,7 +4635,7 @@
           <a:p>
             <a:fld id="{622E22BE-79DE-4FFF-A515-BF1CA8DF801A}" type="datetimeFigureOut">
               <a:rPr lang="en-US" smtClean="0"/>
-              <a:t>05-Oct-19</a:t>
+              <a:t>07-Oct-19</a:t>
             </a:fld>
             <a:endParaRPr lang="en-US"/>
           </a:p>
@@ -4572,7 +4912,7 @@
           <a:p>
             <a:fld id="{622E22BE-79DE-4FFF-A515-BF1CA8DF801A}" type="datetimeFigureOut">
               <a:rPr lang="en-US" smtClean="0"/>
-              <a:t>05-Oct-19</a:t>
+              <a:t>07-Oct-19</a:t>
             </a:fld>
             <a:endParaRPr lang="en-US"/>
           </a:p>
@@ -4825,7 +5165,7 @@
           <a:p>
             <a:fld id="{622E22BE-79DE-4FFF-A515-BF1CA8DF801A}" type="datetimeFigureOut">
               <a:rPr lang="en-US" smtClean="0"/>
-              <a:t>05-Oct-19</a:t>
+              <a:t>07-Oct-19</a:t>
             </a:fld>
             <a:endParaRPr lang="en-US"/>
           </a:p>
@@ -5038,7 +5378,7 @@
           <a:p>
             <a:fld id="{622E22BE-79DE-4FFF-A515-BF1CA8DF801A}" type="datetimeFigureOut">
               <a:rPr lang="en-US" smtClean="0"/>
-              <a:t>05-Oct-19</a:t>
+              <a:t>07-Oct-19</a:t>
             </a:fld>
             <a:endParaRPr lang="en-US"/>
           </a:p>
@@ -12532,7 +12872,7 @@
 </p:sld>
 </file>
 
-<file path=ppt/slides/slide5.xml><?xml version="1.0" encoding="utf-8"?>
+<file path=ppt/slides/slide49.xml><?xml version="1.0" encoding="utf-8"?>
 <p:sld xmlns:a="http://schemas.openxmlformats.org/drawingml/2006/main" xmlns:r="http://schemas.openxmlformats.org/officeDocument/2006/relationships" xmlns:p="http://schemas.openxmlformats.org/presentationml/2006/main">
   <p:cSld>
     <p:bg>
@@ -12593,6 +12933,164 @@
             <p:ph type="title"/>
           </p:nvPr>
         </p:nvSpPr>
+        <p:spPr>
+          <a:xfrm>
+            <a:off x="312821" y="-164575"/>
+            <a:ext cx="10515600" cy="1325563"/>
+          </a:xfrm>
+        </p:spPr>
+        <p:txBody>
+          <a:bodyPr/>
+          <a:lstStyle/>
+          <a:p>
+            <a:r>
+              <a:rPr lang="en-US" dirty="0" smtClean="0"/>
+              <a:t>Dependency injection for filters</a:t>
+            </a:r>
+            <a:endParaRPr lang="en-US" dirty="0"/>
+          </a:p>
+        </p:txBody>
+      </p:sp>
+      <p:sp>
+        <p:nvSpPr>
+          <p:cNvPr id="4" name="TextBox 3"/>
+          <p:cNvSpPr txBox="1"/>
+          <p:nvPr/>
+        </p:nvSpPr>
+        <p:spPr>
+          <a:xfrm>
+            <a:off x="312821" y="2368061"/>
+            <a:ext cx="12189841" cy="3046988"/>
+          </a:xfrm>
+          <a:prstGeom prst="rect">
+            <a:avLst/>
+          </a:prstGeom>
+          <a:noFill/>
+        </p:spPr>
+        <p:txBody>
+          <a:bodyPr wrap="square" rtlCol="0">
+            <a:spAutoFit/>
+          </a:bodyPr>
+          <a:lstStyle/>
+          <a:p>
+            <a:pPr marL="285750" indent="-285750">
+              <a:buFont typeface="Arial" panose="020B0604020202020204" pitchFamily="34" charset="0"/>
+              <a:buChar char="•"/>
+            </a:pPr>
+            <a:r>
+              <a:rPr lang="en-US" sz="3200" dirty="0" smtClean="0"/>
+              <a:t>Type filter attribute - Inject data inside the filter</a:t>
+            </a:r>
+          </a:p>
+          <a:p>
+            <a:endParaRPr lang="en-US" sz="3200" dirty="0" smtClean="0"/>
+          </a:p>
+          <a:p>
+            <a:pPr marL="285750" indent="-285750">
+              <a:buFont typeface="Arial" panose="020B0604020202020204" pitchFamily="34" charset="0"/>
+              <a:buChar char="•"/>
+            </a:pPr>
+            <a:endParaRPr lang="en-US" sz="3200" dirty="0" smtClean="0"/>
+          </a:p>
+          <a:p>
+            <a:pPr marL="285750" indent="-285750">
+              <a:buFont typeface="Arial" panose="020B0604020202020204" pitchFamily="34" charset="0"/>
+              <a:buChar char="•"/>
+            </a:pPr>
+            <a:r>
+              <a:rPr lang="en-US" sz="3200" dirty="0" smtClean="0"/>
+              <a:t>Service filter attribute – Create a filter object using service provider</a:t>
+            </a:r>
+          </a:p>
+          <a:p>
+            <a:endParaRPr lang="en-US" sz="3200" dirty="0" smtClean="0"/>
+          </a:p>
+          <a:p>
+            <a:endParaRPr lang="en-US" sz="3200" dirty="0"/>
+          </a:p>
+        </p:txBody>
+      </p:sp>
+    </p:spTree>
+    <p:extLst>
+      <p:ext uri="{BB962C8B-B14F-4D97-AF65-F5344CB8AC3E}">
+        <p14:creationId xmlns:p14="http://schemas.microsoft.com/office/powerpoint/2010/main" val="3433389158"/>
+      </p:ext>
+    </p:extLst>
+  </p:cSld>
+  <p:clrMapOvr>
+    <a:masterClrMapping/>
+  </p:clrMapOvr>
+  <p:timing>
+    <p:tnLst>
+      <p:par>
+        <p:cTn id="1" dur="indefinite" restart="never" nodeType="tmRoot"/>
+      </p:par>
+    </p:tnLst>
+  </p:timing>
+</p:sld>
+</file>
+
+<file path=ppt/slides/slide5.xml><?xml version="1.0" encoding="utf-8"?>
+<p:sld xmlns:a="http://schemas.openxmlformats.org/drawingml/2006/main" xmlns:r="http://schemas.openxmlformats.org/officeDocument/2006/relationships" xmlns:p="http://schemas.openxmlformats.org/presentationml/2006/main">
+  <p:cSld>
+    <p:bg>
+      <p:bgPr>
+        <a:gradFill>
+          <a:gsLst>
+            <a:gs pos="0">
+              <a:schemeClr val="accent1">
+                <a:lumMod val="5000"/>
+                <a:lumOff val="95000"/>
+              </a:schemeClr>
+            </a:gs>
+            <a:gs pos="42000">
+              <a:schemeClr val="accent1">
+                <a:lumMod val="45000"/>
+                <a:lumOff val="55000"/>
+              </a:schemeClr>
+            </a:gs>
+            <a:gs pos="83000">
+              <a:schemeClr val="accent1">
+                <a:lumMod val="45000"/>
+                <a:lumOff val="55000"/>
+              </a:schemeClr>
+            </a:gs>
+            <a:gs pos="100000">
+              <a:schemeClr val="accent1">
+                <a:lumMod val="30000"/>
+                <a:lumOff val="70000"/>
+              </a:schemeClr>
+            </a:gs>
+          </a:gsLst>
+          <a:lin ang="5400000" scaled="1"/>
+        </a:gradFill>
+        <a:effectLst/>
+      </p:bgPr>
+    </p:bg>
+    <p:spTree>
+      <p:nvGrpSpPr>
+        <p:cNvPr id="1" name=""/>
+        <p:cNvGrpSpPr/>
+        <p:nvPr/>
+      </p:nvGrpSpPr>
+      <p:grpSpPr>
+        <a:xfrm>
+          <a:off x="0" y="0"/>
+          <a:ext cx="0" cy="0"/>
+          <a:chOff x="0" y="0"/>
+          <a:chExt cx="0" cy="0"/>
+        </a:xfrm>
+      </p:grpSpPr>
+      <p:sp>
+        <p:nvSpPr>
+          <p:cNvPr id="2" name="Title 1"/>
+          <p:cNvSpPr>
+            <a:spLocks noGrp="1"/>
+          </p:cNvSpPr>
+          <p:nvPr>
+            <p:ph type="title"/>
+          </p:nvPr>
+        </p:nvSpPr>
         <p:spPr/>
         <p:txBody>
           <a:bodyPr/>
@@ -12700,6 +13198,375 @@
     <p:extLst>
       <p:ext uri="{BB962C8B-B14F-4D97-AF65-F5344CB8AC3E}">
         <p14:creationId xmlns:p14="http://schemas.microsoft.com/office/powerpoint/2010/main" val="3022483728"/>
+      </p:ext>
+    </p:extLst>
+  </p:cSld>
+  <p:clrMapOvr>
+    <a:masterClrMapping/>
+  </p:clrMapOvr>
+  <p:timing>
+    <p:tnLst>
+      <p:par>
+        <p:cTn id="1" dur="indefinite" restart="never" nodeType="tmRoot"/>
+      </p:par>
+    </p:tnLst>
+  </p:timing>
+</p:sld>
+</file>
+
+<file path=ppt/slides/slide50.xml><?xml version="1.0" encoding="utf-8"?>
+<p:sld xmlns:a="http://schemas.openxmlformats.org/drawingml/2006/main" xmlns:r="http://schemas.openxmlformats.org/officeDocument/2006/relationships" xmlns:p="http://schemas.openxmlformats.org/presentationml/2006/main">
+  <p:cSld>
+    <p:bg>
+      <p:bgPr>
+        <a:gradFill>
+          <a:gsLst>
+            <a:gs pos="0">
+              <a:schemeClr val="accent1">
+                <a:lumMod val="5000"/>
+                <a:lumOff val="95000"/>
+              </a:schemeClr>
+            </a:gs>
+            <a:gs pos="42000">
+              <a:schemeClr val="accent1">
+                <a:lumMod val="45000"/>
+                <a:lumOff val="55000"/>
+              </a:schemeClr>
+            </a:gs>
+            <a:gs pos="83000">
+              <a:schemeClr val="accent1">
+                <a:lumMod val="45000"/>
+                <a:lumOff val="55000"/>
+              </a:schemeClr>
+            </a:gs>
+            <a:gs pos="100000">
+              <a:schemeClr val="accent1">
+                <a:lumMod val="30000"/>
+                <a:lumOff val="70000"/>
+              </a:schemeClr>
+            </a:gs>
+          </a:gsLst>
+          <a:lin ang="5400000" scaled="1"/>
+        </a:gradFill>
+        <a:effectLst/>
+      </p:bgPr>
+    </p:bg>
+    <p:spTree>
+      <p:nvGrpSpPr>
+        <p:cNvPr id="1" name=""/>
+        <p:cNvGrpSpPr/>
+        <p:nvPr/>
+      </p:nvGrpSpPr>
+      <p:grpSpPr>
+        <a:xfrm>
+          <a:off x="0" y="0"/>
+          <a:ext cx="0" cy="0"/>
+          <a:chOff x="0" y="0"/>
+          <a:chExt cx="0" cy="0"/>
+        </a:xfrm>
+      </p:grpSpPr>
+      <p:sp>
+        <p:nvSpPr>
+          <p:cNvPr id="2" name="Title 1"/>
+          <p:cNvSpPr>
+            <a:spLocks noGrp="1"/>
+          </p:cNvSpPr>
+          <p:nvPr>
+            <p:ph type="title"/>
+          </p:nvPr>
+        </p:nvSpPr>
+        <p:spPr>
+          <a:xfrm>
+            <a:off x="312821" y="-164575"/>
+            <a:ext cx="10515600" cy="1325563"/>
+          </a:xfrm>
+        </p:spPr>
+        <p:txBody>
+          <a:bodyPr/>
+          <a:lstStyle/>
+          <a:p>
+            <a:r>
+              <a:rPr lang="en-US" dirty="0" smtClean="0"/>
+              <a:t>Type filter attribute</a:t>
+            </a:r>
+            <a:endParaRPr lang="en-US" dirty="0"/>
+          </a:p>
+        </p:txBody>
+      </p:sp>
+      <p:pic>
+        <p:nvPicPr>
+          <p:cNvPr id="3" name="Picture 2"/>
+          <p:cNvPicPr>
+            <a:picLocks noChangeAspect="1"/>
+          </p:cNvPicPr>
+          <p:nvPr/>
+        </p:nvPicPr>
+        <p:blipFill>
+          <a:blip r:embed="rId3"/>
+          <a:stretch>
+            <a:fillRect/>
+          </a:stretch>
+        </p:blipFill>
+        <p:spPr>
+          <a:xfrm>
+            <a:off x="700453" y="949973"/>
+            <a:ext cx="5325209" cy="2411779"/>
+          </a:xfrm>
+          <a:prstGeom prst="rect">
+            <a:avLst/>
+          </a:prstGeom>
+        </p:spPr>
+      </p:pic>
+      <p:pic>
+        <p:nvPicPr>
+          <p:cNvPr id="5" name="Picture 4"/>
+          <p:cNvPicPr>
+            <a:picLocks noChangeAspect="1"/>
+          </p:cNvPicPr>
+          <p:nvPr/>
+        </p:nvPicPr>
+        <p:blipFill>
+          <a:blip r:embed="rId4"/>
+          <a:stretch>
+            <a:fillRect/>
+          </a:stretch>
+        </p:blipFill>
+        <p:spPr>
+          <a:xfrm>
+            <a:off x="700453" y="3499660"/>
+            <a:ext cx="10236757" cy="3194217"/>
+          </a:xfrm>
+          <a:prstGeom prst="rect">
+            <a:avLst/>
+          </a:prstGeom>
+        </p:spPr>
+      </p:pic>
+    </p:spTree>
+    <p:extLst>
+      <p:ext uri="{BB962C8B-B14F-4D97-AF65-F5344CB8AC3E}">
+        <p14:creationId xmlns:p14="http://schemas.microsoft.com/office/powerpoint/2010/main" val="2995909116"/>
+      </p:ext>
+    </p:extLst>
+  </p:cSld>
+  <p:clrMapOvr>
+    <a:masterClrMapping/>
+  </p:clrMapOvr>
+  <p:timing>
+    <p:tnLst>
+      <p:par>
+        <p:cTn id="1" dur="indefinite" restart="never" nodeType="tmRoot"/>
+      </p:par>
+    </p:tnLst>
+  </p:timing>
+</p:sld>
+</file>
+
+<file path=ppt/slides/slide51.xml><?xml version="1.0" encoding="utf-8"?>
+<p:sld xmlns:a="http://schemas.openxmlformats.org/drawingml/2006/main" xmlns:r="http://schemas.openxmlformats.org/officeDocument/2006/relationships" xmlns:p="http://schemas.openxmlformats.org/presentationml/2006/main">
+  <p:cSld>
+    <p:bg>
+      <p:bgPr>
+        <a:gradFill>
+          <a:gsLst>
+            <a:gs pos="0">
+              <a:schemeClr val="accent1">
+                <a:lumMod val="5000"/>
+                <a:lumOff val="95000"/>
+              </a:schemeClr>
+            </a:gs>
+            <a:gs pos="42000">
+              <a:schemeClr val="accent1">
+                <a:lumMod val="45000"/>
+                <a:lumOff val="55000"/>
+              </a:schemeClr>
+            </a:gs>
+            <a:gs pos="83000">
+              <a:schemeClr val="accent1">
+                <a:lumMod val="45000"/>
+                <a:lumOff val="55000"/>
+              </a:schemeClr>
+            </a:gs>
+            <a:gs pos="100000">
+              <a:schemeClr val="accent1">
+                <a:lumMod val="30000"/>
+                <a:lumOff val="70000"/>
+              </a:schemeClr>
+            </a:gs>
+          </a:gsLst>
+          <a:lin ang="5400000" scaled="1"/>
+        </a:gradFill>
+        <a:effectLst/>
+      </p:bgPr>
+    </p:bg>
+    <p:spTree>
+      <p:nvGrpSpPr>
+        <p:cNvPr id="1" name=""/>
+        <p:cNvGrpSpPr/>
+        <p:nvPr/>
+      </p:nvGrpSpPr>
+      <p:grpSpPr>
+        <a:xfrm>
+          <a:off x="0" y="0"/>
+          <a:ext cx="0" cy="0"/>
+          <a:chOff x="0" y="0"/>
+          <a:chExt cx="0" cy="0"/>
+        </a:xfrm>
+      </p:grpSpPr>
+      <p:sp>
+        <p:nvSpPr>
+          <p:cNvPr id="2" name="Title 1"/>
+          <p:cNvSpPr>
+            <a:spLocks noGrp="1"/>
+          </p:cNvSpPr>
+          <p:nvPr>
+            <p:ph type="title"/>
+          </p:nvPr>
+        </p:nvSpPr>
+        <p:spPr>
+          <a:xfrm>
+            <a:off x="312821" y="-164575"/>
+            <a:ext cx="10515600" cy="1325563"/>
+          </a:xfrm>
+        </p:spPr>
+        <p:txBody>
+          <a:bodyPr/>
+          <a:lstStyle/>
+          <a:p>
+            <a:r>
+              <a:rPr lang="en-US" dirty="0" smtClean="0"/>
+              <a:t>Type filter attribute</a:t>
+            </a:r>
+            <a:endParaRPr lang="en-US" dirty="0"/>
+          </a:p>
+        </p:txBody>
+      </p:sp>
+      <p:pic>
+        <p:nvPicPr>
+          <p:cNvPr id="4" name="Picture 3"/>
+          <p:cNvPicPr>
+            <a:picLocks noChangeAspect="1"/>
+          </p:cNvPicPr>
+          <p:nvPr/>
+        </p:nvPicPr>
+        <p:blipFill>
+          <a:blip r:embed="rId3"/>
+          <a:stretch>
+            <a:fillRect/>
+          </a:stretch>
+        </p:blipFill>
+        <p:spPr>
+          <a:xfrm>
+            <a:off x="652424" y="815853"/>
+            <a:ext cx="9836394" cy="5879079"/>
+          </a:xfrm>
+          <a:prstGeom prst="rect">
+            <a:avLst/>
+          </a:prstGeom>
+        </p:spPr>
+      </p:pic>
+    </p:spTree>
+    <p:extLst>
+      <p:ext uri="{BB962C8B-B14F-4D97-AF65-F5344CB8AC3E}">
+        <p14:creationId xmlns:p14="http://schemas.microsoft.com/office/powerpoint/2010/main" val="3053976009"/>
+      </p:ext>
+    </p:extLst>
+  </p:cSld>
+  <p:clrMapOvr>
+    <a:masterClrMapping/>
+  </p:clrMapOvr>
+  <p:timing>
+    <p:tnLst>
+      <p:par>
+        <p:cTn id="1" dur="indefinite" restart="never" nodeType="tmRoot"/>
+      </p:par>
+    </p:tnLst>
+  </p:timing>
+</p:sld>
+</file>
+
+<file path=ppt/slides/slide52.xml><?xml version="1.0" encoding="utf-8"?>
+<p:sld xmlns:a="http://schemas.openxmlformats.org/drawingml/2006/main" xmlns:r="http://schemas.openxmlformats.org/officeDocument/2006/relationships" xmlns:p="http://schemas.openxmlformats.org/presentationml/2006/main">
+  <p:cSld>
+    <p:bg>
+      <p:bgPr>
+        <a:gradFill>
+          <a:gsLst>
+            <a:gs pos="0">
+              <a:schemeClr val="accent1">
+                <a:lumMod val="5000"/>
+                <a:lumOff val="95000"/>
+              </a:schemeClr>
+            </a:gs>
+            <a:gs pos="42000">
+              <a:schemeClr val="accent1">
+                <a:lumMod val="45000"/>
+                <a:lumOff val="55000"/>
+              </a:schemeClr>
+            </a:gs>
+            <a:gs pos="83000">
+              <a:schemeClr val="accent1">
+                <a:lumMod val="45000"/>
+                <a:lumOff val="55000"/>
+              </a:schemeClr>
+            </a:gs>
+            <a:gs pos="100000">
+              <a:schemeClr val="accent1">
+                <a:lumMod val="30000"/>
+                <a:lumOff val="70000"/>
+              </a:schemeClr>
+            </a:gs>
+          </a:gsLst>
+          <a:lin ang="5400000" scaled="1"/>
+        </a:gradFill>
+        <a:effectLst/>
+      </p:bgPr>
+    </p:bg>
+    <p:spTree>
+      <p:nvGrpSpPr>
+        <p:cNvPr id="1" name=""/>
+        <p:cNvGrpSpPr/>
+        <p:nvPr/>
+      </p:nvGrpSpPr>
+      <p:grpSpPr>
+        <a:xfrm>
+          <a:off x="0" y="0"/>
+          <a:ext cx="0" cy="0"/>
+          <a:chOff x="0" y="0"/>
+          <a:chExt cx="0" cy="0"/>
+        </a:xfrm>
+      </p:grpSpPr>
+      <p:sp>
+        <p:nvSpPr>
+          <p:cNvPr id="2" name="Title 1"/>
+          <p:cNvSpPr>
+            <a:spLocks noGrp="1"/>
+          </p:cNvSpPr>
+          <p:nvPr>
+            <p:ph type="title"/>
+          </p:nvPr>
+        </p:nvSpPr>
+        <p:spPr>
+          <a:xfrm>
+            <a:off x="312821" y="-164575"/>
+            <a:ext cx="10515600" cy="1325563"/>
+          </a:xfrm>
+        </p:spPr>
+        <p:txBody>
+          <a:bodyPr/>
+          <a:lstStyle/>
+          <a:p>
+            <a:r>
+              <a:rPr lang="en-US" dirty="0" smtClean="0"/>
+              <a:t>Type filter attribute</a:t>
+            </a:r>
+            <a:endParaRPr lang="en-US" dirty="0"/>
+          </a:p>
+        </p:txBody>
+      </p:sp>
+    </p:spTree>
+    <p:extLst>
+      <p:ext uri="{BB962C8B-B14F-4D97-AF65-F5344CB8AC3E}">
+        <p14:creationId xmlns:p14="http://schemas.microsoft.com/office/powerpoint/2010/main" val="125507476"/>
       </p:ext>
     </p:extLst>
   </p:cSld>

</xml_diff>

<commit_message>
Add Type filter attribute
</commit_message>
<xml_diff>
--- a/AspNetCoreMVC.pptx
+++ b/AspNetCoreMVC.pptx
@@ -5,61 +5,65 @@
     <p:sldMasterId id="2147483648" r:id="rId1"/>
   </p:sldMasterIdLst>
   <p:notesMasterIdLst>
-    <p:notesMasterId r:id="rId54"/>
+    <p:notesMasterId r:id="rId58"/>
   </p:notesMasterIdLst>
   <p:sldIdLst>
     <p:sldId id="256" r:id="rId2"/>
-    <p:sldId id="257" r:id="rId3"/>
-    <p:sldId id="275" r:id="rId4"/>
-    <p:sldId id="260" r:id="rId5"/>
-    <p:sldId id="258" r:id="rId6"/>
-    <p:sldId id="259" r:id="rId7"/>
-    <p:sldId id="262" r:id="rId8"/>
-    <p:sldId id="263" r:id="rId9"/>
-    <p:sldId id="261" r:id="rId10"/>
-    <p:sldId id="266" r:id="rId11"/>
-    <p:sldId id="267" r:id="rId12"/>
-    <p:sldId id="264" r:id="rId13"/>
-    <p:sldId id="268" r:id="rId14"/>
-    <p:sldId id="265" r:id="rId15"/>
-    <p:sldId id="270" r:id="rId16"/>
-    <p:sldId id="271" r:id="rId17"/>
-    <p:sldId id="269" r:id="rId18"/>
-    <p:sldId id="272" r:id="rId19"/>
-    <p:sldId id="273" r:id="rId20"/>
-    <p:sldId id="274" r:id="rId21"/>
-    <p:sldId id="276" r:id="rId22"/>
-    <p:sldId id="277" r:id="rId23"/>
-    <p:sldId id="278" r:id="rId24"/>
-    <p:sldId id="279" r:id="rId25"/>
-    <p:sldId id="280" r:id="rId26"/>
-    <p:sldId id="281" r:id="rId27"/>
-    <p:sldId id="283" r:id="rId28"/>
-    <p:sldId id="284" r:id="rId29"/>
-    <p:sldId id="285" r:id="rId30"/>
-    <p:sldId id="286" r:id="rId31"/>
-    <p:sldId id="287" r:id="rId32"/>
-    <p:sldId id="289" r:id="rId33"/>
-    <p:sldId id="290" r:id="rId34"/>
-    <p:sldId id="291" r:id="rId35"/>
-    <p:sldId id="292" r:id="rId36"/>
-    <p:sldId id="294" r:id="rId37"/>
-    <p:sldId id="293" r:id="rId38"/>
-    <p:sldId id="295" r:id="rId39"/>
-    <p:sldId id="296" r:id="rId40"/>
-    <p:sldId id="297" r:id="rId41"/>
-    <p:sldId id="298" r:id="rId42"/>
-    <p:sldId id="299" r:id="rId43"/>
-    <p:sldId id="301" r:id="rId44"/>
-    <p:sldId id="302" r:id="rId45"/>
-    <p:sldId id="303" r:id="rId46"/>
-    <p:sldId id="304" r:id="rId47"/>
-    <p:sldId id="305" r:id="rId48"/>
-    <p:sldId id="306" r:id="rId49"/>
-    <p:sldId id="307" r:id="rId50"/>
-    <p:sldId id="308" r:id="rId51"/>
-    <p:sldId id="309" r:id="rId52"/>
-    <p:sldId id="310" r:id="rId53"/>
+    <p:sldId id="275" r:id="rId3"/>
+    <p:sldId id="260" r:id="rId4"/>
+    <p:sldId id="258" r:id="rId5"/>
+    <p:sldId id="259" r:id="rId6"/>
+    <p:sldId id="262" r:id="rId7"/>
+    <p:sldId id="263" r:id="rId8"/>
+    <p:sldId id="261" r:id="rId9"/>
+    <p:sldId id="266" r:id="rId10"/>
+    <p:sldId id="267" r:id="rId11"/>
+    <p:sldId id="264" r:id="rId12"/>
+    <p:sldId id="268" r:id="rId13"/>
+    <p:sldId id="265" r:id="rId14"/>
+    <p:sldId id="270" r:id="rId15"/>
+    <p:sldId id="271" r:id="rId16"/>
+    <p:sldId id="269" r:id="rId17"/>
+    <p:sldId id="272" r:id="rId18"/>
+    <p:sldId id="273" r:id="rId19"/>
+    <p:sldId id="274" r:id="rId20"/>
+    <p:sldId id="276" r:id="rId21"/>
+    <p:sldId id="277" r:id="rId22"/>
+    <p:sldId id="278" r:id="rId23"/>
+    <p:sldId id="279" r:id="rId24"/>
+    <p:sldId id="280" r:id="rId25"/>
+    <p:sldId id="281" r:id="rId26"/>
+    <p:sldId id="283" r:id="rId27"/>
+    <p:sldId id="284" r:id="rId28"/>
+    <p:sldId id="285" r:id="rId29"/>
+    <p:sldId id="286" r:id="rId30"/>
+    <p:sldId id="287" r:id="rId31"/>
+    <p:sldId id="289" r:id="rId32"/>
+    <p:sldId id="290" r:id="rId33"/>
+    <p:sldId id="291" r:id="rId34"/>
+    <p:sldId id="292" r:id="rId35"/>
+    <p:sldId id="294" r:id="rId36"/>
+    <p:sldId id="293" r:id="rId37"/>
+    <p:sldId id="295" r:id="rId38"/>
+    <p:sldId id="296" r:id="rId39"/>
+    <p:sldId id="297" r:id="rId40"/>
+    <p:sldId id="298" r:id="rId41"/>
+    <p:sldId id="299" r:id="rId42"/>
+    <p:sldId id="301" r:id="rId43"/>
+    <p:sldId id="302" r:id="rId44"/>
+    <p:sldId id="303" r:id="rId45"/>
+    <p:sldId id="304" r:id="rId46"/>
+    <p:sldId id="305" r:id="rId47"/>
+    <p:sldId id="306" r:id="rId48"/>
+    <p:sldId id="307" r:id="rId49"/>
+    <p:sldId id="308" r:id="rId50"/>
+    <p:sldId id="309" r:id="rId51"/>
+    <p:sldId id="310" r:id="rId52"/>
+    <p:sldId id="311" r:id="rId53"/>
+    <p:sldId id="312" r:id="rId54"/>
+    <p:sldId id="313" r:id="rId55"/>
+    <p:sldId id="314" r:id="rId56"/>
+    <p:sldId id="315" r:id="rId57"/>
   </p:sldIdLst>
   <p:sldSz cx="12192000" cy="6858000"/>
   <p:notesSz cx="6858000" cy="9144000"/>
@@ -248,7 +252,7 @@
           <a:p>
             <a:fld id="{1747B90C-FE49-44DE-93E7-FA9DDECBEA03}" type="datetimeFigureOut">
               <a:rPr lang="en-US" smtClean="0"/>
-              <a:t>07-Oct-19</a:t>
+              <a:t>08-Oct-19</a:t>
             </a:fld>
             <a:endParaRPr lang="en-US"/>
           </a:p>
@@ -665,7 +669,7 @@
           <a:p>
             <a:fld id="{BA1D5B97-ACF5-4677-A104-92B2393AA446}" type="slidenum">
               <a:rPr lang="en-US" smtClean="0"/>
-              <a:t>34</a:t>
+              <a:t>33</a:t>
             </a:fld>
             <a:endParaRPr lang="en-US"/>
           </a:p>
@@ -749,7 +753,7 @@
           <a:p>
             <a:fld id="{BA1D5B97-ACF5-4677-A104-92B2393AA446}" type="slidenum">
               <a:rPr lang="en-US" smtClean="0"/>
-              <a:t>35</a:t>
+              <a:t>34</a:t>
             </a:fld>
             <a:endParaRPr lang="en-US"/>
           </a:p>
@@ -833,7 +837,7 @@
           <a:p>
             <a:fld id="{BA1D5B97-ACF5-4677-A104-92B2393AA446}" type="slidenum">
               <a:rPr lang="en-US" smtClean="0"/>
-              <a:t>36</a:t>
+              <a:t>35</a:t>
             </a:fld>
             <a:endParaRPr lang="en-US"/>
           </a:p>
@@ -917,7 +921,7 @@
           <a:p>
             <a:fld id="{BA1D5B97-ACF5-4677-A104-92B2393AA446}" type="slidenum">
               <a:rPr lang="en-US" smtClean="0"/>
-              <a:t>37</a:t>
+              <a:t>36</a:t>
             </a:fld>
             <a:endParaRPr lang="en-US"/>
           </a:p>
@@ -1001,7 +1005,7 @@
           <a:p>
             <a:fld id="{BA1D5B97-ACF5-4677-A104-92B2393AA446}" type="slidenum">
               <a:rPr lang="en-US" smtClean="0"/>
-              <a:t>38</a:t>
+              <a:t>37</a:t>
             </a:fld>
             <a:endParaRPr lang="en-US"/>
           </a:p>
@@ -1097,7 +1101,7 @@
           <a:p>
             <a:fld id="{BA1D5B97-ACF5-4677-A104-92B2393AA446}" type="slidenum">
               <a:rPr lang="en-US" smtClean="0"/>
-              <a:t>39</a:t>
+              <a:t>38</a:t>
             </a:fld>
             <a:endParaRPr lang="en-US"/>
           </a:p>
@@ -1181,7 +1185,7 @@
           <a:p>
             <a:fld id="{BA1D5B97-ACF5-4677-A104-92B2393AA446}" type="slidenum">
               <a:rPr lang="en-US" smtClean="0"/>
-              <a:t>40</a:t>
+              <a:t>39</a:t>
             </a:fld>
             <a:endParaRPr lang="en-US"/>
           </a:p>
@@ -1265,7 +1269,7 @@
           <a:p>
             <a:fld id="{BA1D5B97-ACF5-4677-A104-92B2393AA446}" type="slidenum">
               <a:rPr lang="en-US" smtClean="0"/>
-              <a:t>41</a:t>
+              <a:t>40</a:t>
             </a:fld>
             <a:endParaRPr lang="en-US"/>
           </a:p>
@@ -1377,7 +1381,7 @@
           <a:p>
             <a:fld id="{BA1D5B97-ACF5-4677-A104-92B2393AA446}" type="slidenum">
               <a:rPr lang="en-US" smtClean="0"/>
-              <a:t>42</a:t>
+              <a:t>41</a:t>
             </a:fld>
             <a:endParaRPr lang="en-US"/>
           </a:p>
@@ -1461,7 +1465,7 @@
           <a:p>
             <a:fld id="{BA1D5B97-ACF5-4677-A104-92B2393AA446}" type="slidenum">
               <a:rPr lang="en-US" smtClean="0"/>
-              <a:t>43</a:t>
+              <a:t>42</a:t>
             </a:fld>
             <a:endParaRPr lang="en-US"/>
           </a:p>
@@ -1563,7 +1567,7 @@
           <a:p>
             <a:fld id="{BA1D5B97-ACF5-4677-A104-92B2393AA446}" type="slidenum">
               <a:rPr lang="en-US" smtClean="0"/>
-              <a:t>25</a:t>
+              <a:t>24</a:t>
             </a:fld>
             <a:endParaRPr lang="en-US"/>
           </a:p>
@@ -1647,7 +1651,7 @@
           <a:p>
             <a:fld id="{BA1D5B97-ACF5-4677-A104-92B2393AA446}" type="slidenum">
               <a:rPr lang="en-US" smtClean="0"/>
-              <a:t>44</a:t>
+              <a:t>43</a:t>
             </a:fld>
             <a:endParaRPr lang="en-US"/>
           </a:p>
@@ -1731,7 +1735,7 @@
           <a:p>
             <a:fld id="{BA1D5B97-ACF5-4677-A104-92B2393AA446}" type="slidenum">
               <a:rPr lang="en-US" smtClean="0"/>
-              <a:t>45</a:t>
+              <a:t>44</a:t>
             </a:fld>
             <a:endParaRPr lang="en-US"/>
           </a:p>
@@ -1815,7 +1819,7 @@
           <a:p>
             <a:fld id="{BA1D5B97-ACF5-4677-A104-92B2393AA446}" type="slidenum">
               <a:rPr lang="en-US" smtClean="0"/>
-              <a:t>46</a:t>
+              <a:t>45</a:t>
             </a:fld>
             <a:endParaRPr lang="en-US"/>
           </a:p>
@@ -1899,7 +1903,7 @@
           <a:p>
             <a:fld id="{BA1D5B97-ACF5-4677-A104-92B2393AA446}" type="slidenum">
               <a:rPr lang="en-US" smtClean="0"/>
-              <a:t>47</a:t>
+              <a:t>46</a:t>
             </a:fld>
             <a:endParaRPr lang="en-US"/>
           </a:p>
@@ -1983,7 +1987,7 @@
           <a:p>
             <a:fld id="{BA1D5B97-ACF5-4677-A104-92B2393AA446}" type="slidenum">
               <a:rPr lang="en-US" smtClean="0"/>
-              <a:t>48</a:t>
+              <a:t>47</a:t>
             </a:fld>
             <a:endParaRPr lang="en-US"/>
           </a:p>
@@ -2067,7 +2071,7 @@
           <a:p>
             <a:fld id="{BA1D5B97-ACF5-4677-A104-92B2393AA446}" type="slidenum">
               <a:rPr lang="en-US" smtClean="0"/>
-              <a:t>49</a:t>
+              <a:t>48</a:t>
             </a:fld>
             <a:endParaRPr lang="en-US"/>
           </a:p>
@@ -2151,7 +2155,7 @@
           <a:p>
             <a:fld id="{BA1D5B97-ACF5-4677-A104-92B2393AA446}" type="slidenum">
               <a:rPr lang="en-US" smtClean="0"/>
-              <a:t>50</a:t>
+              <a:t>49</a:t>
             </a:fld>
             <a:endParaRPr lang="en-US"/>
           </a:p>
@@ -2235,7 +2239,7 @@
           <a:p>
             <a:fld id="{BA1D5B97-ACF5-4677-A104-92B2393AA446}" type="slidenum">
               <a:rPr lang="en-US" smtClean="0"/>
-              <a:t>51</a:t>
+              <a:t>50</a:t>
             </a:fld>
             <a:endParaRPr lang="en-US"/>
           </a:p>
@@ -2319,7 +2323,7 @@
           <a:p>
             <a:fld id="{BA1D5B97-ACF5-4677-A104-92B2393AA446}" type="slidenum">
               <a:rPr lang="en-US" smtClean="0"/>
-              <a:t>52</a:t>
+              <a:t>51</a:t>
             </a:fld>
             <a:endParaRPr lang="en-US"/>
           </a:p>
@@ -2329,6 +2333,90 @@
     <p:extLst>
       <p:ext uri="{BB962C8B-B14F-4D97-AF65-F5344CB8AC3E}">
         <p14:creationId xmlns:p14="http://schemas.microsoft.com/office/powerpoint/2010/main" val="1741717228"/>
+      </p:ext>
+    </p:extLst>
+  </p:cSld>
+  <p:clrMapOvr>
+    <a:masterClrMapping/>
+  </p:clrMapOvr>
+</p:notes>
+</file>
+
+<file path=ppt/notesSlides/notesSlide29.xml><?xml version="1.0" encoding="utf-8"?>
+<p:notes xmlns:a="http://schemas.openxmlformats.org/drawingml/2006/main" xmlns:r="http://schemas.openxmlformats.org/officeDocument/2006/relationships" xmlns:p="http://schemas.openxmlformats.org/presentationml/2006/main">
+  <p:cSld>
+    <p:spTree>
+      <p:nvGrpSpPr>
+        <p:cNvPr id="1" name=""/>
+        <p:cNvGrpSpPr/>
+        <p:nvPr/>
+      </p:nvGrpSpPr>
+      <p:grpSpPr>
+        <a:xfrm>
+          <a:off x="0" y="0"/>
+          <a:ext cx="0" cy="0"/>
+          <a:chOff x="0" y="0"/>
+          <a:chExt cx="0" cy="0"/>
+        </a:xfrm>
+      </p:grpSpPr>
+      <p:sp>
+        <p:nvSpPr>
+          <p:cNvPr id="2" name="Slide Image Placeholder 1"/>
+          <p:cNvSpPr>
+            <a:spLocks noGrp="1" noRot="1" noChangeAspect="1"/>
+          </p:cNvSpPr>
+          <p:nvPr>
+            <p:ph type="sldImg"/>
+          </p:nvPr>
+        </p:nvSpPr>
+        <p:spPr/>
+      </p:sp>
+      <p:sp>
+        <p:nvSpPr>
+          <p:cNvPr id="3" name="Notes Placeholder 2"/>
+          <p:cNvSpPr>
+            <a:spLocks noGrp="1"/>
+          </p:cNvSpPr>
+          <p:nvPr>
+            <p:ph type="body" idx="1"/>
+          </p:nvPr>
+        </p:nvSpPr>
+        <p:spPr/>
+        <p:txBody>
+          <a:bodyPr/>
+          <a:lstStyle/>
+          <a:p>
+            <a:endParaRPr lang="en-US" dirty="0"/>
+          </a:p>
+        </p:txBody>
+      </p:sp>
+      <p:sp>
+        <p:nvSpPr>
+          <p:cNvPr id="4" name="Slide Number Placeholder 3"/>
+          <p:cNvSpPr>
+            <a:spLocks noGrp="1"/>
+          </p:cNvSpPr>
+          <p:nvPr>
+            <p:ph type="sldNum" sz="quarter" idx="10"/>
+          </p:nvPr>
+        </p:nvSpPr>
+        <p:spPr/>
+        <p:txBody>
+          <a:bodyPr/>
+          <a:lstStyle/>
+          <a:p>
+            <a:fld id="{BA1D5B97-ACF5-4677-A104-92B2393AA446}" type="slidenum">
+              <a:rPr lang="en-US" smtClean="0"/>
+              <a:t>52</a:t>
+            </a:fld>
+            <a:endParaRPr lang="en-US"/>
+          </a:p>
+        </p:txBody>
+      </p:sp>
+    </p:spTree>
+    <p:extLst>
+      <p:ext uri="{BB962C8B-B14F-4D97-AF65-F5344CB8AC3E}">
+        <p14:creationId xmlns:p14="http://schemas.microsoft.com/office/powerpoint/2010/main" val="4117592097"/>
       </p:ext>
     </p:extLst>
   </p:cSld>
@@ -2403,7 +2491,7 @@
           <a:p>
             <a:fld id="{BA1D5B97-ACF5-4677-A104-92B2393AA446}" type="slidenum">
               <a:rPr lang="en-US" smtClean="0"/>
-              <a:t>27</a:t>
+              <a:t>26</a:t>
             </a:fld>
             <a:endParaRPr lang="en-US"/>
           </a:p>
@@ -2413,6 +2501,342 @@
     <p:extLst>
       <p:ext uri="{BB962C8B-B14F-4D97-AF65-F5344CB8AC3E}">
         <p14:creationId xmlns:p14="http://schemas.microsoft.com/office/powerpoint/2010/main" val="2276269795"/>
+      </p:ext>
+    </p:extLst>
+  </p:cSld>
+  <p:clrMapOvr>
+    <a:masterClrMapping/>
+  </p:clrMapOvr>
+</p:notes>
+</file>
+
+<file path=ppt/notesSlides/notesSlide30.xml><?xml version="1.0" encoding="utf-8"?>
+<p:notes xmlns:a="http://schemas.openxmlformats.org/drawingml/2006/main" xmlns:r="http://schemas.openxmlformats.org/officeDocument/2006/relationships" xmlns:p="http://schemas.openxmlformats.org/presentationml/2006/main">
+  <p:cSld>
+    <p:spTree>
+      <p:nvGrpSpPr>
+        <p:cNvPr id="1" name=""/>
+        <p:cNvGrpSpPr/>
+        <p:nvPr/>
+      </p:nvGrpSpPr>
+      <p:grpSpPr>
+        <a:xfrm>
+          <a:off x="0" y="0"/>
+          <a:ext cx="0" cy="0"/>
+          <a:chOff x="0" y="0"/>
+          <a:chExt cx="0" cy="0"/>
+        </a:xfrm>
+      </p:grpSpPr>
+      <p:sp>
+        <p:nvSpPr>
+          <p:cNvPr id="2" name="Slide Image Placeholder 1"/>
+          <p:cNvSpPr>
+            <a:spLocks noGrp="1" noRot="1" noChangeAspect="1"/>
+          </p:cNvSpPr>
+          <p:nvPr>
+            <p:ph type="sldImg"/>
+          </p:nvPr>
+        </p:nvSpPr>
+        <p:spPr/>
+      </p:sp>
+      <p:sp>
+        <p:nvSpPr>
+          <p:cNvPr id="3" name="Notes Placeholder 2"/>
+          <p:cNvSpPr>
+            <a:spLocks noGrp="1"/>
+          </p:cNvSpPr>
+          <p:nvPr>
+            <p:ph type="body" idx="1"/>
+          </p:nvPr>
+        </p:nvSpPr>
+        <p:spPr/>
+        <p:txBody>
+          <a:bodyPr/>
+          <a:lstStyle/>
+          <a:p>
+            <a:endParaRPr lang="en-US" dirty="0"/>
+          </a:p>
+        </p:txBody>
+      </p:sp>
+      <p:sp>
+        <p:nvSpPr>
+          <p:cNvPr id="4" name="Slide Number Placeholder 3"/>
+          <p:cNvSpPr>
+            <a:spLocks noGrp="1"/>
+          </p:cNvSpPr>
+          <p:nvPr>
+            <p:ph type="sldNum" sz="quarter" idx="10"/>
+          </p:nvPr>
+        </p:nvSpPr>
+        <p:spPr/>
+        <p:txBody>
+          <a:bodyPr/>
+          <a:lstStyle/>
+          <a:p>
+            <a:fld id="{BA1D5B97-ACF5-4677-A104-92B2393AA446}" type="slidenum">
+              <a:rPr lang="en-US" smtClean="0"/>
+              <a:t>53</a:t>
+            </a:fld>
+            <a:endParaRPr lang="en-US"/>
+          </a:p>
+        </p:txBody>
+      </p:sp>
+    </p:spTree>
+    <p:extLst>
+      <p:ext uri="{BB962C8B-B14F-4D97-AF65-F5344CB8AC3E}">
+        <p14:creationId xmlns:p14="http://schemas.microsoft.com/office/powerpoint/2010/main" val="3153035969"/>
+      </p:ext>
+    </p:extLst>
+  </p:cSld>
+  <p:clrMapOvr>
+    <a:masterClrMapping/>
+  </p:clrMapOvr>
+</p:notes>
+</file>
+
+<file path=ppt/notesSlides/notesSlide31.xml><?xml version="1.0" encoding="utf-8"?>
+<p:notes xmlns:a="http://schemas.openxmlformats.org/drawingml/2006/main" xmlns:r="http://schemas.openxmlformats.org/officeDocument/2006/relationships" xmlns:p="http://schemas.openxmlformats.org/presentationml/2006/main">
+  <p:cSld>
+    <p:spTree>
+      <p:nvGrpSpPr>
+        <p:cNvPr id="1" name=""/>
+        <p:cNvGrpSpPr/>
+        <p:nvPr/>
+      </p:nvGrpSpPr>
+      <p:grpSpPr>
+        <a:xfrm>
+          <a:off x="0" y="0"/>
+          <a:ext cx="0" cy="0"/>
+          <a:chOff x="0" y="0"/>
+          <a:chExt cx="0" cy="0"/>
+        </a:xfrm>
+      </p:grpSpPr>
+      <p:sp>
+        <p:nvSpPr>
+          <p:cNvPr id="2" name="Slide Image Placeholder 1"/>
+          <p:cNvSpPr>
+            <a:spLocks noGrp="1" noRot="1" noChangeAspect="1"/>
+          </p:cNvSpPr>
+          <p:nvPr>
+            <p:ph type="sldImg"/>
+          </p:nvPr>
+        </p:nvSpPr>
+        <p:spPr/>
+      </p:sp>
+      <p:sp>
+        <p:nvSpPr>
+          <p:cNvPr id="3" name="Notes Placeholder 2"/>
+          <p:cNvSpPr>
+            <a:spLocks noGrp="1"/>
+          </p:cNvSpPr>
+          <p:nvPr>
+            <p:ph type="body" idx="1"/>
+          </p:nvPr>
+        </p:nvSpPr>
+        <p:spPr/>
+        <p:txBody>
+          <a:bodyPr/>
+          <a:lstStyle/>
+          <a:p>
+            <a:endParaRPr lang="en-US" dirty="0"/>
+          </a:p>
+        </p:txBody>
+      </p:sp>
+      <p:sp>
+        <p:nvSpPr>
+          <p:cNvPr id="4" name="Slide Number Placeholder 3"/>
+          <p:cNvSpPr>
+            <a:spLocks noGrp="1"/>
+          </p:cNvSpPr>
+          <p:nvPr>
+            <p:ph type="sldNum" sz="quarter" idx="10"/>
+          </p:nvPr>
+        </p:nvSpPr>
+        <p:spPr/>
+        <p:txBody>
+          <a:bodyPr/>
+          <a:lstStyle/>
+          <a:p>
+            <a:fld id="{BA1D5B97-ACF5-4677-A104-92B2393AA446}" type="slidenum">
+              <a:rPr lang="en-US" smtClean="0"/>
+              <a:t>54</a:t>
+            </a:fld>
+            <a:endParaRPr lang="en-US"/>
+          </a:p>
+        </p:txBody>
+      </p:sp>
+    </p:spTree>
+    <p:extLst>
+      <p:ext uri="{BB962C8B-B14F-4D97-AF65-F5344CB8AC3E}">
+        <p14:creationId xmlns:p14="http://schemas.microsoft.com/office/powerpoint/2010/main" val="2080063673"/>
+      </p:ext>
+    </p:extLst>
+  </p:cSld>
+  <p:clrMapOvr>
+    <a:masterClrMapping/>
+  </p:clrMapOvr>
+</p:notes>
+</file>
+
+<file path=ppt/notesSlides/notesSlide32.xml><?xml version="1.0" encoding="utf-8"?>
+<p:notes xmlns:a="http://schemas.openxmlformats.org/drawingml/2006/main" xmlns:r="http://schemas.openxmlformats.org/officeDocument/2006/relationships" xmlns:p="http://schemas.openxmlformats.org/presentationml/2006/main">
+  <p:cSld>
+    <p:spTree>
+      <p:nvGrpSpPr>
+        <p:cNvPr id="1" name=""/>
+        <p:cNvGrpSpPr/>
+        <p:nvPr/>
+      </p:nvGrpSpPr>
+      <p:grpSpPr>
+        <a:xfrm>
+          <a:off x="0" y="0"/>
+          <a:ext cx="0" cy="0"/>
+          <a:chOff x="0" y="0"/>
+          <a:chExt cx="0" cy="0"/>
+        </a:xfrm>
+      </p:grpSpPr>
+      <p:sp>
+        <p:nvSpPr>
+          <p:cNvPr id="2" name="Slide Image Placeholder 1"/>
+          <p:cNvSpPr>
+            <a:spLocks noGrp="1" noRot="1" noChangeAspect="1"/>
+          </p:cNvSpPr>
+          <p:nvPr>
+            <p:ph type="sldImg"/>
+          </p:nvPr>
+        </p:nvSpPr>
+        <p:spPr/>
+      </p:sp>
+      <p:sp>
+        <p:nvSpPr>
+          <p:cNvPr id="3" name="Notes Placeholder 2"/>
+          <p:cNvSpPr>
+            <a:spLocks noGrp="1"/>
+          </p:cNvSpPr>
+          <p:nvPr>
+            <p:ph type="body" idx="1"/>
+          </p:nvPr>
+        </p:nvSpPr>
+        <p:spPr/>
+        <p:txBody>
+          <a:bodyPr/>
+          <a:lstStyle/>
+          <a:p>
+            <a:endParaRPr lang="en-US" dirty="0"/>
+          </a:p>
+        </p:txBody>
+      </p:sp>
+      <p:sp>
+        <p:nvSpPr>
+          <p:cNvPr id="4" name="Slide Number Placeholder 3"/>
+          <p:cNvSpPr>
+            <a:spLocks noGrp="1"/>
+          </p:cNvSpPr>
+          <p:nvPr>
+            <p:ph type="sldNum" sz="quarter" idx="10"/>
+          </p:nvPr>
+        </p:nvSpPr>
+        <p:spPr/>
+        <p:txBody>
+          <a:bodyPr/>
+          <a:lstStyle/>
+          <a:p>
+            <a:fld id="{BA1D5B97-ACF5-4677-A104-92B2393AA446}" type="slidenum">
+              <a:rPr lang="en-US" smtClean="0"/>
+              <a:t>55</a:t>
+            </a:fld>
+            <a:endParaRPr lang="en-US"/>
+          </a:p>
+        </p:txBody>
+      </p:sp>
+    </p:spTree>
+    <p:extLst>
+      <p:ext uri="{BB962C8B-B14F-4D97-AF65-F5344CB8AC3E}">
+        <p14:creationId xmlns:p14="http://schemas.microsoft.com/office/powerpoint/2010/main" val="2214949972"/>
+      </p:ext>
+    </p:extLst>
+  </p:cSld>
+  <p:clrMapOvr>
+    <a:masterClrMapping/>
+  </p:clrMapOvr>
+</p:notes>
+</file>
+
+<file path=ppt/notesSlides/notesSlide33.xml><?xml version="1.0" encoding="utf-8"?>
+<p:notes xmlns:a="http://schemas.openxmlformats.org/drawingml/2006/main" xmlns:r="http://schemas.openxmlformats.org/officeDocument/2006/relationships" xmlns:p="http://schemas.openxmlformats.org/presentationml/2006/main">
+  <p:cSld>
+    <p:spTree>
+      <p:nvGrpSpPr>
+        <p:cNvPr id="1" name=""/>
+        <p:cNvGrpSpPr/>
+        <p:nvPr/>
+      </p:nvGrpSpPr>
+      <p:grpSpPr>
+        <a:xfrm>
+          <a:off x="0" y="0"/>
+          <a:ext cx="0" cy="0"/>
+          <a:chOff x="0" y="0"/>
+          <a:chExt cx="0" cy="0"/>
+        </a:xfrm>
+      </p:grpSpPr>
+      <p:sp>
+        <p:nvSpPr>
+          <p:cNvPr id="2" name="Slide Image Placeholder 1"/>
+          <p:cNvSpPr>
+            <a:spLocks noGrp="1" noRot="1" noChangeAspect="1"/>
+          </p:cNvSpPr>
+          <p:nvPr>
+            <p:ph type="sldImg"/>
+          </p:nvPr>
+        </p:nvSpPr>
+        <p:spPr/>
+      </p:sp>
+      <p:sp>
+        <p:nvSpPr>
+          <p:cNvPr id="3" name="Notes Placeholder 2"/>
+          <p:cNvSpPr>
+            <a:spLocks noGrp="1"/>
+          </p:cNvSpPr>
+          <p:nvPr>
+            <p:ph type="body" idx="1"/>
+          </p:nvPr>
+        </p:nvSpPr>
+        <p:spPr/>
+        <p:txBody>
+          <a:bodyPr/>
+          <a:lstStyle/>
+          <a:p>
+            <a:endParaRPr lang="en-US" dirty="0"/>
+          </a:p>
+        </p:txBody>
+      </p:sp>
+      <p:sp>
+        <p:nvSpPr>
+          <p:cNvPr id="4" name="Slide Number Placeholder 3"/>
+          <p:cNvSpPr>
+            <a:spLocks noGrp="1"/>
+          </p:cNvSpPr>
+          <p:nvPr>
+            <p:ph type="sldNum" sz="quarter" idx="10"/>
+          </p:nvPr>
+        </p:nvSpPr>
+        <p:spPr/>
+        <p:txBody>
+          <a:bodyPr/>
+          <a:lstStyle/>
+          <a:p>
+            <a:fld id="{BA1D5B97-ACF5-4677-A104-92B2393AA446}" type="slidenum">
+              <a:rPr lang="en-US" smtClean="0"/>
+              <a:t>56</a:t>
+            </a:fld>
+            <a:endParaRPr lang="en-US"/>
+          </a:p>
+        </p:txBody>
+      </p:sp>
+    </p:spTree>
+    <p:extLst>
+      <p:ext uri="{BB962C8B-B14F-4D97-AF65-F5344CB8AC3E}">
+        <p14:creationId xmlns:p14="http://schemas.microsoft.com/office/powerpoint/2010/main" val="769168414"/>
       </p:ext>
     </p:extLst>
   </p:cSld>
@@ -2487,7 +2911,7 @@
           <a:p>
             <a:fld id="{BA1D5B97-ACF5-4677-A104-92B2393AA446}" type="slidenum">
               <a:rPr lang="en-US" smtClean="0"/>
-              <a:t>28</a:t>
+              <a:t>27</a:t>
             </a:fld>
             <a:endParaRPr lang="en-US"/>
           </a:p>
@@ -2571,7 +2995,7 @@
           <a:p>
             <a:fld id="{BA1D5B97-ACF5-4677-A104-92B2393AA446}" type="slidenum">
               <a:rPr lang="en-US" smtClean="0"/>
-              <a:t>29</a:t>
+              <a:t>28</a:t>
             </a:fld>
             <a:endParaRPr lang="en-US"/>
           </a:p>
@@ -2655,7 +3079,7 @@
           <a:p>
             <a:fld id="{BA1D5B97-ACF5-4677-A104-92B2393AA446}" type="slidenum">
               <a:rPr lang="en-US" smtClean="0"/>
-              <a:t>30</a:t>
+              <a:t>29</a:t>
             </a:fld>
             <a:endParaRPr lang="en-US"/>
           </a:p>
@@ -2739,7 +3163,7 @@
           <a:p>
             <a:fld id="{BA1D5B97-ACF5-4677-A104-92B2393AA446}" type="slidenum">
               <a:rPr lang="en-US" smtClean="0"/>
-              <a:t>31</a:t>
+              <a:t>30</a:t>
             </a:fld>
             <a:endParaRPr lang="en-US"/>
           </a:p>
@@ -2823,7 +3247,7 @@
           <a:p>
             <a:fld id="{BA1D5B97-ACF5-4677-A104-92B2393AA446}" type="slidenum">
               <a:rPr lang="en-US" smtClean="0"/>
-              <a:t>32</a:t>
+              <a:t>31</a:t>
             </a:fld>
             <a:endParaRPr lang="en-US"/>
           </a:p>
@@ -2907,7 +3331,7 @@
           <a:p>
             <a:fld id="{BA1D5B97-ACF5-4677-A104-92B2393AA446}" type="slidenum">
               <a:rPr lang="en-US" smtClean="0"/>
-              <a:t>33</a:t>
+              <a:t>32</a:t>
             </a:fld>
             <a:endParaRPr lang="en-US"/>
           </a:p>
@@ -3057,7 +3481,7 @@
           <a:p>
             <a:fld id="{622E22BE-79DE-4FFF-A515-BF1CA8DF801A}" type="datetimeFigureOut">
               <a:rPr lang="en-US" smtClean="0"/>
-              <a:t>07-Oct-19</a:t>
+              <a:t>08-Oct-19</a:t>
             </a:fld>
             <a:endParaRPr lang="en-US"/>
           </a:p>
@@ -3227,7 +3651,7 @@
           <a:p>
             <a:fld id="{622E22BE-79DE-4FFF-A515-BF1CA8DF801A}" type="datetimeFigureOut">
               <a:rPr lang="en-US" smtClean="0"/>
-              <a:t>07-Oct-19</a:t>
+              <a:t>08-Oct-19</a:t>
             </a:fld>
             <a:endParaRPr lang="en-US"/>
           </a:p>
@@ -3407,7 +3831,7 @@
           <a:p>
             <a:fld id="{622E22BE-79DE-4FFF-A515-BF1CA8DF801A}" type="datetimeFigureOut">
               <a:rPr lang="en-US" smtClean="0"/>
-              <a:t>07-Oct-19</a:t>
+              <a:t>08-Oct-19</a:t>
             </a:fld>
             <a:endParaRPr lang="en-US"/>
           </a:p>
@@ -3577,7 +4001,7 @@
           <a:p>
             <a:fld id="{622E22BE-79DE-4FFF-A515-BF1CA8DF801A}" type="datetimeFigureOut">
               <a:rPr lang="en-US" smtClean="0"/>
-              <a:t>07-Oct-19</a:t>
+              <a:t>08-Oct-19</a:t>
             </a:fld>
             <a:endParaRPr lang="en-US"/>
           </a:p>
@@ -3823,7 +4247,7 @@
           <a:p>
             <a:fld id="{622E22BE-79DE-4FFF-A515-BF1CA8DF801A}" type="datetimeFigureOut">
               <a:rPr lang="en-US" smtClean="0"/>
-              <a:t>07-Oct-19</a:t>
+              <a:t>08-Oct-19</a:t>
             </a:fld>
             <a:endParaRPr lang="en-US"/>
           </a:p>
@@ -4055,7 +4479,7 @@
           <a:p>
             <a:fld id="{622E22BE-79DE-4FFF-A515-BF1CA8DF801A}" type="datetimeFigureOut">
               <a:rPr lang="en-US" smtClean="0"/>
-              <a:t>07-Oct-19</a:t>
+              <a:t>08-Oct-19</a:t>
             </a:fld>
             <a:endParaRPr lang="en-US"/>
           </a:p>
@@ -4422,7 +4846,7 @@
           <a:p>
             <a:fld id="{622E22BE-79DE-4FFF-A515-BF1CA8DF801A}" type="datetimeFigureOut">
               <a:rPr lang="en-US" smtClean="0"/>
-              <a:t>07-Oct-19</a:t>
+              <a:t>08-Oct-19</a:t>
             </a:fld>
             <a:endParaRPr lang="en-US"/>
           </a:p>
@@ -4540,7 +4964,7 @@
           <a:p>
             <a:fld id="{622E22BE-79DE-4FFF-A515-BF1CA8DF801A}" type="datetimeFigureOut">
               <a:rPr lang="en-US" smtClean="0"/>
-              <a:t>07-Oct-19</a:t>
+              <a:t>08-Oct-19</a:t>
             </a:fld>
             <a:endParaRPr lang="en-US"/>
           </a:p>
@@ -4635,7 +5059,7 @@
           <a:p>
             <a:fld id="{622E22BE-79DE-4FFF-A515-BF1CA8DF801A}" type="datetimeFigureOut">
               <a:rPr lang="en-US" smtClean="0"/>
-              <a:t>07-Oct-19</a:t>
+              <a:t>08-Oct-19</a:t>
             </a:fld>
             <a:endParaRPr lang="en-US"/>
           </a:p>
@@ -4912,7 +5336,7 @@
           <a:p>
             <a:fld id="{622E22BE-79DE-4FFF-A515-BF1CA8DF801A}" type="datetimeFigureOut">
               <a:rPr lang="en-US" smtClean="0"/>
-              <a:t>07-Oct-19</a:t>
+              <a:t>08-Oct-19</a:t>
             </a:fld>
             <a:endParaRPr lang="en-US"/>
           </a:p>
@@ -5165,7 +5589,7 @@
           <a:p>
             <a:fld id="{622E22BE-79DE-4FFF-A515-BF1CA8DF801A}" type="datetimeFigureOut">
               <a:rPr lang="en-US" smtClean="0"/>
-              <a:t>07-Oct-19</a:t>
+              <a:t>08-Oct-19</a:t>
             </a:fld>
             <a:endParaRPr lang="en-US"/>
           </a:p>
@@ -5378,7 +5802,7 @@
           <a:p>
             <a:fld id="{622E22BE-79DE-4FFF-A515-BF1CA8DF801A}" type="datetimeFigureOut">
               <a:rPr lang="en-US" smtClean="0"/>
-              <a:t>07-Oct-19</a:t>
+              <a:t>08-Oct-19</a:t>
             </a:fld>
             <a:endParaRPr lang="en-US"/>
           </a:p>
@@ -5827,11 +6251,27 @@
             <p:ph type="ctrTitle"/>
           </p:nvPr>
         </p:nvSpPr>
-        <p:spPr/>
-        <p:txBody>
-          <a:bodyPr/>
-          <a:lstStyle/>
-          <a:p>
+        <p:spPr>
+          <a:xfrm>
+            <a:off x="1524000" y="480646"/>
+            <a:ext cx="9144000" cy="3029317"/>
+          </a:xfrm>
+        </p:spPr>
+        <p:txBody>
+          <a:bodyPr/>
+          <a:lstStyle/>
+          <a:p>
+            <a:r>
+              <a:rPr lang="en-US" dirty="0" err="1" smtClean="0"/>
+              <a:t>Midlleware</a:t>
+            </a:r>
+            <a:r>
+              <a:rPr lang="en-US" dirty="0" smtClean="0"/>
+              <a:t> and filters in</a:t>
+            </a:r>
+            <a:br>
+              <a:rPr lang="en-US" dirty="0" smtClean="0"/>
+            </a:br>
             <a:r>
               <a:rPr lang="en-US" dirty="0" smtClean="0"/>
               <a:t>ASP </a:t>
@@ -5896,124 +6336,6 @@
 </file>
 
 <file path=ppt/slides/slide10.xml><?xml version="1.0" encoding="utf-8"?>
-<p:sld xmlns:a="http://schemas.openxmlformats.org/drawingml/2006/main" xmlns:r="http://schemas.openxmlformats.org/officeDocument/2006/relationships" xmlns:p="http://schemas.openxmlformats.org/presentationml/2006/main">
-  <p:cSld>
-    <p:bg>
-      <p:bgPr>
-        <a:gradFill>
-          <a:gsLst>
-            <a:gs pos="0">
-              <a:schemeClr val="accent1">
-                <a:lumMod val="5000"/>
-                <a:lumOff val="95000"/>
-              </a:schemeClr>
-            </a:gs>
-            <a:gs pos="42000">
-              <a:schemeClr val="accent1">
-                <a:lumMod val="45000"/>
-                <a:lumOff val="55000"/>
-              </a:schemeClr>
-            </a:gs>
-            <a:gs pos="83000">
-              <a:schemeClr val="accent1">
-                <a:lumMod val="45000"/>
-                <a:lumOff val="55000"/>
-              </a:schemeClr>
-            </a:gs>
-            <a:gs pos="100000">
-              <a:schemeClr val="accent1">
-                <a:lumMod val="30000"/>
-                <a:lumOff val="70000"/>
-              </a:schemeClr>
-            </a:gs>
-          </a:gsLst>
-          <a:lin ang="5400000" scaled="1"/>
-        </a:gradFill>
-        <a:effectLst/>
-      </p:bgPr>
-    </p:bg>
-    <p:spTree>
-      <p:nvGrpSpPr>
-        <p:cNvPr id="1" name=""/>
-        <p:cNvGrpSpPr/>
-        <p:nvPr/>
-      </p:nvGrpSpPr>
-      <p:grpSpPr>
-        <a:xfrm>
-          <a:off x="0" y="0"/>
-          <a:ext cx="0" cy="0"/>
-          <a:chOff x="0" y="0"/>
-          <a:chExt cx="0" cy="0"/>
-        </a:xfrm>
-      </p:grpSpPr>
-      <p:sp>
-        <p:nvSpPr>
-          <p:cNvPr id="2" name="Title 1"/>
-          <p:cNvSpPr>
-            <a:spLocks noGrp="1"/>
-          </p:cNvSpPr>
-          <p:nvPr>
-            <p:ph type="title"/>
-          </p:nvPr>
-        </p:nvSpPr>
-        <p:spPr/>
-        <p:txBody>
-          <a:bodyPr/>
-          <a:lstStyle/>
-          <a:p>
-            <a:r>
-              <a:rPr lang="en-US" dirty="0" smtClean="0"/>
-              <a:t>Short-Circuiting Middleware</a:t>
-            </a:r>
-            <a:endParaRPr lang="en-US" dirty="0"/>
-          </a:p>
-        </p:txBody>
-      </p:sp>
-      <p:pic>
-        <p:nvPicPr>
-          <p:cNvPr id="4" name="Picture 3"/>
-          <p:cNvPicPr>
-            <a:picLocks noChangeAspect="1"/>
-          </p:cNvPicPr>
-          <p:nvPr/>
-        </p:nvPicPr>
-        <p:blipFill>
-          <a:blip r:embed="rId2"/>
-          <a:stretch>
-            <a:fillRect/>
-          </a:stretch>
-        </p:blipFill>
-        <p:spPr>
-          <a:xfrm>
-            <a:off x="938868" y="1488477"/>
-            <a:ext cx="9069198" cy="5197839"/>
-          </a:xfrm>
-          <a:prstGeom prst="rect">
-            <a:avLst/>
-          </a:prstGeom>
-        </p:spPr>
-      </p:pic>
-    </p:spTree>
-    <p:extLst>
-      <p:ext uri="{BB962C8B-B14F-4D97-AF65-F5344CB8AC3E}">
-        <p14:creationId xmlns:p14="http://schemas.microsoft.com/office/powerpoint/2010/main" val="2167962615"/>
-      </p:ext>
-    </p:extLst>
-  </p:cSld>
-  <p:clrMapOvr>
-    <a:masterClrMapping/>
-  </p:clrMapOvr>
-  <p:timing>
-    <p:tnLst>
-      <p:par>
-        <p:cTn id="1" dur="indefinite" restart="never" nodeType="tmRoot"/>
-      </p:par>
-    </p:tnLst>
-  </p:timing>
-</p:sld>
-</file>
-
-<file path=ppt/slides/slide11.xml><?xml version="1.0" encoding="utf-8"?>
 <p:sld xmlns:a="http://schemas.openxmlformats.org/drawingml/2006/main" xmlns:r="http://schemas.openxmlformats.org/officeDocument/2006/relationships" xmlns:p="http://schemas.openxmlformats.org/presentationml/2006/main">
   <p:cSld>
     <p:bg>
@@ -6131,7 +6453,7 @@
 </p:sld>
 </file>
 
-<file path=ppt/slides/slide12.xml><?xml version="1.0" encoding="utf-8"?>
+<file path=ppt/slides/slide11.xml><?xml version="1.0" encoding="utf-8"?>
 <p:sld xmlns:a="http://schemas.openxmlformats.org/drawingml/2006/main" xmlns:r="http://schemas.openxmlformats.org/officeDocument/2006/relationships" xmlns:p="http://schemas.openxmlformats.org/presentationml/2006/main">
   <p:cSld>
     <p:bg>
@@ -6251,7 +6573,7 @@
 </p:sld>
 </file>
 
-<file path=ppt/slides/slide13.xml><?xml version="1.0" encoding="utf-8"?>
+<file path=ppt/slides/slide12.xml><?xml version="1.0" encoding="utf-8"?>
 <p:sld xmlns:a="http://schemas.openxmlformats.org/drawingml/2006/main" xmlns:r="http://schemas.openxmlformats.org/officeDocument/2006/relationships" xmlns:p="http://schemas.openxmlformats.org/presentationml/2006/main">
   <p:cSld>
     <p:bg>
@@ -6388,7 +6710,7 @@
 </p:sld>
 </file>
 
-<file path=ppt/slides/slide14.xml><?xml version="1.0" encoding="utf-8"?>
+<file path=ppt/slides/slide13.xml><?xml version="1.0" encoding="utf-8"?>
 <p:sld xmlns:a="http://schemas.openxmlformats.org/drawingml/2006/main" xmlns:r="http://schemas.openxmlformats.org/officeDocument/2006/relationships" xmlns:p="http://schemas.openxmlformats.org/presentationml/2006/main">
   <p:cSld>
     <p:bg>
@@ -6528,7 +6850,7 @@
 </p:sld>
 </file>
 
-<file path=ppt/slides/slide15.xml><?xml version="1.0" encoding="utf-8"?>
+<file path=ppt/slides/slide14.xml><?xml version="1.0" encoding="utf-8"?>
 <p:sld xmlns:a="http://schemas.openxmlformats.org/drawingml/2006/main" xmlns:r="http://schemas.openxmlformats.org/officeDocument/2006/relationships" xmlns:p="http://schemas.openxmlformats.org/presentationml/2006/main">
   <p:cSld>
     <p:bg>
@@ -6653,7 +6975,7 @@
 </p:sld>
 </file>
 
-<file path=ppt/slides/slide16.xml><?xml version="1.0" encoding="utf-8"?>
+<file path=ppt/slides/slide15.xml><?xml version="1.0" encoding="utf-8"?>
 <p:sld xmlns:a="http://schemas.openxmlformats.org/drawingml/2006/main" xmlns:r="http://schemas.openxmlformats.org/officeDocument/2006/relationships" xmlns:p="http://schemas.openxmlformats.org/presentationml/2006/main">
   <p:cSld>
     <p:bg>
@@ -6778,7 +7100,7 @@
 </p:sld>
 </file>
 
-<file path=ppt/slides/slide17.xml><?xml version="1.0" encoding="utf-8"?>
+<file path=ppt/slides/slide16.xml><?xml version="1.0" encoding="utf-8"?>
 <p:sld xmlns:a="http://schemas.openxmlformats.org/drawingml/2006/main" xmlns:r="http://schemas.openxmlformats.org/officeDocument/2006/relationships" xmlns:p="http://schemas.openxmlformats.org/presentationml/2006/main">
   <p:cSld>
     <p:bg>
@@ -6964,6 +7286,218 @@
     <p:extLst>
       <p:ext uri="{BB962C8B-B14F-4D97-AF65-F5344CB8AC3E}">
         <p14:creationId xmlns:p14="http://schemas.microsoft.com/office/powerpoint/2010/main" val="442834766"/>
+      </p:ext>
+    </p:extLst>
+  </p:cSld>
+  <p:clrMapOvr>
+    <a:masterClrMapping/>
+  </p:clrMapOvr>
+  <p:timing>
+    <p:tnLst>
+      <p:par>
+        <p:cTn id="1" dur="indefinite" restart="never" nodeType="tmRoot"/>
+      </p:par>
+    </p:tnLst>
+  </p:timing>
+</p:sld>
+</file>
+
+<file path=ppt/slides/slide17.xml><?xml version="1.0" encoding="utf-8"?>
+<p:sld xmlns:a="http://schemas.openxmlformats.org/drawingml/2006/main" xmlns:r="http://schemas.openxmlformats.org/officeDocument/2006/relationships" xmlns:p="http://schemas.openxmlformats.org/presentationml/2006/main">
+  <p:cSld>
+    <p:bg>
+      <p:bgPr>
+        <a:gradFill>
+          <a:gsLst>
+            <a:gs pos="0">
+              <a:schemeClr val="accent1">
+                <a:lumMod val="5000"/>
+                <a:lumOff val="95000"/>
+              </a:schemeClr>
+            </a:gs>
+            <a:gs pos="42000">
+              <a:schemeClr val="accent1">
+                <a:lumMod val="45000"/>
+                <a:lumOff val="55000"/>
+              </a:schemeClr>
+            </a:gs>
+            <a:gs pos="83000">
+              <a:schemeClr val="accent1">
+                <a:lumMod val="45000"/>
+                <a:lumOff val="55000"/>
+              </a:schemeClr>
+            </a:gs>
+            <a:gs pos="100000">
+              <a:schemeClr val="accent1">
+                <a:lumMod val="30000"/>
+                <a:lumOff val="70000"/>
+              </a:schemeClr>
+            </a:gs>
+          </a:gsLst>
+          <a:lin ang="5400000" scaled="1"/>
+        </a:gradFill>
+        <a:effectLst/>
+      </p:bgPr>
+    </p:bg>
+    <p:spTree>
+      <p:nvGrpSpPr>
+        <p:cNvPr id="1" name=""/>
+        <p:cNvGrpSpPr/>
+        <p:nvPr/>
+      </p:nvGrpSpPr>
+      <p:grpSpPr>
+        <a:xfrm>
+          <a:off x="0" y="0"/>
+          <a:ext cx="0" cy="0"/>
+          <a:chOff x="0" y="0"/>
+          <a:chExt cx="0" cy="0"/>
+        </a:xfrm>
+      </p:grpSpPr>
+      <p:sp>
+        <p:nvSpPr>
+          <p:cNvPr id="2" name="Title 1"/>
+          <p:cNvSpPr>
+            <a:spLocks noGrp="1"/>
+          </p:cNvSpPr>
+          <p:nvPr>
+            <p:ph type="title"/>
+          </p:nvPr>
+        </p:nvSpPr>
+        <p:spPr/>
+        <p:txBody>
+          <a:bodyPr/>
+          <a:lstStyle/>
+          <a:p>
+            <a:r>
+              <a:rPr lang="en-US" dirty="0" smtClean="0"/>
+              <a:t>Filters</a:t>
+            </a:r>
+            <a:endParaRPr lang="en-US" dirty="0"/>
+          </a:p>
+        </p:txBody>
+      </p:sp>
+      <p:sp>
+        <p:nvSpPr>
+          <p:cNvPr id="3" name="Content Placeholder 2"/>
+          <p:cNvSpPr>
+            <a:spLocks noGrp="1"/>
+          </p:cNvSpPr>
+          <p:nvPr>
+            <p:ph idx="1"/>
+          </p:nvPr>
+        </p:nvSpPr>
+        <p:spPr>
+          <a:xfrm>
+            <a:off x="1031631" y="1690688"/>
+            <a:ext cx="10515600" cy="4351338"/>
+          </a:xfrm>
+        </p:spPr>
+        <p:txBody>
+          <a:bodyPr>
+            <a:normAutofit/>
+          </a:bodyPr>
+          <a:lstStyle/>
+          <a:p>
+            <a:pPr marL="0" indent="0">
+              <a:buNone/>
+            </a:pPr>
+            <a:r>
+              <a:rPr lang="en-US" sz="3600" dirty="0"/>
+              <a:t>	</a:t>
+            </a:r>
+            <a:r>
+              <a:rPr lang="en-US" sz="3600" dirty="0" smtClean="0"/>
+              <a:t>Types and order of filters:</a:t>
+            </a:r>
+          </a:p>
+          <a:p>
+            <a:pPr marL="0" indent="0">
+              <a:buNone/>
+            </a:pPr>
+            <a:endParaRPr lang="en-US" sz="3600" dirty="0" smtClean="0"/>
+          </a:p>
+          <a:p>
+            <a:r>
+              <a:rPr lang="en-US" sz="3600" dirty="0" smtClean="0"/>
+              <a:t>Authorization – I(</a:t>
+            </a:r>
+            <a:r>
+              <a:rPr lang="en-US" sz="3600" dirty="0" err="1" smtClean="0"/>
+              <a:t>Async</a:t>
+            </a:r>
+            <a:r>
+              <a:rPr lang="en-US" sz="3600" dirty="0" smtClean="0"/>
+              <a:t>)</a:t>
+            </a:r>
+            <a:r>
+              <a:rPr lang="en-US" sz="3600" dirty="0" err="1" smtClean="0"/>
+              <a:t>AuthorizationFilter</a:t>
+            </a:r>
+            <a:endParaRPr lang="en-US" sz="3600" dirty="0" smtClean="0"/>
+          </a:p>
+          <a:p>
+            <a:r>
+              <a:rPr lang="en-US" sz="3600" dirty="0" smtClean="0"/>
+              <a:t>Action – I(</a:t>
+            </a:r>
+            <a:r>
+              <a:rPr lang="en-US" sz="3600" dirty="0" err="1" smtClean="0"/>
+              <a:t>Async</a:t>
+            </a:r>
+            <a:r>
+              <a:rPr lang="en-US" sz="3600" dirty="0" smtClean="0"/>
+              <a:t>)</a:t>
+            </a:r>
+            <a:r>
+              <a:rPr lang="en-US" sz="3600" dirty="0" err="1" smtClean="0"/>
+              <a:t>ActionFilter</a:t>
+            </a:r>
+            <a:endParaRPr lang="en-US" sz="3600" dirty="0" smtClean="0"/>
+          </a:p>
+          <a:p>
+            <a:r>
+              <a:rPr lang="en-US" sz="3600" dirty="0" smtClean="0"/>
+              <a:t>Result – I(</a:t>
+            </a:r>
+            <a:r>
+              <a:rPr lang="en-US" sz="3600" dirty="0" err="1" smtClean="0"/>
+              <a:t>Async</a:t>
+            </a:r>
+            <a:r>
+              <a:rPr lang="en-US" sz="3600" dirty="0" smtClean="0"/>
+              <a:t>)</a:t>
+            </a:r>
+            <a:r>
+              <a:rPr lang="en-US" sz="3600" dirty="0" err="1" smtClean="0"/>
+              <a:t>ResultFilter</a:t>
+            </a:r>
+            <a:endParaRPr lang="en-US" sz="3600" dirty="0" smtClean="0"/>
+          </a:p>
+          <a:p>
+            <a:r>
+              <a:rPr lang="en-US" sz="3600" dirty="0" smtClean="0"/>
+              <a:t>Exception – I(</a:t>
+            </a:r>
+            <a:r>
+              <a:rPr lang="en-US" sz="3600" dirty="0" err="1" smtClean="0"/>
+              <a:t>Async</a:t>
+            </a:r>
+            <a:r>
+              <a:rPr lang="en-US" sz="3600" dirty="0" smtClean="0"/>
+              <a:t>)</a:t>
+            </a:r>
+            <a:r>
+              <a:rPr lang="en-US" sz="3600" dirty="0" err="1" smtClean="0"/>
+              <a:t>ExceptionFilter</a:t>
+            </a:r>
+            <a:endParaRPr lang="en-US" sz="3600" dirty="0"/>
+          </a:p>
+        </p:txBody>
+      </p:sp>
+    </p:spTree>
+    <p:extLst>
+      <p:ext uri="{BB962C8B-B14F-4D97-AF65-F5344CB8AC3E}">
+        <p14:creationId xmlns:p14="http://schemas.microsoft.com/office/powerpoint/2010/main" val="2404820062"/>
       </p:ext>
     </p:extLst>
   </p:cSld>
@@ -7048,7 +7582,7 @@
           <a:p>
             <a:r>
               <a:rPr lang="en-US" dirty="0" smtClean="0"/>
-              <a:t>Filters</a:t>
+              <a:t>Authorization filters</a:t>
             </a:r>
             <a:endParaRPr lang="en-US" dirty="0"/>
           </a:p>
@@ -7064,118 +7598,128 @@
             <p:ph idx="1"/>
           </p:nvPr>
         </p:nvSpPr>
-        <p:spPr>
-          <a:xfrm>
-            <a:off x="1031631" y="1690688"/>
-            <a:ext cx="10515600" cy="4351338"/>
-          </a:xfrm>
-        </p:spPr>
-        <p:txBody>
-          <a:bodyPr>
-            <a:normAutofit/>
-          </a:bodyPr>
+        <p:spPr/>
+        <p:txBody>
+          <a:bodyPr/>
           <a:lstStyle/>
           <a:p>
             <a:pPr marL="0" indent="0">
               <a:buNone/>
             </a:pPr>
             <a:r>
-              <a:rPr lang="en-US" sz="3600" dirty="0"/>
-              <a:t>	</a:t>
-            </a:r>
-            <a:r>
-              <a:rPr lang="en-US" sz="3600" dirty="0" smtClean="0"/>
-              <a:t>Types and order of filters:</a:t>
+              <a:rPr lang="en-US" dirty="0"/>
+              <a:t>namespace </a:t>
+            </a:r>
+            <a:r>
+              <a:rPr lang="en-US" dirty="0" err="1"/>
+              <a:t>Microsoft.AspNetCore.Mvc.Filters</a:t>
+            </a:r>
+            <a:r>
+              <a:rPr lang="en-US" dirty="0"/>
+              <a:t> </a:t>
+            </a:r>
+            <a:r>
+              <a:rPr lang="en-US" dirty="0" smtClean="0"/>
+              <a:t>{</a:t>
             </a:r>
           </a:p>
           <a:p>
             <a:pPr marL="0" indent="0">
               <a:buNone/>
             </a:pPr>
-            <a:endParaRPr lang="en-US" sz="3600" dirty="0" smtClean="0"/>
-          </a:p>
-          <a:p>
-            <a:r>
-              <a:rPr lang="en-US" sz="3600" dirty="0" smtClean="0"/>
-              <a:t>Authorization – I(</a:t>
-            </a:r>
-            <a:r>
-              <a:rPr lang="en-US" sz="3600" dirty="0" err="1" smtClean="0"/>
-              <a:t>Async</a:t>
-            </a:r>
-            <a:r>
-              <a:rPr lang="en-US" sz="3600" dirty="0" smtClean="0"/>
-              <a:t>)</a:t>
-            </a:r>
-            <a:r>
-              <a:rPr lang="en-US" sz="3600" dirty="0" err="1" smtClean="0"/>
-              <a:t>AuthorizationFilter</a:t>
-            </a:r>
-            <a:endParaRPr lang="en-US" sz="3600" dirty="0" smtClean="0"/>
-          </a:p>
-          <a:p>
-            <a:r>
-              <a:rPr lang="en-US" sz="3600" dirty="0" smtClean="0"/>
-              <a:t>Action – I(</a:t>
-            </a:r>
-            <a:r>
-              <a:rPr lang="en-US" sz="3600" dirty="0" err="1" smtClean="0"/>
-              <a:t>Async</a:t>
-            </a:r>
-            <a:r>
-              <a:rPr lang="en-US" sz="3600" dirty="0" smtClean="0"/>
-              <a:t>)</a:t>
-            </a:r>
-            <a:r>
-              <a:rPr lang="en-US" sz="3600" dirty="0" err="1" smtClean="0"/>
-              <a:t>ActionFilter</a:t>
-            </a:r>
-            <a:endParaRPr lang="en-US" sz="3600" dirty="0" smtClean="0"/>
-          </a:p>
-          <a:p>
-            <a:r>
-              <a:rPr lang="en-US" sz="3600" dirty="0" smtClean="0"/>
-              <a:t>Result – I(</a:t>
-            </a:r>
-            <a:r>
-              <a:rPr lang="en-US" sz="3600" dirty="0" err="1" smtClean="0"/>
-              <a:t>Async</a:t>
-            </a:r>
-            <a:r>
-              <a:rPr lang="en-US" sz="3600" dirty="0" smtClean="0"/>
-              <a:t>)</a:t>
-            </a:r>
-            <a:r>
-              <a:rPr lang="en-US" sz="3600" dirty="0" err="1" smtClean="0"/>
-              <a:t>ResultFilter</a:t>
-            </a:r>
-            <a:endParaRPr lang="en-US" sz="3600" dirty="0" smtClean="0"/>
-          </a:p>
-          <a:p>
-            <a:r>
-              <a:rPr lang="en-US" sz="3600" dirty="0" smtClean="0"/>
-              <a:t>Exception – I(</a:t>
-            </a:r>
-            <a:r>
-              <a:rPr lang="en-US" sz="3600" dirty="0" err="1" smtClean="0"/>
-              <a:t>Async</a:t>
-            </a:r>
-            <a:r>
-              <a:rPr lang="en-US" sz="3600" dirty="0" smtClean="0"/>
-              <a:t>)</a:t>
-            </a:r>
-            <a:r>
-              <a:rPr lang="en-US" sz="3600" dirty="0" err="1" smtClean="0"/>
-              <a:t>ExceptionFilter</a:t>
-            </a:r>
-            <a:endParaRPr lang="en-US" sz="3600" dirty="0"/>
+            <a:endParaRPr lang="en-US" dirty="0"/>
+          </a:p>
+          <a:p>
+            <a:pPr marL="0" indent="0">
+              <a:buNone/>
+            </a:pPr>
+            <a:r>
+              <a:rPr lang="en-US" dirty="0" smtClean="0"/>
+              <a:t>	public </a:t>
+            </a:r>
+            <a:r>
+              <a:rPr lang="en-US" dirty="0"/>
+              <a:t>interface </a:t>
+            </a:r>
+            <a:r>
+              <a:rPr lang="en-US" dirty="0" err="1"/>
+              <a:t>IAuthorizationFilter</a:t>
+            </a:r>
+            <a:r>
+              <a:rPr lang="en-US" dirty="0"/>
+              <a:t> : </a:t>
+            </a:r>
+            <a:r>
+              <a:rPr lang="en-US" dirty="0" err="1"/>
+              <a:t>IFilterMetadata</a:t>
+            </a:r>
+            <a:r>
+              <a:rPr lang="en-US" dirty="0"/>
+              <a:t> {</a:t>
+            </a:r>
+          </a:p>
+          <a:p>
+            <a:pPr marL="0" indent="0">
+              <a:buNone/>
+            </a:pPr>
+            <a:endParaRPr lang="en-US" dirty="0" smtClean="0"/>
+          </a:p>
+          <a:p>
+            <a:pPr marL="0" indent="0">
+              <a:buNone/>
+            </a:pPr>
+            <a:r>
+              <a:rPr lang="en-US" dirty="0" smtClean="0"/>
+              <a:t>		void </a:t>
+            </a:r>
+            <a:r>
+              <a:rPr lang="en-US" dirty="0" err="1"/>
+              <a:t>OnAuthorization</a:t>
+            </a:r>
+            <a:r>
+              <a:rPr lang="en-US" dirty="0"/>
+              <a:t>(</a:t>
+            </a:r>
+            <a:r>
+              <a:rPr lang="en-US" dirty="0" err="1"/>
+              <a:t>AuthorizationFilterContext</a:t>
+            </a:r>
+            <a:r>
+              <a:rPr lang="en-US" dirty="0"/>
+              <a:t> context);</a:t>
+            </a:r>
+          </a:p>
+          <a:p>
+            <a:pPr marL="0" indent="0">
+              <a:buNone/>
+            </a:pPr>
+            <a:endParaRPr lang="en-US" dirty="0" smtClean="0"/>
+          </a:p>
+          <a:p>
+            <a:pPr marL="0" indent="0">
+              <a:buNone/>
+            </a:pPr>
+            <a:r>
+              <a:rPr lang="en-US" dirty="0" smtClean="0"/>
+              <a:t>	}</a:t>
+            </a:r>
+            <a:endParaRPr lang="en-US" dirty="0"/>
+          </a:p>
+          <a:p>
+            <a:pPr marL="0" indent="0">
+              <a:buNone/>
+            </a:pPr>
+            <a:r>
+              <a:rPr lang="en-US" dirty="0"/>
+              <a:t>}</a:t>
+            </a:r>
           </a:p>
         </p:txBody>
       </p:sp>
     </p:spTree>
     <p:extLst>
       <p:ext uri="{BB962C8B-B14F-4D97-AF65-F5344CB8AC3E}">
-        <p14:creationId xmlns:p14="http://schemas.microsoft.com/office/powerpoint/2010/main" val="2404820062"/>
+        <p14:creationId xmlns:p14="http://schemas.microsoft.com/office/powerpoint/2010/main" val="437217886"/>
       </p:ext>
     </p:extLst>
   </p:cSld>
@@ -7259,8 +7803,12 @@
           <a:lstStyle/>
           <a:p>
             <a:r>
+              <a:rPr lang="en-US" dirty="0" err="1" smtClean="0"/>
+              <a:t>Async</a:t>
+            </a:r>
+            <a:r>
               <a:rPr lang="en-US" dirty="0" smtClean="0"/>
-              <a:t>Authorization filters</a:t>
+              <a:t> authorization filters</a:t>
             </a:r>
             <a:endParaRPr lang="en-US" dirty="0"/>
           </a:p>
@@ -7276,9 +7824,16 @@
             <p:ph idx="1"/>
           </p:nvPr>
         </p:nvSpPr>
-        <p:spPr/>
-        <p:txBody>
-          <a:bodyPr/>
+        <p:spPr>
+          <a:xfrm>
+            <a:off x="419100" y="1943321"/>
+            <a:ext cx="11353800" cy="4351338"/>
+          </a:xfrm>
+        </p:spPr>
+        <p:txBody>
+          <a:bodyPr>
+            <a:normAutofit lnSpcReduction="10000"/>
+          </a:bodyPr>
           <a:lstStyle/>
           <a:p>
             <a:pPr marL="0" indent="0">
@@ -7321,7 +7876,7 @@
             </a:r>
             <a:r>
               <a:rPr lang="en-US" dirty="0" err="1"/>
-              <a:t>IAuthorizationFilter</a:t>
+              <a:t>IAsyncAuthorizationFilter</a:t>
             </a:r>
             <a:r>
               <a:rPr lang="en-US" dirty="0"/>
@@ -7348,11 +7903,11 @@
             </a:pPr>
             <a:r>
               <a:rPr lang="en-US" dirty="0" smtClean="0"/>
-              <a:t>		void </a:t>
+              <a:t>		Task </a:t>
             </a:r>
             <a:r>
               <a:rPr lang="en-US" dirty="0" err="1"/>
-              <a:t>OnAuthorization</a:t>
+              <a:t>OnAuthorizationAsync</a:t>
             </a:r>
             <a:r>
               <a:rPr lang="en-US" dirty="0"/>
@@ -7387,17 +7942,24 @@
             <a:pPr marL="0" indent="0">
               <a:buNone/>
             </a:pPr>
-            <a:r>
-              <a:rPr lang="en-US" dirty="0"/>
+            <a:endParaRPr lang="en-US" dirty="0" smtClean="0"/>
+          </a:p>
+          <a:p>
+            <a:pPr marL="0" indent="0">
+              <a:buNone/>
+            </a:pPr>
+            <a:r>
+              <a:rPr lang="en-US" dirty="0" smtClean="0"/>
               <a:t>}</a:t>
             </a:r>
+            <a:endParaRPr lang="en-US" dirty="0"/>
           </a:p>
         </p:txBody>
       </p:sp>
     </p:spTree>
     <p:extLst>
       <p:ext uri="{BB962C8B-B14F-4D97-AF65-F5344CB8AC3E}">
-        <p14:creationId xmlns:p14="http://schemas.microsoft.com/office/powerpoint/2010/main" val="437217886"/>
+        <p14:creationId xmlns:p14="http://schemas.microsoft.com/office/powerpoint/2010/main" val="2890340635"/>
       </p:ext>
     </p:extLst>
   </p:cSld>
@@ -7482,7 +8044,7 @@
           <a:p>
             <a:r>
               <a:rPr lang="en-US" dirty="0" smtClean="0"/>
-              <a:t>Routing</a:t>
+              <a:t>Middleware</a:t>
             </a:r>
             <a:endParaRPr lang="en-US" dirty="0"/>
           </a:p>
@@ -7511,6 +8073,48 @@
             <a:pPr marL="0" indent="0">
               <a:buNone/>
             </a:pPr>
+            <a:r>
+              <a:rPr lang="en-US" dirty="0" smtClean="0"/>
+              <a:t>Middleware </a:t>
+            </a:r>
+            <a:r>
+              <a:rPr lang="en-US" dirty="0"/>
+              <a:t>is the term used for the components that are combined to form the request pipeline</a:t>
+            </a:r>
+            <a:r>
+              <a:rPr lang="en-US" dirty="0" smtClean="0"/>
+              <a:t>.</a:t>
+            </a:r>
+          </a:p>
+          <a:p>
+            <a:pPr marL="0" indent="0">
+              <a:buNone/>
+            </a:pPr>
+            <a:endParaRPr lang="en-US" dirty="0" smtClean="0"/>
+          </a:p>
+          <a:p>
+            <a:r>
+              <a:rPr lang="en-US" dirty="0" smtClean="0"/>
+              <a:t>Content-Generating</a:t>
+            </a:r>
+          </a:p>
+          <a:p>
+            <a:r>
+              <a:rPr lang="en-US" dirty="0" smtClean="0"/>
+              <a:t>Short-circuiting</a:t>
+            </a:r>
+          </a:p>
+          <a:p>
+            <a:r>
+              <a:rPr lang="en-US" dirty="0" smtClean="0"/>
+              <a:t>Request-editing</a:t>
+            </a:r>
+          </a:p>
+          <a:p>
+            <a:r>
+              <a:rPr lang="en-US" dirty="0" smtClean="0"/>
+              <a:t>Response-editing</a:t>
+            </a:r>
             <a:endParaRPr lang="en-US" dirty="0"/>
           </a:p>
         </p:txBody>
@@ -7518,7 +8122,7 @@
     </p:spTree>
     <p:extLst>
       <p:ext uri="{BB962C8B-B14F-4D97-AF65-F5344CB8AC3E}">
-        <p14:creationId xmlns:p14="http://schemas.microsoft.com/office/powerpoint/2010/main" val="3347348274"/>
+        <p14:creationId xmlns:p14="http://schemas.microsoft.com/office/powerpoint/2010/main" val="4052774876"/>
       </p:ext>
     </p:extLst>
   </p:cSld>
@@ -7602,246 +8206,6 @@
           <a:lstStyle/>
           <a:p>
             <a:r>
-              <a:rPr lang="en-US" dirty="0" err="1" smtClean="0"/>
-              <a:t>Async</a:t>
-            </a:r>
-            <a:r>
-              <a:rPr lang="en-US" dirty="0" smtClean="0"/>
-              <a:t> authorization filters</a:t>
-            </a:r>
-            <a:endParaRPr lang="en-US" dirty="0"/>
-          </a:p>
-        </p:txBody>
-      </p:sp>
-      <p:sp>
-        <p:nvSpPr>
-          <p:cNvPr id="3" name="Content Placeholder 2"/>
-          <p:cNvSpPr>
-            <a:spLocks noGrp="1"/>
-          </p:cNvSpPr>
-          <p:nvPr>
-            <p:ph idx="1"/>
-          </p:nvPr>
-        </p:nvSpPr>
-        <p:spPr>
-          <a:xfrm>
-            <a:off x="419100" y="1943321"/>
-            <a:ext cx="11353800" cy="4351338"/>
-          </a:xfrm>
-        </p:spPr>
-        <p:txBody>
-          <a:bodyPr>
-            <a:normAutofit lnSpcReduction="10000"/>
-          </a:bodyPr>
-          <a:lstStyle/>
-          <a:p>
-            <a:pPr marL="0" indent="0">
-              <a:buNone/>
-            </a:pPr>
-            <a:r>
-              <a:rPr lang="en-US" dirty="0"/>
-              <a:t>namespace </a:t>
-            </a:r>
-            <a:r>
-              <a:rPr lang="en-US" dirty="0" err="1"/>
-              <a:t>Microsoft.AspNetCore.Mvc.Filters</a:t>
-            </a:r>
-            <a:r>
-              <a:rPr lang="en-US" dirty="0"/>
-              <a:t> </a:t>
-            </a:r>
-            <a:r>
-              <a:rPr lang="en-US" dirty="0" smtClean="0"/>
-              <a:t>{</a:t>
-            </a:r>
-          </a:p>
-          <a:p>
-            <a:pPr marL="0" indent="0">
-              <a:buNone/>
-            </a:pPr>
-            <a:endParaRPr lang="en-US" dirty="0"/>
-          </a:p>
-          <a:p>
-            <a:pPr marL="0" indent="0">
-              <a:buNone/>
-            </a:pPr>
-            <a:r>
-              <a:rPr lang="en-US" dirty="0" smtClean="0"/>
-              <a:t>	public </a:t>
-            </a:r>
-            <a:r>
-              <a:rPr lang="en-US" dirty="0"/>
-              <a:t>interface </a:t>
-            </a:r>
-            <a:r>
-              <a:rPr lang="en-US" dirty="0" err="1"/>
-              <a:t>IAsyncAuthorizationFilter</a:t>
-            </a:r>
-            <a:r>
-              <a:rPr lang="en-US" dirty="0"/>
-              <a:t> : </a:t>
-            </a:r>
-            <a:r>
-              <a:rPr lang="en-US" dirty="0" err="1"/>
-              <a:t>IFilterMetadata</a:t>
-            </a:r>
-            <a:r>
-              <a:rPr lang="en-US" dirty="0"/>
-              <a:t> {</a:t>
-            </a:r>
-          </a:p>
-          <a:p>
-            <a:pPr marL="0" indent="0">
-              <a:buNone/>
-            </a:pPr>
-            <a:endParaRPr lang="en-US" dirty="0" smtClean="0"/>
-          </a:p>
-          <a:p>
-            <a:pPr marL="0" indent="0">
-              <a:buNone/>
-            </a:pPr>
-            <a:r>
-              <a:rPr lang="en-US" dirty="0" smtClean="0"/>
-              <a:t>		Task </a:t>
-            </a:r>
-            <a:r>
-              <a:rPr lang="en-US" dirty="0" err="1"/>
-              <a:t>OnAuthorizationAsync</a:t>
-            </a:r>
-            <a:r>
-              <a:rPr lang="en-US" dirty="0"/>
-              <a:t>(</a:t>
-            </a:r>
-            <a:r>
-              <a:rPr lang="en-US" dirty="0" err="1"/>
-              <a:t>AuthorizationFilterContext</a:t>
-            </a:r>
-            <a:r>
-              <a:rPr lang="en-US" dirty="0"/>
-              <a:t> context);</a:t>
-            </a:r>
-          </a:p>
-          <a:p>
-            <a:pPr marL="0" indent="0">
-              <a:buNone/>
-            </a:pPr>
-            <a:endParaRPr lang="en-US" dirty="0" smtClean="0"/>
-          </a:p>
-          <a:p>
-            <a:pPr marL="0" indent="0">
-              <a:buNone/>
-            </a:pPr>
-            <a:r>
-              <a:rPr lang="en-US" dirty="0" smtClean="0"/>
-              <a:t>	}</a:t>
-            </a:r>
-            <a:endParaRPr lang="en-US" dirty="0"/>
-          </a:p>
-          <a:p>
-            <a:pPr marL="0" indent="0">
-              <a:buNone/>
-            </a:pPr>
-            <a:endParaRPr lang="en-US" dirty="0" smtClean="0"/>
-          </a:p>
-          <a:p>
-            <a:pPr marL="0" indent="0">
-              <a:buNone/>
-            </a:pPr>
-            <a:r>
-              <a:rPr lang="en-US" dirty="0" smtClean="0"/>
-              <a:t>}</a:t>
-            </a:r>
-            <a:endParaRPr lang="en-US" dirty="0"/>
-          </a:p>
-        </p:txBody>
-      </p:sp>
-    </p:spTree>
-    <p:extLst>
-      <p:ext uri="{BB962C8B-B14F-4D97-AF65-F5344CB8AC3E}">
-        <p14:creationId xmlns:p14="http://schemas.microsoft.com/office/powerpoint/2010/main" val="2890340635"/>
-      </p:ext>
-    </p:extLst>
-  </p:cSld>
-  <p:clrMapOvr>
-    <a:masterClrMapping/>
-  </p:clrMapOvr>
-  <p:timing>
-    <p:tnLst>
-      <p:par>
-        <p:cTn id="1" dur="indefinite" restart="never" nodeType="tmRoot"/>
-      </p:par>
-    </p:tnLst>
-  </p:timing>
-</p:sld>
-</file>
-
-<file path=ppt/slides/slide21.xml><?xml version="1.0" encoding="utf-8"?>
-<p:sld xmlns:a="http://schemas.openxmlformats.org/drawingml/2006/main" xmlns:r="http://schemas.openxmlformats.org/officeDocument/2006/relationships" xmlns:p="http://schemas.openxmlformats.org/presentationml/2006/main">
-  <p:cSld>
-    <p:bg>
-      <p:bgPr>
-        <a:gradFill>
-          <a:gsLst>
-            <a:gs pos="0">
-              <a:schemeClr val="accent1">
-                <a:lumMod val="5000"/>
-                <a:lumOff val="95000"/>
-              </a:schemeClr>
-            </a:gs>
-            <a:gs pos="42000">
-              <a:schemeClr val="accent1">
-                <a:lumMod val="45000"/>
-                <a:lumOff val="55000"/>
-              </a:schemeClr>
-            </a:gs>
-            <a:gs pos="83000">
-              <a:schemeClr val="accent1">
-                <a:lumMod val="45000"/>
-                <a:lumOff val="55000"/>
-              </a:schemeClr>
-            </a:gs>
-            <a:gs pos="100000">
-              <a:schemeClr val="accent1">
-                <a:lumMod val="30000"/>
-                <a:lumOff val="70000"/>
-              </a:schemeClr>
-            </a:gs>
-          </a:gsLst>
-          <a:lin ang="5400000" scaled="1"/>
-        </a:gradFill>
-        <a:effectLst/>
-      </p:bgPr>
-    </p:bg>
-    <p:spTree>
-      <p:nvGrpSpPr>
-        <p:cNvPr id="1" name=""/>
-        <p:cNvGrpSpPr/>
-        <p:nvPr/>
-      </p:nvGrpSpPr>
-      <p:grpSpPr>
-        <a:xfrm>
-          <a:off x="0" y="0"/>
-          <a:ext cx="0" cy="0"/>
-          <a:chOff x="0" y="0"/>
-          <a:chExt cx="0" cy="0"/>
-        </a:xfrm>
-      </p:grpSpPr>
-      <p:sp>
-        <p:nvSpPr>
-          <p:cNvPr id="2" name="Title 1"/>
-          <p:cNvSpPr>
-            <a:spLocks noGrp="1"/>
-          </p:cNvSpPr>
-          <p:nvPr>
-            <p:ph type="title"/>
-          </p:nvPr>
-        </p:nvSpPr>
-        <p:spPr/>
-        <p:txBody>
-          <a:bodyPr/>
-          <a:lstStyle/>
-          <a:p>
-            <a:r>
               <a:rPr lang="en-US" dirty="0" smtClean="0"/>
               <a:t>Authorization Filters</a:t>
             </a:r>
@@ -7955,7 +8319,7 @@
 </p:sld>
 </file>
 
-<file path=ppt/slides/slide22.xml><?xml version="1.0" encoding="utf-8"?>
+<file path=ppt/slides/slide21.xml><?xml version="1.0" encoding="utf-8"?>
 <p:sld xmlns:a="http://schemas.openxmlformats.org/drawingml/2006/main" xmlns:r="http://schemas.openxmlformats.org/officeDocument/2006/relationships" xmlns:p="http://schemas.openxmlformats.org/presentationml/2006/main">
   <p:cSld>
     <p:bg>
@@ -8073,7 +8437,7 @@
 </p:sld>
 </file>
 
-<file path=ppt/slides/slide23.xml><?xml version="1.0" encoding="utf-8"?>
+<file path=ppt/slides/slide22.xml><?xml version="1.0" encoding="utf-8"?>
 <p:sld xmlns:a="http://schemas.openxmlformats.org/drawingml/2006/main" xmlns:r="http://schemas.openxmlformats.org/officeDocument/2006/relationships" xmlns:p="http://schemas.openxmlformats.org/presentationml/2006/main">
   <p:cSld>
     <p:bg>
@@ -8191,7 +8555,7 @@
 </p:sld>
 </file>
 
-<file path=ppt/slides/slide24.xml><?xml version="1.0" encoding="utf-8"?>
+<file path=ppt/slides/slide23.xml><?xml version="1.0" encoding="utf-8"?>
 <p:sld xmlns:a="http://schemas.openxmlformats.org/drawingml/2006/main" xmlns:r="http://schemas.openxmlformats.org/officeDocument/2006/relationships" xmlns:p="http://schemas.openxmlformats.org/presentationml/2006/main">
   <p:cSld>
     <p:bg>
@@ -8309,7 +8673,7 @@
 </p:sld>
 </file>
 
-<file path=ppt/slides/slide25.xml><?xml version="1.0" encoding="utf-8"?>
+<file path=ppt/slides/slide24.xml><?xml version="1.0" encoding="utf-8"?>
 <p:sld xmlns:a="http://schemas.openxmlformats.org/drawingml/2006/main" xmlns:r="http://schemas.openxmlformats.org/officeDocument/2006/relationships" xmlns:p="http://schemas.openxmlformats.org/presentationml/2006/main">
   <p:cSld>
     <p:bg>
@@ -8600,6 +8964,249 @@
     <p:extLst>
       <p:ext uri="{BB962C8B-B14F-4D97-AF65-F5344CB8AC3E}">
         <p14:creationId xmlns:p14="http://schemas.microsoft.com/office/powerpoint/2010/main" val="1074381049"/>
+      </p:ext>
+    </p:extLst>
+  </p:cSld>
+  <p:clrMapOvr>
+    <a:masterClrMapping/>
+  </p:clrMapOvr>
+  <p:timing>
+    <p:tnLst>
+      <p:par>
+        <p:cTn id="1" dur="indefinite" restart="never" nodeType="tmRoot"/>
+      </p:par>
+    </p:tnLst>
+  </p:timing>
+</p:sld>
+</file>
+
+<file path=ppt/slides/slide25.xml><?xml version="1.0" encoding="utf-8"?>
+<p:sld xmlns:a="http://schemas.openxmlformats.org/drawingml/2006/main" xmlns:r="http://schemas.openxmlformats.org/officeDocument/2006/relationships" xmlns:p="http://schemas.openxmlformats.org/presentationml/2006/main">
+  <p:cSld>
+    <p:bg>
+      <p:bgPr>
+        <a:gradFill>
+          <a:gsLst>
+            <a:gs pos="0">
+              <a:schemeClr val="accent1">
+                <a:lumMod val="5000"/>
+                <a:lumOff val="95000"/>
+              </a:schemeClr>
+            </a:gs>
+            <a:gs pos="42000">
+              <a:schemeClr val="accent1">
+                <a:lumMod val="45000"/>
+                <a:lumOff val="55000"/>
+              </a:schemeClr>
+            </a:gs>
+            <a:gs pos="83000">
+              <a:schemeClr val="accent1">
+                <a:lumMod val="45000"/>
+                <a:lumOff val="55000"/>
+              </a:schemeClr>
+            </a:gs>
+            <a:gs pos="100000">
+              <a:schemeClr val="accent1">
+                <a:lumMod val="30000"/>
+                <a:lumOff val="70000"/>
+              </a:schemeClr>
+            </a:gs>
+          </a:gsLst>
+          <a:lin ang="5400000" scaled="1"/>
+        </a:gradFill>
+        <a:effectLst/>
+      </p:bgPr>
+    </p:bg>
+    <p:spTree>
+      <p:nvGrpSpPr>
+        <p:cNvPr id="1" name=""/>
+        <p:cNvGrpSpPr/>
+        <p:nvPr/>
+      </p:nvGrpSpPr>
+      <p:grpSpPr>
+        <a:xfrm>
+          <a:off x="0" y="0"/>
+          <a:ext cx="0" cy="0"/>
+          <a:chOff x="0" y="0"/>
+          <a:chExt cx="0" cy="0"/>
+        </a:xfrm>
+      </p:grpSpPr>
+      <p:sp>
+        <p:nvSpPr>
+          <p:cNvPr id="2" name="Title 1"/>
+          <p:cNvSpPr>
+            <a:spLocks noGrp="1"/>
+          </p:cNvSpPr>
+          <p:nvPr>
+            <p:ph type="title"/>
+          </p:nvPr>
+        </p:nvSpPr>
+        <p:spPr/>
+        <p:txBody>
+          <a:bodyPr/>
+          <a:lstStyle/>
+          <a:p>
+            <a:r>
+              <a:rPr lang="en-US" dirty="0" smtClean="0"/>
+              <a:t>Action Filters</a:t>
+            </a:r>
+            <a:endParaRPr lang="en-US" dirty="0"/>
+          </a:p>
+        </p:txBody>
+      </p:sp>
+      <p:sp>
+        <p:nvSpPr>
+          <p:cNvPr id="3" name="Rectangle 2"/>
+          <p:cNvSpPr/>
+          <p:nvPr/>
+        </p:nvSpPr>
+        <p:spPr>
+          <a:xfrm>
+            <a:off x="299206" y="1892022"/>
+            <a:ext cx="11892794" cy="3539430"/>
+          </a:xfrm>
+          <a:prstGeom prst="rect">
+            <a:avLst/>
+          </a:prstGeom>
+        </p:spPr>
+        <p:txBody>
+          <a:bodyPr wrap="square">
+            <a:spAutoFit/>
+          </a:bodyPr>
+          <a:lstStyle/>
+          <a:p>
+            <a:r>
+              <a:rPr lang="en-US" sz="2800" dirty="0" err="1" smtClean="0">
+                <a:latin typeface="Consolas" panose="020B0609020204030204" pitchFamily="49" charset="0"/>
+              </a:rPr>
+              <a:t>ActionExecutingContext</a:t>
+            </a:r>
+            <a:r>
+              <a:rPr lang="en-US" sz="2800" dirty="0" smtClean="0">
+                <a:latin typeface="Consolas" panose="020B0609020204030204" pitchFamily="49" charset="0"/>
+              </a:rPr>
+              <a:t> properties:</a:t>
+            </a:r>
+          </a:p>
+          <a:p>
+            <a:endParaRPr lang="en-US" sz="2800" dirty="0">
+              <a:latin typeface="Consolas" panose="020B0609020204030204" pitchFamily="49" charset="0"/>
+            </a:endParaRPr>
+          </a:p>
+          <a:p>
+            <a:pPr marL="457200" indent="-457200">
+              <a:buFont typeface="Arial" panose="020B0604020202020204" pitchFamily="34" charset="0"/>
+              <a:buChar char="•"/>
+            </a:pPr>
+            <a:r>
+              <a:rPr lang="en-US" sz="2800" dirty="0" smtClean="0">
+                <a:latin typeface="Consolas" panose="020B0609020204030204" pitchFamily="49" charset="0"/>
+              </a:rPr>
+              <a:t> </a:t>
+            </a:r>
+            <a:r>
+              <a:rPr lang="en-US" sz="2800" dirty="0" smtClean="0">
+                <a:solidFill>
+                  <a:srgbClr val="C00000"/>
+                </a:solidFill>
+                <a:latin typeface="Consolas" panose="020B0609020204030204" pitchFamily="49" charset="0"/>
+              </a:rPr>
+              <a:t>Controller</a:t>
+            </a:r>
+          </a:p>
+          <a:p>
+            <a:pPr marL="457200" indent="-457200">
+              <a:buFont typeface="Arial" panose="020B0604020202020204" pitchFamily="34" charset="0"/>
+              <a:buChar char="•"/>
+            </a:pPr>
+            <a:endParaRPr lang="en-US" sz="2800" dirty="0" smtClean="0">
+              <a:latin typeface="Consolas" panose="020B0609020204030204" pitchFamily="49" charset="0"/>
+            </a:endParaRPr>
+          </a:p>
+          <a:p>
+            <a:pPr marL="457200" indent="-457200">
+              <a:buFont typeface="Arial" panose="020B0604020202020204" pitchFamily="34" charset="0"/>
+              <a:buChar char="•"/>
+            </a:pPr>
+            <a:r>
+              <a:rPr lang="en-US" sz="2800" dirty="0" smtClean="0">
+                <a:latin typeface="Consolas" panose="020B0609020204030204" pitchFamily="49" charset="0"/>
+              </a:rPr>
+              <a:t> </a:t>
+            </a:r>
+            <a:r>
+              <a:rPr lang="en-US" sz="2800" dirty="0" err="1" smtClean="0">
+                <a:solidFill>
+                  <a:srgbClr val="C00000"/>
+                </a:solidFill>
+                <a:latin typeface="Consolas" panose="020B0609020204030204" pitchFamily="49" charset="0"/>
+              </a:rPr>
+              <a:t>ActionArguments</a:t>
+            </a:r>
+            <a:r>
+              <a:rPr lang="en-US" sz="2800" dirty="0" smtClean="0">
+                <a:latin typeface="Consolas" panose="020B0609020204030204" pitchFamily="49" charset="0"/>
+              </a:rPr>
+              <a:t> – dictionary of arguments</a:t>
+            </a:r>
+          </a:p>
+          <a:p>
+            <a:pPr marL="457200" indent="-457200">
+              <a:buFont typeface="Arial" panose="020B0604020202020204" pitchFamily="34" charset="0"/>
+              <a:buChar char="•"/>
+            </a:pPr>
+            <a:endParaRPr lang="en-US" sz="2800" dirty="0" smtClean="0">
+              <a:latin typeface="Consolas" panose="020B0609020204030204" pitchFamily="49" charset="0"/>
+            </a:endParaRPr>
+          </a:p>
+          <a:p>
+            <a:pPr marL="457200" indent="-457200">
+              <a:buFont typeface="Arial" panose="020B0604020202020204" pitchFamily="34" charset="0"/>
+              <a:buChar char="•"/>
+            </a:pPr>
+            <a:r>
+              <a:rPr lang="en-US" sz="2800" dirty="0" smtClean="0">
+                <a:latin typeface="Consolas" panose="020B0609020204030204" pitchFamily="49" charset="0"/>
+              </a:rPr>
+              <a:t> </a:t>
+            </a:r>
+            <a:r>
+              <a:rPr lang="en-US" sz="2800" dirty="0" err="1" smtClean="0">
+                <a:solidFill>
+                  <a:srgbClr val="C00000"/>
+                </a:solidFill>
+                <a:latin typeface="Consolas" panose="020B0609020204030204" pitchFamily="49" charset="0"/>
+              </a:rPr>
+              <a:t>IActionResult</a:t>
+            </a:r>
+            <a:r>
+              <a:rPr lang="en-US" sz="2800" dirty="0" smtClean="0">
+                <a:latin typeface="Consolas" panose="020B0609020204030204" pitchFamily="49" charset="0"/>
+              </a:rPr>
+              <a:t> </a:t>
+            </a:r>
+            <a:r>
+              <a:rPr lang="en-US" sz="2800" dirty="0" smtClean="0">
+                <a:solidFill>
+                  <a:srgbClr val="C00000"/>
+                </a:solidFill>
+                <a:latin typeface="Consolas" panose="020B0609020204030204" pitchFamily="49" charset="0"/>
+              </a:rPr>
+              <a:t>Result</a:t>
+            </a:r>
+            <a:r>
+              <a:rPr lang="en-US" sz="2800" dirty="0" smtClean="0">
+                <a:latin typeface="Consolas" panose="020B0609020204030204" pitchFamily="49" charset="0"/>
+              </a:rPr>
+              <a:t> – if set, short-circuits the request and returns </a:t>
+            </a:r>
+          </a:p>
+        </p:txBody>
+      </p:sp>
+    </p:spTree>
+    <p:extLst>
+      <p:ext uri="{BB962C8B-B14F-4D97-AF65-F5344CB8AC3E}">
+        <p14:creationId xmlns:p14="http://schemas.microsoft.com/office/powerpoint/2010/main" val="2307477297"/>
       </p:ext>
     </p:extLst>
   </p:cSld>
@@ -8715,249 +9322,6 @@
               <a:rPr lang="en-US" sz="2800" dirty="0" err="1" smtClean="0">
                 <a:latin typeface="Consolas" panose="020B0609020204030204" pitchFamily="49" charset="0"/>
               </a:rPr>
-              <a:t>ActionExecutingContext</a:t>
-            </a:r>
-            <a:r>
-              <a:rPr lang="en-US" sz="2800" dirty="0" smtClean="0">
-                <a:latin typeface="Consolas" panose="020B0609020204030204" pitchFamily="49" charset="0"/>
-              </a:rPr>
-              <a:t> properties:</a:t>
-            </a:r>
-          </a:p>
-          <a:p>
-            <a:endParaRPr lang="en-US" sz="2800" dirty="0">
-              <a:latin typeface="Consolas" panose="020B0609020204030204" pitchFamily="49" charset="0"/>
-            </a:endParaRPr>
-          </a:p>
-          <a:p>
-            <a:pPr marL="457200" indent="-457200">
-              <a:buFont typeface="Arial" panose="020B0604020202020204" pitchFamily="34" charset="0"/>
-              <a:buChar char="•"/>
-            </a:pPr>
-            <a:r>
-              <a:rPr lang="en-US" sz="2800" dirty="0" smtClean="0">
-                <a:latin typeface="Consolas" panose="020B0609020204030204" pitchFamily="49" charset="0"/>
-              </a:rPr>
-              <a:t> </a:t>
-            </a:r>
-            <a:r>
-              <a:rPr lang="en-US" sz="2800" dirty="0" smtClean="0">
-                <a:solidFill>
-                  <a:srgbClr val="C00000"/>
-                </a:solidFill>
-                <a:latin typeface="Consolas" panose="020B0609020204030204" pitchFamily="49" charset="0"/>
-              </a:rPr>
-              <a:t>Controller</a:t>
-            </a:r>
-          </a:p>
-          <a:p>
-            <a:pPr marL="457200" indent="-457200">
-              <a:buFont typeface="Arial" panose="020B0604020202020204" pitchFamily="34" charset="0"/>
-              <a:buChar char="•"/>
-            </a:pPr>
-            <a:endParaRPr lang="en-US" sz="2800" dirty="0" smtClean="0">
-              <a:latin typeface="Consolas" panose="020B0609020204030204" pitchFamily="49" charset="0"/>
-            </a:endParaRPr>
-          </a:p>
-          <a:p>
-            <a:pPr marL="457200" indent="-457200">
-              <a:buFont typeface="Arial" panose="020B0604020202020204" pitchFamily="34" charset="0"/>
-              <a:buChar char="•"/>
-            </a:pPr>
-            <a:r>
-              <a:rPr lang="en-US" sz="2800" dirty="0" smtClean="0">
-                <a:latin typeface="Consolas" panose="020B0609020204030204" pitchFamily="49" charset="0"/>
-              </a:rPr>
-              <a:t> </a:t>
-            </a:r>
-            <a:r>
-              <a:rPr lang="en-US" sz="2800" dirty="0" err="1" smtClean="0">
-                <a:solidFill>
-                  <a:srgbClr val="C00000"/>
-                </a:solidFill>
-                <a:latin typeface="Consolas" panose="020B0609020204030204" pitchFamily="49" charset="0"/>
-              </a:rPr>
-              <a:t>ActionArguments</a:t>
-            </a:r>
-            <a:r>
-              <a:rPr lang="en-US" sz="2800" dirty="0" smtClean="0">
-                <a:latin typeface="Consolas" panose="020B0609020204030204" pitchFamily="49" charset="0"/>
-              </a:rPr>
-              <a:t> – dictionary of arguments</a:t>
-            </a:r>
-          </a:p>
-          <a:p>
-            <a:pPr marL="457200" indent="-457200">
-              <a:buFont typeface="Arial" panose="020B0604020202020204" pitchFamily="34" charset="0"/>
-              <a:buChar char="•"/>
-            </a:pPr>
-            <a:endParaRPr lang="en-US" sz="2800" dirty="0" smtClean="0">
-              <a:latin typeface="Consolas" panose="020B0609020204030204" pitchFamily="49" charset="0"/>
-            </a:endParaRPr>
-          </a:p>
-          <a:p>
-            <a:pPr marL="457200" indent="-457200">
-              <a:buFont typeface="Arial" panose="020B0604020202020204" pitchFamily="34" charset="0"/>
-              <a:buChar char="•"/>
-            </a:pPr>
-            <a:r>
-              <a:rPr lang="en-US" sz="2800" dirty="0" smtClean="0">
-                <a:latin typeface="Consolas" panose="020B0609020204030204" pitchFamily="49" charset="0"/>
-              </a:rPr>
-              <a:t> </a:t>
-            </a:r>
-            <a:r>
-              <a:rPr lang="en-US" sz="2800" dirty="0" err="1" smtClean="0">
-                <a:solidFill>
-                  <a:srgbClr val="C00000"/>
-                </a:solidFill>
-                <a:latin typeface="Consolas" panose="020B0609020204030204" pitchFamily="49" charset="0"/>
-              </a:rPr>
-              <a:t>IActionResult</a:t>
-            </a:r>
-            <a:r>
-              <a:rPr lang="en-US" sz="2800" dirty="0" smtClean="0">
-                <a:latin typeface="Consolas" panose="020B0609020204030204" pitchFamily="49" charset="0"/>
-              </a:rPr>
-              <a:t> </a:t>
-            </a:r>
-            <a:r>
-              <a:rPr lang="en-US" sz="2800" dirty="0" smtClean="0">
-                <a:solidFill>
-                  <a:srgbClr val="C00000"/>
-                </a:solidFill>
-                <a:latin typeface="Consolas" panose="020B0609020204030204" pitchFamily="49" charset="0"/>
-              </a:rPr>
-              <a:t>Result</a:t>
-            </a:r>
-            <a:r>
-              <a:rPr lang="en-US" sz="2800" dirty="0" smtClean="0">
-                <a:latin typeface="Consolas" panose="020B0609020204030204" pitchFamily="49" charset="0"/>
-              </a:rPr>
-              <a:t> – if set, short-circuits the request and returns </a:t>
-            </a:r>
-          </a:p>
-        </p:txBody>
-      </p:sp>
-    </p:spTree>
-    <p:extLst>
-      <p:ext uri="{BB962C8B-B14F-4D97-AF65-F5344CB8AC3E}">
-        <p14:creationId xmlns:p14="http://schemas.microsoft.com/office/powerpoint/2010/main" val="2307477297"/>
-      </p:ext>
-    </p:extLst>
-  </p:cSld>
-  <p:clrMapOvr>
-    <a:masterClrMapping/>
-  </p:clrMapOvr>
-  <p:timing>
-    <p:tnLst>
-      <p:par>
-        <p:cTn id="1" dur="indefinite" restart="never" nodeType="tmRoot"/>
-      </p:par>
-    </p:tnLst>
-  </p:timing>
-</p:sld>
-</file>
-
-<file path=ppt/slides/slide27.xml><?xml version="1.0" encoding="utf-8"?>
-<p:sld xmlns:a="http://schemas.openxmlformats.org/drawingml/2006/main" xmlns:r="http://schemas.openxmlformats.org/officeDocument/2006/relationships" xmlns:p="http://schemas.openxmlformats.org/presentationml/2006/main">
-  <p:cSld>
-    <p:bg>
-      <p:bgPr>
-        <a:gradFill>
-          <a:gsLst>
-            <a:gs pos="0">
-              <a:schemeClr val="accent1">
-                <a:lumMod val="5000"/>
-                <a:lumOff val="95000"/>
-              </a:schemeClr>
-            </a:gs>
-            <a:gs pos="42000">
-              <a:schemeClr val="accent1">
-                <a:lumMod val="45000"/>
-                <a:lumOff val="55000"/>
-              </a:schemeClr>
-            </a:gs>
-            <a:gs pos="83000">
-              <a:schemeClr val="accent1">
-                <a:lumMod val="45000"/>
-                <a:lumOff val="55000"/>
-              </a:schemeClr>
-            </a:gs>
-            <a:gs pos="100000">
-              <a:schemeClr val="accent1">
-                <a:lumMod val="30000"/>
-                <a:lumOff val="70000"/>
-              </a:schemeClr>
-            </a:gs>
-          </a:gsLst>
-          <a:lin ang="5400000" scaled="1"/>
-        </a:gradFill>
-        <a:effectLst/>
-      </p:bgPr>
-    </p:bg>
-    <p:spTree>
-      <p:nvGrpSpPr>
-        <p:cNvPr id="1" name=""/>
-        <p:cNvGrpSpPr/>
-        <p:nvPr/>
-      </p:nvGrpSpPr>
-      <p:grpSpPr>
-        <a:xfrm>
-          <a:off x="0" y="0"/>
-          <a:ext cx="0" cy="0"/>
-          <a:chOff x="0" y="0"/>
-          <a:chExt cx="0" cy="0"/>
-        </a:xfrm>
-      </p:grpSpPr>
-      <p:sp>
-        <p:nvSpPr>
-          <p:cNvPr id="2" name="Title 1"/>
-          <p:cNvSpPr>
-            <a:spLocks noGrp="1"/>
-          </p:cNvSpPr>
-          <p:nvPr>
-            <p:ph type="title"/>
-          </p:nvPr>
-        </p:nvSpPr>
-        <p:spPr/>
-        <p:txBody>
-          <a:bodyPr/>
-          <a:lstStyle/>
-          <a:p>
-            <a:r>
-              <a:rPr lang="en-US" dirty="0" smtClean="0"/>
-              <a:t>Action Filters</a:t>
-            </a:r>
-            <a:endParaRPr lang="en-US" dirty="0"/>
-          </a:p>
-        </p:txBody>
-      </p:sp>
-      <p:sp>
-        <p:nvSpPr>
-          <p:cNvPr id="3" name="Rectangle 2"/>
-          <p:cNvSpPr/>
-          <p:nvPr/>
-        </p:nvSpPr>
-        <p:spPr>
-          <a:xfrm>
-            <a:off x="299206" y="1892022"/>
-            <a:ext cx="11892794" cy="3539430"/>
-          </a:xfrm>
-          <a:prstGeom prst="rect">
-            <a:avLst/>
-          </a:prstGeom>
-        </p:spPr>
-        <p:txBody>
-          <a:bodyPr wrap="square">
-            <a:spAutoFit/>
-          </a:bodyPr>
-          <a:lstStyle/>
-          <a:p>
-            <a:r>
-              <a:rPr lang="en-US" sz="2800" dirty="0" err="1" smtClean="0">
-                <a:latin typeface="Consolas" panose="020B0609020204030204" pitchFamily="49" charset="0"/>
-              </a:rPr>
               <a:t>ActionExecutedContext</a:t>
             </a:r>
             <a:r>
@@ -9144,7 +9508,7 @@
 </p:sld>
 </file>
 
-<file path=ppt/slides/slide28.xml><?xml version="1.0" encoding="utf-8"?>
+<file path=ppt/slides/slide27.xml><?xml version="1.0" encoding="utf-8"?>
 <p:sld xmlns:a="http://schemas.openxmlformats.org/drawingml/2006/main" xmlns:r="http://schemas.openxmlformats.org/officeDocument/2006/relationships" xmlns:p="http://schemas.openxmlformats.org/presentationml/2006/main">
   <p:cSld>
     <p:bg>
@@ -9267,7 +9631,7 @@
 </p:sld>
 </file>
 
-<file path=ppt/slides/slide29.xml><?xml version="1.0" encoding="utf-8"?>
+<file path=ppt/slides/slide28.xml><?xml version="1.0" encoding="utf-8"?>
 <p:sld xmlns:a="http://schemas.openxmlformats.org/drawingml/2006/main" xmlns:r="http://schemas.openxmlformats.org/officeDocument/2006/relationships" xmlns:p="http://schemas.openxmlformats.org/presentationml/2006/main">
   <p:cSld>
     <p:bg>
@@ -9390,170 +9754,7 @@
 </p:sld>
 </file>
 
-<file path=ppt/slides/slide3.xml><?xml version="1.0" encoding="utf-8"?>
-<p:sld xmlns:a="http://schemas.openxmlformats.org/drawingml/2006/main" xmlns:r="http://schemas.openxmlformats.org/officeDocument/2006/relationships" xmlns:p="http://schemas.openxmlformats.org/presentationml/2006/main">
-  <p:cSld>
-    <p:bg>
-      <p:bgPr>
-        <a:gradFill>
-          <a:gsLst>
-            <a:gs pos="0">
-              <a:schemeClr val="accent1">
-                <a:lumMod val="5000"/>
-                <a:lumOff val="95000"/>
-              </a:schemeClr>
-            </a:gs>
-            <a:gs pos="42000">
-              <a:schemeClr val="accent1">
-                <a:lumMod val="45000"/>
-                <a:lumOff val="55000"/>
-              </a:schemeClr>
-            </a:gs>
-            <a:gs pos="83000">
-              <a:schemeClr val="accent1">
-                <a:lumMod val="45000"/>
-                <a:lumOff val="55000"/>
-              </a:schemeClr>
-            </a:gs>
-            <a:gs pos="100000">
-              <a:schemeClr val="accent1">
-                <a:lumMod val="30000"/>
-                <a:lumOff val="70000"/>
-              </a:schemeClr>
-            </a:gs>
-          </a:gsLst>
-          <a:lin ang="5400000" scaled="1"/>
-        </a:gradFill>
-        <a:effectLst/>
-      </p:bgPr>
-    </p:bg>
-    <p:spTree>
-      <p:nvGrpSpPr>
-        <p:cNvPr id="1" name=""/>
-        <p:cNvGrpSpPr/>
-        <p:nvPr/>
-      </p:nvGrpSpPr>
-      <p:grpSpPr>
-        <a:xfrm>
-          <a:off x="0" y="0"/>
-          <a:ext cx="0" cy="0"/>
-          <a:chOff x="0" y="0"/>
-          <a:chExt cx="0" cy="0"/>
-        </a:xfrm>
-      </p:grpSpPr>
-      <p:sp>
-        <p:nvSpPr>
-          <p:cNvPr id="2" name="Title 1"/>
-          <p:cNvSpPr>
-            <a:spLocks noGrp="1"/>
-          </p:cNvSpPr>
-          <p:nvPr>
-            <p:ph type="title"/>
-          </p:nvPr>
-        </p:nvSpPr>
-        <p:spPr/>
-        <p:txBody>
-          <a:bodyPr/>
-          <a:lstStyle/>
-          <a:p>
-            <a:r>
-              <a:rPr lang="en-US" dirty="0" smtClean="0"/>
-              <a:t>Middleware</a:t>
-            </a:r>
-            <a:endParaRPr lang="en-US" dirty="0"/>
-          </a:p>
-        </p:txBody>
-      </p:sp>
-      <p:sp>
-        <p:nvSpPr>
-          <p:cNvPr id="3" name="Content Placeholder 2"/>
-          <p:cNvSpPr>
-            <a:spLocks noGrp="1"/>
-          </p:cNvSpPr>
-          <p:nvPr>
-            <p:ph idx="1"/>
-          </p:nvPr>
-        </p:nvSpPr>
-        <p:spPr>
-          <a:xfrm>
-            <a:off x="838200" y="1927225"/>
-            <a:ext cx="10515600" cy="4351338"/>
-          </a:xfrm>
-        </p:spPr>
-        <p:txBody>
-          <a:bodyPr/>
-          <a:lstStyle/>
-          <a:p>
-            <a:pPr marL="0" indent="0">
-              <a:buNone/>
-            </a:pPr>
-            <a:r>
-              <a:rPr lang="en-US" dirty="0" smtClean="0"/>
-              <a:t>Middleware </a:t>
-            </a:r>
-            <a:r>
-              <a:rPr lang="en-US" dirty="0"/>
-              <a:t>is the term used for the components that are combined to form the request pipeline</a:t>
-            </a:r>
-            <a:r>
-              <a:rPr lang="en-US" dirty="0" smtClean="0"/>
-              <a:t>.</a:t>
-            </a:r>
-          </a:p>
-          <a:p>
-            <a:pPr marL="0" indent="0">
-              <a:buNone/>
-            </a:pPr>
-            <a:endParaRPr lang="en-US" dirty="0" smtClean="0"/>
-          </a:p>
-          <a:p>
-            <a:r>
-              <a:rPr lang="en-US" dirty="0" smtClean="0"/>
-              <a:t>Content-Generating</a:t>
-            </a:r>
-          </a:p>
-          <a:p>
-            <a:r>
-              <a:rPr lang="en-US" dirty="0" smtClean="0"/>
-              <a:t>Short-circuiting</a:t>
-            </a:r>
-          </a:p>
-          <a:p>
-            <a:r>
-              <a:rPr lang="en-US" dirty="0" smtClean="0"/>
-              <a:t>Request-editing</a:t>
-            </a:r>
-          </a:p>
-          <a:p>
-            <a:r>
-              <a:rPr lang="en-US" dirty="0" smtClean="0"/>
-              <a:t>Response-editing</a:t>
-            </a:r>
-            <a:endParaRPr lang="en-US" dirty="0"/>
-          </a:p>
-        </p:txBody>
-      </p:sp>
-    </p:spTree>
-    <p:extLst>
-      <p:ext uri="{BB962C8B-B14F-4D97-AF65-F5344CB8AC3E}">
-        <p14:creationId xmlns:p14="http://schemas.microsoft.com/office/powerpoint/2010/main" val="4052774876"/>
-      </p:ext>
-    </p:extLst>
-  </p:cSld>
-  <p:clrMapOvr>
-    <a:masterClrMapping/>
-  </p:clrMapOvr>
-  <p:timing>
-    <p:tnLst>
-      <p:par>
-        <p:cTn id="1" dur="indefinite" restart="never" nodeType="tmRoot"/>
-      </p:par>
-    </p:tnLst>
-  </p:timing>
-</p:sld>
-</file>
-
-<file path=ppt/slides/slide30.xml><?xml version="1.0" encoding="utf-8"?>
+<file path=ppt/slides/slide29.xml><?xml version="1.0" encoding="utf-8"?>
 <p:sld xmlns:a="http://schemas.openxmlformats.org/drawingml/2006/main" xmlns:r="http://schemas.openxmlformats.org/officeDocument/2006/relationships" xmlns:p="http://schemas.openxmlformats.org/presentationml/2006/main">
   <p:cSld>
     <p:bg>
@@ -9676,7 +9877,7 @@
 </p:sld>
 </file>
 
-<file path=ppt/slides/slide31.xml><?xml version="1.0" encoding="utf-8"?>
+<file path=ppt/slides/slide3.xml><?xml version="1.0" encoding="utf-8"?>
 <p:sld xmlns:a="http://schemas.openxmlformats.org/drawingml/2006/main" xmlns:r="http://schemas.openxmlformats.org/officeDocument/2006/relationships" xmlns:p="http://schemas.openxmlformats.org/presentationml/2006/main">
   <p:cSld>
     <p:bg>
@@ -9737,6 +9938,167 @@
             <p:ph type="title"/>
           </p:nvPr>
         </p:nvSpPr>
+        <p:spPr/>
+        <p:txBody>
+          <a:bodyPr/>
+          <a:lstStyle/>
+          <a:p>
+            <a:r>
+              <a:rPr lang="en-US" dirty="0"/>
+              <a:t>M</a:t>
+            </a:r>
+            <a:r>
+              <a:rPr lang="en-US" dirty="0" smtClean="0"/>
+              <a:t>iddleware</a:t>
+            </a:r>
+            <a:endParaRPr lang="en-US" dirty="0"/>
+          </a:p>
+        </p:txBody>
+      </p:sp>
+      <p:pic>
+        <p:nvPicPr>
+          <p:cNvPr id="4" name="Content Placeholder 3"/>
+          <p:cNvPicPr>
+            <a:picLocks noGrp="1" noChangeAspect="1"/>
+          </p:cNvPicPr>
+          <p:nvPr>
+            <p:ph idx="1"/>
+          </p:nvPr>
+        </p:nvPicPr>
+        <p:blipFill>
+          <a:blip r:embed="rId2"/>
+          <a:stretch>
+            <a:fillRect/>
+          </a:stretch>
+        </p:blipFill>
+        <p:spPr>
+          <a:xfrm>
+            <a:off x="126" y="2199890"/>
+            <a:ext cx="12191874" cy="3132686"/>
+          </a:xfrm>
+          <a:prstGeom prst="rect">
+            <a:avLst/>
+          </a:prstGeom>
+        </p:spPr>
+      </p:pic>
+      <p:sp>
+        <p:nvSpPr>
+          <p:cNvPr id="5" name="TextBox 4"/>
+          <p:cNvSpPr txBox="1"/>
+          <p:nvPr/>
+        </p:nvSpPr>
+        <p:spPr>
+          <a:xfrm>
+            <a:off x="9067087" y="6170064"/>
+            <a:ext cx="3221765" cy="369332"/>
+          </a:xfrm>
+          <a:prstGeom prst="rect">
+            <a:avLst/>
+          </a:prstGeom>
+          <a:noFill/>
+        </p:spPr>
+        <p:txBody>
+          <a:bodyPr wrap="square" rtlCol="0">
+            <a:spAutoFit/>
+          </a:bodyPr>
+          <a:lstStyle/>
+          <a:p>
+            <a:r>
+              <a:rPr lang="en-US" dirty="0"/>
+              <a:t>@ Pro Asp </a:t>
+            </a:r>
+            <a:r>
+              <a:rPr lang="en-US" dirty="0" err="1"/>
+              <a:t>.Net</a:t>
+            </a:r>
+            <a:r>
+              <a:rPr lang="en-US" dirty="0"/>
+              <a:t> Core MVC 2</a:t>
+            </a:r>
+          </a:p>
+        </p:txBody>
+      </p:sp>
+    </p:spTree>
+    <p:extLst>
+      <p:ext uri="{BB962C8B-B14F-4D97-AF65-F5344CB8AC3E}">
+        <p14:creationId xmlns:p14="http://schemas.microsoft.com/office/powerpoint/2010/main" val="1015542385"/>
+      </p:ext>
+    </p:extLst>
+  </p:cSld>
+  <p:clrMapOvr>
+    <a:masterClrMapping/>
+  </p:clrMapOvr>
+  <p:timing>
+    <p:tnLst>
+      <p:par>
+        <p:cTn id="1" dur="indefinite" restart="never" nodeType="tmRoot"/>
+      </p:par>
+    </p:tnLst>
+  </p:timing>
+</p:sld>
+</file>
+
+<file path=ppt/slides/slide30.xml><?xml version="1.0" encoding="utf-8"?>
+<p:sld xmlns:a="http://schemas.openxmlformats.org/drawingml/2006/main" xmlns:r="http://schemas.openxmlformats.org/officeDocument/2006/relationships" xmlns:p="http://schemas.openxmlformats.org/presentationml/2006/main">
+  <p:cSld>
+    <p:bg>
+      <p:bgPr>
+        <a:gradFill>
+          <a:gsLst>
+            <a:gs pos="0">
+              <a:schemeClr val="accent1">
+                <a:lumMod val="5000"/>
+                <a:lumOff val="95000"/>
+              </a:schemeClr>
+            </a:gs>
+            <a:gs pos="42000">
+              <a:schemeClr val="accent1">
+                <a:lumMod val="45000"/>
+                <a:lumOff val="55000"/>
+              </a:schemeClr>
+            </a:gs>
+            <a:gs pos="83000">
+              <a:schemeClr val="accent1">
+                <a:lumMod val="45000"/>
+                <a:lumOff val="55000"/>
+              </a:schemeClr>
+            </a:gs>
+            <a:gs pos="100000">
+              <a:schemeClr val="accent1">
+                <a:lumMod val="30000"/>
+                <a:lumOff val="70000"/>
+              </a:schemeClr>
+            </a:gs>
+          </a:gsLst>
+          <a:lin ang="5400000" scaled="1"/>
+        </a:gradFill>
+        <a:effectLst/>
+      </p:bgPr>
+    </p:bg>
+    <p:spTree>
+      <p:nvGrpSpPr>
+        <p:cNvPr id="1" name=""/>
+        <p:cNvGrpSpPr/>
+        <p:nvPr/>
+      </p:nvGrpSpPr>
+      <p:grpSpPr>
+        <a:xfrm>
+          <a:off x="0" y="0"/>
+          <a:ext cx="0" cy="0"/>
+          <a:chOff x="0" y="0"/>
+          <a:chExt cx="0" cy="0"/>
+        </a:xfrm>
+      </p:grpSpPr>
+      <p:sp>
+        <p:nvSpPr>
+          <p:cNvPr id="2" name="Title 1"/>
+          <p:cNvSpPr>
+            <a:spLocks noGrp="1"/>
+          </p:cNvSpPr>
+          <p:nvPr>
+            <p:ph type="title"/>
+          </p:nvPr>
+        </p:nvSpPr>
         <p:spPr>
           <a:xfrm>
             <a:off x="768015" y="128337"/>
@@ -9914,7 +10276,7 @@
 </p:sld>
 </file>
 
-<file path=ppt/slides/slide32.xml><?xml version="1.0" encoding="utf-8"?>
+<file path=ppt/slides/slide31.xml><?xml version="1.0" encoding="utf-8"?>
 <p:sld xmlns:a="http://schemas.openxmlformats.org/drawingml/2006/main" xmlns:r="http://schemas.openxmlformats.org/officeDocument/2006/relationships" xmlns:p="http://schemas.openxmlformats.org/presentationml/2006/main">
   <p:cSld>
     <p:bg>
@@ -10036,7 +10398,7 @@
 </p:sld>
 </file>
 
-<file path=ppt/slides/slide33.xml><?xml version="1.0" encoding="utf-8"?>
+<file path=ppt/slides/slide32.xml><?xml version="1.0" encoding="utf-8"?>
 <p:sld xmlns:a="http://schemas.openxmlformats.org/drawingml/2006/main" xmlns:r="http://schemas.openxmlformats.org/officeDocument/2006/relationships" xmlns:p="http://schemas.openxmlformats.org/presentationml/2006/main">
   <p:cSld>
     <p:bg>
@@ -10182,7 +10544,7 @@
 </p:sld>
 </file>
 
-<file path=ppt/slides/slide34.xml><?xml version="1.0" encoding="utf-8"?>
+<file path=ppt/slides/slide33.xml><?xml version="1.0" encoding="utf-8"?>
 <p:sld xmlns:a="http://schemas.openxmlformats.org/drawingml/2006/main" xmlns:r="http://schemas.openxmlformats.org/officeDocument/2006/relationships" xmlns:p="http://schemas.openxmlformats.org/presentationml/2006/main">
   <p:cSld>
     <p:bg>
@@ -10424,6 +10786,217 @@
     <p:extLst>
       <p:ext uri="{BB962C8B-B14F-4D97-AF65-F5344CB8AC3E}">
         <p14:creationId xmlns:p14="http://schemas.microsoft.com/office/powerpoint/2010/main" val="4144785726"/>
+      </p:ext>
+    </p:extLst>
+  </p:cSld>
+  <p:clrMapOvr>
+    <a:masterClrMapping/>
+  </p:clrMapOvr>
+  <p:timing>
+    <p:tnLst>
+      <p:par>
+        <p:cTn id="1" dur="indefinite" restart="never" nodeType="tmRoot"/>
+      </p:par>
+    </p:tnLst>
+  </p:timing>
+</p:sld>
+</file>
+
+<file path=ppt/slides/slide34.xml><?xml version="1.0" encoding="utf-8"?>
+<p:sld xmlns:a="http://schemas.openxmlformats.org/drawingml/2006/main" xmlns:r="http://schemas.openxmlformats.org/officeDocument/2006/relationships" xmlns:p="http://schemas.openxmlformats.org/presentationml/2006/main">
+  <p:cSld>
+    <p:bg>
+      <p:bgPr>
+        <a:gradFill>
+          <a:gsLst>
+            <a:gs pos="0">
+              <a:schemeClr val="accent1">
+                <a:lumMod val="5000"/>
+                <a:lumOff val="95000"/>
+              </a:schemeClr>
+            </a:gs>
+            <a:gs pos="42000">
+              <a:schemeClr val="accent1">
+                <a:lumMod val="45000"/>
+                <a:lumOff val="55000"/>
+              </a:schemeClr>
+            </a:gs>
+            <a:gs pos="83000">
+              <a:schemeClr val="accent1">
+                <a:lumMod val="45000"/>
+                <a:lumOff val="55000"/>
+              </a:schemeClr>
+            </a:gs>
+            <a:gs pos="100000">
+              <a:schemeClr val="accent1">
+                <a:lumMod val="30000"/>
+                <a:lumOff val="70000"/>
+              </a:schemeClr>
+            </a:gs>
+          </a:gsLst>
+          <a:lin ang="5400000" scaled="1"/>
+        </a:gradFill>
+        <a:effectLst/>
+      </p:bgPr>
+    </p:bg>
+    <p:spTree>
+      <p:nvGrpSpPr>
+        <p:cNvPr id="1" name=""/>
+        <p:cNvGrpSpPr/>
+        <p:nvPr/>
+      </p:nvGrpSpPr>
+      <p:grpSpPr>
+        <a:xfrm>
+          <a:off x="0" y="0"/>
+          <a:ext cx="0" cy="0"/>
+          <a:chOff x="0" y="0"/>
+          <a:chExt cx="0" cy="0"/>
+        </a:xfrm>
+      </p:grpSpPr>
+      <p:sp>
+        <p:nvSpPr>
+          <p:cNvPr id="2" name="Title 1"/>
+          <p:cNvSpPr>
+            <a:spLocks noGrp="1"/>
+          </p:cNvSpPr>
+          <p:nvPr>
+            <p:ph type="title"/>
+          </p:nvPr>
+        </p:nvSpPr>
+        <p:spPr>
+          <a:xfrm>
+            <a:off x="768015" y="128337"/>
+            <a:ext cx="10515600" cy="1325563"/>
+          </a:xfrm>
+        </p:spPr>
+        <p:txBody>
+          <a:bodyPr/>
+          <a:lstStyle/>
+          <a:p>
+            <a:r>
+              <a:rPr lang="en-US" smtClean="0"/>
+              <a:t>Result Filters</a:t>
+            </a:r>
+            <a:endParaRPr lang="en-US" dirty="0"/>
+          </a:p>
+        </p:txBody>
+      </p:sp>
+      <p:sp>
+        <p:nvSpPr>
+          <p:cNvPr id="4" name="TextBox 3"/>
+          <p:cNvSpPr txBox="1"/>
+          <p:nvPr/>
+        </p:nvSpPr>
+        <p:spPr>
+          <a:xfrm>
+            <a:off x="768015" y="1301261"/>
+            <a:ext cx="11295031" cy="4524315"/>
+          </a:xfrm>
+          <a:prstGeom prst="rect">
+            <a:avLst/>
+          </a:prstGeom>
+          <a:noFill/>
+        </p:spPr>
+        <p:txBody>
+          <a:bodyPr wrap="square" rtlCol="0">
+            <a:spAutoFit/>
+          </a:bodyPr>
+          <a:lstStyle/>
+          <a:p>
+            <a:r>
+              <a:rPr lang="en-US" sz="3200" dirty="0" err="1" smtClean="0"/>
+              <a:t>ResultExecutingContext</a:t>
+            </a:r>
+            <a:r>
+              <a:rPr lang="en-US" sz="3200" dirty="0" smtClean="0"/>
+              <a:t> properties:</a:t>
+            </a:r>
+          </a:p>
+          <a:p>
+            <a:endParaRPr lang="en-US" sz="3200" dirty="0"/>
+          </a:p>
+          <a:p>
+            <a:pPr marL="457200" indent="-457200">
+              <a:buFont typeface="Arial" panose="020B0604020202020204" pitchFamily="34" charset="0"/>
+              <a:buChar char="•"/>
+            </a:pPr>
+            <a:r>
+              <a:rPr lang="en-US" sz="3200" dirty="0" smtClean="0"/>
+              <a:t> Controller</a:t>
+            </a:r>
+          </a:p>
+          <a:p>
+            <a:pPr marL="457200" indent="-457200">
+              <a:buFont typeface="Arial" panose="020B0604020202020204" pitchFamily="34" charset="0"/>
+              <a:buChar char="•"/>
+            </a:pPr>
+            <a:endParaRPr lang="en-US" sz="3200" dirty="0" smtClean="0"/>
+          </a:p>
+          <a:p>
+            <a:pPr marL="457200" indent="-457200">
+              <a:buFont typeface="Arial" panose="020B0604020202020204" pitchFamily="34" charset="0"/>
+              <a:buChar char="•"/>
+            </a:pPr>
+            <a:r>
+              <a:rPr lang="en-US" sz="3200" dirty="0" smtClean="0"/>
+              <a:t> </a:t>
+            </a:r>
+            <a:r>
+              <a:rPr lang="en-US" sz="3200" dirty="0" smtClean="0">
+                <a:solidFill>
+                  <a:srgbClr val="C00000"/>
+                </a:solidFill>
+              </a:rPr>
+              <a:t>bool Cancel </a:t>
+            </a:r>
+            <a:r>
+              <a:rPr lang="en-US" sz="3200" dirty="0" smtClean="0"/>
+              <a:t>- if true, will stop the action result from being processed</a:t>
+            </a:r>
+          </a:p>
+          <a:p>
+            <a:pPr marL="457200" indent="-457200">
+              <a:buFont typeface="Arial" panose="020B0604020202020204" pitchFamily="34" charset="0"/>
+              <a:buChar char="•"/>
+            </a:pPr>
+            <a:endParaRPr lang="en-US" sz="3200" dirty="0" smtClean="0"/>
+          </a:p>
+          <a:p>
+            <a:pPr marL="457200" indent="-457200">
+              <a:buFont typeface="Arial" panose="020B0604020202020204" pitchFamily="34" charset="0"/>
+              <a:buChar char="•"/>
+            </a:pPr>
+            <a:r>
+              <a:rPr lang="en-US" sz="3200" dirty="0" smtClean="0"/>
+              <a:t> </a:t>
+            </a:r>
+            <a:r>
+              <a:rPr lang="en-US" sz="3200" dirty="0" err="1" smtClean="0">
+                <a:solidFill>
+                  <a:srgbClr val="C00000"/>
+                </a:solidFill>
+              </a:rPr>
+              <a:t>IActionResult</a:t>
+            </a:r>
+            <a:r>
+              <a:rPr lang="en-US" sz="3200" dirty="0" smtClean="0">
+                <a:solidFill>
+                  <a:srgbClr val="C00000"/>
+                </a:solidFill>
+              </a:rPr>
+              <a:t> Result</a:t>
+            </a:r>
+            <a:r>
+              <a:rPr lang="en-US" sz="3200" dirty="0" smtClean="0"/>
+              <a:t> – result object returned by the action method</a:t>
+            </a:r>
+          </a:p>
+        </p:txBody>
+      </p:sp>
+    </p:spTree>
+    <p:extLst>
+      <p:ext uri="{BB962C8B-B14F-4D97-AF65-F5344CB8AC3E}">
+        <p14:creationId xmlns:p14="http://schemas.microsoft.com/office/powerpoint/2010/main" val="1756904845"/>
       </p:ext>
     </p:extLst>
   </p:cSld>
@@ -10542,217 +11115,6 @@
           <a:lstStyle/>
           <a:p>
             <a:r>
-              <a:rPr lang="en-US" sz="3200" dirty="0" err="1" smtClean="0"/>
-              <a:t>ResultExecutingContext</a:t>
-            </a:r>
-            <a:r>
-              <a:rPr lang="en-US" sz="3200" dirty="0" smtClean="0"/>
-              <a:t> properties:</a:t>
-            </a:r>
-          </a:p>
-          <a:p>
-            <a:endParaRPr lang="en-US" sz="3200" dirty="0"/>
-          </a:p>
-          <a:p>
-            <a:pPr marL="457200" indent="-457200">
-              <a:buFont typeface="Arial" panose="020B0604020202020204" pitchFamily="34" charset="0"/>
-              <a:buChar char="•"/>
-            </a:pPr>
-            <a:r>
-              <a:rPr lang="en-US" sz="3200" dirty="0" smtClean="0"/>
-              <a:t> Controller</a:t>
-            </a:r>
-          </a:p>
-          <a:p>
-            <a:pPr marL="457200" indent="-457200">
-              <a:buFont typeface="Arial" panose="020B0604020202020204" pitchFamily="34" charset="0"/>
-              <a:buChar char="•"/>
-            </a:pPr>
-            <a:endParaRPr lang="en-US" sz="3200" dirty="0" smtClean="0"/>
-          </a:p>
-          <a:p>
-            <a:pPr marL="457200" indent="-457200">
-              <a:buFont typeface="Arial" panose="020B0604020202020204" pitchFamily="34" charset="0"/>
-              <a:buChar char="•"/>
-            </a:pPr>
-            <a:r>
-              <a:rPr lang="en-US" sz="3200" dirty="0" smtClean="0"/>
-              <a:t> </a:t>
-            </a:r>
-            <a:r>
-              <a:rPr lang="en-US" sz="3200" dirty="0" smtClean="0">
-                <a:solidFill>
-                  <a:srgbClr val="C00000"/>
-                </a:solidFill>
-              </a:rPr>
-              <a:t>bool Cancel </a:t>
-            </a:r>
-            <a:r>
-              <a:rPr lang="en-US" sz="3200" dirty="0" smtClean="0"/>
-              <a:t>- if true, will stop the action result from being processed</a:t>
-            </a:r>
-          </a:p>
-          <a:p>
-            <a:pPr marL="457200" indent="-457200">
-              <a:buFont typeface="Arial" panose="020B0604020202020204" pitchFamily="34" charset="0"/>
-              <a:buChar char="•"/>
-            </a:pPr>
-            <a:endParaRPr lang="en-US" sz="3200" dirty="0" smtClean="0"/>
-          </a:p>
-          <a:p>
-            <a:pPr marL="457200" indent="-457200">
-              <a:buFont typeface="Arial" panose="020B0604020202020204" pitchFamily="34" charset="0"/>
-              <a:buChar char="•"/>
-            </a:pPr>
-            <a:r>
-              <a:rPr lang="en-US" sz="3200" dirty="0" smtClean="0"/>
-              <a:t> </a:t>
-            </a:r>
-            <a:r>
-              <a:rPr lang="en-US" sz="3200" dirty="0" err="1" smtClean="0">
-                <a:solidFill>
-                  <a:srgbClr val="C00000"/>
-                </a:solidFill>
-              </a:rPr>
-              <a:t>IActionResult</a:t>
-            </a:r>
-            <a:r>
-              <a:rPr lang="en-US" sz="3200" dirty="0" smtClean="0">
-                <a:solidFill>
-                  <a:srgbClr val="C00000"/>
-                </a:solidFill>
-              </a:rPr>
-              <a:t> Result</a:t>
-            </a:r>
-            <a:r>
-              <a:rPr lang="en-US" sz="3200" dirty="0" smtClean="0"/>
-              <a:t> – result object returned by the action method</a:t>
-            </a:r>
-          </a:p>
-        </p:txBody>
-      </p:sp>
-    </p:spTree>
-    <p:extLst>
-      <p:ext uri="{BB962C8B-B14F-4D97-AF65-F5344CB8AC3E}">
-        <p14:creationId xmlns:p14="http://schemas.microsoft.com/office/powerpoint/2010/main" val="1756904845"/>
-      </p:ext>
-    </p:extLst>
-  </p:cSld>
-  <p:clrMapOvr>
-    <a:masterClrMapping/>
-  </p:clrMapOvr>
-  <p:timing>
-    <p:tnLst>
-      <p:par>
-        <p:cTn id="1" dur="indefinite" restart="never" nodeType="tmRoot"/>
-      </p:par>
-    </p:tnLst>
-  </p:timing>
-</p:sld>
-</file>
-
-<file path=ppt/slides/slide36.xml><?xml version="1.0" encoding="utf-8"?>
-<p:sld xmlns:a="http://schemas.openxmlformats.org/drawingml/2006/main" xmlns:r="http://schemas.openxmlformats.org/officeDocument/2006/relationships" xmlns:p="http://schemas.openxmlformats.org/presentationml/2006/main">
-  <p:cSld>
-    <p:bg>
-      <p:bgPr>
-        <a:gradFill>
-          <a:gsLst>
-            <a:gs pos="0">
-              <a:schemeClr val="accent1">
-                <a:lumMod val="5000"/>
-                <a:lumOff val="95000"/>
-              </a:schemeClr>
-            </a:gs>
-            <a:gs pos="42000">
-              <a:schemeClr val="accent1">
-                <a:lumMod val="45000"/>
-                <a:lumOff val="55000"/>
-              </a:schemeClr>
-            </a:gs>
-            <a:gs pos="83000">
-              <a:schemeClr val="accent1">
-                <a:lumMod val="45000"/>
-                <a:lumOff val="55000"/>
-              </a:schemeClr>
-            </a:gs>
-            <a:gs pos="100000">
-              <a:schemeClr val="accent1">
-                <a:lumMod val="30000"/>
-                <a:lumOff val="70000"/>
-              </a:schemeClr>
-            </a:gs>
-          </a:gsLst>
-          <a:lin ang="5400000" scaled="1"/>
-        </a:gradFill>
-        <a:effectLst/>
-      </p:bgPr>
-    </p:bg>
-    <p:spTree>
-      <p:nvGrpSpPr>
-        <p:cNvPr id="1" name=""/>
-        <p:cNvGrpSpPr/>
-        <p:nvPr/>
-      </p:nvGrpSpPr>
-      <p:grpSpPr>
-        <a:xfrm>
-          <a:off x="0" y="0"/>
-          <a:ext cx="0" cy="0"/>
-          <a:chOff x="0" y="0"/>
-          <a:chExt cx="0" cy="0"/>
-        </a:xfrm>
-      </p:grpSpPr>
-      <p:sp>
-        <p:nvSpPr>
-          <p:cNvPr id="2" name="Title 1"/>
-          <p:cNvSpPr>
-            <a:spLocks noGrp="1"/>
-          </p:cNvSpPr>
-          <p:nvPr>
-            <p:ph type="title"/>
-          </p:nvPr>
-        </p:nvSpPr>
-        <p:spPr>
-          <a:xfrm>
-            <a:off x="768015" y="128337"/>
-            <a:ext cx="10515600" cy="1325563"/>
-          </a:xfrm>
-        </p:spPr>
-        <p:txBody>
-          <a:bodyPr/>
-          <a:lstStyle/>
-          <a:p>
-            <a:r>
-              <a:rPr lang="en-US" smtClean="0"/>
-              <a:t>Result Filters</a:t>
-            </a:r>
-            <a:endParaRPr lang="en-US" dirty="0"/>
-          </a:p>
-        </p:txBody>
-      </p:sp>
-      <p:sp>
-        <p:nvSpPr>
-          <p:cNvPr id="4" name="TextBox 3"/>
-          <p:cNvSpPr txBox="1"/>
-          <p:nvPr/>
-        </p:nvSpPr>
-        <p:spPr>
-          <a:xfrm>
-            <a:off x="768015" y="1301261"/>
-            <a:ext cx="11295031" cy="4524315"/>
-          </a:xfrm>
-          <a:prstGeom prst="rect">
-            <a:avLst/>
-          </a:prstGeom>
-          <a:noFill/>
-        </p:spPr>
-        <p:txBody>
-          <a:bodyPr wrap="square" rtlCol="0">
-            <a:spAutoFit/>
-          </a:bodyPr>
-          <a:lstStyle/>
-          <a:p>
-            <a:r>
               <a:rPr lang="en-US" sz="3200" dirty="0" err="1">
                 <a:latin typeface="LpnnbbGbhjltBwywxpUtopiaStd-Italic"/>
               </a:rPr>
@@ -10897,7 +11259,7 @@
 </p:sld>
 </file>
 
-<file path=ppt/slides/slide37.xml><?xml version="1.0" encoding="utf-8"?>
+<file path=ppt/slides/slide36.xml><?xml version="1.0" encoding="utf-8"?>
 <p:sld xmlns:a="http://schemas.openxmlformats.org/drawingml/2006/main" xmlns:r="http://schemas.openxmlformats.org/officeDocument/2006/relationships" xmlns:p="http://schemas.openxmlformats.org/presentationml/2006/main">
   <p:cSld>
     <p:bg>
@@ -11020,7 +11382,7 @@
 </p:sld>
 </file>
 
-<file path=ppt/slides/slide38.xml><?xml version="1.0" encoding="utf-8"?>
+<file path=ppt/slides/slide37.xml><?xml version="1.0" encoding="utf-8"?>
 <p:sld xmlns:a="http://schemas.openxmlformats.org/drawingml/2006/main" xmlns:r="http://schemas.openxmlformats.org/officeDocument/2006/relationships" xmlns:p="http://schemas.openxmlformats.org/presentationml/2006/main">
   <p:cSld>
     <p:bg>
@@ -11167,7 +11529,7 @@
 </p:sld>
 </file>
 
-<file path=ppt/slides/slide39.xml><?xml version="1.0" encoding="utf-8"?>
+<file path=ppt/slides/slide38.xml><?xml version="1.0" encoding="utf-8"?>
 <p:sld xmlns:a="http://schemas.openxmlformats.org/drawingml/2006/main" xmlns:r="http://schemas.openxmlformats.org/officeDocument/2006/relationships" xmlns:p="http://schemas.openxmlformats.org/presentationml/2006/main">
   <p:cSld>
     <p:bg>
@@ -11294,168 +11656,7 @@
 </p:sld>
 </file>
 
-<file path=ppt/slides/slide4.xml><?xml version="1.0" encoding="utf-8"?>
-<p:sld xmlns:a="http://schemas.openxmlformats.org/drawingml/2006/main" xmlns:r="http://schemas.openxmlformats.org/officeDocument/2006/relationships" xmlns:p="http://schemas.openxmlformats.org/presentationml/2006/main">
-  <p:cSld>
-    <p:bg>
-      <p:bgPr>
-        <a:gradFill>
-          <a:gsLst>
-            <a:gs pos="0">
-              <a:schemeClr val="accent1">
-                <a:lumMod val="5000"/>
-                <a:lumOff val="95000"/>
-              </a:schemeClr>
-            </a:gs>
-            <a:gs pos="42000">
-              <a:schemeClr val="accent1">
-                <a:lumMod val="45000"/>
-                <a:lumOff val="55000"/>
-              </a:schemeClr>
-            </a:gs>
-            <a:gs pos="83000">
-              <a:schemeClr val="accent1">
-                <a:lumMod val="45000"/>
-                <a:lumOff val="55000"/>
-              </a:schemeClr>
-            </a:gs>
-            <a:gs pos="100000">
-              <a:schemeClr val="accent1">
-                <a:lumMod val="30000"/>
-                <a:lumOff val="70000"/>
-              </a:schemeClr>
-            </a:gs>
-          </a:gsLst>
-          <a:lin ang="5400000" scaled="1"/>
-        </a:gradFill>
-        <a:effectLst/>
-      </p:bgPr>
-    </p:bg>
-    <p:spTree>
-      <p:nvGrpSpPr>
-        <p:cNvPr id="1" name=""/>
-        <p:cNvGrpSpPr/>
-        <p:nvPr/>
-      </p:nvGrpSpPr>
-      <p:grpSpPr>
-        <a:xfrm>
-          <a:off x="0" y="0"/>
-          <a:ext cx="0" cy="0"/>
-          <a:chOff x="0" y="0"/>
-          <a:chExt cx="0" cy="0"/>
-        </a:xfrm>
-      </p:grpSpPr>
-      <p:sp>
-        <p:nvSpPr>
-          <p:cNvPr id="2" name="Title 1"/>
-          <p:cNvSpPr>
-            <a:spLocks noGrp="1"/>
-          </p:cNvSpPr>
-          <p:nvPr>
-            <p:ph type="title"/>
-          </p:nvPr>
-        </p:nvSpPr>
-        <p:spPr/>
-        <p:txBody>
-          <a:bodyPr/>
-          <a:lstStyle/>
-          <a:p>
-            <a:r>
-              <a:rPr lang="en-US" dirty="0"/>
-              <a:t>M</a:t>
-            </a:r>
-            <a:r>
-              <a:rPr lang="en-US" dirty="0" smtClean="0"/>
-              <a:t>iddleware</a:t>
-            </a:r>
-            <a:endParaRPr lang="en-US" dirty="0"/>
-          </a:p>
-        </p:txBody>
-      </p:sp>
-      <p:pic>
-        <p:nvPicPr>
-          <p:cNvPr id="4" name="Content Placeholder 3"/>
-          <p:cNvPicPr>
-            <a:picLocks noGrp="1" noChangeAspect="1"/>
-          </p:cNvPicPr>
-          <p:nvPr>
-            <p:ph idx="1"/>
-          </p:nvPr>
-        </p:nvPicPr>
-        <p:blipFill>
-          <a:blip r:embed="rId2"/>
-          <a:stretch>
-            <a:fillRect/>
-          </a:stretch>
-        </p:blipFill>
-        <p:spPr>
-          <a:xfrm>
-            <a:off x="126" y="2199890"/>
-            <a:ext cx="12191874" cy="3132686"/>
-          </a:xfrm>
-          <a:prstGeom prst="rect">
-            <a:avLst/>
-          </a:prstGeom>
-        </p:spPr>
-      </p:pic>
-      <p:sp>
-        <p:nvSpPr>
-          <p:cNvPr id="5" name="TextBox 4"/>
-          <p:cNvSpPr txBox="1"/>
-          <p:nvPr/>
-        </p:nvSpPr>
-        <p:spPr>
-          <a:xfrm>
-            <a:off x="9067087" y="6170064"/>
-            <a:ext cx="3221765" cy="369332"/>
-          </a:xfrm>
-          <a:prstGeom prst="rect">
-            <a:avLst/>
-          </a:prstGeom>
-          <a:noFill/>
-        </p:spPr>
-        <p:txBody>
-          <a:bodyPr wrap="square" rtlCol="0">
-            <a:spAutoFit/>
-          </a:bodyPr>
-          <a:lstStyle/>
-          <a:p>
-            <a:r>
-              <a:rPr lang="en-US" dirty="0"/>
-              <a:t>@ Pro Asp </a:t>
-            </a:r>
-            <a:r>
-              <a:rPr lang="en-US" dirty="0" err="1"/>
-              <a:t>.Net</a:t>
-            </a:r>
-            <a:r>
-              <a:rPr lang="en-US" dirty="0"/>
-              <a:t> Core MVC 2</a:t>
-            </a:r>
-          </a:p>
-        </p:txBody>
-      </p:sp>
-    </p:spTree>
-    <p:extLst>
-      <p:ext uri="{BB962C8B-B14F-4D97-AF65-F5344CB8AC3E}">
-        <p14:creationId xmlns:p14="http://schemas.microsoft.com/office/powerpoint/2010/main" val="1015542385"/>
-      </p:ext>
-    </p:extLst>
-  </p:cSld>
-  <p:clrMapOvr>
-    <a:masterClrMapping/>
-  </p:clrMapOvr>
-  <p:timing>
-    <p:tnLst>
-      <p:par>
-        <p:cTn id="1" dur="indefinite" restart="never" nodeType="tmRoot"/>
-      </p:par>
-    </p:tnLst>
-  </p:timing>
-</p:sld>
-</file>
-
-<file path=ppt/slides/slide40.xml><?xml version="1.0" encoding="utf-8"?>
+<file path=ppt/slides/slide39.xml><?xml version="1.0" encoding="utf-8"?>
 <p:sld xmlns:a="http://schemas.openxmlformats.org/drawingml/2006/main" xmlns:r="http://schemas.openxmlformats.org/officeDocument/2006/relationships" xmlns:p="http://schemas.openxmlformats.org/presentationml/2006/main">
   <p:cSld>
     <p:bg>
@@ -11578,7 +11779,191 @@
 </p:sld>
 </file>
 
-<file path=ppt/slides/slide41.xml><?xml version="1.0" encoding="utf-8"?>
+<file path=ppt/slides/slide4.xml><?xml version="1.0" encoding="utf-8"?>
+<p:sld xmlns:a="http://schemas.openxmlformats.org/drawingml/2006/main" xmlns:r="http://schemas.openxmlformats.org/officeDocument/2006/relationships" xmlns:p="http://schemas.openxmlformats.org/presentationml/2006/main">
+  <p:cSld>
+    <p:bg>
+      <p:bgPr>
+        <a:gradFill>
+          <a:gsLst>
+            <a:gs pos="0">
+              <a:schemeClr val="accent1">
+                <a:lumMod val="5000"/>
+                <a:lumOff val="95000"/>
+              </a:schemeClr>
+            </a:gs>
+            <a:gs pos="42000">
+              <a:schemeClr val="accent1">
+                <a:lumMod val="45000"/>
+                <a:lumOff val="55000"/>
+              </a:schemeClr>
+            </a:gs>
+            <a:gs pos="83000">
+              <a:schemeClr val="accent1">
+                <a:lumMod val="45000"/>
+                <a:lumOff val="55000"/>
+              </a:schemeClr>
+            </a:gs>
+            <a:gs pos="100000">
+              <a:schemeClr val="accent1">
+                <a:lumMod val="30000"/>
+                <a:lumOff val="70000"/>
+              </a:schemeClr>
+            </a:gs>
+          </a:gsLst>
+          <a:lin ang="5400000" scaled="1"/>
+        </a:gradFill>
+        <a:effectLst/>
+      </p:bgPr>
+    </p:bg>
+    <p:spTree>
+      <p:nvGrpSpPr>
+        <p:cNvPr id="1" name=""/>
+        <p:cNvGrpSpPr/>
+        <p:nvPr/>
+      </p:nvGrpSpPr>
+      <p:grpSpPr>
+        <a:xfrm>
+          <a:off x="0" y="0"/>
+          <a:ext cx="0" cy="0"/>
+          <a:chOff x="0" y="0"/>
+          <a:chExt cx="0" cy="0"/>
+        </a:xfrm>
+      </p:grpSpPr>
+      <p:sp>
+        <p:nvSpPr>
+          <p:cNvPr id="2" name="Title 1"/>
+          <p:cNvSpPr>
+            <a:spLocks noGrp="1"/>
+          </p:cNvSpPr>
+          <p:nvPr>
+            <p:ph type="title"/>
+          </p:nvPr>
+        </p:nvSpPr>
+        <p:spPr/>
+        <p:txBody>
+          <a:bodyPr/>
+          <a:lstStyle/>
+          <a:p>
+            <a:r>
+              <a:rPr lang="en-US" dirty="0"/>
+              <a:t>M</a:t>
+            </a:r>
+            <a:r>
+              <a:rPr lang="en-US" dirty="0" smtClean="0"/>
+              <a:t>iddleware</a:t>
+            </a:r>
+            <a:endParaRPr lang="en-US" dirty="0"/>
+          </a:p>
+        </p:txBody>
+      </p:sp>
+      <p:sp>
+        <p:nvSpPr>
+          <p:cNvPr id="3" name="Content Placeholder 2"/>
+          <p:cNvSpPr>
+            <a:spLocks noGrp="1"/>
+          </p:cNvSpPr>
+          <p:nvPr>
+            <p:ph idx="1"/>
+          </p:nvPr>
+        </p:nvSpPr>
+        <p:spPr/>
+        <p:txBody>
+          <a:bodyPr/>
+          <a:lstStyle/>
+          <a:p>
+            <a:pPr marL="0" indent="0">
+              <a:buNone/>
+            </a:pPr>
+            <a:r>
+              <a:rPr lang="en-US" dirty="0" smtClean="0"/>
+              <a:t>To be a middleware component class must have:</a:t>
+            </a:r>
+          </a:p>
+          <a:p>
+            <a:pPr marL="0" indent="0">
+              <a:buNone/>
+            </a:pPr>
+            <a:endParaRPr lang="en-US" dirty="0" smtClean="0"/>
+          </a:p>
+          <a:p>
+            <a:pPr marL="0" indent="0">
+              <a:buNone/>
+            </a:pPr>
+            <a:endParaRPr lang="en-US" dirty="0"/>
+          </a:p>
+          <a:p>
+            <a:pPr marL="0" indent="0">
+              <a:buNone/>
+            </a:pPr>
+            <a:r>
+              <a:rPr lang="en-US" dirty="0" smtClean="0"/>
+              <a:t>Constructor that takes a </a:t>
+            </a:r>
+            <a:r>
+              <a:rPr lang="en-US" dirty="0" err="1" smtClean="0"/>
+              <a:t>RequestDelegate</a:t>
+            </a:r>
+            <a:r>
+              <a:rPr lang="en-US" dirty="0" smtClean="0"/>
+              <a:t> (</a:t>
+            </a:r>
+            <a:r>
+              <a:rPr lang="en-US" dirty="0" err="1" smtClean="0"/>
+              <a:t>nextDelegate</a:t>
+            </a:r>
+            <a:r>
+              <a:rPr lang="en-US" dirty="0" smtClean="0"/>
+              <a:t>)</a:t>
+            </a:r>
+          </a:p>
+          <a:p>
+            <a:pPr marL="0" indent="0">
+              <a:buNone/>
+            </a:pPr>
+            <a:endParaRPr lang="en-US" dirty="0" smtClean="0"/>
+          </a:p>
+          <a:p>
+            <a:pPr marL="0" indent="0">
+              <a:buNone/>
+            </a:pPr>
+            <a:r>
+              <a:rPr lang="en-US" dirty="0" smtClean="0"/>
+              <a:t>Define Invoke method which takes </a:t>
+            </a:r>
+            <a:r>
+              <a:rPr lang="en-US" dirty="0" err="1" smtClean="0"/>
+              <a:t>HttpContext</a:t>
+            </a:r>
+            <a:r>
+              <a:rPr lang="en-US" dirty="0" smtClean="0"/>
+              <a:t> as and argument</a:t>
+            </a:r>
+            <a:endParaRPr lang="en-US" dirty="0"/>
+          </a:p>
+        </p:txBody>
+      </p:sp>
+    </p:spTree>
+    <p:extLst>
+      <p:ext uri="{BB962C8B-B14F-4D97-AF65-F5344CB8AC3E}">
+        <p14:creationId xmlns:p14="http://schemas.microsoft.com/office/powerpoint/2010/main" val="3022483728"/>
+      </p:ext>
+    </p:extLst>
+  </p:cSld>
+  <p:clrMapOvr>
+    <a:masterClrMapping/>
+  </p:clrMapOvr>
+  <p:timing>
+    <p:tnLst>
+      <p:par>
+        <p:cTn id="1" dur="indefinite" restart="never" nodeType="tmRoot"/>
+      </p:par>
+    </p:tnLst>
+  </p:timing>
+</p:sld>
+</file>
+
+<file path=ppt/slides/slide40.xml><?xml version="1.0" encoding="utf-8"?>
 <p:sld xmlns:a="http://schemas.openxmlformats.org/drawingml/2006/main" xmlns:r="http://schemas.openxmlformats.org/officeDocument/2006/relationships" xmlns:p="http://schemas.openxmlformats.org/presentationml/2006/main">
   <p:cSld>
     <p:bg>
@@ -11701,7 +12086,7 @@
 </p:sld>
 </file>
 
-<file path=ppt/slides/slide42.xml><?xml version="1.0" encoding="utf-8"?>
+<file path=ppt/slides/slide41.xml><?xml version="1.0" encoding="utf-8"?>
 <p:sld xmlns:a="http://schemas.openxmlformats.org/drawingml/2006/main" xmlns:r="http://schemas.openxmlformats.org/officeDocument/2006/relationships" xmlns:p="http://schemas.openxmlformats.org/presentationml/2006/main">
   <p:cSld>
     <p:bg>
@@ -11848,7 +12233,7 @@
 </p:sld>
 </file>
 
-<file path=ppt/slides/slide43.xml><?xml version="1.0" encoding="utf-8"?>
+<file path=ppt/slides/slide42.xml><?xml version="1.0" encoding="utf-8"?>
 <p:sld xmlns:a="http://schemas.openxmlformats.org/drawingml/2006/main" xmlns:r="http://schemas.openxmlformats.org/officeDocument/2006/relationships" xmlns:p="http://schemas.openxmlformats.org/presentationml/2006/main">
   <p:cSld>
     <p:bg>
@@ -12179,7 +12564,7 @@
 </p:sld>
 </file>
 
-<file path=ppt/slides/slide44.xml><?xml version="1.0" encoding="utf-8"?>
+<file path=ppt/slides/slide43.xml><?xml version="1.0" encoding="utf-8"?>
 <p:sld xmlns:a="http://schemas.openxmlformats.org/drawingml/2006/main" xmlns:r="http://schemas.openxmlformats.org/officeDocument/2006/relationships" xmlns:p="http://schemas.openxmlformats.org/presentationml/2006/main">
   <p:cSld>
     <p:bg>
@@ -12364,7 +12749,7 @@
 </p:sld>
 </file>
 
-<file path=ppt/slides/slide45.xml><?xml version="1.0" encoding="utf-8"?>
+<file path=ppt/slides/slide44.xml><?xml version="1.0" encoding="utf-8"?>
 <p:sld xmlns:a="http://schemas.openxmlformats.org/drawingml/2006/main" xmlns:r="http://schemas.openxmlformats.org/officeDocument/2006/relationships" xmlns:p="http://schemas.openxmlformats.org/presentationml/2006/main">
   <p:cSld>
     <p:bg>
@@ -12491,7 +12876,7 @@
 </p:sld>
 </file>
 
-<file path=ppt/slides/slide46.xml><?xml version="1.0" encoding="utf-8"?>
+<file path=ppt/slides/slide45.xml><?xml version="1.0" encoding="utf-8"?>
 <p:sld xmlns:a="http://schemas.openxmlformats.org/drawingml/2006/main" xmlns:r="http://schemas.openxmlformats.org/officeDocument/2006/relationships" xmlns:p="http://schemas.openxmlformats.org/presentationml/2006/main">
   <p:cSld>
     <p:bg>
@@ -12618,7 +13003,7 @@
 </p:sld>
 </file>
 
-<file path=ppt/slides/slide47.xml><?xml version="1.0" encoding="utf-8"?>
+<file path=ppt/slides/slide46.xml><?xml version="1.0" encoding="utf-8"?>
 <p:sld xmlns:a="http://schemas.openxmlformats.org/drawingml/2006/main" xmlns:r="http://schemas.openxmlformats.org/officeDocument/2006/relationships" xmlns:p="http://schemas.openxmlformats.org/presentationml/2006/main">
   <p:cSld>
     <p:bg>
@@ -12745,7 +13130,7 @@
 </p:sld>
 </file>
 
-<file path=ppt/slides/slide48.xml><?xml version="1.0" encoding="utf-8"?>
+<file path=ppt/slides/slide47.xml><?xml version="1.0" encoding="utf-8"?>
 <p:sld xmlns:a="http://schemas.openxmlformats.org/drawingml/2006/main" xmlns:r="http://schemas.openxmlformats.org/officeDocument/2006/relationships" xmlns:p="http://schemas.openxmlformats.org/presentationml/2006/main">
   <p:cSld>
     <p:bg>
@@ -12872,7 +13257,7 @@
 </p:sld>
 </file>
 
-<file path=ppt/slides/slide49.xml><?xml version="1.0" encoding="utf-8"?>
+<file path=ppt/slides/slide48.xml><?xml version="1.0" encoding="utf-8"?>
 <p:sld xmlns:a="http://schemas.openxmlformats.org/drawingml/2006/main" xmlns:r="http://schemas.openxmlformats.org/officeDocument/2006/relationships" xmlns:p="http://schemas.openxmlformats.org/presentationml/2006/main">
   <p:cSld>
     <p:bg>
@@ -13030,7 +13415,7 @@
 </p:sld>
 </file>
 
-<file path=ppt/slides/slide5.xml><?xml version="1.0" encoding="utf-8"?>
+<file path=ppt/slides/slide49.xml><?xml version="1.0" encoding="utf-8"?>
 <p:sld xmlns:a="http://schemas.openxmlformats.org/drawingml/2006/main" xmlns:r="http://schemas.openxmlformats.org/officeDocument/2006/relationships" xmlns:p="http://schemas.openxmlformats.org/presentationml/2006/main">
   <p:cSld>
     <p:bg>
@@ -13091,190 +13476,6 @@
             <p:ph type="title"/>
           </p:nvPr>
         </p:nvSpPr>
-        <p:spPr/>
-        <p:txBody>
-          <a:bodyPr/>
-          <a:lstStyle/>
-          <a:p>
-            <a:r>
-              <a:rPr lang="en-US" dirty="0"/>
-              <a:t>M</a:t>
-            </a:r>
-            <a:r>
-              <a:rPr lang="en-US" dirty="0" smtClean="0"/>
-              <a:t>iddleware</a:t>
-            </a:r>
-            <a:endParaRPr lang="en-US" dirty="0"/>
-          </a:p>
-        </p:txBody>
-      </p:sp>
-      <p:sp>
-        <p:nvSpPr>
-          <p:cNvPr id="3" name="Content Placeholder 2"/>
-          <p:cNvSpPr>
-            <a:spLocks noGrp="1"/>
-          </p:cNvSpPr>
-          <p:nvPr>
-            <p:ph idx="1"/>
-          </p:nvPr>
-        </p:nvSpPr>
-        <p:spPr/>
-        <p:txBody>
-          <a:bodyPr/>
-          <a:lstStyle/>
-          <a:p>
-            <a:pPr marL="0" indent="0">
-              <a:buNone/>
-            </a:pPr>
-            <a:r>
-              <a:rPr lang="en-US" dirty="0" smtClean="0"/>
-              <a:t>To be a middleware component class must have:</a:t>
-            </a:r>
-          </a:p>
-          <a:p>
-            <a:pPr marL="0" indent="0">
-              <a:buNone/>
-            </a:pPr>
-            <a:endParaRPr lang="en-US" dirty="0" smtClean="0"/>
-          </a:p>
-          <a:p>
-            <a:pPr marL="0" indent="0">
-              <a:buNone/>
-            </a:pPr>
-            <a:endParaRPr lang="en-US" dirty="0"/>
-          </a:p>
-          <a:p>
-            <a:pPr marL="0" indent="0">
-              <a:buNone/>
-            </a:pPr>
-            <a:r>
-              <a:rPr lang="en-US" dirty="0" smtClean="0"/>
-              <a:t>Constructor that takes a </a:t>
-            </a:r>
-            <a:r>
-              <a:rPr lang="en-US" dirty="0" err="1" smtClean="0"/>
-              <a:t>RequestDelegate</a:t>
-            </a:r>
-            <a:r>
-              <a:rPr lang="en-US" dirty="0" smtClean="0"/>
-              <a:t> (</a:t>
-            </a:r>
-            <a:r>
-              <a:rPr lang="en-US" dirty="0" err="1" smtClean="0"/>
-              <a:t>nextDelegate</a:t>
-            </a:r>
-            <a:r>
-              <a:rPr lang="en-US" dirty="0" smtClean="0"/>
-              <a:t>)</a:t>
-            </a:r>
-          </a:p>
-          <a:p>
-            <a:pPr marL="0" indent="0">
-              <a:buNone/>
-            </a:pPr>
-            <a:endParaRPr lang="en-US" dirty="0" smtClean="0"/>
-          </a:p>
-          <a:p>
-            <a:pPr marL="0" indent="0">
-              <a:buNone/>
-            </a:pPr>
-            <a:r>
-              <a:rPr lang="en-US" dirty="0" smtClean="0"/>
-              <a:t>Define Invoke method which takes </a:t>
-            </a:r>
-            <a:r>
-              <a:rPr lang="en-US" dirty="0" err="1" smtClean="0"/>
-              <a:t>HttpContext</a:t>
-            </a:r>
-            <a:r>
-              <a:rPr lang="en-US" dirty="0" smtClean="0"/>
-              <a:t> as and argument</a:t>
-            </a:r>
-            <a:endParaRPr lang="en-US" dirty="0"/>
-          </a:p>
-        </p:txBody>
-      </p:sp>
-    </p:spTree>
-    <p:extLst>
-      <p:ext uri="{BB962C8B-B14F-4D97-AF65-F5344CB8AC3E}">
-        <p14:creationId xmlns:p14="http://schemas.microsoft.com/office/powerpoint/2010/main" val="3022483728"/>
-      </p:ext>
-    </p:extLst>
-  </p:cSld>
-  <p:clrMapOvr>
-    <a:masterClrMapping/>
-  </p:clrMapOvr>
-  <p:timing>
-    <p:tnLst>
-      <p:par>
-        <p:cTn id="1" dur="indefinite" restart="never" nodeType="tmRoot"/>
-      </p:par>
-    </p:tnLst>
-  </p:timing>
-</p:sld>
-</file>
-
-<file path=ppt/slides/slide50.xml><?xml version="1.0" encoding="utf-8"?>
-<p:sld xmlns:a="http://schemas.openxmlformats.org/drawingml/2006/main" xmlns:r="http://schemas.openxmlformats.org/officeDocument/2006/relationships" xmlns:p="http://schemas.openxmlformats.org/presentationml/2006/main">
-  <p:cSld>
-    <p:bg>
-      <p:bgPr>
-        <a:gradFill>
-          <a:gsLst>
-            <a:gs pos="0">
-              <a:schemeClr val="accent1">
-                <a:lumMod val="5000"/>
-                <a:lumOff val="95000"/>
-              </a:schemeClr>
-            </a:gs>
-            <a:gs pos="42000">
-              <a:schemeClr val="accent1">
-                <a:lumMod val="45000"/>
-                <a:lumOff val="55000"/>
-              </a:schemeClr>
-            </a:gs>
-            <a:gs pos="83000">
-              <a:schemeClr val="accent1">
-                <a:lumMod val="45000"/>
-                <a:lumOff val="55000"/>
-              </a:schemeClr>
-            </a:gs>
-            <a:gs pos="100000">
-              <a:schemeClr val="accent1">
-                <a:lumMod val="30000"/>
-                <a:lumOff val="70000"/>
-              </a:schemeClr>
-            </a:gs>
-          </a:gsLst>
-          <a:lin ang="5400000" scaled="1"/>
-        </a:gradFill>
-        <a:effectLst/>
-      </p:bgPr>
-    </p:bg>
-    <p:spTree>
-      <p:nvGrpSpPr>
-        <p:cNvPr id="1" name=""/>
-        <p:cNvGrpSpPr/>
-        <p:nvPr/>
-      </p:nvGrpSpPr>
-      <p:grpSpPr>
-        <a:xfrm>
-          <a:off x="0" y="0"/>
-          <a:ext cx="0" cy="0"/>
-          <a:chOff x="0" y="0"/>
-          <a:chExt cx="0" cy="0"/>
-        </a:xfrm>
-      </p:grpSpPr>
-      <p:sp>
-        <p:nvSpPr>
-          <p:cNvPr id="2" name="Title 1"/>
-          <p:cNvSpPr>
-            <a:spLocks noGrp="1"/>
-          </p:cNvSpPr>
-          <p:nvPr>
-            <p:ph type="title"/>
-          </p:nvPr>
-        </p:nvSpPr>
         <p:spPr>
           <a:xfrm>
             <a:off x="312821" y="-164575"/>
@@ -13287,7 +13488,19 @@
           <a:p>
             <a:r>
               <a:rPr lang="en-US" dirty="0" smtClean="0"/>
-              <a:t>Type filter attribute</a:t>
+              <a:t>Type filter </a:t>
+            </a:r>
+            <a:r>
+              <a:rPr lang="en-US" dirty="0" smtClean="0"/>
+              <a:t>attribute (</a:t>
+            </a:r>
+            <a:r>
+              <a:rPr lang="en-US" dirty="0" err="1" smtClean="0"/>
+              <a:t>FilterDiagnostics</a:t>
+            </a:r>
+            <a:r>
+              <a:rPr lang="en-US" dirty="0" smtClean="0"/>
+              <a:t>)</a:t>
             </a:r>
             <a:endParaRPr lang="en-US" dirty="0"/>
           </a:p>
@@ -13361,7 +13574,7 @@
 </p:sld>
 </file>
 
-<file path=ppt/slides/slide51.xml><?xml version="1.0" encoding="utf-8"?>
+<file path=ppt/slides/slide5.xml><?xml version="1.0" encoding="utf-8"?>
 <p:sld xmlns:a="http://schemas.openxmlformats.org/drawingml/2006/main" xmlns:r="http://schemas.openxmlformats.org/officeDocument/2006/relationships" xmlns:p="http://schemas.openxmlformats.org/presentationml/2006/main">
   <p:cSld>
     <p:bg>
@@ -13424,6 +13637,129 @@
         </p:nvSpPr>
         <p:spPr>
           <a:xfrm>
+            <a:off x="117763" y="0"/>
+            <a:ext cx="5049855" cy="1325563"/>
+          </a:xfrm>
+        </p:spPr>
+        <p:txBody>
+          <a:bodyPr/>
+          <a:lstStyle/>
+          <a:p>
+            <a:r>
+              <a:rPr lang="en-US" dirty="0" smtClean="0"/>
+              <a:t>Content Middleware</a:t>
+            </a:r>
+            <a:endParaRPr lang="en-US" dirty="0"/>
+          </a:p>
+        </p:txBody>
+      </p:sp>
+      <p:pic>
+        <p:nvPicPr>
+          <p:cNvPr id="6" name="Picture 5"/>
+          <p:cNvPicPr>
+            <a:picLocks noChangeAspect="1"/>
+          </p:cNvPicPr>
+          <p:nvPr/>
+        </p:nvPicPr>
+        <p:blipFill>
+          <a:blip r:embed="rId2"/>
+          <a:stretch>
+            <a:fillRect/>
+          </a:stretch>
+        </p:blipFill>
+        <p:spPr>
+          <a:xfrm>
+            <a:off x="1243991" y="1466227"/>
+            <a:ext cx="9686925" cy="4933950"/>
+          </a:xfrm>
+          <a:prstGeom prst="rect">
+            <a:avLst/>
+          </a:prstGeom>
+        </p:spPr>
+      </p:pic>
+    </p:spTree>
+    <p:extLst>
+      <p:ext uri="{BB962C8B-B14F-4D97-AF65-F5344CB8AC3E}">
+        <p14:creationId xmlns:p14="http://schemas.microsoft.com/office/powerpoint/2010/main" val="616726611"/>
+      </p:ext>
+    </p:extLst>
+  </p:cSld>
+  <p:clrMapOvr>
+    <a:masterClrMapping/>
+  </p:clrMapOvr>
+  <p:timing>
+    <p:tnLst>
+      <p:par>
+        <p:cTn id="1" dur="indefinite" restart="never" nodeType="tmRoot"/>
+      </p:par>
+    </p:tnLst>
+  </p:timing>
+</p:sld>
+</file>
+
+<file path=ppt/slides/slide50.xml><?xml version="1.0" encoding="utf-8"?>
+<p:sld xmlns:a="http://schemas.openxmlformats.org/drawingml/2006/main" xmlns:r="http://schemas.openxmlformats.org/officeDocument/2006/relationships" xmlns:p="http://schemas.openxmlformats.org/presentationml/2006/main">
+  <p:cSld>
+    <p:bg>
+      <p:bgPr>
+        <a:gradFill>
+          <a:gsLst>
+            <a:gs pos="0">
+              <a:schemeClr val="accent1">
+                <a:lumMod val="5000"/>
+                <a:lumOff val="95000"/>
+              </a:schemeClr>
+            </a:gs>
+            <a:gs pos="42000">
+              <a:schemeClr val="accent1">
+                <a:lumMod val="45000"/>
+                <a:lumOff val="55000"/>
+              </a:schemeClr>
+            </a:gs>
+            <a:gs pos="83000">
+              <a:schemeClr val="accent1">
+                <a:lumMod val="45000"/>
+                <a:lumOff val="55000"/>
+              </a:schemeClr>
+            </a:gs>
+            <a:gs pos="100000">
+              <a:schemeClr val="accent1">
+                <a:lumMod val="30000"/>
+                <a:lumOff val="70000"/>
+              </a:schemeClr>
+            </a:gs>
+          </a:gsLst>
+          <a:lin ang="5400000" scaled="1"/>
+        </a:gradFill>
+        <a:effectLst/>
+      </p:bgPr>
+    </p:bg>
+    <p:spTree>
+      <p:nvGrpSpPr>
+        <p:cNvPr id="1" name=""/>
+        <p:cNvGrpSpPr/>
+        <p:nvPr/>
+      </p:nvGrpSpPr>
+      <p:grpSpPr>
+        <a:xfrm>
+          <a:off x="0" y="0"/>
+          <a:ext cx="0" cy="0"/>
+          <a:chOff x="0" y="0"/>
+          <a:chExt cx="0" cy="0"/>
+        </a:xfrm>
+      </p:grpSpPr>
+      <p:sp>
+        <p:nvSpPr>
+          <p:cNvPr id="2" name="Title 1"/>
+          <p:cNvSpPr>
+            <a:spLocks noGrp="1"/>
+          </p:cNvSpPr>
+          <p:nvPr>
+            <p:ph type="title"/>
+          </p:nvPr>
+        </p:nvSpPr>
+        <p:spPr>
+          <a:xfrm>
             <a:off x="312821" y="-164575"/>
             <a:ext cx="10515600" cy="1325563"/>
           </a:xfrm>
@@ -13434,7 +13770,11 @@
           <a:p>
             <a:r>
               <a:rPr lang="en-US" dirty="0" smtClean="0"/>
-              <a:t>Type filter attribute</a:t>
+              <a:t>Type filter </a:t>
+            </a:r>
+            <a:r>
+              <a:rPr lang="en-US" dirty="0" smtClean="0"/>
+              <a:t>attribute (Startup)</a:t>
             </a:r>
             <a:endParaRPr lang="en-US" dirty="0"/>
           </a:p>
@@ -13484,7 +13824,7 @@
 </p:sld>
 </file>
 
-<file path=ppt/slides/slide52.xml><?xml version="1.0" encoding="utf-8"?>
+<file path=ppt/slides/slide51.xml><?xml version="1.0" encoding="utf-8"?>
 <p:sld xmlns:a="http://schemas.openxmlformats.org/drawingml/2006/main" xmlns:r="http://schemas.openxmlformats.org/officeDocument/2006/relationships" xmlns:p="http://schemas.openxmlformats.org/presentationml/2006/main">
   <p:cSld>
     <p:bg>
@@ -13557,12 +13897,48 @@
           <a:p>
             <a:r>
               <a:rPr lang="en-US" dirty="0" smtClean="0"/>
-              <a:t>Type filter attribute</a:t>
+              <a:t>Type filter </a:t>
+            </a:r>
+            <a:r>
+              <a:rPr lang="en-US" dirty="0" smtClean="0"/>
+              <a:t>attribute (</a:t>
+            </a:r>
+            <a:r>
+              <a:rPr lang="en-US" dirty="0" err="1" smtClean="0"/>
+              <a:t>TimeFilter</a:t>
+            </a:r>
+            <a:r>
+              <a:rPr lang="en-US" dirty="0" smtClean="0"/>
+              <a:t>)</a:t>
             </a:r>
             <a:endParaRPr lang="en-US" dirty="0"/>
           </a:p>
         </p:txBody>
       </p:sp>
+      <p:pic>
+        <p:nvPicPr>
+          <p:cNvPr id="3" name="Picture 2"/>
+          <p:cNvPicPr>
+            <a:picLocks noChangeAspect="1"/>
+          </p:cNvPicPr>
+          <p:nvPr/>
+        </p:nvPicPr>
+        <p:blipFill>
+          <a:blip r:embed="rId3"/>
+          <a:stretch>
+            <a:fillRect/>
+          </a:stretch>
+        </p:blipFill>
+        <p:spPr>
+          <a:xfrm>
+            <a:off x="558678" y="862012"/>
+            <a:ext cx="10518089" cy="5632573"/>
+          </a:xfrm>
+          <a:prstGeom prst="rect">
+            <a:avLst/>
+          </a:prstGeom>
+        </p:spPr>
+      </p:pic>
     </p:spTree>
     <p:extLst>
       <p:ext uri="{BB962C8B-B14F-4D97-AF65-F5344CB8AC3E}">
@@ -13583,7 +13959,7 @@
 </p:sld>
 </file>
 
-<file path=ppt/slides/slide6.xml><?xml version="1.0" encoding="utf-8"?>
+<file path=ppt/slides/slide52.xml><?xml version="1.0" encoding="utf-8"?>
 <p:sld xmlns:a="http://schemas.openxmlformats.org/drawingml/2006/main" xmlns:r="http://schemas.openxmlformats.org/officeDocument/2006/relationships" xmlns:p="http://schemas.openxmlformats.org/presentationml/2006/main">
   <p:cSld>
     <p:bg>
@@ -13646,8 +14022,8 @@
         </p:nvSpPr>
         <p:spPr>
           <a:xfrm>
-            <a:off x="117763" y="0"/>
-            <a:ext cx="5049855" cy="1325563"/>
+            <a:off x="312821" y="-164575"/>
+            <a:ext cx="10515600" cy="1325563"/>
           </a:xfrm>
         </p:spPr>
         <p:txBody>
@@ -13656,7 +14032,19 @@
           <a:p>
             <a:r>
               <a:rPr lang="en-US" dirty="0" smtClean="0"/>
-              <a:t>Content Middleware</a:t>
+              <a:t>Type filter </a:t>
+            </a:r>
+            <a:r>
+              <a:rPr lang="en-US" dirty="0" smtClean="0"/>
+              <a:t>attribute (</a:t>
+            </a:r>
+            <a:r>
+              <a:rPr lang="en-US" dirty="0" err="1" smtClean="0"/>
+              <a:t>TimeFilter</a:t>
+            </a:r>
+            <a:r>
+              <a:rPr lang="en-US" dirty="0" smtClean="0"/>
+              <a:t>)</a:t>
             </a:r>
             <a:endParaRPr lang="en-US" dirty="0"/>
           </a:p>
@@ -13664,22 +14052,22 @@
       </p:sp>
       <p:pic>
         <p:nvPicPr>
-          <p:cNvPr id="6" name="Picture 5"/>
+          <p:cNvPr id="4" name="Picture 3"/>
           <p:cNvPicPr>
             <a:picLocks noChangeAspect="1"/>
           </p:cNvPicPr>
           <p:nvPr/>
         </p:nvPicPr>
         <p:blipFill>
-          <a:blip r:embed="rId2"/>
+          <a:blip r:embed="rId3"/>
           <a:stretch>
             <a:fillRect/>
           </a:stretch>
         </p:blipFill>
         <p:spPr>
           <a:xfrm>
-            <a:off x="1243991" y="1466227"/>
-            <a:ext cx="9686925" cy="4933950"/>
+            <a:off x="263062" y="2019666"/>
+            <a:ext cx="10615118" cy="3138488"/>
           </a:xfrm>
           <a:prstGeom prst="rect">
             <a:avLst/>
@@ -13689,7 +14077,7 @@
     </p:spTree>
     <p:extLst>
       <p:ext uri="{BB962C8B-B14F-4D97-AF65-F5344CB8AC3E}">
-        <p14:creationId xmlns:p14="http://schemas.microsoft.com/office/powerpoint/2010/main" val="616726611"/>
+        <p14:creationId xmlns:p14="http://schemas.microsoft.com/office/powerpoint/2010/main" val="3477781844"/>
       </p:ext>
     </p:extLst>
   </p:cSld>
@@ -13706,7 +14094,539 @@
 </p:sld>
 </file>
 
-<file path=ppt/slides/slide7.xml><?xml version="1.0" encoding="utf-8"?>
+<file path=ppt/slides/slide53.xml><?xml version="1.0" encoding="utf-8"?>
+<p:sld xmlns:a="http://schemas.openxmlformats.org/drawingml/2006/main" xmlns:r="http://schemas.openxmlformats.org/officeDocument/2006/relationships" xmlns:p="http://schemas.openxmlformats.org/presentationml/2006/main">
+  <p:cSld>
+    <p:bg>
+      <p:bgPr>
+        <a:gradFill>
+          <a:gsLst>
+            <a:gs pos="0">
+              <a:schemeClr val="accent1">
+                <a:lumMod val="5000"/>
+                <a:lumOff val="95000"/>
+              </a:schemeClr>
+            </a:gs>
+            <a:gs pos="42000">
+              <a:schemeClr val="accent1">
+                <a:lumMod val="45000"/>
+                <a:lumOff val="55000"/>
+              </a:schemeClr>
+            </a:gs>
+            <a:gs pos="83000">
+              <a:schemeClr val="accent1">
+                <a:lumMod val="45000"/>
+                <a:lumOff val="55000"/>
+              </a:schemeClr>
+            </a:gs>
+            <a:gs pos="100000">
+              <a:schemeClr val="accent1">
+                <a:lumMod val="30000"/>
+                <a:lumOff val="70000"/>
+              </a:schemeClr>
+            </a:gs>
+          </a:gsLst>
+          <a:lin ang="5400000" scaled="1"/>
+        </a:gradFill>
+        <a:effectLst/>
+      </p:bgPr>
+    </p:bg>
+    <p:spTree>
+      <p:nvGrpSpPr>
+        <p:cNvPr id="1" name=""/>
+        <p:cNvGrpSpPr/>
+        <p:nvPr/>
+      </p:nvGrpSpPr>
+      <p:grpSpPr>
+        <a:xfrm>
+          <a:off x="0" y="0"/>
+          <a:ext cx="0" cy="0"/>
+          <a:chOff x="0" y="0"/>
+          <a:chExt cx="0" cy="0"/>
+        </a:xfrm>
+      </p:grpSpPr>
+      <p:sp>
+        <p:nvSpPr>
+          <p:cNvPr id="2" name="Title 1"/>
+          <p:cNvSpPr>
+            <a:spLocks noGrp="1"/>
+          </p:cNvSpPr>
+          <p:nvPr>
+            <p:ph type="title"/>
+          </p:nvPr>
+        </p:nvSpPr>
+        <p:spPr>
+          <a:xfrm>
+            <a:off x="312821" y="-164575"/>
+            <a:ext cx="10515600" cy="1325563"/>
+          </a:xfrm>
+        </p:spPr>
+        <p:txBody>
+          <a:bodyPr/>
+          <a:lstStyle/>
+          <a:p>
+            <a:r>
+              <a:rPr lang="en-US" dirty="0" smtClean="0"/>
+              <a:t>Type filter </a:t>
+            </a:r>
+            <a:r>
+              <a:rPr lang="en-US" dirty="0" smtClean="0"/>
+              <a:t>attribute (</a:t>
+            </a:r>
+            <a:r>
+              <a:rPr lang="en-US" dirty="0" err="1" smtClean="0"/>
+              <a:t>DiagnosticsFilter</a:t>
+            </a:r>
+            <a:r>
+              <a:rPr lang="en-US" dirty="0" smtClean="0"/>
+              <a:t>)</a:t>
+            </a:r>
+            <a:endParaRPr lang="en-US" dirty="0"/>
+          </a:p>
+        </p:txBody>
+      </p:sp>
+      <p:pic>
+        <p:nvPicPr>
+          <p:cNvPr id="5" name="Picture 4"/>
+          <p:cNvPicPr>
+            <a:picLocks noChangeAspect="1"/>
+          </p:cNvPicPr>
+          <p:nvPr/>
+        </p:nvPicPr>
+        <p:blipFill>
+          <a:blip r:embed="rId3"/>
+          <a:stretch>
+            <a:fillRect/>
+          </a:stretch>
+        </p:blipFill>
+        <p:spPr>
+          <a:xfrm>
+            <a:off x="1182565" y="1629911"/>
+            <a:ext cx="9734959" cy="3797874"/>
+          </a:xfrm>
+          <a:prstGeom prst="rect">
+            <a:avLst/>
+          </a:prstGeom>
+        </p:spPr>
+      </p:pic>
+    </p:spTree>
+    <p:extLst>
+      <p:ext uri="{BB962C8B-B14F-4D97-AF65-F5344CB8AC3E}">
+        <p14:creationId xmlns:p14="http://schemas.microsoft.com/office/powerpoint/2010/main" val="4002499722"/>
+      </p:ext>
+    </p:extLst>
+  </p:cSld>
+  <p:clrMapOvr>
+    <a:masterClrMapping/>
+  </p:clrMapOvr>
+  <p:timing>
+    <p:tnLst>
+      <p:par>
+        <p:cTn id="1" dur="indefinite" restart="never" nodeType="tmRoot"/>
+      </p:par>
+    </p:tnLst>
+  </p:timing>
+</p:sld>
+</file>
+
+<file path=ppt/slides/slide54.xml><?xml version="1.0" encoding="utf-8"?>
+<p:sld xmlns:a="http://schemas.openxmlformats.org/drawingml/2006/main" xmlns:r="http://schemas.openxmlformats.org/officeDocument/2006/relationships" xmlns:p="http://schemas.openxmlformats.org/presentationml/2006/main">
+  <p:cSld>
+    <p:bg>
+      <p:bgPr>
+        <a:gradFill>
+          <a:gsLst>
+            <a:gs pos="0">
+              <a:schemeClr val="accent1">
+                <a:lumMod val="5000"/>
+                <a:lumOff val="95000"/>
+              </a:schemeClr>
+            </a:gs>
+            <a:gs pos="42000">
+              <a:schemeClr val="accent1">
+                <a:lumMod val="45000"/>
+                <a:lumOff val="55000"/>
+              </a:schemeClr>
+            </a:gs>
+            <a:gs pos="83000">
+              <a:schemeClr val="accent1">
+                <a:lumMod val="45000"/>
+                <a:lumOff val="55000"/>
+              </a:schemeClr>
+            </a:gs>
+            <a:gs pos="100000">
+              <a:schemeClr val="accent1">
+                <a:lumMod val="30000"/>
+                <a:lumOff val="70000"/>
+              </a:schemeClr>
+            </a:gs>
+          </a:gsLst>
+          <a:lin ang="5400000" scaled="1"/>
+        </a:gradFill>
+        <a:effectLst/>
+      </p:bgPr>
+    </p:bg>
+    <p:spTree>
+      <p:nvGrpSpPr>
+        <p:cNvPr id="1" name=""/>
+        <p:cNvGrpSpPr/>
+        <p:nvPr/>
+      </p:nvGrpSpPr>
+      <p:grpSpPr>
+        <a:xfrm>
+          <a:off x="0" y="0"/>
+          <a:ext cx="0" cy="0"/>
+          <a:chOff x="0" y="0"/>
+          <a:chExt cx="0" cy="0"/>
+        </a:xfrm>
+      </p:grpSpPr>
+      <p:sp>
+        <p:nvSpPr>
+          <p:cNvPr id="2" name="Title 1"/>
+          <p:cNvSpPr>
+            <a:spLocks noGrp="1"/>
+          </p:cNvSpPr>
+          <p:nvPr>
+            <p:ph type="title"/>
+          </p:nvPr>
+        </p:nvSpPr>
+        <p:spPr>
+          <a:xfrm>
+            <a:off x="312821" y="-164575"/>
+            <a:ext cx="10515600" cy="1325563"/>
+          </a:xfrm>
+        </p:spPr>
+        <p:txBody>
+          <a:bodyPr/>
+          <a:lstStyle/>
+          <a:p>
+            <a:r>
+              <a:rPr lang="en-US" dirty="0" smtClean="0"/>
+              <a:t>Type filter </a:t>
+            </a:r>
+            <a:r>
+              <a:rPr lang="en-US" dirty="0" smtClean="0"/>
+              <a:t>attribute (</a:t>
+            </a:r>
+            <a:r>
+              <a:rPr lang="en-US" dirty="0" err="1" smtClean="0"/>
+              <a:t>DiagnosticsFilter</a:t>
+            </a:r>
+            <a:r>
+              <a:rPr lang="en-US" dirty="0" smtClean="0"/>
+              <a:t>)</a:t>
+            </a:r>
+            <a:endParaRPr lang="en-US" dirty="0"/>
+          </a:p>
+        </p:txBody>
+      </p:sp>
+      <p:pic>
+        <p:nvPicPr>
+          <p:cNvPr id="4" name="Picture 3"/>
+          <p:cNvPicPr>
+            <a:picLocks noChangeAspect="1"/>
+          </p:cNvPicPr>
+          <p:nvPr/>
+        </p:nvPicPr>
+        <p:blipFill>
+          <a:blip r:embed="rId3"/>
+          <a:stretch>
+            <a:fillRect/>
+          </a:stretch>
+        </p:blipFill>
+        <p:spPr>
+          <a:xfrm>
+            <a:off x="453496" y="974481"/>
+            <a:ext cx="11267633" cy="5461488"/>
+          </a:xfrm>
+          <a:prstGeom prst="rect">
+            <a:avLst/>
+          </a:prstGeom>
+        </p:spPr>
+      </p:pic>
+    </p:spTree>
+    <p:extLst>
+      <p:ext uri="{BB962C8B-B14F-4D97-AF65-F5344CB8AC3E}">
+        <p14:creationId xmlns:p14="http://schemas.microsoft.com/office/powerpoint/2010/main" val="2352362642"/>
+      </p:ext>
+    </p:extLst>
+  </p:cSld>
+  <p:clrMapOvr>
+    <a:masterClrMapping/>
+  </p:clrMapOvr>
+  <p:timing>
+    <p:tnLst>
+      <p:par>
+        <p:cTn id="1" dur="indefinite" restart="never" nodeType="tmRoot"/>
+      </p:par>
+    </p:tnLst>
+  </p:timing>
+</p:sld>
+</file>
+
+<file path=ppt/slides/slide55.xml><?xml version="1.0" encoding="utf-8"?>
+<p:sld xmlns:a="http://schemas.openxmlformats.org/drawingml/2006/main" xmlns:r="http://schemas.openxmlformats.org/officeDocument/2006/relationships" xmlns:p="http://schemas.openxmlformats.org/presentationml/2006/main">
+  <p:cSld>
+    <p:bg>
+      <p:bgPr>
+        <a:gradFill>
+          <a:gsLst>
+            <a:gs pos="0">
+              <a:schemeClr val="accent1">
+                <a:lumMod val="5000"/>
+                <a:lumOff val="95000"/>
+              </a:schemeClr>
+            </a:gs>
+            <a:gs pos="42000">
+              <a:schemeClr val="accent1">
+                <a:lumMod val="45000"/>
+                <a:lumOff val="55000"/>
+              </a:schemeClr>
+            </a:gs>
+            <a:gs pos="83000">
+              <a:schemeClr val="accent1">
+                <a:lumMod val="45000"/>
+                <a:lumOff val="55000"/>
+              </a:schemeClr>
+            </a:gs>
+            <a:gs pos="100000">
+              <a:schemeClr val="accent1">
+                <a:lumMod val="30000"/>
+                <a:lumOff val="70000"/>
+              </a:schemeClr>
+            </a:gs>
+          </a:gsLst>
+          <a:lin ang="5400000" scaled="1"/>
+        </a:gradFill>
+        <a:effectLst/>
+      </p:bgPr>
+    </p:bg>
+    <p:spTree>
+      <p:nvGrpSpPr>
+        <p:cNvPr id="1" name=""/>
+        <p:cNvGrpSpPr/>
+        <p:nvPr/>
+      </p:nvGrpSpPr>
+      <p:grpSpPr>
+        <a:xfrm>
+          <a:off x="0" y="0"/>
+          <a:ext cx="0" cy="0"/>
+          <a:chOff x="0" y="0"/>
+          <a:chExt cx="0" cy="0"/>
+        </a:xfrm>
+      </p:grpSpPr>
+      <p:sp>
+        <p:nvSpPr>
+          <p:cNvPr id="2" name="Title 1"/>
+          <p:cNvSpPr>
+            <a:spLocks noGrp="1"/>
+          </p:cNvSpPr>
+          <p:nvPr>
+            <p:ph type="title"/>
+          </p:nvPr>
+        </p:nvSpPr>
+        <p:spPr>
+          <a:xfrm>
+            <a:off x="312821" y="-164575"/>
+            <a:ext cx="10515600" cy="1325563"/>
+          </a:xfrm>
+        </p:spPr>
+        <p:txBody>
+          <a:bodyPr/>
+          <a:lstStyle/>
+          <a:p>
+            <a:r>
+              <a:rPr lang="en-US" dirty="0" smtClean="0"/>
+              <a:t>Type filter </a:t>
+            </a:r>
+            <a:r>
+              <a:rPr lang="en-US" dirty="0" smtClean="0"/>
+              <a:t>attribute (</a:t>
+            </a:r>
+            <a:r>
+              <a:rPr lang="en-US" dirty="0" err="1" smtClean="0"/>
+              <a:t>HomeController</a:t>
+            </a:r>
+            <a:r>
+              <a:rPr lang="en-US" dirty="0" smtClean="0"/>
+              <a:t>)</a:t>
+            </a:r>
+            <a:endParaRPr lang="en-US" dirty="0"/>
+          </a:p>
+        </p:txBody>
+      </p:sp>
+      <p:pic>
+        <p:nvPicPr>
+          <p:cNvPr id="5" name="Picture 4"/>
+          <p:cNvPicPr>
+            <a:picLocks noChangeAspect="1"/>
+          </p:cNvPicPr>
+          <p:nvPr/>
+        </p:nvPicPr>
+        <p:blipFill>
+          <a:blip r:embed="rId3"/>
+          <a:stretch>
+            <a:fillRect/>
+          </a:stretch>
+        </p:blipFill>
+        <p:spPr>
+          <a:xfrm>
+            <a:off x="901211" y="1032034"/>
+            <a:ext cx="10517066" cy="5395316"/>
+          </a:xfrm>
+          <a:prstGeom prst="rect">
+            <a:avLst/>
+          </a:prstGeom>
+        </p:spPr>
+      </p:pic>
+    </p:spTree>
+    <p:extLst>
+      <p:ext uri="{BB962C8B-B14F-4D97-AF65-F5344CB8AC3E}">
+        <p14:creationId xmlns:p14="http://schemas.microsoft.com/office/powerpoint/2010/main" val="4115995359"/>
+      </p:ext>
+    </p:extLst>
+  </p:cSld>
+  <p:clrMapOvr>
+    <a:masterClrMapping/>
+  </p:clrMapOvr>
+  <p:timing>
+    <p:tnLst>
+      <p:par>
+        <p:cTn id="1" dur="indefinite" restart="never" nodeType="tmRoot"/>
+      </p:par>
+    </p:tnLst>
+  </p:timing>
+</p:sld>
+</file>
+
+<file path=ppt/slides/slide56.xml><?xml version="1.0" encoding="utf-8"?>
+<p:sld xmlns:a="http://schemas.openxmlformats.org/drawingml/2006/main" xmlns:r="http://schemas.openxmlformats.org/officeDocument/2006/relationships" xmlns:p="http://schemas.openxmlformats.org/presentationml/2006/main">
+  <p:cSld>
+    <p:bg>
+      <p:bgPr>
+        <a:gradFill>
+          <a:gsLst>
+            <a:gs pos="0">
+              <a:schemeClr val="accent1">
+                <a:lumMod val="5000"/>
+                <a:lumOff val="95000"/>
+              </a:schemeClr>
+            </a:gs>
+            <a:gs pos="42000">
+              <a:schemeClr val="accent1">
+                <a:lumMod val="45000"/>
+                <a:lumOff val="55000"/>
+              </a:schemeClr>
+            </a:gs>
+            <a:gs pos="83000">
+              <a:schemeClr val="accent1">
+                <a:lumMod val="45000"/>
+                <a:lumOff val="55000"/>
+              </a:schemeClr>
+            </a:gs>
+            <a:gs pos="100000">
+              <a:schemeClr val="accent1">
+                <a:lumMod val="30000"/>
+                <a:lumOff val="70000"/>
+              </a:schemeClr>
+            </a:gs>
+          </a:gsLst>
+          <a:lin ang="5400000" scaled="1"/>
+        </a:gradFill>
+        <a:effectLst/>
+      </p:bgPr>
+    </p:bg>
+    <p:spTree>
+      <p:nvGrpSpPr>
+        <p:cNvPr id="1" name=""/>
+        <p:cNvGrpSpPr/>
+        <p:nvPr/>
+      </p:nvGrpSpPr>
+      <p:grpSpPr>
+        <a:xfrm>
+          <a:off x="0" y="0"/>
+          <a:ext cx="0" cy="0"/>
+          <a:chOff x="0" y="0"/>
+          <a:chExt cx="0" cy="0"/>
+        </a:xfrm>
+      </p:grpSpPr>
+      <p:sp>
+        <p:nvSpPr>
+          <p:cNvPr id="2" name="Title 1"/>
+          <p:cNvSpPr>
+            <a:spLocks noGrp="1"/>
+          </p:cNvSpPr>
+          <p:nvPr>
+            <p:ph type="title"/>
+          </p:nvPr>
+        </p:nvSpPr>
+        <p:spPr>
+          <a:xfrm>
+            <a:off x="312821" y="-164575"/>
+            <a:ext cx="10515600" cy="1325563"/>
+          </a:xfrm>
+        </p:spPr>
+        <p:txBody>
+          <a:bodyPr/>
+          <a:lstStyle/>
+          <a:p>
+            <a:r>
+              <a:rPr lang="en-US" dirty="0" smtClean="0"/>
+              <a:t>Type filter </a:t>
+            </a:r>
+            <a:r>
+              <a:rPr lang="en-US" dirty="0" smtClean="0"/>
+              <a:t>attribute (Demo)</a:t>
+            </a:r>
+            <a:endParaRPr lang="en-US" dirty="0"/>
+          </a:p>
+        </p:txBody>
+      </p:sp>
+      <p:pic>
+        <p:nvPicPr>
+          <p:cNvPr id="3" name="Picture 2"/>
+          <p:cNvPicPr>
+            <a:picLocks noChangeAspect="1"/>
+          </p:cNvPicPr>
+          <p:nvPr/>
+        </p:nvPicPr>
+        <p:blipFill>
+          <a:blip r:embed="rId3"/>
+          <a:stretch>
+            <a:fillRect/>
+          </a:stretch>
+        </p:blipFill>
+        <p:spPr>
+          <a:xfrm>
+            <a:off x="1593238" y="1427285"/>
+            <a:ext cx="8465161" cy="4582644"/>
+          </a:xfrm>
+          <a:prstGeom prst="rect">
+            <a:avLst/>
+          </a:prstGeom>
+        </p:spPr>
+      </p:pic>
+    </p:spTree>
+    <p:extLst>
+      <p:ext uri="{BB962C8B-B14F-4D97-AF65-F5344CB8AC3E}">
+        <p14:creationId xmlns:p14="http://schemas.microsoft.com/office/powerpoint/2010/main" val="1697960569"/>
+      </p:ext>
+    </p:extLst>
+  </p:cSld>
+  <p:clrMapOvr>
+    <a:masterClrMapping/>
+  </p:clrMapOvr>
+  <p:timing>
+    <p:tnLst>
+      <p:par>
+        <p:cTn id="1" dur="indefinite" restart="never" nodeType="tmRoot"/>
+      </p:par>
+    </p:tnLst>
+  </p:timing>
+</p:sld>
+</file>
+
+<file path=ppt/slides/slide6.xml><?xml version="1.0" encoding="utf-8"?>
 <p:sld xmlns:a="http://schemas.openxmlformats.org/drawingml/2006/main" xmlns:r="http://schemas.openxmlformats.org/officeDocument/2006/relationships" xmlns:p="http://schemas.openxmlformats.org/presentationml/2006/main">
   <p:cSld>
     <p:bg>
@@ -13829,7 +14749,7 @@
 </p:sld>
 </file>
 
-<file path=ppt/slides/slide8.xml><?xml version="1.0" encoding="utf-8"?>
+<file path=ppt/slides/slide7.xml><?xml version="1.0" encoding="utf-8"?>
 <p:sld xmlns:a="http://schemas.openxmlformats.org/drawingml/2006/main" xmlns:r="http://schemas.openxmlformats.org/officeDocument/2006/relationships" xmlns:p="http://schemas.openxmlformats.org/presentationml/2006/main">
   <p:cSld>
     <p:bg>
@@ -13952,7 +14872,7 @@
 </p:sld>
 </file>
 
-<file path=ppt/slides/slide9.xml><?xml version="1.0" encoding="utf-8"?>
+<file path=ppt/slides/slide8.xml><?xml version="1.0" encoding="utf-8"?>
 <p:sld xmlns:a="http://schemas.openxmlformats.org/drawingml/2006/main" xmlns:r="http://schemas.openxmlformats.org/officeDocument/2006/relationships" xmlns:p="http://schemas.openxmlformats.org/presentationml/2006/main">
   <p:cSld>
     <p:bg>
@@ -14054,6 +14974,124 @@
     <p:extLst>
       <p:ext uri="{BB962C8B-B14F-4D97-AF65-F5344CB8AC3E}">
         <p14:creationId xmlns:p14="http://schemas.microsoft.com/office/powerpoint/2010/main" val="1334250059"/>
+      </p:ext>
+    </p:extLst>
+  </p:cSld>
+  <p:clrMapOvr>
+    <a:masterClrMapping/>
+  </p:clrMapOvr>
+  <p:timing>
+    <p:tnLst>
+      <p:par>
+        <p:cTn id="1" dur="indefinite" restart="never" nodeType="tmRoot"/>
+      </p:par>
+    </p:tnLst>
+  </p:timing>
+</p:sld>
+</file>
+
+<file path=ppt/slides/slide9.xml><?xml version="1.0" encoding="utf-8"?>
+<p:sld xmlns:a="http://schemas.openxmlformats.org/drawingml/2006/main" xmlns:r="http://schemas.openxmlformats.org/officeDocument/2006/relationships" xmlns:p="http://schemas.openxmlformats.org/presentationml/2006/main">
+  <p:cSld>
+    <p:bg>
+      <p:bgPr>
+        <a:gradFill>
+          <a:gsLst>
+            <a:gs pos="0">
+              <a:schemeClr val="accent1">
+                <a:lumMod val="5000"/>
+                <a:lumOff val="95000"/>
+              </a:schemeClr>
+            </a:gs>
+            <a:gs pos="42000">
+              <a:schemeClr val="accent1">
+                <a:lumMod val="45000"/>
+                <a:lumOff val="55000"/>
+              </a:schemeClr>
+            </a:gs>
+            <a:gs pos="83000">
+              <a:schemeClr val="accent1">
+                <a:lumMod val="45000"/>
+                <a:lumOff val="55000"/>
+              </a:schemeClr>
+            </a:gs>
+            <a:gs pos="100000">
+              <a:schemeClr val="accent1">
+                <a:lumMod val="30000"/>
+                <a:lumOff val="70000"/>
+              </a:schemeClr>
+            </a:gs>
+          </a:gsLst>
+          <a:lin ang="5400000" scaled="1"/>
+        </a:gradFill>
+        <a:effectLst/>
+      </p:bgPr>
+    </p:bg>
+    <p:spTree>
+      <p:nvGrpSpPr>
+        <p:cNvPr id="1" name=""/>
+        <p:cNvGrpSpPr/>
+        <p:nvPr/>
+      </p:nvGrpSpPr>
+      <p:grpSpPr>
+        <a:xfrm>
+          <a:off x="0" y="0"/>
+          <a:ext cx="0" cy="0"/>
+          <a:chOff x="0" y="0"/>
+          <a:chExt cx="0" cy="0"/>
+        </a:xfrm>
+      </p:grpSpPr>
+      <p:sp>
+        <p:nvSpPr>
+          <p:cNvPr id="2" name="Title 1"/>
+          <p:cNvSpPr>
+            <a:spLocks noGrp="1"/>
+          </p:cNvSpPr>
+          <p:nvPr>
+            <p:ph type="title"/>
+          </p:nvPr>
+        </p:nvSpPr>
+        <p:spPr/>
+        <p:txBody>
+          <a:bodyPr/>
+          <a:lstStyle/>
+          <a:p>
+            <a:r>
+              <a:rPr lang="en-US" dirty="0" smtClean="0"/>
+              <a:t>Short-Circuiting Middleware</a:t>
+            </a:r>
+            <a:endParaRPr lang="en-US" dirty="0"/>
+          </a:p>
+        </p:txBody>
+      </p:sp>
+      <p:pic>
+        <p:nvPicPr>
+          <p:cNvPr id="4" name="Picture 3"/>
+          <p:cNvPicPr>
+            <a:picLocks noChangeAspect="1"/>
+          </p:cNvPicPr>
+          <p:nvPr/>
+        </p:nvPicPr>
+        <p:blipFill>
+          <a:blip r:embed="rId2"/>
+          <a:stretch>
+            <a:fillRect/>
+          </a:stretch>
+        </p:blipFill>
+        <p:spPr>
+          <a:xfrm>
+            <a:off x="938868" y="1488477"/>
+            <a:ext cx="9069198" cy="5197839"/>
+          </a:xfrm>
+          <a:prstGeom prst="rect">
+            <a:avLst/>
+          </a:prstGeom>
+        </p:spPr>
+      </p:pic>
+    </p:spTree>
+    <p:extLst>
+      <p:ext uri="{BB962C8B-B14F-4D97-AF65-F5344CB8AC3E}">
+        <p14:creationId xmlns:p14="http://schemas.microsoft.com/office/powerpoint/2010/main" val="2167962615"/>
       </p:ext>
     </p:extLst>
   </p:cSld>

</xml_diff>